<commit_message>
Update Presentation, Add partial matrix
Add cluster-stuff folder, specifically for the purposes of adding 6zge-1.csv.
Also updated the presentation.
</commit_message>
<xml_diff>
--- a/Vas-Data/FinalPresentation.pptx
+++ b/Vas-Data/FinalPresentation.pptx
@@ -8,11 +8,12 @@
     <p:sldId id="256" r:id="rId2"/>
     <p:sldId id="272" r:id="rId3"/>
     <p:sldId id="273" r:id="rId4"/>
-    <p:sldId id="259" r:id="rId5"/>
-    <p:sldId id="257" r:id="rId6"/>
-    <p:sldId id="260" r:id="rId7"/>
-    <p:sldId id="258" r:id="rId8"/>
-    <p:sldId id="271" r:id="rId9"/>
+    <p:sldId id="274" r:id="rId5"/>
+    <p:sldId id="259" r:id="rId6"/>
+    <p:sldId id="257" r:id="rId7"/>
+    <p:sldId id="260" r:id="rId8"/>
+    <p:sldId id="258" r:id="rId9"/>
+    <p:sldId id="271" r:id="rId10"/>
   </p:sldIdLst>
   <p:sldSz cx="12192000" cy="6858000"/>
   <p:notesSz cx="6858000" cy="9144000"/>
@@ -111,6 +112,11 @@
       </a:defRPr>
     </a:lvl9pPr>
   </p:defaultTextStyle>
+  <p:extLst>
+    <p:ext uri="{EFAFB233-063F-42B5-8137-9DF3F51BA10A}">
+      <p15:sldGuideLst xmlns:p15="http://schemas.microsoft.com/office/powerpoint/2012/main"/>
+    </p:ext>
+  </p:extLst>
 </p:presentation>
 </file>
 
@@ -2591,7 +2597,7 @@
           <a:noFill/>
           <a:extLst>
             <a:ext uri="{909E8E84-426E-40dd-AFC4-6F175D3DCCD1}">
-              <a14:hiddenFill xmlns:a14="http://schemas.microsoft.com/office/drawing/2010/main" xmlns="">
+              <a14:hiddenFill xmlns="" xmlns:a14="http://schemas.microsoft.com/office/drawing/2010/main">
                 <a:solidFill>
                   <a:srgbClr val="FFFFFF"/>
                 </a:solidFill>
@@ -2650,7 +2656,7 @@
             </a:ln>
             <a:extLst>
               <a:ext uri="{91240B29-F687-4f45-9708-019B960494DF}">
-                <a14:hiddenLine xmlns:a14="http://schemas.microsoft.com/office/drawing/2010/main" xmlns="" w="9525">
+                <a14:hiddenLine xmlns="" xmlns:a14="http://schemas.microsoft.com/office/drawing/2010/main" w="9525">
                   <a:solidFill>
                     <a:srgbClr val="000000"/>
                   </a:solidFill>
@@ -2740,7 +2746,7 @@
             </a:ln>
             <a:extLst>
               <a:ext uri="{91240B29-F687-4f45-9708-019B960494DF}">
-                <a14:hiddenLine xmlns:a14="http://schemas.microsoft.com/office/drawing/2010/main" xmlns="" w="9525">
+                <a14:hiddenLine xmlns="" xmlns:a14="http://schemas.microsoft.com/office/drawing/2010/main" w="9525">
                   <a:solidFill>
                     <a:srgbClr val="000000"/>
                   </a:solidFill>
@@ -2830,7 +2836,7 @@
             </a:ln>
             <a:extLst>
               <a:ext uri="{91240B29-F687-4f45-9708-019B960494DF}">
-                <a14:hiddenLine xmlns:a14="http://schemas.microsoft.com/office/drawing/2010/main" xmlns="" w="9525">
+                <a14:hiddenLine xmlns="" xmlns:a14="http://schemas.microsoft.com/office/drawing/2010/main" w="9525">
                   <a:solidFill>
                     <a:srgbClr val="000000"/>
                   </a:solidFill>
@@ -2864,7 +2870,7 @@
             </a:ln>
             <a:extLst>
               <a:ext uri="{91240B29-F687-4f45-9708-019B960494DF}">
-                <a14:hiddenLine xmlns:a14="http://schemas.microsoft.com/office/drawing/2010/main" xmlns="" w="9525">
+                <a14:hiddenLine xmlns="" xmlns:a14="http://schemas.microsoft.com/office/drawing/2010/main" w="9525">
                   <a:solidFill>
                     <a:srgbClr val="000000"/>
                   </a:solidFill>
@@ -2954,7 +2960,7 @@
             </a:ln>
             <a:extLst>
               <a:ext uri="{91240B29-F687-4f45-9708-019B960494DF}">
-                <a14:hiddenLine xmlns:a14="http://schemas.microsoft.com/office/drawing/2010/main" xmlns="" w="9525">
+                <a14:hiddenLine xmlns="" xmlns:a14="http://schemas.microsoft.com/office/drawing/2010/main" w="9525">
                   <a:solidFill>
                     <a:srgbClr val="000000"/>
                   </a:solidFill>
@@ -3016,7 +3022,7 @@
             </a:ln>
             <a:extLst>
               <a:ext uri="{91240B29-F687-4f45-9708-019B960494DF}">
-                <a14:hiddenLine xmlns:a14="http://schemas.microsoft.com/office/drawing/2010/main" xmlns="" w="9525">
+                <a14:hiddenLine xmlns="" xmlns:a14="http://schemas.microsoft.com/office/drawing/2010/main" w="9525">
                   <a:solidFill>
                     <a:srgbClr val="000000"/>
                   </a:solidFill>
@@ -3078,7 +3084,7 @@
             </a:ln>
             <a:extLst>
               <a:ext uri="{91240B29-F687-4f45-9708-019B960494DF}">
-                <a14:hiddenLine xmlns:a14="http://schemas.microsoft.com/office/drawing/2010/main" xmlns="" w="9525">
+                <a14:hiddenLine xmlns="" xmlns:a14="http://schemas.microsoft.com/office/drawing/2010/main" w="9525">
                   <a:solidFill>
                     <a:srgbClr val="000000"/>
                   </a:solidFill>
@@ -3168,7 +3174,7 @@
             </a:ln>
             <a:extLst>
               <a:ext uri="{91240B29-F687-4f45-9708-019B960494DF}">
-                <a14:hiddenLine xmlns:a14="http://schemas.microsoft.com/office/drawing/2010/main" xmlns="" w="9525">
+                <a14:hiddenLine xmlns="" xmlns:a14="http://schemas.microsoft.com/office/drawing/2010/main" w="9525">
                   <a:solidFill>
                     <a:srgbClr val="000000"/>
                   </a:solidFill>
@@ -3230,7 +3236,7 @@
             </a:ln>
             <a:extLst>
               <a:ext uri="{91240B29-F687-4f45-9708-019B960494DF}">
-                <a14:hiddenLine xmlns:a14="http://schemas.microsoft.com/office/drawing/2010/main" xmlns="" w="9525">
+                <a14:hiddenLine xmlns="" xmlns:a14="http://schemas.microsoft.com/office/drawing/2010/main" w="9525">
                   <a:solidFill>
                     <a:srgbClr val="000000"/>
                   </a:solidFill>
@@ -3292,7 +3298,7 @@
             </a:ln>
             <a:extLst>
               <a:ext uri="{91240B29-F687-4f45-9708-019B960494DF}">
-                <a14:hiddenLine xmlns:a14="http://schemas.microsoft.com/office/drawing/2010/main" xmlns="" w="9525">
+                <a14:hiddenLine xmlns="" xmlns:a14="http://schemas.microsoft.com/office/drawing/2010/main" w="9525">
                   <a:solidFill>
                     <a:srgbClr val="000000"/>
                   </a:solidFill>
@@ -3382,7 +3388,7 @@
             </a:ln>
             <a:extLst>
               <a:ext uri="{91240B29-F687-4f45-9708-019B960494DF}">
-                <a14:hiddenLine xmlns:a14="http://schemas.microsoft.com/office/drawing/2010/main" xmlns="" w="9525">
+                <a14:hiddenLine xmlns="" xmlns:a14="http://schemas.microsoft.com/office/drawing/2010/main" w="9525">
                   <a:solidFill>
                     <a:srgbClr val="000000"/>
                   </a:solidFill>
@@ -3472,7 +3478,7 @@
             </a:ln>
             <a:extLst>
               <a:ext uri="{91240B29-F687-4f45-9708-019B960494DF}">
-                <a14:hiddenLine xmlns:a14="http://schemas.microsoft.com/office/drawing/2010/main" xmlns="" w="9525">
+                <a14:hiddenLine xmlns="" xmlns:a14="http://schemas.microsoft.com/office/drawing/2010/main" w="9525">
                   <a:solidFill>
                     <a:srgbClr val="000000"/>
                   </a:solidFill>
@@ -3534,7 +3540,7 @@
             </a:ln>
             <a:extLst>
               <a:ext uri="{91240B29-F687-4f45-9708-019B960494DF}">
-                <a14:hiddenLine xmlns:a14="http://schemas.microsoft.com/office/drawing/2010/main" xmlns="" w="9525">
+                <a14:hiddenLine xmlns="" xmlns:a14="http://schemas.microsoft.com/office/drawing/2010/main" w="9525">
                   <a:solidFill>
                     <a:srgbClr val="000000"/>
                   </a:solidFill>
@@ -3644,7 +3650,7 @@
             </a:ln>
             <a:extLst>
               <a:ext uri="{91240B29-F687-4f45-9708-019B960494DF}">
-                <a14:hiddenLine xmlns:a14="http://schemas.microsoft.com/office/drawing/2010/main" xmlns="" w="9525">
+                <a14:hiddenLine xmlns="" xmlns:a14="http://schemas.microsoft.com/office/drawing/2010/main" w="9525">
                   <a:solidFill>
                     <a:srgbClr val="000000"/>
                   </a:solidFill>
@@ -3706,7 +3712,7 @@
             </a:ln>
             <a:extLst>
               <a:ext uri="{91240B29-F687-4f45-9708-019B960494DF}">
-                <a14:hiddenLine xmlns:a14="http://schemas.microsoft.com/office/drawing/2010/main" xmlns="" w="9525">
+                <a14:hiddenLine xmlns="" xmlns:a14="http://schemas.microsoft.com/office/drawing/2010/main" w="9525">
                   <a:solidFill>
                     <a:srgbClr val="000000"/>
                   </a:solidFill>
@@ -3796,7 +3802,7 @@
             </a:ln>
             <a:extLst>
               <a:ext uri="{91240B29-F687-4f45-9708-019B960494DF}">
-                <a14:hiddenLine xmlns:a14="http://schemas.microsoft.com/office/drawing/2010/main" xmlns="" w="9525">
+                <a14:hiddenLine xmlns="" xmlns:a14="http://schemas.microsoft.com/office/drawing/2010/main" w="9525">
                   <a:solidFill>
                     <a:srgbClr val="000000"/>
                   </a:solidFill>
@@ -3886,7 +3892,7 @@
             </a:ln>
             <a:extLst>
               <a:ext uri="{91240B29-F687-4f45-9708-019B960494DF}">
-                <a14:hiddenLine xmlns:a14="http://schemas.microsoft.com/office/drawing/2010/main" xmlns="" w="9525">
+                <a14:hiddenLine xmlns="" xmlns:a14="http://schemas.microsoft.com/office/drawing/2010/main" w="9525">
                   <a:solidFill>
                     <a:srgbClr val="000000"/>
                   </a:solidFill>
@@ -3948,7 +3954,7 @@
             </a:ln>
             <a:extLst>
               <a:ext uri="{91240B29-F687-4f45-9708-019B960494DF}">
-                <a14:hiddenLine xmlns:a14="http://schemas.microsoft.com/office/drawing/2010/main" xmlns="" w="9525">
+                <a14:hiddenLine xmlns="" xmlns:a14="http://schemas.microsoft.com/office/drawing/2010/main" w="9525">
                   <a:solidFill>
                     <a:srgbClr val="000000"/>
                   </a:solidFill>
@@ -4038,7 +4044,7 @@
             </a:ln>
             <a:extLst>
               <a:ext uri="{91240B29-F687-4f45-9708-019B960494DF}">
-                <a14:hiddenLine xmlns:a14="http://schemas.microsoft.com/office/drawing/2010/main" xmlns="" w="9525">
+                <a14:hiddenLine xmlns="" xmlns:a14="http://schemas.microsoft.com/office/drawing/2010/main" w="9525">
                   <a:solidFill>
                     <a:srgbClr val="000000"/>
                   </a:solidFill>
@@ -4128,7 +4134,7 @@
             </a:ln>
             <a:extLst>
               <a:ext uri="{91240B29-F687-4f45-9708-019B960494DF}">
-                <a14:hiddenLine xmlns:a14="http://schemas.microsoft.com/office/drawing/2010/main" xmlns="" w="9525">
+                <a14:hiddenLine xmlns="" xmlns:a14="http://schemas.microsoft.com/office/drawing/2010/main" w="9525">
                   <a:solidFill>
                     <a:srgbClr val="000000"/>
                   </a:solidFill>
@@ -4184,7 +4190,7 @@
             </a:ln>
             <a:extLst>
               <a:ext uri="{91240B29-F687-4f45-9708-019B960494DF}">
-                <a14:hiddenLine xmlns:a14="http://schemas.microsoft.com/office/drawing/2010/main" xmlns="" w="9525">
+                <a14:hiddenLine xmlns="" xmlns:a14="http://schemas.microsoft.com/office/drawing/2010/main" w="9525">
                   <a:solidFill>
                     <a:srgbClr val="000000"/>
                   </a:solidFill>
@@ -4274,7 +4280,7 @@
             </a:ln>
             <a:extLst>
               <a:ext uri="{91240B29-F687-4f45-9708-019B960494DF}">
-                <a14:hiddenLine xmlns:a14="http://schemas.microsoft.com/office/drawing/2010/main" xmlns="" w="9525">
+                <a14:hiddenLine xmlns="" xmlns:a14="http://schemas.microsoft.com/office/drawing/2010/main" w="9525">
                   <a:solidFill>
                     <a:srgbClr val="000000"/>
                   </a:solidFill>
@@ -4330,7 +4336,7 @@
             </a:ln>
             <a:extLst>
               <a:ext uri="{91240B29-F687-4f45-9708-019B960494DF}">
-                <a14:hiddenLine xmlns:a14="http://schemas.microsoft.com/office/drawing/2010/main" xmlns="" w="9525">
+                <a14:hiddenLine xmlns="" xmlns:a14="http://schemas.microsoft.com/office/drawing/2010/main" w="9525">
                   <a:solidFill>
                     <a:srgbClr val="000000"/>
                   </a:solidFill>
@@ -4420,7 +4426,7 @@
             </a:ln>
             <a:extLst>
               <a:ext uri="{91240B29-F687-4f45-9708-019B960494DF}">
-                <a14:hiddenLine xmlns:a14="http://schemas.microsoft.com/office/drawing/2010/main" xmlns="" w="9525">
+                <a14:hiddenLine xmlns="" xmlns:a14="http://schemas.microsoft.com/office/drawing/2010/main" w="9525">
                   <a:solidFill>
                     <a:srgbClr val="000000"/>
                   </a:solidFill>
@@ -4488,7 +4494,7 @@
             </a:ln>
             <a:extLst>
               <a:ext uri="{91240B29-F687-4f45-9708-019B960494DF}">
-                <a14:hiddenLine xmlns:a14="http://schemas.microsoft.com/office/drawing/2010/main" xmlns="" w="9525">
+                <a14:hiddenLine xmlns="" xmlns:a14="http://schemas.microsoft.com/office/drawing/2010/main" w="9525">
                   <a:solidFill>
                     <a:srgbClr val="000000"/>
                   </a:solidFill>
@@ -4578,7 +4584,7 @@
             </a:ln>
             <a:extLst>
               <a:ext uri="{91240B29-F687-4f45-9708-019B960494DF}">
-                <a14:hiddenLine xmlns:a14="http://schemas.microsoft.com/office/drawing/2010/main" xmlns="" w="9525">
+                <a14:hiddenLine xmlns="" xmlns:a14="http://schemas.microsoft.com/office/drawing/2010/main" w="9525">
                   <a:solidFill>
                     <a:srgbClr val="000000"/>
                   </a:solidFill>
@@ -4646,7 +4652,7 @@
             </a:ln>
             <a:extLst>
               <a:ext uri="{91240B29-F687-4f45-9708-019B960494DF}">
-                <a14:hiddenLine xmlns:a14="http://schemas.microsoft.com/office/drawing/2010/main" xmlns="" w="9525">
+                <a14:hiddenLine xmlns="" xmlns:a14="http://schemas.microsoft.com/office/drawing/2010/main" w="9525">
                   <a:solidFill>
                     <a:srgbClr val="000000"/>
                   </a:solidFill>
@@ -4736,7 +4742,7 @@
             </a:ln>
             <a:extLst>
               <a:ext uri="{91240B29-F687-4f45-9708-019B960494DF}">
-                <a14:hiddenLine xmlns:a14="http://schemas.microsoft.com/office/drawing/2010/main" xmlns="" w="9525">
+                <a14:hiddenLine xmlns="" xmlns:a14="http://schemas.microsoft.com/office/drawing/2010/main" w="9525">
                   <a:solidFill>
                     <a:srgbClr val="000000"/>
                   </a:solidFill>
@@ -4770,7 +4776,7 @@
             </a:ln>
             <a:extLst>
               <a:ext uri="{91240B29-F687-4f45-9708-019B960494DF}">
-                <a14:hiddenLine xmlns:a14="http://schemas.microsoft.com/office/drawing/2010/main" xmlns="" w="9525">
+                <a14:hiddenLine xmlns="" xmlns:a14="http://schemas.microsoft.com/office/drawing/2010/main" w="9525">
                   <a:solidFill>
                     <a:srgbClr val="000000"/>
                   </a:solidFill>
@@ -4860,7 +4866,7 @@
             </a:ln>
             <a:extLst>
               <a:ext uri="{91240B29-F687-4f45-9708-019B960494DF}">
-                <a14:hiddenLine xmlns:a14="http://schemas.microsoft.com/office/drawing/2010/main" xmlns="" w="9525">
+                <a14:hiddenLine xmlns="" xmlns:a14="http://schemas.microsoft.com/office/drawing/2010/main" w="9525">
                   <a:solidFill>
                     <a:srgbClr val="000000"/>
                   </a:solidFill>
@@ -4922,7 +4928,7 @@
             </a:ln>
             <a:extLst>
               <a:ext uri="{91240B29-F687-4f45-9708-019B960494DF}">
-                <a14:hiddenLine xmlns:a14="http://schemas.microsoft.com/office/drawing/2010/main" xmlns="" w="9525">
+                <a14:hiddenLine xmlns="" xmlns:a14="http://schemas.microsoft.com/office/drawing/2010/main" w="9525">
                   <a:solidFill>
                     <a:srgbClr val="000000"/>
                   </a:solidFill>
@@ -4984,7 +4990,7 @@
             </a:ln>
             <a:extLst>
               <a:ext uri="{91240B29-F687-4f45-9708-019B960494DF}">
-                <a14:hiddenLine xmlns:a14="http://schemas.microsoft.com/office/drawing/2010/main" xmlns="" w="9525">
+                <a14:hiddenLine xmlns="" xmlns:a14="http://schemas.microsoft.com/office/drawing/2010/main" w="9525">
                   <a:solidFill>
                     <a:srgbClr val="000000"/>
                   </a:solidFill>
@@ -5074,7 +5080,7 @@
             </a:ln>
             <a:extLst>
               <a:ext uri="{91240B29-F687-4f45-9708-019B960494DF}">
-                <a14:hiddenLine xmlns:a14="http://schemas.microsoft.com/office/drawing/2010/main" xmlns="" w="9525">
+                <a14:hiddenLine xmlns="" xmlns:a14="http://schemas.microsoft.com/office/drawing/2010/main" w="9525">
                   <a:solidFill>
                     <a:srgbClr val="000000"/>
                   </a:solidFill>
@@ -5142,7 +5148,7 @@
             </a:ln>
             <a:extLst>
               <a:ext uri="{91240B29-F687-4f45-9708-019B960494DF}">
-                <a14:hiddenLine xmlns:a14="http://schemas.microsoft.com/office/drawing/2010/main" xmlns="" w="9525">
+                <a14:hiddenLine xmlns="" xmlns:a14="http://schemas.microsoft.com/office/drawing/2010/main" w="9525">
                   <a:solidFill>
                     <a:srgbClr val="000000"/>
                   </a:solidFill>
@@ -5204,7 +5210,7 @@
             </a:ln>
             <a:extLst>
               <a:ext uri="{91240B29-F687-4f45-9708-019B960494DF}">
-                <a14:hiddenLine xmlns:a14="http://schemas.microsoft.com/office/drawing/2010/main" xmlns="" w="9525">
+                <a14:hiddenLine xmlns="" xmlns:a14="http://schemas.microsoft.com/office/drawing/2010/main" w="9525">
                   <a:solidFill>
                     <a:srgbClr val="000000"/>
                   </a:solidFill>
@@ -5294,7 +5300,7 @@
             </a:ln>
             <a:extLst>
               <a:ext uri="{91240B29-F687-4f45-9708-019B960494DF}">
-                <a14:hiddenLine xmlns:a14="http://schemas.microsoft.com/office/drawing/2010/main" xmlns="" w="9525">
+                <a14:hiddenLine xmlns="" xmlns:a14="http://schemas.microsoft.com/office/drawing/2010/main" w="9525">
                   <a:solidFill>
                     <a:srgbClr val="000000"/>
                   </a:solidFill>
@@ -5356,7 +5362,7 @@
             </a:ln>
             <a:extLst>
               <a:ext uri="{91240B29-F687-4f45-9708-019B960494DF}">
-                <a14:hiddenLine xmlns:a14="http://schemas.microsoft.com/office/drawing/2010/main" xmlns="" w="9525">
+                <a14:hiddenLine xmlns="" xmlns:a14="http://schemas.microsoft.com/office/drawing/2010/main" w="9525">
                   <a:solidFill>
                     <a:srgbClr val="000000"/>
                   </a:solidFill>
@@ -5446,7 +5452,7 @@
             </a:ln>
             <a:extLst>
               <a:ext uri="{91240B29-F687-4f45-9708-019B960494DF}">
-                <a14:hiddenLine xmlns:a14="http://schemas.microsoft.com/office/drawing/2010/main" xmlns="" w="9525">
+                <a14:hiddenLine xmlns="" xmlns:a14="http://schemas.microsoft.com/office/drawing/2010/main" w="9525">
                   <a:solidFill>
                     <a:srgbClr val="000000"/>
                   </a:solidFill>
@@ -5508,7 +5514,7 @@
             </a:ln>
             <a:extLst>
               <a:ext uri="{91240B29-F687-4f45-9708-019B960494DF}">
-                <a14:hiddenLine xmlns:a14="http://schemas.microsoft.com/office/drawing/2010/main" xmlns="" w="9525">
+                <a14:hiddenLine xmlns="" xmlns:a14="http://schemas.microsoft.com/office/drawing/2010/main" w="9525">
                   <a:solidFill>
                     <a:srgbClr val="000000"/>
                   </a:solidFill>
@@ -5598,7 +5604,7 @@
             </a:ln>
             <a:extLst>
               <a:ext uri="{91240B29-F687-4f45-9708-019B960494DF}">
-                <a14:hiddenLine xmlns:a14="http://schemas.microsoft.com/office/drawing/2010/main" xmlns="" w="9525">
+                <a14:hiddenLine xmlns="" xmlns:a14="http://schemas.microsoft.com/office/drawing/2010/main" w="9525">
                   <a:solidFill>
                     <a:srgbClr val="000000"/>
                   </a:solidFill>
@@ -5632,7 +5638,7 @@
             </a:ln>
             <a:extLst>
               <a:ext uri="{91240B29-F687-4f45-9708-019B960494DF}">
-                <a14:hiddenLine xmlns:a14="http://schemas.microsoft.com/office/drawing/2010/main" xmlns="" w="9525">
+                <a14:hiddenLine xmlns="" xmlns:a14="http://schemas.microsoft.com/office/drawing/2010/main" w="9525">
                   <a:solidFill>
                     <a:srgbClr val="000000"/>
                   </a:solidFill>
@@ -5697,7 +5703,7 @@
             </a:ln>
             <a:extLst>
               <a:ext uri="{91240B29-F687-4f45-9708-019B960494DF}">
-                <a14:hiddenLine xmlns:a14="http://schemas.microsoft.com/office/drawing/2010/main" xmlns="" w="9525">
+                <a14:hiddenLine xmlns="" xmlns:a14="http://schemas.microsoft.com/office/drawing/2010/main" w="9525">
                   <a:solidFill>
                     <a:srgbClr val="000000"/>
                   </a:solidFill>
@@ -5787,7 +5793,7 @@
             </a:ln>
             <a:extLst>
               <a:ext uri="{91240B29-F687-4f45-9708-019B960494DF}">
-                <a14:hiddenLine xmlns:a14="http://schemas.microsoft.com/office/drawing/2010/main" xmlns="" w="9525">
+                <a14:hiddenLine xmlns="" xmlns:a14="http://schemas.microsoft.com/office/drawing/2010/main" w="9525">
                   <a:solidFill>
                     <a:srgbClr val="000000"/>
                   </a:solidFill>
@@ -5849,7 +5855,7 @@
             </a:ln>
             <a:extLst>
               <a:ext uri="{91240B29-F687-4f45-9708-019B960494DF}">
-                <a14:hiddenLine xmlns:a14="http://schemas.microsoft.com/office/drawing/2010/main" xmlns="" w="9525">
+                <a14:hiddenLine xmlns="" xmlns:a14="http://schemas.microsoft.com/office/drawing/2010/main" w="9525">
                   <a:solidFill>
                     <a:srgbClr val="000000"/>
                   </a:solidFill>
@@ -5939,7 +5945,7 @@
             </a:ln>
             <a:extLst>
               <a:ext uri="{91240B29-F687-4f45-9708-019B960494DF}">
-                <a14:hiddenLine xmlns:a14="http://schemas.microsoft.com/office/drawing/2010/main" xmlns="" w="9525">
+                <a14:hiddenLine xmlns="" xmlns:a14="http://schemas.microsoft.com/office/drawing/2010/main" w="9525">
                   <a:solidFill>
                     <a:srgbClr val="000000"/>
                   </a:solidFill>
@@ -6029,7 +6035,7 @@
             </a:ln>
             <a:extLst>
               <a:ext uri="{91240B29-F687-4f45-9708-019B960494DF}">
-                <a14:hiddenLine xmlns:a14="http://schemas.microsoft.com/office/drawing/2010/main" xmlns="" w="9525">
+                <a14:hiddenLine xmlns="" xmlns:a14="http://schemas.microsoft.com/office/drawing/2010/main" w="9525">
                   <a:solidFill>
                     <a:srgbClr val="000000"/>
                   </a:solidFill>
@@ -6094,7 +6100,7 @@
             </a:ln>
             <a:extLst>
               <a:ext uri="{91240B29-F687-4f45-9708-019B960494DF}">
-                <a14:hiddenLine xmlns:a14="http://schemas.microsoft.com/office/drawing/2010/main" xmlns="" w="9525">
+                <a14:hiddenLine xmlns="" xmlns:a14="http://schemas.microsoft.com/office/drawing/2010/main" w="9525">
                   <a:solidFill>
                     <a:srgbClr val="000000"/>
                   </a:solidFill>
@@ -6156,7 +6162,7 @@
             </a:ln>
             <a:extLst>
               <a:ext uri="{91240B29-F687-4f45-9708-019B960494DF}">
-                <a14:hiddenLine xmlns:a14="http://schemas.microsoft.com/office/drawing/2010/main" xmlns="" w="9525">
+                <a14:hiddenLine xmlns="" xmlns:a14="http://schemas.microsoft.com/office/drawing/2010/main" w="9525">
                   <a:solidFill>
                     <a:srgbClr val="000000"/>
                   </a:solidFill>
@@ -6246,7 +6252,7 @@
             </a:ln>
             <a:extLst>
               <a:ext uri="{91240B29-F687-4f45-9708-019B960494DF}">
-                <a14:hiddenLine xmlns:a14="http://schemas.microsoft.com/office/drawing/2010/main" xmlns="" w="9525">
+                <a14:hiddenLine xmlns="" xmlns:a14="http://schemas.microsoft.com/office/drawing/2010/main" w="9525">
                   <a:solidFill>
                     <a:srgbClr val="000000"/>
                   </a:solidFill>
@@ -6336,7 +6342,7 @@
             </a:ln>
             <a:extLst>
               <a:ext uri="{91240B29-F687-4f45-9708-019B960494DF}">
-                <a14:hiddenLine xmlns:a14="http://schemas.microsoft.com/office/drawing/2010/main" xmlns="" w="9525">
+                <a14:hiddenLine xmlns="" xmlns:a14="http://schemas.microsoft.com/office/drawing/2010/main" w="9525">
                   <a:solidFill>
                     <a:srgbClr val="000000"/>
                   </a:solidFill>
@@ -6398,7 +6404,7 @@
             </a:ln>
             <a:extLst>
               <a:ext uri="{91240B29-F687-4f45-9708-019B960494DF}">
-                <a14:hiddenLine xmlns:a14="http://schemas.microsoft.com/office/drawing/2010/main" xmlns="" w="9525">
+                <a14:hiddenLine xmlns="" xmlns:a14="http://schemas.microsoft.com/office/drawing/2010/main" w="9525">
                   <a:solidFill>
                     <a:srgbClr val="000000"/>
                   </a:solidFill>
@@ -6518,7 +6524,7 @@
             </a:ln>
             <a:extLst>
               <a:ext uri="{91240B29-F687-4f45-9708-019B960494DF}">
-                <a14:hiddenLine xmlns:a14="http://schemas.microsoft.com/office/drawing/2010/main" xmlns="" w="9525">
+                <a14:hiddenLine xmlns="" xmlns:a14="http://schemas.microsoft.com/office/drawing/2010/main" w="9525">
                   <a:solidFill>
                     <a:srgbClr val="000000"/>
                   </a:solidFill>
@@ -6586,7 +6592,7 @@
             </a:ln>
             <a:extLst>
               <a:ext uri="{91240B29-F687-4f45-9708-019B960494DF}">
-                <a14:hiddenLine xmlns:a14="http://schemas.microsoft.com/office/drawing/2010/main" xmlns="" w="9525">
+                <a14:hiddenLine xmlns="" xmlns:a14="http://schemas.microsoft.com/office/drawing/2010/main" w="9525">
                   <a:solidFill>
                     <a:srgbClr val="000000"/>
                   </a:solidFill>
@@ -6676,7 +6682,7 @@
             </a:ln>
             <a:extLst>
               <a:ext uri="{91240B29-F687-4f45-9708-019B960494DF}">
-                <a14:hiddenLine xmlns:a14="http://schemas.microsoft.com/office/drawing/2010/main" xmlns="" w="9525">
+                <a14:hiddenLine xmlns="" xmlns:a14="http://schemas.microsoft.com/office/drawing/2010/main" w="9525">
                   <a:solidFill>
                     <a:srgbClr val="000000"/>
                   </a:solidFill>
@@ -11697,7 +11703,7 @@
           <a:noFill/>
           <a:extLst>
             <a:ext uri="{909E8E84-426E-40dd-AFC4-6F175D3DCCD1}">
-              <a14:hiddenFill xmlns:a14="http://schemas.microsoft.com/office/drawing/2010/main" xmlns="">
+              <a14:hiddenFill xmlns="" xmlns:a14="http://schemas.microsoft.com/office/drawing/2010/main">
                 <a:solidFill>
                   <a:srgbClr val="FFFFFF"/>
                 </a:solidFill>
@@ -11771,7 +11777,7 @@
               </a:ln>
               <a:extLst>
                 <a:ext uri="{91240B29-F687-4f45-9708-019B960494DF}">
-                  <a14:hiddenLine xmlns:a14="http://schemas.microsoft.com/office/drawing/2010/main" xmlns="" w="9525">
+                  <a14:hiddenLine xmlns="" xmlns:a14="http://schemas.microsoft.com/office/drawing/2010/main" w="9525">
                     <a:solidFill>
                       <a:srgbClr val="000000"/>
                     </a:solidFill>
@@ -11861,7 +11867,7 @@
               </a:ln>
               <a:extLst>
                 <a:ext uri="{91240B29-F687-4f45-9708-019B960494DF}">
-                  <a14:hiddenLine xmlns:a14="http://schemas.microsoft.com/office/drawing/2010/main" xmlns="" w="9525">
+                  <a14:hiddenLine xmlns="" xmlns:a14="http://schemas.microsoft.com/office/drawing/2010/main" w="9525">
                     <a:solidFill>
                       <a:srgbClr val="000000"/>
                     </a:solidFill>
@@ -11951,7 +11957,7 @@
               </a:ln>
               <a:extLst>
                 <a:ext uri="{91240B29-F687-4f45-9708-019B960494DF}">
-                  <a14:hiddenLine xmlns:a14="http://schemas.microsoft.com/office/drawing/2010/main" xmlns="" w="9525">
+                  <a14:hiddenLine xmlns="" xmlns:a14="http://schemas.microsoft.com/office/drawing/2010/main" w="9525">
                     <a:solidFill>
                       <a:srgbClr val="000000"/>
                     </a:solidFill>
@@ -12013,7 +12019,7 @@
               </a:ln>
               <a:extLst>
                 <a:ext uri="{91240B29-F687-4f45-9708-019B960494DF}">
-                  <a14:hiddenLine xmlns:a14="http://schemas.microsoft.com/office/drawing/2010/main" xmlns="" w="9525">
+                  <a14:hiddenLine xmlns="" xmlns:a14="http://schemas.microsoft.com/office/drawing/2010/main" w="9525">
                     <a:solidFill>
                       <a:srgbClr val="000000"/>
                     </a:solidFill>
@@ -12103,7 +12109,7 @@
               </a:ln>
               <a:extLst>
                 <a:ext uri="{91240B29-F687-4f45-9708-019B960494DF}">
-                  <a14:hiddenLine xmlns:a14="http://schemas.microsoft.com/office/drawing/2010/main" xmlns="" w="9525">
+                  <a14:hiddenLine xmlns="" xmlns:a14="http://schemas.microsoft.com/office/drawing/2010/main" w="9525">
                     <a:solidFill>
                       <a:srgbClr val="000000"/>
                     </a:solidFill>
@@ -12165,7 +12171,7 @@
               </a:ln>
               <a:extLst>
                 <a:ext uri="{91240B29-F687-4f45-9708-019B960494DF}">
-                  <a14:hiddenLine xmlns:a14="http://schemas.microsoft.com/office/drawing/2010/main" xmlns="" w="9525">
+                  <a14:hiddenLine xmlns="" xmlns:a14="http://schemas.microsoft.com/office/drawing/2010/main" w="9525">
                     <a:solidFill>
                       <a:srgbClr val="000000"/>
                     </a:solidFill>
@@ -12227,7 +12233,7 @@
               </a:ln>
               <a:extLst>
                 <a:ext uri="{91240B29-F687-4f45-9708-019B960494DF}">
-                  <a14:hiddenLine xmlns:a14="http://schemas.microsoft.com/office/drawing/2010/main" xmlns="" w="9525">
+                  <a14:hiddenLine xmlns="" xmlns:a14="http://schemas.microsoft.com/office/drawing/2010/main" w="9525">
                     <a:solidFill>
                       <a:srgbClr val="000000"/>
                     </a:solidFill>
@@ -12317,7 +12323,7 @@
               </a:ln>
               <a:extLst>
                 <a:ext uri="{91240B29-F687-4f45-9708-019B960494DF}">
-                  <a14:hiddenLine xmlns:a14="http://schemas.microsoft.com/office/drawing/2010/main" xmlns="" w="9525">
+                  <a14:hiddenLine xmlns="" xmlns:a14="http://schemas.microsoft.com/office/drawing/2010/main" w="9525">
                     <a:solidFill>
                       <a:srgbClr val="000000"/>
                     </a:solidFill>
@@ -12407,7 +12413,7 @@
               </a:ln>
               <a:extLst>
                 <a:ext uri="{91240B29-F687-4f45-9708-019B960494DF}">
-                  <a14:hiddenLine xmlns:a14="http://schemas.microsoft.com/office/drawing/2010/main" xmlns="" w="9525">
+                  <a14:hiddenLine xmlns="" xmlns:a14="http://schemas.microsoft.com/office/drawing/2010/main" w="9525">
                     <a:solidFill>
                       <a:srgbClr val="000000"/>
                     </a:solidFill>
@@ -12469,7 +12475,7 @@
               </a:ln>
               <a:extLst>
                 <a:ext uri="{91240B29-F687-4f45-9708-019B960494DF}">
-                  <a14:hiddenLine xmlns:a14="http://schemas.microsoft.com/office/drawing/2010/main" xmlns="" w="9525">
+                  <a14:hiddenLine xmlns="" xmlns:a14="http://schemas.microsoft.com/office/drawing/2010/main" w="9525">
                     <a:solidFill>
                       <a:srgbClr val="000000"/>
                     </a:solidFill>
@@ -12579,7 +12585,7 @@
               </a:ln>
               <a:extLst>
                 <a:ext uri="{91240B29-F687-4f45-9708-019B960494DF}">
-                  <a14:hiddenLine xmlns:a14="http://schemas.microsoft.com/office/drawing/2010/main" xmlns="" w="9525">
+                  <a14:hiddenLine xmlns="" xmlns:a14="http://schemas.microsoft.com/office/drawing/2010/main" w="9525">
                     <a:solidFill>
                       <a:srgbClr val="000000"/>
                     </a:solidFill>
@@ -12663,7 +12669,7 @@
               </a:ln>
               <a:extLst>
                 <a:ext uri="{91240B29-F687-4f45-9708-019B960494DF}">
-                  <a14:hiddenLine xmlns:a14="http://schemas.microsoft.com/office/drawing/2010/main" xmlns="" w="9525">
+                  <a14:hiddenLine xmlns="" xmlns:a14="http://schemas.microsoft.com/office/drawing/2010/main" w="9525">
                     <a:solidFill>
                       <a:srgbClr val="000000"/>
                     </a:solidFill>
@@ -12725,7 +12731,7 @@
               </a:ln>
               <a:extLst>
                 <a:ext uri="{91240B29-F687-4f45-9708-019B960494DF}">
-                  <a14:hiddenLine xmlns:a14="http://schemas.microsoft.com/office/drawing/2010/main" xmlns="" w="9525">
+                  <a14:hiddenLine xmlns="" xmlns:a14="http://schemas.microsoft.com/office/drawing/2010/main" w="9525">
                     <a:solidFill>
                       <a:srgbClr val="000000"/>
                     </a:solidFill>
@@ -12787,7 +12793,7 @@
               </a:ln>
               <a:extLst>
                 <a:ext uri="{91240B29-F687-4f45-9708-019B960494DF}">
-                  <a14:hiddenLine xmlns:a14="http://schemas.microsoft.com/office/drawing/2010/main" xmlns="" w="9525">
+                  <a14:hiddenLine xmlns="" xmlns:a14="http://schemas.microsoft.com/office/drawing/2010/main" w="9525">
                     <a:solidFill>
                       <a:srgbClr val="000000"/>
                     </a:solidFill>
@@ -12877,7 +12883,7 @@
               </a:ln>
               <a:extLst>
                 <a:ext uri="{91240B29-F687-4f45-9708-019B960494DF}">
-                  <a14:hiddenLine xmlns:a14="http://schemas.microsoft.com/office/drawing/2010/main" xmlns="" w="9525">
+                  <a14:hiddenLine xmlns="" xmlns:a14="http://schemas.microsoft.com/office/drawing/2010/main" w="9525">
                     <a:solidFill>
                       <a:srgbClr val="000000"/>
                     </a:solidFill>
@@ -12911,7 +12917,7 @@
               </a:ln>
               <a:extLst>
                 <a:ext uri="{91240B29-F687-4f45-9708-019B960494DF}">
-                  <a14:hiddenLine xmlns:a14="http://schemas.microsoft.com/office/drawing/2010/main" xmlns="" w="9525">
+                  <a14:hiddenLine xmlns="" xmlns:a14="http://schemas.microsoft.com/office/drawing/2010/main" w="9525">
                     <a:solidFill>
                       <a:srgbClr val="000000"/>
                     </a:solidFill>
@@ -12976,7 +12982,7 @@
               </a:ln>
               <a:extLst>
                 <a:ext uri="{91240B29-F687-4f45-9708-019B960494DF}">
-                  <a14:hiddenLine xmlns:a14="http://schemas.microsoft.com/office/drawing/2010/main" xmlns="" w="9525">
+                  <a14:hiddenLine xmlns="" xmlns:a14="http://schemas.microsoft.com/office/drawing/2010/main" w="9525">
                     <a:solidFill>
                       <a:srgbClr val="000000"/>
                     </a:solidFill>
@@ -13066,7 +13072,7 @@
               </a:ln>
               <a:extLst>
                 <a:ext uri="{91240B29-F687-4f45-9708-019B960494DF}">
-                  <a14:hiddenLine xmlns:a14="http://schemas.microsoft.com/office/drawing/2010/main" xmlns="" w="9525">
+                  <a14:hiddenLine xmlns="" xmlns:a14="http://schemas.microsoft.com/office/drawing/2010/main" w="9525">
                     <a:solidFill>
                       <a:srgbClr val="000000"/>
                     </a:solidFill>
@@ -13128,7 +13134,7 @@
               </a:ln>
               <a:extLst>
                 <a:ext uri="{91240B29-F687-4f45-9708-019B960494DF}">
-                  <a14:hiddenLine xmlns:a14="http://schemas.microsoft.com/office/drawing/2010/main" xmlns="" w="9525">
+                  <a14:hiddenLine xmlns="" xmlns:a14="http://schemas.microsoft.com/office/drawing/2010/main" w="9525">
                     <a:solidFill>
                       <a:srgbClr val="000000"/>
                     </a:solidFill>
@@ -13218,7 +13224,7 @@
               </a:ln>
               <a:extLst>
                 <a:ext uri="{91240B29-F687-4f45-9708-019B960494DF}">
-                  <a14:hiddenLine xmlns:a14="http://schemas.microsoft.com/office/drawing/2010/main" xmlns="" w="9525">
+                  <a14:hiddenLine xmlns="" xmlns:a14="http://schemas.microsoft.com/office/drawing/2010/main" w="9525">
                     <a:solidFill>
                       <a:srgbClr val="000000"/>
                     </a:solidFill>
@@ -13283,7 +13289,7 @@
               </a:ln>
               <a:extLst>
                 <a:ext uri="{91240B29-F687-4f45-9708-019B960494DF}">
-                  <a14:hiddenLine xmlns:a14="http://schemas.microsoft.com/office/drawing/2010/main" xmlns="" w="9525">
+                  <a14:hiddenLine xmlns="" xmlns:a14="http://schemas.microsoft.com/office/drawing/2010/main" w="9525">
                     <a:solidFill>
                       <a:srgbClr val="000000"/>
                     </a:solidFill>
@@ -13345,7 +13351,7 @@
               </a:ln>
               <a:extLst>
                 <a:ext uri="{91240B29-F687-4f45-9708-019B960494DF}">
-                  <a14:hiddenLine xmlns:a14="http://schemas.microsoft.com/office/drawing/2010/main" xmlns="" w="9525">
+                  <a14:hiddenLine xmlns="" xmlns:a14="http://schemas.microsoft.com/office/drawing/2010/main" w="9525">
                     <a:solidFill>
                       <a:srgbClr val="000000"/>
                     </a:solidFill>
@@ -13435,7 +13441,7 @@
               </a:ln>
               <a:extLst>
                 <a:ext uri="{91240B29-F687-4f45-9708-019B960494DF}">
-                  <a14:hiddenLine xmlns:a14="http://schemas.microsoft.com/office/drawing/2010/main" xmlns="" w="9525">
+                  <a14:hiddenLine xmlns="" xmlns:a14="http://schemas.microsoft.com/office/drawing/2010/main" w="9525">
                     <a:solidFill>
                       <a:srgbClr val="000000"/>
                     </a:solidFill>
@@ -13525,7 +13531,7 @@
               </a:ln>
               <a:extLst>
                 <a:ext uri="{91240B29-F687-4f45-9708-019B960494DF}">
-                  <a14:hiddenLine xmlns:a14="http://schemas.microsoft.com/office/drawing/2010/main" xmlns="" w="9525">
+                  <a14:hiddenLine xmlns="" xmlns:a14="http://schemas.microsoft.com/office/drawing/2010/main" w="9525">
                     <a:solidFill>
                       <a:srgbClr val="000000"/>
                     </a:solidFill>
@@ -13590,7 +13596,7 @@
               </a:ln>
               <a:extLst>
                 <a:ext uri="{91240B29-F687-4f45-9708-019B960494DF}">
-                  <a14:hiddenLine xmlns:a14="http://schemas.microsoft.com/office/drawing/2010/main" xmlns="" w="9525">
+                  <a14:hiddenLine xmlns="" xmlns:a14="http://schemas.microsoft.com/office/drawing/2010/main" w="9525">
                     <a:solidFill>
                       <a:srgbClr val="000000"/>
                     </a:solidFill>
@@ -13710,7 +13716,7 @@
               </a:ln>
               <a:extLst>
                 <a:ext uri="{91240B29-F687-4f45-9708-019B960494DF}">
-                  <a14:hiddenLine xmlns:a14="http://schemas.microsoft.com/office/drawing/2010/main" xmlns="" w="9525">
+                  <a14:hiddenLine xmlns="" xmlns:a14="http://schemas.microsoft.com/office/drawing/2010/main" w="9525">
                     <a:solidFill>
                       <a:srgbClr val="000000"/>
                     </a:solidFill>
@@ -13791,7 +13797,7 @@
               </a:ln>
               <a:extLst>
                 <a:ext uri="{91240B29-F687-4f45-9708-019B960494DF}">
-                  <a14:hiddenLine xmlns:a14="http://schemas.microsoft.com/office/drawing/2010/main" xmlns="" w="9525">
+                  <a14:hiddenLine xmlns="" xmlns:a14="http://schemas.microsoft.com/office/drawing/2010/main" w="9525">
                     <a:solidFill>
                       <a:srgbClr val="000000"/>
                     </a:solidFill>
@@ -13906,7 +13912,7 @@
               </a:ln>
               <a:extLst>
                 <a:ext uri="{91240B29-F687-4f45-9708-019B960494DF}">
-                  <a14:hiddenLine xmlns:a14="http://schemas.microsoft.com/office/drawing/2010/main" xmlns="" w="9525">
+                  <a14:hiddenLine xmlns="" xmlns:a14="http://schemas.microsoft.com/office/drawing/2010/main" w="9525">
                     <a:solidFill>
                       <a:srgbClr val="000000"/>
                     </a:solidFill>
@@ -13996,7 +14002,7 @@
               </a:ln>
               <a:extLst>
                 <a:ext uri="{91240B29-F687-4f45-9708-019B960494DF}">
-                  <a14:hiddenLine xmlns:a14="http://schemas.microsoft.com/office/drawing/2010/main" xmlns="" w="9525">
+                  <a14:hiddenLine xmlns="" xmlns:a14="http://schemas.microsoft.com/office/drawing/2010/main" w="9525">
                     <a:solidFill>
                       <a:srgbClr val="000000"/>
                     </a:solidFill>
@@ -14061,7 +14067,7 @@
               </a:ln>
               <a:extLst>
                 <a:ext uri="{91240B29-F687-4f45-9708-019B960494DF}">
-                  <a14:hiddenLine xmlns:a14="http://schemas.microsoft.com/office/drawing/2010/main" xmlns="" w="9525">
+                  <a14:hiddenLine xmlns="" xmlns:a14="http://schemas.microsoft.com/office/drawing/2010/main" w="9525">
                     <a:solidFill>
                       <a:srgbClr val="000000"/>
                     </a:solidFill>
@@ -14151,7 +14157,7 @@
               </a:ln>
               <a:extLst>
                 <a:ext uri="{91240B29-F687-4f45-9708-019B960494DF}">
-                  <a14:hiddenLine xmlns:a14="http://schemas.microsoft.com/office/drawing/2010/main" xmlns="" w="9525">
+                  <a14:hiddenLine xmlns="" xmlns:a14="http://schemas.microsoft.com/office/drawing/2010/main" w="9525">
                     <a:solidFill>
                       <a:srgbClr val="000000"/>
                     </a:solidFill>
@@ -14219,7 +14225,7 @@
               </a:ln>
               <a:extLst>
                 <a:ext uri="{91240B29-F687-4f45-9708-019B960494DF}">
-                  <a14:hiddenLine xmlns:a14="http://schemas.microsoft.com/office/drawing/2010/main" xmlns="" w="9525">
+                  <a14:hiddenLine xmlns="" xmlns:a14="http://schemas.microsoft.com/office/drawing/2010/main" w="9525">
                     <a:solidFill>
                       <a:srgbClr val="000000"/>
                     </a:solidFill>
@@ -14309,7 +14315,7 @@
               </a:ln>
               <a:extLst>
                 <a:ext uri="{91240B29-F687-4f45-9708-019B960494DF}">
-                  <a14:hiddenLine xmlns:a14="http://schemas.microsoft.com/office/drawing/2010/main" xmlns="" w="9525">
+                  <a14:hiddenLine xmlns="" xmlns:a14="http://schemas.microsoft.com/office/drawing/2010/main" w="9525">
                     <a:solidFill>
                       <a:srgbClr val="000000"/>
                     </a:solidFill>
@@ -14377,7 +14383,7 @@
               </a:ln>
               <a:extLst>
                 <a:ext uri="{91240B29-F687-4f45-9708-019B960494DF}">
-                  <a14:hiddenLine xmlns:a14="http://schemas.microsoft.com/office/drawing/2010/main" xmlns="" w="9525">
+                  <a14:hiddenLine xmlns="" xmlns:a14="http://schemas.microsoft.com/office/drawing/2010/main" w="9525">
                     <a:solidFill>
                       <a:srgbClr val="000000"/>
                     </a:solidFill>
@@ -14467,7 +14473,7 @@
               </a:ln>
               <a:extLst>
                 <a:ext uri="{91240B29-F687-4f45-9708-019B960494DF}">
-                  <a14:hiddenLine xmlns:a14="http://schemas.microsoft.com/office/drawing/2010/main" xmlns="" w="9525">
+                  <a14:hiddenLine xmlns="" xmlns:a14="http://schemas.microsoft.com/office/drawing/2010/main" w="9525">
                     <a:solidFill>
                       <a:srgbClr val="000000"/>
                     </a:solidFill>
@@ -14501,7 +14507,7 @@
               </a:ln>
               <a:extLst>
                 <a:ext uri="{91240B29-F687-4f45-9708-019B960494DF}">
-                  <a14:hiddenLine xmlns:a14="http://schemas.microsoft.com/office/drawing/2010/main" xmlns="" w="9525">
+                  <a14:hiddenLine xmlns="" xmlns:a14="http://schemas.microsoft.com/office/drawing/2010/main" w="9525">
                     <a:solidFill>
                       <a:srgbClr val="000000"/>
                     </a:solidFill>
@@ -15227,7 +15233,7 @@
             <a:noFill/>
             <a:extLst>
               <a:ext uri="{909E8E84-426E-40dd-AFC4-6F175D3DCCD1}">
-                <a14:hiddenFill xmlns="" xmlns:a16="http://schemas.microsoft.com/office/drawing/2014/main" xmlns:a14="http://schemas.microsoft.com/office/drawing/2010/main" xmlns:p14="http://schemas.microsoft.com/office/powerpoint/2010/main">
+                <a14:hiddenFill xmlns:p14="http://schemas.microsoft.com/office/powerpoint/2010/main" xmlns:a14="http://schemas.microsoft.com/office/drawing/2010/main" xmlns:a16="http://schemas.microsoft.com/office/drawing/2014/main" xmlns="">
                   <a:solidFill>
                     <a:srgbClr val="FFFFFF"/>
                   </a:solidFill>
@@ -15255,8 +15261,8 @@
         </p:nvSpPr>
         <p:spPr>
           <a:xfrm>
-            <a:off x="6600824" y="930806"/>
-            <a:ext cx="4749800" cy="2278061"/>
+            <a:off x="6600824" y="9526"/>
+            <a:ext cx="4749800" cy="3199342"/>
           </a:xfrm>
         </p:spPr>
         <p:txBody>
@@ -15384,7 +15390,7 @@
             </a:ln>
             <a:extLst>
               <a:ext uri="{91240B29-F687-4f45-9708-019B960494DF}">
-                <a14:hiddenLine xmlns="" xmlns:a16="http://schemas.microsoft.com/office/drawing/2014/main" xmlns:a14="http://schemas.microsoft.com/office/drawing/2010/main" xmlns:p14="http://schemas.microsoft.com/office/powerpoint/2010/main" w="9525">
+                <a14:hiddenLine xmlns:p14="http://schemas.microsoft.com/office/powerpoint/2010/main" xmlns:a14="http://schemas.microsoft.com/office/drawing/2010/main" xmlns:a16="http://schemas.microsoft.com/office/drawing/2014/main" xmlns="" w="9525">
                   <a:solidFill>
                     <a:srgbClr val="000000"/>
                   </a:solidFill>
@@ -15489,7 +15495,7 @@
             </a:ln>
             <a:extLst>
               <a:ext uri="{91240B29-F687-4f45-9708-019B960494DF}">
-                <a14:hiddenLine xmlns="" xmlns:a16="http://schemas.microsoft.com/office/drawing/2014/main" xmlns:a14="http://schemas.microsoft.com/office/drawing/2010/main" xmlns:p14="http://schemas.microsoft.com/office/powerpoint/2010/main" w="9525">
+                <a14:hiddenLine xmlns:p14="http://schemas.microsoft.com/office/powerpoint/2010/main" xmlns:a14="http://schemas.microsoft.com/office/drawing/2010/main" xmlns:a16="http://schemas.microsoft.com/office/drawing/2014/main" xmlns="" w="9525">
                   <a:solidFill>
                     <a:srgbClr val="000000"/>
                   </a:solidFill>
@@ -15594,7 +15600,7 @@
             </a:ln>
             <a:extLst>
               <a:ext uri="{91240B29-F687-4f45-9708-019B960494DF}">
-                <a14:hiddenLine xmlns="" xmlns:a16="http://schemas.microsoft.com/office/drawing/2014/main" xmlns:a14="http://schemas.microsoft.com/office/drawing/2010/main" xmlns:p14="http://schemas.microsoft.com/office/powerpoint/2010/main" w="9525">
+                <a14:hiddenLine xmlns:p14="http://schemas.microsoft.com/office/powerpoint/2010/main" xmlns:a14="http://schemas.microsoft.com/office/drawing/2010/main" xmlns:a16="http://schemas.microsoft.com/office/drawing/2014/main" xmlns="" w="9525">
                   <a:solidFill>
                     <a:srgbClr val="000000"/>
                   </a:solidFill>
@@ -15643,7 +15649,7 @@
             </a:ln>
             <a:extLst>
               <a:ext uri="{91240B29-F687-4f45-9708-019B960494DF}">
-                <a14:hiddenLine xmlns="" xmlns:a16="http://schemas.microsoft.com/office/drawing/2014/main" xmlns:a14="http://schemas.microsoft.com/office/drawing/2010/main" xmlns:p14="http://schemas.microsoft.com/office/powerpoint/2010/main" w="9525">
+                <a14:hiddenLine xmlns:p14="http://schemas.microsoft.com/office/powerpoint/2010/main" xmlns:a14="http://schemas.microsoft.com/office/drawing/2010/main" xmlns:a16="http://schemas.microsoft.com/office/drawing/2014/main" xmlns="" w="9525">
                   <a:solidFill>
                     <a:srgbClr val="000000"/>
                   </a:solidFill>
@@ -15748,7 +15754,7 @@
             </a:ln>
             <a:extLst>
               <a:ext uri="{91240B29-F687-4f45-9708-019B960494DF}">
-                <a14:hiddenLine xmlns="" xmlns:a16="http://schemas.microsoft.com/office/drawing/2014/main" xmlns:a14="http://schemas.microsoft.com/office/drawing/2010/main" xmlns:p14="http://schemas.microsoft.com/office/powerpoint/2010/main" w="9525">
+                <a14:hiddenLine xmlns:p14="http://schemas.microsoft.com/office/powerpoint/2010/main" xmlns:a14="http://schemas.microsoft.com/office/drawing/2010/main" xmlns:a16="http://schemas.microsoft.com/office/drawing/2014/main" xmlns="" w="9525">
                   <a:solidFill>
                     <a:srgbClr val="000000"/>
                   </a:solidFill>
@@ -15825,7 +15831,7 @@
             </a:ln>
             <a:extLst>
               <a:ext uri="{91240B29-F687-4f45-9708-019B960494DF}">
-                <a14:hiddenLine xmlns="" xmlns:a16="http://schemas.microsoft.com/office/drawing/2014/main" xmlns:a14="http://schemas.microsoft.com/office/drawing/2010/main" xmlns:p14="http://schemas.microsoft.com/office/powerpoint/2010/main" w="9525">
+                <a14:hiddenLine xmlns:p14="http://schemas.microsoft.com/office/powerpoint/2010/main" xmlns:a14="http://schemas.microsoft.com/office/drawing/2010/main" xmlns:a16="http://schemas.microsoft.com/office/drawing/2014/main" xmlns="" w="9525">
                   <a:solidFill>
                     <a:srgbClr val="000000"/>
                   </a:solidFill>
@@ -15902,7 +15908,7 @@
             </a:ln>
             <a:extLst>
               <a:ext uri="{91240B29-F687-4f45-9708-019B960494DF}">
-                <a14:hiddenLine xmlns="" xmlns:a16="http://schemas.microsoft.com/office/drawing/2014/main" xmlns:a14="http://schemas.microsoft.com/office/drawing/2010/main" xmlns:p14="http://schemas.microsoft.com/office/powerpoint/2010/main" w="9525">
+                <a14:hiddenLine xmlns:p14="http://schemas.microsoft.com/office/powerpoint/2010/main" xmlns:a14="http://schemas.microsoft.com/office/drawing/2010/main" xmlns:a16="http://schemas.microsoft.com/office/drawing/2014/main" xmlns="" w="9525">
                   <a:solidFill>
                     <a:srgbClr val="000000"/>
                   </a:solidFill>
@@ -16007,7 +16013,7 @@
             </a:ln>
             <a:extLst>
               <a:ext uri="{91240B29-F687-4f45-9708-019B960494DF}">
-                <a14:hiddenLine xmlns="" xmlns:a16="http://schemas.microsoft.com/office/drawing/2014/main" xmlns:a14="http://schemas.microsoft.com/office/drawing/2010/main" xmlns:p14="http://schemas.microsoft.com/office/powerpoint/2010/main" w="9525">
+                <a14:hiddenLine xmlns:p14="http://schemas.microsoft.com/office/powerpoint/2010/main" xmlns:a14="http://schemas.microsoft.com/office/drawing/2010/main" xmlns:a16="http://schemas.microsoft.com/office/drawing/2014/main" xmlns="" w="9525">
                   <a:solidFill>
                     <a:srgbClr val="000000"/>
                   </a:solidFill>
@@ -16084,7 +16090,7 @@
             </a:ln>
             <a:extLst>
               <a:ext uri="{91240B29-F687-4f45-9708-019B960494DF}">
-                <a14:hiddenLine xmlns="" xmlns:a16="http://schemas.microsoft.com/office/drawing/2014/main" xmlns:a14="http://schemas.microsoft.com/office/drawing/2010/main" xmlns:p14="http://schemas.microsoft.com/office/powerpoint/2010/main" w="9525">
+                <a14:hiddenLine xmlns:p14="http://schemas.microsoft.com/office/powerpoint/2010/main" xmlns:a14="http://schemas.microsoft.com/office/drawing/2010/main" xmlns:a16="http://schemas.microsoft.com/office/drawing/2014/main" xmlns="" w="9525">
                   <a:solidFill>
                     <a:srgbClr val="000000"/>
                   </a:solidFill>
@@ -16161,7 +16167,7 @@
             </a:ln>
             <a:extLst>
               <a:ext uri="{91240B29-F687-4f45-9708-019B960494DF}">
-                <a14:hiddenLine xmlns="" xmlns:a16="http://schemas.microsoft.com/office/drawing/2014/main" xmlns:a14="http://schemas.microsoft.com/office/drawing/2010/main" xmlns:p14="http://schemas.microsoft.com/office/powerpoint/2010/main" w="9525">
+                <a14:hiddenLine xmlns:p14="http://schemas.microsoft.com/office/powerpoint/2010/main" xmlns:a14="http://schemas.microsoft.com/office/drawing/2010/main" xmlns:a16="http://schemas.microsoft.com/office/drawing/2014/main" xmlns="" w="9525">
                   <a:solidFill>
                     <a:srgbClr val="000000"/>
                   </a:solidFill>
@@ -16266,7 +16272,7 @@
             </a:ln>
             <a:extLst>
               <a:ext uri="{91240B29-F687-4f45-9708-019B960494DF}">
-                <a14:hiddenLine xmlns="" xmlns:a16="http://schemas.microsoft.com/office/drawing/2014/main" xmlns:a14="http://schemas.microsoft.com/office/drawing/2010/main" xmlns:p14="http://schemas.microsoft.com/office/powerpoint/2010/main" w="9525">
+                <a14:hiddenLine xmlns:p14="http://schemas.microsoft.com/office/powerpoint/2010/main" xmlns:a14="http://schemas.microsoft.com/office/drawing/2010/main" xmlns:a16="http://schemas.microsoft.com/office/drawing/2014/main" xmlns="" w="9525">
                   <a:solidFill>
                     <a:srgbClr val="000000"/>
                   </a:solidFill>
@@ -16371,7 +16377,7 @@
             </a:ln>
             <a:extLst>
               <a:ext uri="{91240B29-F687-4f45-9708-019B960494DF}">
-                <a14:hiddenLine xmlns="" xmlns:a16="http://schemas.microsoft.com/office/drawing/2014/main" xmlns:a14="http://schemas.microsoft.com/office/drawing/2010/main" xmlns:p14="http://schemas.microsoft.com/office/powerpoint/2010/main" w="9525">
+                <a14:hiddenLine xmlns:p14="http://schemas.microsoft.com/office/powerpoint/2010/main" xmlns:a14="http://schemas.microsoft.com/office/drawing/2010/main" xmlns:a16="http://schemas.microsoft.com/office/drawing/2014/main" xmlns="" w="9525">
                   <a:solidFill>
                     <a:srgbClr val="000000"/>
                   </a:solidFill>
@@ -16448,7 +16454,7 @@
             </a:ln>
             <a:extLst>
               <a:ext uri="{91240B29-F687-4f45-9708-019B960494DF}">
-                <a14:hiddenLine xmlns="" xmlns:a16="http://schemas.microsoft.com/office/drawing/2014/main" xmlns:a14="http://schemas.microsoft.com/office/drawing/2010/main" xmlns:p14="http://schemas.microsoft.com/office/powerpoint/2010/main" w="9525">
+                <a14:hiddenLine xmlns:p14="http://schemas.microsoft.com/office/powerpoint/2010/main" xmlns:a14="http://schemas.microsoft.com/office/drawing/2010/main" xmlns:a16="http://schemas.microsoft.com/office/drawing/2014/main" xmlns="" w="9525">
                   <a:solidFill>
                     <a:srgbClr val="000000"/>
                   </a:solidFill>
@@ -16573,7 +16579,7 @@
             </a:ln>
             <a:extLst>
               <a:ext uri="{91240B29-F687-4f45-9708-019B960494DF}">
-                <a14:hiddenLine xmlns="" xmlns:a16="http://schemas.microsoft.com/office/drawing/2014/main" xmlns:a14="http://schemas.microsoft.com/office/drawing/2010/main" xmlns:p14="http://schemas.microsoft.com/office/powerpoint/2010/main" w="9525">
+                <a14:hiddenLine xmlns:p14="http://schemas.microsoft.com/office/powerpoint/2010/main" xmlns:a14="http://schemas.microsoft.com/office/drawing/2010/main" xmlns:a16="http://schemas.microsoft.com/office/drawing/2014/main" xmlns="" w="9525">
                   <a:solidFill>
                     <a:srgbClr val="000000"/>
                   </a:solidFill>
@@ -16650,7 +16656,7 @@
             </a:ln>
             <a:extLst>
               <a:ext uri="{91240B29-F687-4f45-9708-019B960494DF}">
-                <a14:hiddenLine xmlns="" xmlns:a16="http://schemas.microsoft.com/office/drawing/2014/main" xmlns:a14="http://schemas.microsoft.com/office/drawing/2010/main" xmlns:p14="http://schemas.microsoft.com/office/powerpoint/2010/main" w="9525">
+                <a14:hiddenLine xmlns:p14="http://schemas.microsoft.com/office/powerpoint/2010/main" xmlns:a14="http://schemas.microsoft.com/office/drawing/2010/main" xmlns:a16="http://schemas.microsoft.com/office/drawing/2014/main" xmlns="" w="9525">
                   <a:solidFill>
                     <a:srgbClr val="000000"/>
                   </a:solidFill>
@@ -16755,7 +16761,7 @@
             </a:ln>
             <a:extLst>
               <a:ext uri="{91240B29-F687-4f45-9708-019B960494DF}">
-                <a14:hiddenLine xmlns="" xmlns:a16="http://schemas.microsoft.com/office/drawing/2014/main" xmlns:a14="http://schemas.microsoft.com/office/drawing/2010/main" xmlns:p14="http://schemas.microsoft.com/office/powerpoint/2010/main" w="9525">
+                <a14:hiddenLine xmlns:p14="http://schemas.microsoft.com/office/powerpoint/2010/main" xmlns:a14="http://schemas.microsoft.com/office/drawing/2010/main" xmlns:a16="http://schemas.microsoft.com/office/drawing/2014/main" xmlns="" w="9525">
                   <a:solidFill>
                     <a:srgbClr val="000000"/>
                   </a:solidFill>
@@ -16860,7 +16866,7 @@
             </a:ln>
             <a:extLst>
               <a:ext uri="{91240B29-F687-4f45-9708-019B960494DF}">
-                <a14:hiddenLine xmlns="" xmlns:a16="http://schemas.microsoft.com/office/drawing/2014/main" xmlns:a14="http://schemas.microsoft.com/office/drawing/2010/main" xmlns:p14="http://schemas.microsoft.com/office/powerpoint/2010/main" w="9525">
+                <a14:hiddenLine xmlns:p14="http://schemas.microsoft.com/office/powerpoint/2010/main" xmlns:a14="http://schemas.microsoft.com/office/drawing/2010/main" xmlns:a16="http://schemas.microsoft.com/office/drawing/2014/main" xmlns="" w="9525">
                   <a:solidFill>
                     <a:srgbClr val="000000"/>
                   </a:solidFill>
@@ -16937,7 +16943,7 @@
             </a:ln>
             <a:extLst>
               <a:ext uri="{91240B29-F687-4f45-9708-019B960494DF}">
-                <a14:hiddenLine xmlns="" xmlns:a16="http://schemas.microsoft.com/office/drawing/2014/main" xmlns:a14="http://schemas.microsoft.com/office/drawing/2010/main" xmlns:p14="http://schemas.microsoft.com/office/powerpoint/2010/main" w="9525">
+                <a14:hiddenLine xmlns:p14="http://schemas.microsoft.com/office/powerpoint/2010/main" xmlns:a14="http://schemas.microsoft.com/office/drawing/2010/main" xmlns:a16="http://schemas.microsoft.com/office/drawing/2014/main" xmlns="" w="9525">
                   <a:solidFill>
                     <a:srgbClr val="000000"/>
                   </a:solidFill>
@@ -17042,7 +17048,7 @@
             </a:ln>
             <a:extLst>
               <a:ext uri="{91240B29-F687-4f45-9708-019B960494DF}">
-                <a14:hiddenLine xmlns="" xmlns:a16="http://schemas.microsoft.com/office/drawing/2014/main" xmlns:a14="http://schemas.microsoft.com/office/drawing/2010/main" xmlns:p14="http://schemas.microsoft.com/office/powerpoint/2010/main" w="9525">
+                <a14:hiddenLine xmlns:p14="http://schemas.microsoft.com/office/powerpoint/2010/main" xmlns:a14="http://schemas.microsoft.com/office/drawing/2010/main" xmlns:a16="http://schemas.microsoft.com/office/drawing/2014/main" xmlns="" w="9525">
                   <a:solidFill>
                     <a:srgbClr val="000000"/>
                   </a:solidFill>
@@ -17147,7 +17153,7 @@
             </a:ln>
             <a:extLst>
               <a:ext uri="{91240B29-F687-4f45-9708-019B960494DF}">
-                <a14:hiddenLine xmlns="" xmlns:a16="http://schemas.microsoft.com/office/drawing/2014/main" xmlns:a14="http://schemas.microsoft.com/office/drawing/2010/main" xmlns:p14="http://schemas.microsoft.com/office/powerpoint/2010/main" w="9525">
+                <a14:hiddenLine xmlns:p14="http://schemas.microsoft.com/office/powerpoint/2010/main" xmlns:a14="http://schemas.microsoft.com/office/drawing/2010/main" xmlns:a16="http://schemas.microsoft.com/office/drawing/2014/main" xmlns="" w="9525">
                   <a:solidFill>
                     <a:srgbClr val="000000"/>
                   </a:solidFill>
@@ -17218,7 +17224,7 @@
             </a:ln>
             <a:extLst>
               <a:ext uri="{91240B29-F687-4f45-9708-019B960494DF}">
-                <a14:hiddenLine xmlns="" xmlns:a16="http://schemas.microsoft.com/office/drawing/2014/main" xmlns:a14="http://schemas.microsoft.com/office/drawing/2010/main" xmlns:p14="http://schemas.microsoft.com/office/powerpoint/2010/main" w="9525">
+                <a14:hiddenLine xmlns:p14="http://schemas.microsoft.com/office/powerpoint/2010/main" xmlns:a14="http://schemas.microsoft.com/office/drawing/2010/main" xmlns:a16="http://schemas.microsoft.com/office/drawing/2014/main" xmlns="" w="9525">
                   <a:solidFill>
                     <a:srgbClr val="000000"/>
                   </a:solidFill>
@@ -17323,7 +17329,7 @@
             </a:ln>
             <a:extLst>
               <a:ext uri="{91240B29-F687-4f45-9708-019B960494DF}">
-                <a14:hiddenLine xmlns="" xmlns:a16="http://schemas.microsoft.com/office/drawing/2014/main" xmlns:a14="http://schemas.microsoft.com/office/drawing/2010/main" xmlns:p14="http://schemas.microsoft.com/office/powerpoint/2010/main" w="9525">
+                <a14:hiddenLine xmlns:p14="http://schemas.microsoft.com/office/powerpoint/2010/main" xmlns:a14="http://schemas.microsoft.com/office/drawing/2010/main" xmlns:a16="http://schemas.microsoft.com/office/drawing/2014/main" xmlns="" w="9525">
                   <a:solidFill>
                     <a:srgbClr val="000000"/>
                   </a:solidFill>
@@ -17394,7 +17400,7 @@
             </a:ln>
             <a:extLst>
               <a:ext uri="{91240B29-F687-4f45-9708-019B960494DF}">
-                <a14:hiddenLine xmlns="" xmlns:a16="http://schemas.microsoft.com/office/drawing/2014/main" xmlns:a14="http://schemas.microsoft.com/office/drawing/2010/main" xmlns:p14="http://schemas.microsoft.com/office/powerpoint/2010/main" w="9525">
+                <a14:hiddenLine xmlns:p14="http://schemas.microsoft.com/office/powerpoint/2010/main" xmlns:a14="http://schemas.microsoft.com/office/drawing/2010/main" xmlns:a16="http://schemas.microsoft.com/office/drawing/2014/main" xmlns="" w="9525">
                   <a:solidFill>
                     <a:srgbClr val="000000"/>
                   </a:solidFill>
@@ -17499,7 +17505,7 @@
             </a:ln>
             <a:extLst>
               <a:ext uri="{91240B29-F687-4f45-9708-019B960494DF}">
-                <a14:hiddenLine xmlns="" xmlns:a16="http://schemas.microsoft.com/office/drawing/2014/main" xmlns:a14="http://schemas.microsoft.com/office/drawing/2010/main" xmlns:p14="http://schemas.microsoft.com/office/powerpoint/2010/main" w="9525">
+                <a14:hiddenLine xmlns:p14="http://schemas.microsoft.com/office/powerpoint/2010/main" xmlns:a14="http://schemas.microsoft.com/office/drawing/2010/main" xmlns:a16="http://schemas.microsoft.com/office/drawing/2014/main" xmlns="" w="9525">
                   <a:solidFill>
                     <a:srgbClr val="000000"/>
                   </a:solidFill>
@@ -17582,7 +17588,7 @@
             </a:ln>
             <a:extLst>
               <a:ext uri="{91240B29-F687-4f45-9708-019B960494DF}">
-                <a14:hiddenLine xmlns="" xmlns:a16="http://schemas.microsoft.com/office/drawing/2014/main" xmlns:a14="http://schemas.microsoft.com/office/drawing/2010/main" xmlns:p14="http://schemas.microsoft.com/office/powerpoint/2010/main" w="9525">
+                <a14:hiddenLine xmlns:p14="http://schemas.microsoft.com/office/powerpoint/2010/main" xmlns:a14="http://schemas.microsoft.com/office/drawing/2010/main" xmlns:a16="http://schemas.microsoft.com/office/drawing/2014/main" xmlns="" w="9525">
                   <a:solidFill>
                     <a:srgbClr val="000000"/>
                   </a:solidFill>
@@ -17687,7 +17693,7 @@
             </a:ln>
             <a:extLst>
               <a:ext uri="{91240B29-F687-4f45-9708-019B960494DF}">
-                <a14:hiddenLine xmlns="" xmlns:a16="http://schemas.microsoft.com/office/drawing/2014/main" xmlns:a14="http://schemas.microsoft.com/office/drawing/2010/main" xmlns:p14="http://schemas.microsoft.com/office/powerpoint/2010/main" w="9525">
+                <a14:hiddenLine xmlns:p14="http://schemas.microsoft.com/office/powerpoint/2010/main" xmlns:a14="http://schemas.microsoft.com/office/drawing/2010/main" xmlns:a16="http://schemas.microsoft.com/office/drawing/2014/main" xmlns="" w="9525">
                   <a:solidFill>
                     <a:srgbClr val="000000"/>
                   </a:solidFill>
@@ -17770,7 +17776,7 @@
             </a:ln>
             <a:extLst>
               <a:ext uri="{91240B29-F687-4f45-9708-019B960494DF}">
-                <a14:hiddenLine xmlns="" xmlns:a16="http://schemas.microsoft.com/office/drawing/2014/main" xmlns:a14="http://schemas.microsoft.com/office/drawing/2010/main" xmlns:p14="http://schemas.microsoft.com/office/powerpoint/2010/main" w="9525">
+                <a14:hiddenLine xmlns:p14="http://schemas.microsoft.com/office/powerpoint/2010/main" xmlns:a14="http://schemas.microsoft.com/office/drawing/2010/main" xmlns:a16="http://schemas.microsoft.com/office/drawing/2014/main" xmlns="" w="9525">
                   <a:solidFill>
                     <a:srgbClr val="000000"/>
                   </a:solidFill>
@@ -17875,7 +17881,7 @@
             </a:ln>
             <a:extLst>
               <a:ext uri="{91240B29-F687-4f45-9708-019B960494DF}">
-                <a14:hiddenLine xmlns="" xmlns:a16="http://schemas.microsoft.com/office/drawing/2014/main" xmlns:a14="http://schemas.microsoft.com/office/drawing/2010/main" xmlns:p14="http://schemas.microsoft.com/office/powerpoint/2010/main" w="9525">
+                <a14:hiddenLine xmlns:p14="http://schemas.microsoft.com/office/powerpoint/2010/main" xmlns:a14="http://schemas.microsoft.com/office/drawing/2010/main" xmlns:a16="http://schemas.microsoft.com/office/drawing/2014/main" xmlns="" w="9525">
                   <a:solidFill>
                     <a:srgbClr val="000000"/>
                   </a:solidFill>
@@ -17924,7 +17930,7 @@
             </a:ln>
             <a:extLst>
               <a:ext uri="{91240B29-F687-4f45-9708-019B960494DF}">
-                <a14:hiddenLine xmlns="" xmlns:a16="http://schemas.microsoft.com/office/drawing/2014/main" xmlns:a14="http://schemas.microsoft.com/office/drawing/2010/main" xmlns:p14="http://schemas.microsoft.com/office/powerpoint/2010/main" w="9525">
+                <a14:hiddenLine xmlns:p14="http://schemas.microsoft.com/office/powerpoint/2010/main" xmlns:a14="http://schemas.microsoft.com/office/drawing/2010/main" xmlns:a16="http://schemas.microsoft.com/office/drawing/2014/main" xmlns="" w="9525">
                   <a:solidFill>
                     <a:srgbClr val="000000"/>
                   </a:solidFill>
@@ -18029,7 +18035,7 @@
             </a:ln>
             <a:extLst>
               <a:ext uri="{91240B29-F687-4f45-9708-019B960494DF}">
-                <a14:hiddenLine xmlns="" xmlns:a16="http://schemas.microsoft.com/office/drawing/2014/main" xmlns:a14="http://schemas.microsoft.com/office/drawing/2010/main" xmlns:p14="http://schemas.microsoft.com/office/powerpoint/2010/main" w="9525">
+                <a14:hiddenLine xmlns:p14="http://schemas.microsoft.com/office/powerpoint/2010/main" xmlns:a14="http://schemas.microsoft.com/office/drawing/2010/main" xmlns:a16="http://schemas.microsoft.com/office/drawing/2014/main" xmlns="" w="9525">
                   <a:solidFill>
                     <a:srgbClr val="000000"/>
                   </a:solidFill>
@@ -18106,7 +18112,7 @@
             </a:ln>
             <a:extLst>
               <a:ext uri="{91240B29-F687-4f45-9708-019B960494DF}">
-                <a14:hiddenLine xmlns="" xmlns:a16="http://schemas.microsoft.com/office/drawing/2014/main" xmlns:a14="http://schemas.microsoft.com/office/drawing/2010/main" xmlns:p14="http://schemas.microsoft.com/office/powerpoint/2010/main" w="9525">
+                <a14:hiddenLine xmlns:p14="http://schemas.microsoft.com/office/powerpoint/2010/main" xmlns:a14="http://schemas.microsoft.com/office/drawing/2010/main" xmlns:a16="http://schemas.microsoft.com/office/drawing/2014/main" xmlns="" w="9525">
                   <a:solidFill>
                     <a:srgbClr val="000000"/>
                   </a:solidFill>
@@ -18183,7 +18189,7 @@
             </a:ln>
             <a:extLst>
               <a:ext uri="{91240B29-F687-4f45-9708-019B960494DF}">
-                <a14:hiddenLine xmlns="" xmlns:a16="http://schemas.microsoft.com/office/drawing/2014/main" xmlns:a14="http://schemas.microsoft.com/office/drawing/2010/main" xmlns:p14="http://schemas.microsoft.com/office/powerpoint/2010/main" w="9525">
+                <a14:hiddenLine xmlns:p14="http://schemas.microsoft.com/office/powerpoint/2010/main" xmlns:a14="http://schemas.microsoft.com/office/drawing/2010/main" xmlns:a16="http://schemas.microsoft.com/office/drawing/2014/main" xmlns="" w="9525">
                   <a:solidFill>
                     <a:srgbClr val="000000"/>
                   </a:solidFill>
@@ -18288,7 +18294,7 @@
             </a:ln>
             <a:extLst>
               <a:ext uri="{91240B29-F687-4f45-9708-019B960494DF}">
-                <a14:hiddenLine xmlns="" xmlns:a16="http://schemas.microsoft.com/office/drawing/2014/main" xmlns:a14="http://schemas.microsoft.com/office/drawing/2010/main" xmlns:p14="http://schemas.microsoft.com/office/powerpoint/2010/main" w="9525">
+                <a14:hiddenLine xmlns:p14="http://schemas.microsoft.com/office/powerpoint/2010/main" xmlns:a14="http://schemas.microsoft.com/office/drawing/2010/main" xmlns:a16="http://schemas.microsoft.com/office/drawing/2014/main" xmlns="" w="9525">
                   <a:solidFill>
                     <a:srgbClr val="000000"/>
                   </a:solidFill>
@@ -18371,7 +18377,7 @@
             </a:ln>
             <a:extLst>
               <a:ext uri="{91240B29-F687-4f45-9708-019B960494DF}">
-                <a14:hiddenLine xmlns="" xmlns:a16="http://schemas.microsoft.com/office/drawing/2014/main" xmlns:a14="http://schemas.microsoft.com/office/drawing/2010/main" xmlns:p14="http://schemas.microsoft.com/office/powerpoint/2010/main" w="9525">
+                <a14:hiddenLine xmlns:p14="http://schemas.microsoft.com/office/powerpoint/2010/main" xmlns:a14="http://schemas.microsoft.com/office/drawing/2010/main" xmlns:a16="http://schemas.microsoft.com/office/drawing/2014/main" xmlns="" w="9525">
                   <a:solidFill>
                     <a:srgbClr val="000000"/>
                   </a:solidFill>
@@ -18448,7 +18454,7 @@
             </a:ln>
             <a:extLst>
               <a:ext uri="{91240B29-F687-4f45-9708-019B960494DF}">
-                <a14:hiddenLine xmlns="" xmlns:a16="http://schemas.microsoft.com/office/drawing/2014/main" xmlns:a14="http://schemas.microsoft.com/office/drawing/2010/main" xmlns:p14="http://schemas.microsoft.com/office/powerpoint/2010/main" w="9525">
+                <a14:hiddenLine xmlns:p14="http://schemas.microsoft.com/office/powerpoint/2010/main" xmlns:a14="http://schemas.microsoft.com/office/drawing/2010/main" xmlns:a16="http://schemas.microsoft.com/office/drawing/2014/main" xmlns="" w="9525">
                   <a:solidFill>
                     <a:srgbClr val="000000"/>
                   </a:solidFill>
@@ -18553,7 +18559,7 @@
             </a:ln>
             <a:extLst>
               <a:ext uri="{91240B29-F687-4f45-9708-019B960494DF}">
-                <a14:hiddenLine xmlns="" xmlns:a16="http://schemas.microsoft.com/office/drawing/2014/main" xmlns:a14="http://schemas.microsoft.com/office/drawing/2010/main" xmlns:p14="http://schemas.microsoft.com/office/powerpoint/2010/main" w="9525">
+                <a14:hiddenLine xmlns:p14="http://schemas.microsoft.com/office/powerpoint/2010/main" xmlns:a14="http://schemas.microsoft.com/office/drawing/2010/main" xmlns:a16="http://schemas.microsoft.com/office/drawing/2014/main" xmlns="" w="9525">
                   <a:solidFill>
                     <a:srgbClr val="000000"/>
                   </a:solidFill>
@@ -18630,7 +18636,7 @@
             </a:ln>
             <a:extLst>
               <a:ext uri="{91240B29-F687-4f45-9708-019B960494DF}">
-                <a14:hiddenLine xmlns="" xmlns:a16="http://schemas.microsoft.com/office/drawing/2014/main" xmlns:a14="http://schemas.microsoft.com/office/drawing/2010/main" xmlns:p14="http://schemas.microsoft.com/office/powerpoint/2010/main" w="9525">
+                <a14:hiddenLine xmlns:p14="http://schemas.microsoft.com/office/powerpoint/2010/main" xmlns:a14="http://schemas.microsoft.com/office/drawing/2010/main" xmlns:a16="http://schemas.microsoft.com/office/drawing/2014/main" xmlns="" w="9525">
                   <a:solidFill>
                     <a:srgbClr val="000000"/>
                   </a:solidFill>
@@ -18735,7 +18741,7 @@
             </a:ln>
             <a:extLst>
               <a:ext uri="{91240B29-F687-4f45-9708-019B960494DF}">
-                <a14:hiddenLine xmlns="" xmlns:a16="http://schemas.microsoft.com/office/drawing/2014/main" xmlns:a14="http://schemas.microsoft.com/office/drawing/2010/main" xmlns:p14="http://schemas.microsoft.com/office/powerpoint/2010/main" w="9525">
+                <a14:hiddenLine xmlns:p14="http://schemas.microsoft.com/office/powerpoint/2010/main" xmlns:a14="http://schemas.microsoft.com/office/drawing/2010/main" xmlns:a16="http://schemas.microsoft.com/office/drawing/2014/main" xmlns="" w="9525">
                   <a:solidFill>
                     <a:srgbClr val="000000"/>
                   </a:solidFill>
@@ -18812,7 +18818,7 @@
             </a:ln>
             <a:extLst>
               <a:ext uri="{91240B29-F687-4f45-9708-019B960494DF}">
-                <a14:hiddenLine xmlns="" xmlns:a16="http://schemas.microsoft.com/office/drawing/2014/main" xmlns:a14="http://schemas.microsoft.com/office/drawing/2010/main" xmlns:p14="http://schemas.microsoft.com/office/powerpoint/2010/main" w="9525">
+                <a14:hiddenLine xmlns:p14="http://schemas.microsoft.com/office/powerpoint/2010/main" xmlns:a14="http://schemas.microsoft.com/office/drawing/2010/main" xmlns:a16="http://schemas.microsoft.com/office/drawing/2014/main" xmlns="" w="9525">
                   <a:solidFill>
                     <a:srgbClr val="000000"/>
                   </a:solidFill>
@@ -18917,7 +18923,7 @@
             </a:ln>
             <a:extLst>
               <a:ext uri="{91240B29-F687-4f45-9708-019B960494DF}">
-                <a14:hiddenLine xmlns="" xmlns:a16="http://schemas.microsoft.com/office/drawing/2014/main" xmlns:a14="http://schemas.microsoft.com/office/drawing/2010/main" xmlns:p14="http://schemas.microsoft.com/office/powerpoint/2010/main" w="9525">
+                <a14:hiddenLine xmlns:p14="http://schemas.microsoft.com/office/powerpoint/2010/main" xmlns:a14="http://schemas.microsoft.com/office/drawing/2010/main" xmlns:a16="http://schemas.microsoft.com/office/drawing/2014/main" xmlns="" w="9525">
                   <a:solidFill>
                     <a:srgbClr val="000000"/>
                   </a:solidFill>
@@ -18966,7 +18972,7 @@
             </a:ln>
             <a:extLst>
               <a:ext uri="{91240B29-F687-4f45-9708-019B960494DF}">
-                <a14:hiddenLine xmlns="" xmlns:a16="http://schemas.microsoft.com/office/drawing/2014/main" xmlns:a14="http://schemas.microsoft.com/office/drawing/2010/main" xmlns:p14="http://schemas.microsoft.com/office/powerpoint/2010/main" w="9525">
+                <a14:hiddenLine xmlns:p14="http://schemas.microsoft.com/office/powerpoint/2010/main" xmlns:a14="http://schemas.microsoft.com/office/drawing/2010/main" xmlns:a16="http://schemas.microsoft.com/office/drawing/2014/main" xmlns="" w="9525">
                   <a:solidFill>
                     <a:srgbClr val="000000"/>
                   </a:solidFill>
@@ -19046,7 +19052,7 @@
             </a:ln>
             <a:extLst>
               <a:ext uri="{91240B29-F687-4f45-9708-019B960494DF}">
-                <a14:hiddenLine xmlns="" xmlns:a16="http://schemas.microsoft.com/office/drawing/2014/main" xmlns:a14="http://schemas.microsoft.com/office/drawing/2010/main" xmlns:p14="http://schemas.microsoft.com/office/powerpoint/2010/main" w="9525">
+                <a14:hiddenLine xmlns:p14="http://schemas.microsoft.com/office/powerpoint/2010/main" xmlns:a14="http://schemas.microsoft.com/office/drawing/2010/main" xmlns:a16="http://schemas.microsoft.com/office/drawing/2014/main" xmlns="" w="9525">
                   <a:solidFill>
                     <a:srgbClr val="000000"/>
                   </a:solidFill>
@@ -19151,7 +19157,7 @@
             </a:ln>
             <a:extLst>
               <a:ext uri="{91240B29-F687-4f45-9708-019B960494DF}">
-                <a14:hiddenLine xmlns="" xmlns:a16="http://schemas.microsoft.com/office/drawing/2014/main" xmlns:a14="http://schemas.microsoft.com/office/drawing/2010/main" xmlns:p14="http://schemas.microsoft.com/office/powerpoint/2010/main" w="9525">
+                <a14:hiddenLine xmlns:p14="http://schemas.microsoft.com/office/powerpoint/2010/main" xmlns:a14="http://schemas.microsoft.com/office/drawing/2010/main" xmlns:a16="http://schemas.microsoft.com/office/drawing/2014/main" xmlns="" w="9525">
                   <a:solidFill>
                     <a:srgbClr val="000000"/>
                   </a:solidFill>
@@ -19228,7 +19234,7 @@
             </a:ln>
             <a:extLst>
               <a:ext uri="{91240B29-F687-4f45-9708-019B960494DF}">
-                <a14:hiddenLine xmlns="" xmlns:a16="http://schemas.microsoft.com/office/drawing/2014/main" xmlns:a14="http://schemas.microsoft.com/office/drawing/2010/main" xmlns:p14="http://schemas.microsoft.com/office/powerpoint/2010/main" w="9525">
+                <a14:hiddenLine xmlns:p14="http://schemas.microsoft.com/office/powerpoint/2010/main" xmlns:a14="http://schemas.microsoft.com/office/drawing/2010/main" xmlns:a16="http://schemas.microsoft.com/office/drawing/2014/main" xmlns="" w="9525">
                   <a:solidFill>
                     <a:srgbClr val="000000"/>
                   </a:solidFill>
@@ -19333,7 +19339,7 @@
             </a:ln>
             <a:extLst>
               <a:ext uri="{91240B29-F687-4f45-9708-019B960494DF}">
-                <a14:hiddenLine xmlns="" xmlns:a16="http://schemas.microsoft.com/office/drawing/2014/main" xmlns:a14="http://schemas.microsoft.com/office/drawing/2010/main" xmlns:p14="http://schemas.microsoft.com/office/powerpoint/2010/main" w="9525">
+                <a14:hiddenLine xmlns:p14="http://schemas.microsoft.com/office/powerpoint/2010/main" xmlns:a14="http://schemas.microsoft.com/office/drawing/2010/main" xmlns:a16="http://schemas.microsoft.com/office/drawing/2014/main" xmlns="" w="9525">
                   <a:solidFill>
                     <a:srgbClr val="000000"/>
                   </a:solidFill>
@@ -19438,7 +19444,7 @@
             </a:ln>
             <a:extLst>
               <a:ext uri="{91240B29-F687-4f45-9708-019B960494DF}">
-                <a14:hiddenLine xmlns="" xmlns:a16="http://schemas.microsoft.com/office/drawing/2014/main" xmlns:a14="http://schemas.microsoft.com/office/drawing/2010/main" xmlns:p14="http://schemas.microsoft.com/office/powerpoint/2010/main" w="9525">
+                <a14:hiddenLine xmlns:p14="http://schemas.microsoft.com/office/powerpoint/2010/main" xmlns:a14="http://schemas.microsoft.com/office/drawing/2010/main" xmlns:a16="http://schemas.microsoft.com/office/drawing/2014/main" xmlns="" w="9525">
                   <a:solidFill>
                     <a:srgbClr val="000000"/>
                   </a:solidFill>
@@ -19518,7 +19524,7 @@
             </a:ln>
             <a:extLst>
               <a:ext uri="{91240B29-F687-4f45-9708-019B960494DF}">
-                <a14:hiddenLine xmlns="" xmlns:a16="http://schemas.microsoft.com/office/drawing/2014/main" xmlns:a14="http://schemas.microsoft.com/office/drawing/2010/main" xmlns:p14="http://schemas.microsoft.com/office/powerpoint/2010/main" w="9525">
+                <a14:hiddenLine xmlns:p14="http://schemas.microsoft.com/office/powerpoint/2010/main" xmlns:a14="http://schemas.microsoft.com/office/drawing/2010/main" xmlns:a16="http://schemas.microsoft.com/office/drawing/2014/main" xmlns="" w="9525">
                   <a:solidFill>
                     <a:srgbClr val="000000"/>
                   </a:solidFill>
@@ -19595,7 +19601,7 @@
             </a:ln>
             <a:extLst>
               <a:ext uri="{91240B29-F687-4f45-9708-019B960494DF}">
-                <a14:hiddenLine xmlns="" xmlns:a16="http://schemas.microsoft.com/office/drawing/2014/main" xmlns:a14="http://schemas.microsoft.com/office/drawing/2010/main" xmlns:p14="http://schemas.microsoft.com/office/powerpoint/2010/main" w="9525">
+                <a14:hiddenLine xmlns:p14="http://schemas.microsoft.com/office/powerpoint/2010/main" xmlns:a14="http://schemas.microsoft.com/office/drawing/2010/main" xmlns:a16="http://schemas.microsoft.com/office/drawing/2014/main" xmlns="" w="9525">
                   <a:solidFill>
                     <a:srgbClr val="000000"/>
                   </a:solidFill>
@@ -19700,7 +19706,7 @@
             </a:ln>
             <a:extLst>
               <a:ext uri="{91240B29-F687-4f45-9708-019B960494DF}">
-                <a14:hiddenLine xmlns="" xmlns:a16="http://schemas.microsoft.com/office/drawing/2014/main" xmlns:a14="http://schemas.microsoft.com/office/drawing/2010/main" xmlns:p14="http://schemas.microsoft.com/office/powerpoint/2010/main" w="9525">
+                <a14:hiddenLine xmlns:p14="http://schemas.microsoft.com/office/powerpoint/2010/main" xmlns:a14="http://schemas.microsoft.com/office/drawing/2010/main" xmlns:a16="http://schemas.microsoft.com/office/drawing/2014/main" xmlns="" w="9525">
                   <a:solidFill>
                     <a:srgbClr val="000000"/>
                   </a:solidFill>
@@ -19805,7 +19811,7 @@
             </a:ln>
             <a:extLst>
               <a:ext uri="{91240B29-F687-4f45-9708-019B960494DF}">
-                <a14:hiddenLine xmlns="" xmlns:a16="http://schemas.microsoft.com/office/drawing/2014/main" xmlns:a14="http://schemas.microsoft.com/office/drawing/2010/main" xmlns:p14="http://schemas.microsoft.com/office/powerpoint/2010/main" w="9525">
+                <a14:hiddenLine xmlns:p14="http://schemas.microsoft.com/office/powerpoint/2010/main" xmlns:a14="http://schemas.microsoft.com/office/drawing/2010/main" xmlns:a16="http://schemas.microsoft.com/office/drawing/2014/main" xmlns="" w="9525">
                   <a:solidFill>
                     <a:srgbClr val="000000"/>
                   </a:solidFill>
@@ -19882,7 +19888,7 @@
             </a:ln>
             <a:extLst>
               <a:ext uri="{91240B29-F687-4f45-9708-019B960494DF}">
-                <a14:hiddenLine xmlns="" xmlns:a16="http://schemas.microsoft.com/office/drawing/2014/main" xmlns:a14="http://schemas.microsoft.com/office/drawing/2010/main" xmlns:p14="http://schemas.microsoft.com/office/powerpoint/2010/main" w="9525">
+                <a14:hiddenLine xmlns:p14="http://schemas.microsoft.com/office/powerpoint/2010/main" xmlns:a14="http://schemas.microsoft.com/office/drawing/2010/main" xmlns:a16="http://schemas.microsoft.com/office/drawing/2014/main" xmlns="" w="9525">
                   <a:solidFill>
                     <a:srgbClr val="000000"/>
                   </a:solidFill>
@@ -20017,7 +20023,7 @@
             </a:ln>
             <a:extLst>
               <a:ext uri="{91240B29-F687-4f45-9708-019B960494DF}">
-                <a14:hiddenLine xmlns="" xmlns:a16="http://schemas.microsoft.com/office/drawing/2014/main" xmlns:a14="http://schemas.microsoft.com/office/drawing/2010/main" xmlns:p14="http://schemas.microsoft.com/office/powerpoint/2010/main" w="9525">
+                <a14:hiddenLine xmlns:p14="http://schemas.microsoft.com/office/powerpoint/2010/main" xmlns:a14="http://schemas.microsoft.com/office/drawing/2010/main" xmlns:a16="http://schemas.microsoft.com/office/drawing/2014/main" xmlns="" w="9525">
                   <a:solidFill>
                     <a:srgbClr val="000000"/>
                   </a:solidFill>
@@ -20100,7 +20106,7 @@
             </a:ln>
             <a:extLst>
               <a:ext uri="{91240B29-F687-4f45-9708-019B960494DF}">
-                <a14:hiddenLine xmlns="" xmlns:a16="http://schemas.microsoft.com/office/drawing/2014/main" xmlns:a14="http://schemas.microsoft.com/office/drawing/2010/main" xmlns:p14="http://schemas.microsoft.com/office/powerpoint/2010/main" w="9525">
+                <a14:hiddenLine xmlns:p14="http://schemas.microsoft.com/office/powerpoint/2010/main" xmlns:a14="http://schemas.microsoft.com/office/drawing/2010/main" xmlns:a16="http://schemas.microsoft.com/office/drawing/2014/main" xmlns="" w="9525">
                   <a:solidFill>
                     <a:srgbClr val="000000"/>
                   </a:solidFill>
@@ -20205,7 +20211,7 @@
             </a:ln>
             <a:extLst>
               <a:ext uri="{91240B29-F687-4f45-9708-019B960494DF}">
-                <a14:hiddenLine xmlns="" xmlns:a16="http://schemas.microsoft.com/office/drawing/2014/main" xmlns:a14="http://schemas.microsoft.com/office/drawing/2010/main" xmlns:p14="http://schemas.microsoft.com/office/powerpoint/2010/main" w="9525">
+                <a14:hiddenLine xmlns:p14="http://schemas.microsoft.com/office/powerpoint/2010/main" xmlns:a14="http://schemas.microsoft.com/office/drawing/2010/main" xmlns:a16="http://schemas.microsoft.com/office/drawing/2014/main" xmlns="" w="9525">
                   <a:solidFill>
                     <a:srgbClr val="000000"/>
                   </a:solidFill>
@@ -20335,7 +20341,7 @@
             </a:ln>
             <a:extLst>
               <a:ext uri="{91240B29-F687-4f45-9708-019B960494DF}">
-                <a14:hiddenLine xmlns="" xmlns:a16="http://schemas.microsoft.com/office/drawing/2014/main" xmlns:a14="http://schemas.microsoft.com/office/drawing/2010/main" xmlns:p14="http://schemas.microsoft.com/office/powerpoint/2010/main" w="9525">
+                <a14:hiddenLine xmlns:p14="http://schemas.microsoft.com/office/powerpoint/2010/main" xmlns:a14="http://schemas.microsoft.com/office/drawing/2010/main" xmlns:a16="http://schemas.microsoft.com/office/drawing/2014/main" xmlns="" w="9525">
                   <a:solidFill>
                     <a:srgbClr val="000000"/>
                   </a:solidFill>
@@ -20465,7 +20471,7 @@
             </a:ln>
             <a:extLst>
               <a:ext uri="{91240B29-F687-4f45-9708-019B960494DF}">
-                <a14:hiddenLine xmlns="" xmlns:a16="http://schemas.microsoft.com/office/drawing/2014/main" xmlns:a14="http://schemas.microsoft.com/office/drawing/2010/main" xmlns:p14="http://schemas.microsoft.com/office/powerpoint/2010/main" w="9525">
+                <a14:hiddenLine xmlns:p14="http://schemas.microsoft.com/office/powerpoint/2010/main" xmlns:a14="http://schemas.microsoft.com/office/drawing/2010/main" xmlns:a16="http://schemas.microsoft.com/office/drawing/2014/main" xmlns="" w="9525">
                   <a:solidFill>
                     <a:srgbClr val="000000"/>
                   </a:solidFill>
@@ -20570,7 +20576,7 @@
             </a:ln>
             <a:extLst>
               <a:ext uri="{91240B29-F687-4f45-9708-019B960494DF}">
-                <a14:hiddenLine xmlns="" xmlns:a16="http://schemas.microsoft.com/office/drawing/2014/main" xmlns:a14="http://schemas.microsoft.com/office/drawing/2010/main" xmlns:p14="http://schemas.microsoft.com/office/powerpoint/2010/main" w="9525">
+                <a14:hiddenLine xmlns:p14="http://schemas.microsoft.com/office/powerpoint/2010/main" xmlns:a14="http://schemas.microsoft.com/office/drawing/2010/main" xmlns:a16="http://schemas.microsoft.com/office/drawing/2014/main" xmlns="" w="9525">
                   <a:solidFill>
                     <a:srgbClr val="000000"/>
                   </a:solidFill>
@@ -20650,7 +20656,7 @@
             </a:ln>
             <a:extLst>
               <a:ext uri="{91240B29-F687-4f45-9708-019B960494DF}">
-                <a14:hiddenLine xmlns="" xmlns:a16="http://schemas.microsoft.com/office/drawing/2014/main" xmlns:a14="http://schemas.microsoft.com/office/drawing/2010/main" xmlns:p14="http://schemas.microsoft.com/office/powerpoint/2010/main" w="9525">
+                <a14:hiddenLine xmlns:p14="http://schemas.microsoft.com/office/powerpoint/2010/main" xmlns:a14="http://schemas.microsoft.com/office/drawing/2010/main" xmlns:a16="http://schemas.microsoft.com/office/drawing/2014/main" xmlns="" w="9525">
                   <a:solidFill>
                     <a:srgbClr val="000000"/>
                   </a:solidFill>
@@ -20755,7 +20761,7 @@
             </a:ln>
             <a:extLst>
               <a:ext uri="{91240B29-F687-4f45-9708-019B960494DF}">
-                <a14:hiddenLine xmlns="" xmlns:a16="http://schemas.microsoft.com/office/drawing/2014/main" xmlns:a14="http://schemas.microsoft.com/office/drawing/2010/main" xmlns:p14="http://schemas.microsoft.com/office/powerpoint/2010/main" w="9525">
+                <a14:hiddenLine xmlns:p14="http://schemas.microsoft.com/office/powerpoint/2010/main" xmlns:a14="http://schemas.microsoft.com/office/drawing/2010/main" xmlns:a16="http://schemas.microsoft.com/office/drawing/2014/main" xmlns="" w="9525">
                   <a:solidFill>
                     <a:srgbClr val="000000"/>
                   </a:solidFill>
@@ -20838,7 +20844,7 @@
             </a:ln>
             <a:extLst>
               <a:ext uri="{91240B29-F687-4f45-9708-019B960494DF}">
-                <a14:hiddenLine xmlns="" xmlns:a16="http://schemas.microsoft.com/office/drawing/2014/main" xmlns:a14="http://schemas.microsoft.com/office/drawing/2010/main" xmlns:p14="http://schemas.microsoft.com/office/powerpoint/2010/main" w="9525">
+                <a14:hiddenLine xmlns:p14="http://schemas.microsoft.com/office/powerpoint/2010/main" xmlns:a14="http://schemas.microsoft.com/office/drawing/2010/main" xmlns:a16="http://schemas.microsoft.com/office/drawing/2014/main" xmlns="" w="9525">
                   <a:solidFill>
                     <a:srgbClr val="000000"/>
                   </a:solidFill>
@@ -20943,7 +20949,7 @@
             </a:ln>
             <a:extLst>
               <a:ext uri="{91240B29-F687-4f45-9708-019B960494DF}">
-                <a14:hiddenLine xmlns="" xmlns:a16="http://schemas.microsoft.com/office/drawing/2014/main" xmlns:a14="http://schemas.microsoft.com/office/drawing/2010/main" xmlns:p14="http://schemas.microsoft.com/office/powerpoint/2010/main" w="9525">
+                <a14:hiddenLine xmlns:p14="http://schemas.microsoft.com/office/powerpoint/2010/main" xmlns:a14="http://schemas.microsoft.com/office/drawing/2010/main" xmlns:a16="http://schemas.microsoft.com/office/drawing/2014/main" xmlns="" w="9525">
                   <a:solidFill>
                     <a:srgbClr val="000000"/>
                   </a:solidFill>
@@ -21026,7 +21032,7 @@
             </a:ln>
             <a:extLst>
               <a:ext uri="{91240B29-F687-4f45-9708-019B960494DF}">
-                <a14:hiddenLine xmlns="" xmlns:a16="http://schemas.microsoft.com/office/drawing/2014/main" xmlns:a14="http://schemas.microsoft.com/office/drawing/2010/main" xmlns:p14="http://schemas.microsoft.com/office/powerpoint/2010/main" w="9525">
+                <a14:hiddenLine xmlns:p14="http://schemas.microsoft.com/office/powerpoint/2010/main" xmlns:a14="http://schemas.microsoft.com/office/drawing/2010/main" xmlns:a16="http://schemas.microsoft.com/office/drawing/2014/main" xmlns="" w="9525">
                   <a:solidFill>
                     <a:srgbClr val="000000"/>
                   </a:solidFill>
@@ -21131,7 +21137,7 @@
             </a:ln>
             <a:extLst>
               <a:ext uri="{91240B29-F687-4f45-9708-019B960494DF}">
-                <a14:hiddenLine xmlns="" xmlns:a16="http://schemas.microsoft.com/office/drawing/2014/main" xmlns:a14="http://schemas.microsoft.com/office/drawing/2010/main" xmlns:p14="http://schemas.microsoft.com/office/powerpoint/2010/main" w="9525">
+                <a14:hiddenLine xmlns:p14="http://schemas.microsoft.com/office/powerpoint/2010/main" xmlns:a14="http://schemas.microsoft.com/office/drawing/2010/main" xmlns:a16="http://schemas.microsoft.com/office/drawing/2014/main" xmlns="" w="9525">
                   <a:solidFill>
                     <a:srgbClr val="000000"/>
                   </a:solidFill>
@@ -21180,7 +21186,7 @@
             </a:ln>
             <a:extLst>
               <a:ext uri="{91240B29-F687-4f45-9708-019B960494DF}">
-                <a14:hiddenLine xmlns="" xmlns:a16="http://schemas.microsoft.com/office/drawing/2014/main" xmlns:a14="http://schemas.microsoft.com/office/drawing/2010/main" xmlns:p14="http://schemas.microsoft.com/office/powerpoint/2010/main" w="9525">
+                <a14:hiddenLine xmlns:p14="http://schemas.microsoft.com/office/powerpoint/2010/main" xmlns:a14="http://schemas.microsoft.com/office/drawing/2010/main" xmlns:a16="http://schemas.microsoft.com/office/drawing/2014/main" xmlns="" w="9525">
                   <a:solidFill>
                     <a:srgbClr val="000000"/>
                   </a:solidFill>
@@ -21522,6 +21528,101 @@
           <p:cNvPr id="2" name="Title 1">
             <a:extLst>
               <a:ext uri="{FF2B5EF4-FFF2-40B4-BE49-F238E27FC236}">
+                <a16:creationId xmlns:a16="http://schemas.microsoft.com/office/drawing/2014/main" id="{788D4D23-7D2E-48CD-98DA-4D2E949152C6}"/>
+              </a:ext>
+            </a:extLst>
+          </p:cNvPr>
+          <p:cNvSpPr>
+            <a:spLocks noGrp="1"/>
+          </p:cNvSpPr>
+          <p:nvPr>
+            <p:ph type="title"/>
+          </p:nvPr>
+        </p:nvSpPr>
+        <p:spPr/>
+        <p:txBody>
+          <a:bodyPr/>
+          <a:lstStyle/>
+          <a:p>
+            <a:pPr algn="ctr"/>
+            <a:r>
+              <a:rPr lang="en-US" dirty="0"/>
+              <a:t>Protein Structure and Domains</a:t>
+            </a:r>
+          </a:p>
+        </p:txBody>
+      </p:sp>
+      <p:sp>
+        <p:nvSpPr>
+          <p:cNvPr id="3" name="Content Placeholder 2">
+            <a:extLst>
+              <a:ext uri="{FF2B5EF4-FFF2-40B4-BE49-F238E27FC236}">
+                <a16:creationId xmlns:a16="http://schemas.microsoft.com/office/drawing/2014/main" id="{53274F13-FA89-4BB9-BE9D-33722F0F966D}"/>
+              </a:ext>
+            </a:extLst>
+          </p:cNvPr>
+          <p:cNvSpPr>
+            <a:spLocks noGrp="1"/>
+          </p:cNvSpPr>
+          <p:nvPr>
+            <p:ph idx="1"/>
+          </p:nvPr>
+        </p:nvSpPr>
+        <p:spPr/>
+        <p:txBody>
+          <a:bodyPr/>
+          <a:lstStyle/>
+          <a:p>
+            <a:r>
+              <a:rPr lang="en-US" dirty="0"/>
+              <a:t>Receptor Binding Domain (</a:t>
+            </a:r>
+            <a:r>
+              <a:rPr lang="en-US" u="sng" dirty="0"/>
+              <a:t>RBD</a:t>
+            </a:r>
+            <a:r>
+              <a:rPr lang="en-US" dirty="0"/>
+              <a:t>) is at amino acids 327-529</a:t>
+            </a:r>
+          </a:p>
+        </p:txBody>
+      </p:sp>
+    </p:spTree>
+    <p:extLst>
+      <p:ext uri="{BB962C8B-B14F-4D97-AF65-F5344CB8AC3E}">
+        <p14:creationId xmlns:p14="http://schemas.microsoft.com/office/powerpoint/2010/main" val="1711689920"/>
+      </p:ext>
+    </p:extLst>
+  </p:cSld>
+  <p:clrMapOvr>
+    <a:masterClrMapping/>
+  </p:clrMapOvr>
+</p:sld>
+</file>
+
+<file path=ppt/slides/slide5.xml><?xml version="1.0" encoding="utf-8"?>
+<p:sld xmlns:a="http://schemas.openxmlformats.org/drawingml/2006/main" xmlns:r="http://schemas.openxmlformats.org/officeDocument/2006/relationships" xmlns:p="http://schemas.openxmlformats.org/presentationml/2006/main">
+  <p:cSld>
+    <p:spTree>
+      <p:nvGrpSpPr>
+        <p:cNvPr id="1" name=""/>
+        <p:cNvGrpSpPr/>
+        <p:nvPr/>
+      </p:nvGrpSpPr>
+      <p:grpSpPr>
+        <a:xfrm>
+          <a:off x="0" y="0"/>
+          <a:ext cx="0" cy="0"/>
+          <a:chOff x="0" y="0"/>
+          <a:chExt cx="0" cy="0"/>
+        </a:xfrm>
+      </p:grpSpPr>
+      <p:sp>
+        <p:nvSpPr>
+          <p:cNvPr id="2" name="Title 1">
+            <a:extLst>
+              <a:ext uri="{FF2B5EF4-FFF2-40B4-BE49-F238E27FC236}">
                 <a16:creationId xmlns:a16="http://schemas.microsoft.com/office/drawing/2014/main" id="{930B5D7E-D893-4EA6-A007-907C2EE8E32B}"/>
               </a:ext>
             </a:extLst>
@@ -21593,7 +21694,7 @@
 </p:sld>
 </file>
 
-<file path=ppt/slides/slide5.xml><?xml version="1.0" encoding="utf-8"?>
+<file path=ppt/slides/slide6.xml><?xml version="1.0" encoding="utf-8"?>
 <p:sld xmlns:a="http://schemas.openxmlformats.org/drawingml/2006/main" xmlns:r="http://schemas.openxmlformats.org/officeDocument/2006/relationships" xmlns:p="http://schemas.openxmlformats.org/presentationml/2006/main">
   <p:cSld>
     <p:spTree>
@@ -21715,7 +21816,7 @@
 </p:sld>
 </file>
 
-<file path=ppt/slides/slide6.xml><?xml version="1.0" encoding="utf-8"?>
+<file path=ppt/slides/slide7.xml><?xml version="1.0" encoding="utf-8"?>
 <p:sld xmlns:a="http://schemas.openxmlformats.org/drawingml/2006/main" xmlns:r="http://schemas.openxmlformats.org/officeDocument/2006/relationships" xmlns:p="http://schemas.openxmlformats.org/presentationml/2006/main">
   <p:cSld>
     <p:spTree>
@@ -21807,7 +21908,7 @@
 </p:sld>
 </file>
 
-<file path=ppt/slides/slide7.xml><?xml version="1.0" encoding="utf-8"?>
+<file path=ppt/slides/slide8.xml><?xml version="1.0" encoding="utf-8"?>
 <p:sld xmlns:a="http://schemas.openxmlformats.org/drawingml/2006/main" xmlns:r="http://schemas.openxmlformats.org/officeDocument/2006/relationships" xmlns:p="http://schemas.openxmlformats.org/presentationml/2006/main">
   <p:cSld>
     <p:spTree>
@@ -21927,7 +22028,7 @@
 </p:sld>
 </file>
 
-<file path=ppt/slides/slide8.xml><?xml version="1.0" encoding="utf-8"?>
+<file path=ppt/slides/slide9.xml><?xml version="1.0" encoding="utf-8"?>
 <p:sld xmlns:a="http://schemas.openxmlformats.org/drawingml/2006/main" xmlns:r="http://schemas.openxmlformats.org/officeDocument/2006/relationships" xmlns:p="http://schemas.openxmlformats.org/presentationml/2006/main">
   <p:cSld>
     <p:spTree>

</xml_diff>

<commit_message>
Clean up Files, Update Presentation
</commit_message>
<xml_diff>
--- a/Vas-Data/FinalPresentation.pptx
+++ b/Vas-Data/FinalPresentation.pptx
@@ -6,14 +6,16 @@
   </p:sldMasterIdLst>
   <p:sldIdLst>
     <p:sldId id="256" r:id="rId2"/>
-    <p:sldId id="272" r:id="rId3"/>
-    <p:sldId id="273" r:id="rId4"/>
-    <p:sldId id="274" r:id="rId5"/>
-    <p:sldId id="259" r:id="rId6"/>
-    <p:sldId id="257" r:id="rId7"/>
-    <p:sldId id="260" r:id="rId8"/>
-    <p:sldId id="258" r:id="rId9"/>
-    <p:sldId id="271" r:id="rId10"/>
+    <p:sldId id="275" r:id="rId3"/>
+    <p:sldId id="276" r:id="rId4"/>
+    <p:sldId id="272" r:id="rId5"/>
+    <p:sldId id="273" r:id="rId6"/>
+    <p:sldId id="274" r:id="rId7"/>
+    <p:sldId id="259" r:id="rId8"/>
+    <p:sldId id="257" r:id="rId9"/>
+    <p:sldId id="260" r:id="rId10"/>
+    <p:sldId id="258" r:id="rId11"/>
+    <p:sldId id="271" r:id="rId12"/>
   </p:sldIdLst>
   <p:sldSz cx="12192000" cy="6858000"/>
   <p:notesSz cx="6858000" cy="9144000"/>
@@ -141,6 +143,560 @@
           <a:lstStyle/>
           <a:p>
             <a:pPr>
+              <a:defRPr sz="3200" b="1" i="0" u="none" strike="noStrike" kern="1200" spc="0" baseline="0">
+                <a:solidFill>
+                  <a:schemeClr val="tx1">
+                    <a:lumMod val="65000"/>
+                    <a:lumOff val="35000"/>
+                  </a:schemeClr>
+                </a:solidFill>
+                <a:latin typeface="+mn-lt"/>
+                <a:ea typeface="+mn-ea"/>
+                <a:cs typeface="+mn-cs"/>
+              </a:defRPr>
+            </a:pPr>
+            <a:r>
+              <a:rPr lang="en-US" sz="3200" b="1" dirty="0"/>
+              <a:t>Average Runtime For All Proteins</a:t>
+            </a:r>
+          </a:p>
+        </c:rich>
+      </c:tx>
+      <c:layout>
+        <c:manualLayout>
+          <c:xMode val="edge"/>
+          <c:yMode val="edge"/>
+          <c:x val="0.21898382778012249"/>
+          <c:y val="3.4825209386773068E-2"/>
+        </c:manualLayout>
+      </c:layout>
+      <c:overlay val="0"/>
+      <c:spPr>
+        <a:noFill/>
+        <a:ln>
+          <a:noFill/>
+        </a:ln>
+        <a:effectLst/>
+      </c:spPr>
+      <c:txPr>
+        <a:bodyPr rot="0" spcFirstLastPara="1" vertOverflow="ellipsis" vert="horz" wrap="square" anchor="ctr" anchorCtr="1"/>
+        <a:lstStyle/>
+        <a:p>
+          <a:pPr>
+            <a:defRPr sz="3200" b="1" i="0" u="none" strike="noStrike" kern="1200" spc="0" baseline="0">
+              <a:solidFill>
+                <a:schemeClr val="tx1">
+                  <a:lumMod val="65000"/>
+                  <a:lumOff val="35000"/>
+                </a:schemeClr>
+              </a:solidFill>
+              <a:latin typeface="+mn-lt"/>
+              <a:ea typeface="+mn-ea"/>
+              <a:cs typeface="+mn-cs"/>
+            </a:defRPr>
+          </a:pPr>
+          <a:endParaRPr lang="en-US"/>
+        </a:p>
+      </c:txPr>
+    </c:title>
+    <c:autoTitleDeleted val="0"/>
+    <c:view3D>
+      <c:rotX val="15"/>
+      <c:rotY val="20"/>
+      <c:depthPercent val="100"/>
+      <c:rAngAx val="1"/>
+    </c:view3D>
+    <c:floor>
+      <c:thickness val="0"/>
+      <c:spPr>
+        <a:noFill/>
+        <a:ln>
+          <a:noFill/>
+        </a:ln>
+        <a:effectLst/>
+        <a:sp3d/>
+      </c:spPr>
+    </c:floor>
+    <c:sideWall>
+      <c:thickness val="0"/>
+      <c:spPr>
+        <a:noFill/>
+        <a:ln>
+          <a:noFill/>
+        </a:ln>
+        <a:effectLst/>
+        <a:sp3d/>
+      </c:spPr>
+    </c:sideWall>
+    <c:backWall>
+      <c:thickness val="0"/>
+      <c:spPr>
+        <a:noFill/>
+        <a:ln>
+          <a:noFill/>
+        </a:ln>
+        <a:effectLst/>
+        <a:sp3d/>
+      </c:spPr>
+    </c:backWall>
+    <c:plotArea>
+      <c:layout>
+        <c:manualLayout>
+          <c:layoutTarget val="inner"/>
+          <c:xMode val="edge"/>
+          <c:yMode val="edge"/>
+          <c:x val="9.9652263964697119E-2"/>
+          <c:y val="0.14014912738574462"/>
+          <c:w val="0.87314343288706198"/>
+          <c:h val="0.68029006060457464"/>
+        </c:manualLayout>
+      </c:layout>
+      <c:bar3DChart>
+        <c:barDir val="col"/>
+        <c:grouping val="clustered"/>
+        <c:varyColors val="0"/>
+        <c:ser>
+          <c:idx val="0"/>
+          <c:order val="0"/>
+          <c:tx>
+            <c:strRef>
+              <c:f>ProteinVas!$Q$78</c:f>
+              <c:strCache>
+                <c:ptCount val="1"/>
+                <c:pt idx="0">
+                  <c:v>Runtime in Minutes</c:v>
+                </c:pt>
+              </c:strCache>
+            </c:strRef>
+          </c:tx>
+          <c:spPr>
+            <a:solidFill>
+              <a:schemeClr val="accent1">
+                <a:lumMod val="75000"/>
+              </a:schemeClr>
+            </a:solidFill>
+            <a:ln>
+              <a:noFill/>
+            </a:ln>
+            <a:effectLst/>
+            <a:scene3d>
+              <a:camera prst="orthographicFront"/>
+              <a:lightRig rig="threePt" dir="t"/>
+            </a:scene3d>
+            <a:sp3d>
+              <a:bevelT w="6350" h="88900"/>
+              <a:bevelB w="88900" h="6350"/>
+            </a:sp3d>
+          </c:spPr>
+          <c:invertIfNegative val="0"/>
+          <c:dLbls>
+            <c:numFmt formatCode="#,##0.00" sourceLinked="0"/>
+            <c:spPr>
+              <a:noFill/>
+              <a:ln>
+                <a:noFill/>
+              </a:ln>
+              <a:effectLst/>
+            </c:spPr>
+            <c:txPr>
+              <a:bodyPr rot="0" spcFirstLastPara="1" vertOverflow="ellipsis" vert="horz" wrap="square" lIns="38100" tIns="19050" rIns="38100" bIns="19050" anchor="ctr" anchorCtr="1">
+                <a:spAutoFit/>
+              </a:bodyPr>
+              <a:lstStyle/>
+              <a:p>
+                <a:pPr>
+                  <a:defRPr sz="2000" b="0" i="0" u="none" strike="noStrike" kern="1200" baseline="0">
+                    <a:solidFill>
+                      <a:schemeClr val="tx1">
+                        <a:lumMod val="75000"/>
+                        <a:lumOff val="25000"/>
+                      </a:schemeClr>
+                    </a:solidFill>
+                    <a:latin typeface="+mn-lt"/>
+                    <a:ea typeface="+mn-ea"/>
+                    <a:cs typeface="+mn-cs"/>
+                  </a:defRPr>
+                </a:pPr>
+                <a:endParaRPr lang="en-US"/>
+              </a:p>
+            </c:txPr>
+            <c:showLegendKey val="0"/>
+            <c:showVal val="1"/>
+            <c:showCatName val="0"/>
+            <c:showSerName val="0"/>
+            <c:showPercent val="0"/>
+            <c:showBubbleSize val="0"/>
+            <c:showLeaderLines val="0"/>
+            <c:extLst>
+              <c:ext xmlns:c15="http://schemas.microsoft.com/office/drawing/2012/chart" uri="{CE6537A1-D6FC-4f65-9D91-7224C49458BB}">
+                <c15:showLeaderLines val="1"/>
+                <c15:leaderLines>
+                  <c:spPr>
+                    <a:ln w="9525" cap="flat" cmpd="sng" algn="ctr">
+                      <a:solidFill>
+                        <a:schemeClr val="tx1">
+                          <a:lumMod val="35000"/>
+                          <a:lumOff val="65000"/>
+                        </a:schemeClr>
+                      </a:solidFill>
+                      <a:round/>
+                    </a:ln>
+                    <a:effectLst/>
+                  </c:spPr>
+                </c15:leaderLines>
+              </c:ext>
+            </c:extLst>
+          </c:dLbls>
+          <c:cat>
+            <c:strRef>
+              <c:f>ProteinVas!$P$79:$P$83</c:f>
+              <c:strCache>
+                <c:ptCount val="5"/>
+                <c:pt idx="0">
+                  <c:v>100 Projections</c:v>
+                </c:pt>
+                <c:pt idx="1">
+                  <c:v>1000 Projections</c:v>
+                </c:pt>
+                <c:pt idx="2">
+                  <c:v>2000 Projections</c:v>
+                </c:pt>
+                <c:pt idx="3">
+                  <c:v>600 Scanlength</c:v>
+                </c:pt>
+                <c:pt idx="4">
+                  <c:v>200, 400, 600 Scan</c:v>
+                </c:pt>
+              </c:strCache>
+            </c:strRef>
+          </c:cat>
+          <c:val>
+            <c:numRef>
+              <c:f>ProteinVas!$Q$79:$Q$83</c:f>
+              <c:numCache>
+                <c:formatCode>General</c:formatCode>
+                <c:ptCount val="5"/>
+                <c:pt idx="0">
+                  <c:v>45.389166666666668</c:v>
+                </c:pt>
+                <c:pt idx="1">
+                  <c:v>146.55070921985816</c:v>
+                </c:pt>
+                <c:pt idx="2">
+                  <c:v>267.57727272727271</c:v>
+                </c:pt>
+                <c:pt idx="3">
+                  <c:v>570.99763619506246</c:v>
+                </c:pt>
+                <c:pt idx="4">
+                  <c:v>1055.9942038605554</c:v>
+                </c:pt>
+              </c:numCache>
+            </c:numRef>
+          </c:val>
+          <c:extLst>
+            <c:ext xmlns:c16="http://schemas.microsoft.com/office/drawing/2014/chart" uri="{C3380CC4-5D6E-409C-BE32-E72D297353CC}">
+              <c16:uniqueId val="{00000000-E7CD-4DED-BF74-C458F3C77BB0}"/>
+            </c:ext>
+          </c:extLst>
+        </c:ser>
+        <c:dLbls>
+          <c:showLegendKey val="0"/>
+          <c:showVal val="0"/>
+          <c:showCatName val="0"/>
+          <c:showSerName val="0"/>
+          <c:showPercent val="0"/>
+          <c:showBubbleSize val="0"/>
+        </c:dLbls>
+        <c:gapWidth val="100"/>
+        <c:gapDepth val="70"/>
+        <c:shape val="box"/>
+        <c:axId val="1916327727"/>
+        <c:axId val="1916325231"/>
+        <c:axId val="0"/>
+      </c:bar3DChart>
+      <c:catAx>
+        <c:axId val="1916327727"/>
+        <c:scaling>
+          <c:orientation val="minMax"/>
+        </c:scaling>
+        <c:delete val="0"/>
+        <c:axPos val="b"/>
+        <c:title>
+          <c:tx>
+            <c:rich>
+              <a:bodyPr rot="0" spcFirstLastPara="1" vertOverflow="ellipsis" vert="horz" wrap="square" anchor="ctr" anchorCtr="1"/>
+              <a:lstStyle/>
+              <a:p>
+                <a:pPr>
+                  <a:defRPr sz="2000" b="1" i="0" u="none" strike="noStrike" kern="1200" baseline="0">
+                    <a:solidFill>
+                      <a:schemeClr val="tx1">
+                        <a:lumMod val="65000"/>
+                        <a:lumOff val="35000"/>
+                      </a:schemeClr>
+                    </a:solidFill>
+                    <a:latin typeface="+mn-lt"/>
+                    <a:ea typeface="+mn-ea"/>
+                    <a:cs typeface="+mn-cs"/>
+                  </a:defRPr>
+                </a:pPr>
+                <a:r>
+                  <a:rPr lang="en-US" b="1" dirty="0"/>
+                  <a:t>Number of Projections / Scan Type</a:t>
+                </a:r>
+              </a:p>
+            </c:rich>
+          </c:tx>
+          <c:layout>
+            <c:manualLayout>
+              <c:xMode val="edge"/>
+              <c:yMode val="edge"/>
+              <c:x val="0.32688074352744106"/>
+              <c:y val="0.93857423431317077"/>
+            </c:manualLayout>
+          </c:layout>
+          <c:overlay val="0"/>
+          <c:spPr>
+            <a:noFill/>
+            <a:ln>
+              <a:noFill/>
+            </a:ln>
+            <a:effectLst/>
+          </c:spPr>
+          <c:txPr>
+            <a:bodyPr rot="0" spcFirstLastPara="1" vertOverflow="ellipsis" vert="horz" wrap="square" anchor="ctr" anchorCtr="1"/>
+            <a:lstStyle/>
+            <a:p>
+              <a:pPr>
+                <a:defRPr sz="2000" b="1" i="0" u="none" strike="noStrike" kern="1200" baseline="0">
+                  <a:solidFill>
+                    <a:schemeClr val="tx1">
+                      <a:lumMod val="65000"/>
+                      <a:lumOff val="35000"/>
+                    </a:schemeClr>
+                  </a:solidFill>
+                  <a:latin typeface="+mn-lt"/>
+                  <a:ea typeface="+mn-ea"/>
+                  <a:cs typeface="+mn-cs"/>
+                </a:defRPr>
+              </a:pPr>
+              <a:endParaRPr lang="en-US"/>
+            </a:p>
+          </c:txPr>
+        </c:title>
+        <c:numFmt formatCode="General" sourceLinked="1"/>
+        <c:majorTickMark val="none"/>
+        <c:minorTickMark val="none"/>
+        <c:tickLblPos val="nextTo"/>
+        <c:spPr>
+          <a:noFill/>
+          <a:ln>
+            <a:noFill/>
+          </a:ln>
+          <a:effectLst/>
+        </c:spPr>
+        <c:txPr>
+          <a:bodyPr rot="0" spcFirstLastPara="1" vertOverflow="ellipsis" wrap="square" anchor="ctr" anchorCtr="1"/>
+          <a:lstStyle/>
+          <a:p>
+            <a:pPr>
+              <a:defRPr sz="2000" b="0" i="0" u="none" strike="noStrike" kern="1200" baseline="0">
+                <a:solidFill>
+                  <a:schemeClr val="tx1">
+                    <a:lumMod val="65000"/>
+                    <a:lumOff val="35000"/>
+                  </a:schemeClr>
+                </a:solidFill>
+                <a:latin typeface="+mn-lt"/>
+                <a:ea typeface="+mn-ea"/>
+                <a:cs typeface="+mn-cs"/>
+              </a:defRPr>
+            </a:pPr>
+            <a:endParaRPr lang="en-US"/>
+          </a:p>
+        </c:txPr>
+        <c:crossAx val="1916325231"/>
+        <c:crosses val="autoZero"/>
+        <c:auto val="1"/>
+        <c:lblAlgn val="ctr"/>
+        <c:lblOffset val="100"/>
+        <c:noMultiLvlLbl val="0"/>
+      </c:catAx>
+      <c:valAx>
+        <c:axId val="1916325231"/>
+        <c:scaling>
+          <c:orientation val="minMax"/>
+        </c:scaling>
+        <c:delete val="0"/>
+        <c:axPos val="l"/>
+        <c:majorGridlines>
+          <c:spPr>
+            <a:ln w="9525" cap="flat" cmpd="sng" algn="ctr">
+              <a:solidFill>
+                <a:schemeClr val="tx1">
+                  <a:lumMod val="15000"/>
+                  <a:lumOff val="85000"/>
+                </a:schemeClr>
+              </a:solidFill>
+              <a:round/>
+            </a:ln>
+            <a:effectLst/>
+          </c:spPr>
+        </c:majorGridlines>
+        <c:title>
+          <c:tx>
+            <c:rich>
+              <a:bodyPr rot="-5400000" spcFirstLastPara="1" vertOverflow="ellipsis" vert="horz" wrap="square" anchor="ctr" anchorCtr="1"/>
+              <a:lstStyle/>
+              <a:p>
+                <a:pPr>
+                  <a:defRPr sz="2000" b="1" i="0" u="none" strike="noStrike" kern="1200" baseline="0">
+                    <a:solidFill>
+                      <a:schemeClr val="tx1">
+                        <a:lumMod val="65000"/>
+                        <a:lumOff val="35000"/>
+                      </a:schemeClr>
+                    </a:solidFill>
+                    <a:latin typeface="+mn-lt"/>
+                    <a:ea typeface="+mn-ea"/>
+                    <a:cs typeface="+mn-cs"/>
+                  </a:defRPr>
+                </a:pPr>
+                <a:r>
+                  <a:rPr lang="en-US" b="1"/>
+                  <a:t>Runtime in Minutes</a:t>
+                </a:r>
+              </a:p>
+            </c:rich>
+          </c:tx>
+          <c:overlay val="0"/>
+          <c:spPr>
+            <a:noFill/>
+            <a:ln>
+              <a:noFill/>
+            </a:ln>
+            <a:effectLst/>
+          </c:spPr>
+          <c:txPr>
+            <a:bodyPr rot="-5400000" spcFirstLastPara="1" vertOverflow="ellipsis" vert="horz" wrap="square" anchor="ctr" anchorCtr="1"/>
+            <a:lstStyle/>
+            <a:p>
+              <a:pPr>
+                <a:defRPr sz="2000" b="1" i="0" u="none" strike="noStrike" kern="1200" baseline="0">
+                  <a:solidFill>
+                    <a:schemeClr val="tx1">
+                      <a:lumMod val="65000"/>
+                      <a:lumOff val="35000"/>
+                    </a:schemeClr>
+                  </a:solidFill>
+                  <a:latin typeface="+mn-lt"/>
+                  <a:ea typeface="+mn-ea"/>
+                  <a:cs typeface="+mn-cs"/>
+                </a:defRPr>
+              </a:pPr>
+              <a:endParaRPr lang="en-US"/>
+            </a:p>
+          </c:txPr>
+        </c:title>
+        <c:numFmt formatCode="General" sourceLinked="1"/>
+        <c:majorTickMark val="none"/>
+        <c:minorTickMark val="none"/>
+        <c:tickLblPos val="nextTo"/>
+        <c:spPr>
+          <a:noFill/>
+          <a:ln>
+            <a:noFill/>
+          </a:ln>
+          <a:effectLst/>
+        </c:spPr>
+        <c:txPr>
+          <a:bodyPr rot="-60000000" spcFirstLastPara="1" vertOverflow="ellipsis" vert="horz" wrap="square" anchor="ctr" anchorCtr="1"/>
+          <a:lstStyle/>
+          <a:p>
+            <a:pPr>
+              <a:defRPr sz="2000" b="0" i="0" u="none" strike="noStrike" kern="1200" baseline="0">
+                <a:solidFill>
+                  <a:schemeClr val="tx1">
+                    <a:lumMod val="65000"/>
+                    <a:lumOff val="35000"/>
+                  </a:schemeClr>
+                </a:solidFill>
+                <a:latin typeface="+mn-lt"/>
+                <a:ea typeface="+mn-ea"/>
+                <a:cs typeface="+mn-cs"/>
+              </a:defRPr>
+            </a:pPr>
+            <a:endParaRPr lang="en-US"/>
+          </a:p>
+        </c:txPr>
+        <c:crossAx val="1916327727"/>
+        <c:crosses val="autoZero"/>
+        <c:crossBetween val="between"/>
+      </c:valAx>
+      <c:spPr>
+        <a:noFill/>
+        <a:ln>
+          <a:noFill/>
+        </a:ln>
+        <a:effectLst/>
+      </c:spPr>
+    </c:plotArea>
+    <c:plotVisOnly val="1"/>
+    <c:dispBlanksAs val="gap"/>
+    <c:extLst>
+      <c:ext xmlns:c16r3="http://schemas.microsoft.com/office/drawing/2017/03/chart" uri="{56B9EC1D-385E-4148-901F-78D8002777C0}">
+        <c16r3:dataDisplayOptions16>
+          <c16r3:dispNaAsBlank val="1"/>
+        </c16r3:dataDisplayOptions16>
+      </c:ext>
+    </c:extLst>
+    <c:showDLblsOverMax val="0"/>
+  </c:chart>
+  <c:spPr>
+    <a:noFill/>
+    <a:ln>
+      <a:noFill/>
+    </a:ln>
+    <a:effectLst/>
+  </c:spPr>
+  <c:txPr>
+    <a:bodyPr/>
+    <a:lstStyle/>
+    <a:p>
+      <a:pPr>
+        <a:defRPr sz="2000"/>
+      </a:pPr>
+      <a:endParaRPr lang="en-US"/>
+    </a:p>
+  </c:txPr>
+  <c:externalData r:id="rId3">
+    <c:autoUpdate val="0"/>
+  </c:externalData>
+</c:chartSpace>
+</file>
+
+<file path=ppt/charts/chart2.xml><?xml version="1.0" encoding="utf-8"?>
+<c:chartSpace xmlns:c="http://schemas.openxmlformats.org/drawingml/2006/chart" xmlns:a="http://schemas.openxmlformats.org/drawingml/2006/main" xmlns:r="http://schemas.openxmlformats.org/officeDocument/2006/relationships" xmlns:c16r2="http://schemas.microsoft.com/office/drawing/2015/06/chart">
+  <c:date1904 val="0"/>
+  <c:lang val="en-US"/>
+  <c:roundedCorners val="0"/>
+  <mc:AlternateContent xmlns:mc="http://schemas.openxmlformats.org/markup-compatibility/2006">
+    <mc:Choice xmlns:c14="http://schemas.microsoft.com/office/drawing/2007/8/2/chart" Requires="c14">
+      <c14:style val="102"/>
+    </mc:Choice>
+    <mc:Fallback>
+      <c:style val="2"/>
+    </mc:Fallback>
+  </mc:AlternateContent>
+  <c:chart>
+    <c:title>
+      <c:tx>
+        <c:rich>
+          <a:bodyPr rot="0" spcFirstLastPara="1" vertOverflow="ellipsis" vert="horz" wrap="square" anchor="ctr" anchorCtr="1"/>
+          <a:lstStyle/>
+          <a:p>
+            <a:pPr>
               <a:defRPr sz="2000" b="0" i="0" u="none" strike="noStrike" kern="1200" cap="none" spc="50" normalizeH="0" baseline="0">
                 <a:solidFill>
                   <a:schemeClr val="tx1">
@@ -160,6 +716,14 @@
           </a:p>
         </c:rich>
       </c:tx>
+      <c:layout>
+        <c:manualLayout>
+          <c:xMode val="edge"/>
+          <c:yMode val="edge"/>
+          <c:x val="0.41199353926912979"/>
+          <c:y val="0.12386771413807737"/>
+        </c:manualLayout>
+      </c:layout>
       <c:overlay val="0"/>
       <c:spPr>
         <a:noFill/>
@@ -198,7 +762,7 @@
           <c:yMode val="edge"/>
           <c:x val="9.8534423581667682E-2"/>
           <c:y val="9.0883760386305301E-2"/>
-          <c:w val="0.87378184938421155"/>
+          <c:w val="0.89120916616192203"/>
           <c:h val="0.77394005307347624"/>
         </c:manualLayout>
       </c:layout>
@@ -495,7 +1059,7 @@
               <a:lstStyle/>
               <a:p>
                 <a:pPr>
-                  <a:defRPr sz="1600" b="0" i="0" u="none" strike="noStrike" kern="1200" cap="all" baseline="0">
+                  <a:defRPr sz="1600" b="1" i="0" u="none" strike="noStrike" kern="1200" cap="all" baseline="0">
                     <a:solidFill>
                       <a:schemeClr val="tx1">
                         <a:lumMod val="65000"/>
@@ -508,7 +1072,7 @@
                   </a:defRPr>
                 </a:pPr>
                 <a:r>
-                  <a:rPr lang="en-US" dirty="0"/>
+                  <a:rPr lang="en-US" b="1" dirty="0"/>
                   <a:t>Protein Name</a:t>
                 </a:r>
               </a:p>
@@ -535,7 +1099,7 @@
             <a:lstStyle/>
             <a:p>
               <a:pPr>
-                <a:defRPr sz="1600" b="0" i="0" u="none" strike="noStrike" kern="1200" cap="all" baseline="0">
+                <a:defRPr sz="1600" b="1" i="0" u="none" strike="noStrike" kern="1200" cap="all" baseline="0">
                   <a:solidFill>
                     <a:schemeClr val="tx1">
                       <a:lumMod val="65000"/>
@@ -573,7 +1137,7 @@
           <a:lstStyle/>
           <a:p>
             <a:pPr>
-              <a:defRPr sz="1500" b="0" i="0" u="none" strike="noStrike" kern="1200" cap="none" spc="20" normalizeH="0" baseline="0">
+              <a:defRPr sz="1600" b="0" i="0" u="none" strike="noStrike" kern="1200" cap="none" spc="20" normalizeH="0" baseline="0">
                 <a:solidFill>
                   <a:schemeClr val="tx1">
                     <a:lumMod val="65000"/>
@@ -623,7 +1187,7 @@
               <a:lstStyle/>
               <a:p>
                 <a:pPr>
-                  <a:defRPr sz="1600" b="0" i="0" u="none" strike="noStrike" kern="1200" cap="all" baseline="0">
+                  <a:defRPr sz="1600" b="1" i="0" u="none" strike="noStrike" kern="1200" cap="all" baseline="0">
                     <a:solidFill>
                       <a:schemeClr val="tx1">
                         <a:lumMod val="65000"/>
@@ -636,14 +1200,14 @@
                   </a:defRPr>
                 </a:pPr>
                 <a:r>
-                  <a:rPr lang="en-US" dirty="0" err="1"/>
+                  <a:rPr lang="en-US" b="1" dirty="0" err="1"/>
                   <a:t>AVerage</a:t>
                 </a:r>
                 <a:r>
-                  <a:rPr lang="en-US" baseline="0" dirty="0"/>
-                  <a:t> Vas (Abs. Value)</a:t>
+                  <a:rPr lang="en-US" b="1" baseline="0" dirty="0"/>
+                  <a:t> V2 (Abs. Value)</a:t>
                 </a:r>
-                <a:endParaRPr lang="en-US" dirty="0"/>
+                <a:endParaRPr lang="en-US" b="1" dirty="0"/>
               </a:p>
             </c:rich>
           </c:tx>
@@ -660,7 +1224,7 @@
             <a:lstStyle/>
             <a:p>
               <a:pPr>
-                <a:defRPr sz="1600" b="0" i="0" u="none" strike="noStrike" kern="1200" cap="all" baseline="0">
+                <a:defRPr sz="1600" b="1" i="0" u="none" strike="noStrike" kern="1200" cap="all" baseline="0">
                   <a:solidFill>
                     <a:schemeClr val="tx1">
                       <a:lumMod val="65000"/>
@@ -794,7 +1358,7 @@
 </c:chartSpace>
 </file>
 
-<file path=ppt/charts/chart2.xml><?xml version="1.0" encoding="utf-8"?>
+<file path=ppt/charts/chart3.xml><?xml version="1.0" encoding="utf-8"?>
 <c:chartSpace xmlns:c="http://schemas.openxmlformats.org/drawingml/2006/chart" xmlns:a="http://schemas.openxmlformats.org/drawingml/2006/main" xmlns:r="http://schemas.openxmlformats.org/officeDocument/2006/relationships" xmlns:c16r2="http://schemas.microsoft.com/office/drawing/2015/06/chart">
   <c:date1904 val="0"/>
   <c:lang val="en-US"/>
@@ -844,7 +1408,7 @@
           <c:xMode val="edge"/>
           <c:yMode val="edge"/>
           <c:x val="0.28563809812235008"/>
-          <c:y val="1.5847405083145017E-2"/>
+          <c:y val="7.1053438074321976E-2"/>
         </c:manualLayout>
       </c:layout>
       <c:overlay val="0"/>
@@ -884,9 +1448,9 @@
           <c:xMode val="edge"/>
           <c:yMode val="edge"/>
           <c:x val="0.10426226529376136"/>
-          <c:y val="8.8357635815589933E-2"/>
-          <c:w val="0.86919907126993745"/>
-          <c:h val="0.75640284691129822"/>
+          <c:y val="4.8565718834480714E-2"/>
+          <c:w val="0.8833016353725015"/>
+          <c:h val="0.79619470230967404"/>
         </c:manualLayout>
       </c:layout>
       <c:barChart>
@@ -1182,7 +1746,7 @@
               <a:lstStyle/>
               <a:p>
                 <a:pPr>
-                  <a:defRPr sz="1600" b="0" i="0" u="none" strike="noStrike" kern="1200" cap="all" baseline="0">
+                  <a:defRPr sz="1800" b="1" i="0" u="none" strike="noStrike" kern="1200" cap="all" baseline="0">
                     <a:solidFill>
                       <a:schemeClr val="tx1">
                         <a:lumMod val="65000"/>
@@ -1195,7 +1759,7 @@
                   </a:defRPr>
                 </a:pPr>
                 <a:r>
-                  <a:rPr lang="en-US"/>
+                  <a:rPr lang="en-US" sz="1800" b="1"/>
                   <a:t>Protein Name</a:t>
                 </a:r>
               </a:p>
@@ -1222,7 +1786,7 @@
             <a:lstStyle/>
             <a:p>
               <a:pPr>
-                <a:defRPr sz="1600" b="0" i="0" u="none" strike="noStrike" kern="1200" cap="all" baseline="0">
+                <a:defRPr sz="1800" b="1" i="0" u="none" strike="noStrike" kern="1200" cap="all" baseline="0">
                   <a:solidFill>
                     <a:schemeClr val="tx1">
                       <a:lumMod val="65000"/>
@@ -1310,7 +1874,7 @@
               <a:lstStyle/>
               <a:p>
                 <a:pPr>
-                  <a:defRPr sz="1600" b="0" i="0" u="none" strike="noStrike" kern="1200" cap="all" baseline="0">
+                  <a:defRPr sz="1800" b="1" i="0" u="none" strike="noStrike" kern="1200" cap="all" baseline="0">
                     <a:solidFill>
                       <a:schemeClr val="tx1">
                         <a:lumMod val="65000"/>
@@ -1323,8 +1887,8 @@
                   </a:defRPr>
                 </a:pPr>
                 <a:r>
-                  <a:rPr lang="en-US" dirty="0"/>
-                  <a:t>Average Vas (Abs. value)</a:t>
+                  <a:rPr lang="en-US" sz="1800" b="1" dirty="0"/>
+                  <a:t>Average V2 (Abs. value)</a:t>
                 </a:r>
               </a:p>
             </c:rich>
@@ -1342,7 +1906,7 @@
             <a:lstStyle/>
             <a:p>
               <a:pPr>
-                <a:defRPr sz="1600" b="0" i="0" u="none" strike="noStrike" kern="1200" cap="all" baseline="0">
+                <a:defRPr sz="1800" b="1" i="0" u="none" strike="noStrike" kern="1200" cap="all" baseline="0">
                   <a:solidFill>
                     <a:schemeClr val="tx1">
                       <a:lumMod val="65000"/>
@@ -1407,10 +1971,10 @@
         <c:manualLayout>
           <c:xMode val="edge"/>
           <c:yMode val="edge"/>
-          <c:x val="0.75677437916414292"/>
-          <c:y val="9.2256790910990163E-2"/>
+          <c:x val="0.74651796890773281"/>
+          <c:y val="4.7490827983194192E-2"/>
           <c:w val="0.19881000677777511"/>
-          <c:h val="0.14871682329010766"/>
+          <c:h val="0.1586647775951153"/>
         </c:manualLayout>
       </c:layout>
       <c:overlay val="0"/>
@@ -1556,7 +2120,541 @@
 </cs:colorStyle>
 </file>
 
+<file path=ppt/charts/colors3.xml><?xml version="1.0" encoding="utf-8"?>
+<cs:colorStyle xmlns:cs="http://schemas.microsoft.com/office/drawing/2012/chartStyle" xmlns:a="http://schemas.openxmlformats.org/drawingml/2006/main" meth="cycle" id="10">
+  <a:schemeClr val="accent1"/>
+  <a:schemeClr val="accent2"/>
+  <a:schemeClr val="accent3"/>
+  <a:schemeClr val="accent4"/>
+  <a:schemeClr val="accent5"/>
+  <a:schemeClr val="accent6"/>
+  <cs:variation/>
+  <cs:variation>
+    <a:lumMod val="60000"/>
+  </cs:variation>
+  <cs:variation>
+    <a:lumMod val="80000"/>
+    <a:lumOff val="20000"/>
+  </cs:variation>
+  <cs:variation>
+    <a:lumMod val="80000"/>
+  </cs:variation>
+  <cs:variation>
+    <a:lumMod val="60000"/>
+    <a:lumOff val="40000"/>
+  </cs:variation>
+  <cs:variation>
+    <a:lumMod val="50000"/>
+  </cs:variation>
+  <cs:variation>
+    <a:lumMod val="70000"/>
+    <a:lumOff val="30000"/>
+  </cs:variation>
+  <cs:variation>
+    <a:lumMod val="70000"/>
+  </cs:variation>
+  <cs:variation>
+    <a:lumMod val="50000"/>
+    <a:lumOff val="50000"/>
+  </cs:variation>
+</cs:colorStyle>
+</file>
+
 <file path=ppt/charts/style1.xml><?xml version="1.0" encoding="utf-8"?>
+<cs:chartStyle xmlns:cs="http://schemas.microsoft.com/office/drawing/2012/chartStyle" xmlns:a="http://schemas.openxmlformats.org/drawingml/2006/main" id="286">
+  <cs:axisTitle>
+    <cs:lnRef idx="0"/>
+    <cs:fillRef idx="0"/>
+    <cs:effectRef idx="0"/>
+    <cs:fontRef idx="minor">
+      <a:schemeClr val="tx1">
+        <a:lumMod val="65000"/>
+        <a:lumOff val="35000"/>
+      </a:schemeClr>
+    </cs:fontRef>
+    <cs:defRPr sz="1000" kern="1200"/>
+  </cs:axisTitle>
+  <cs:categoryAxis>
+    <cs:lnRef idx="0"/>
+    <cs:fillRef idx="0"/>
+    <cs:effectRef idx="0"/>
+    <cs:fontRef idx="minor">
+      <a:schemeClr val="tx1">
+        <a:lumMod val="65000"/>
+        <a:lumOff val="35000"/>
+      </a:schemeClr>
+    </cs:fontRef>
+    <cs:defRPr sz="900" kern="1200"/>
+  </cs:categoryAxis>
+  <cs:chartArea mods="allowNoFillOverride allowNoLineOverride">
+    <cs:lnRef idx="0"/>
+    <cs:fillRef idx="0"/>
+    <cs:effectRef idx="0"/>
+    <cs:fontRef idx="minor">
+      <a:schemeClr val="tx1"/>
+    </cs:fontRef>
+    <cs:spPr>
+      <a:solidFill>
+        <a:schemeClr val="bg1"/>
+      </a:solidFill>
+      <a:ln w="9525" cap="flat" cmpd="sng" algn="ctr">
+        <a:solidFill>
+          <a:schemeClr val="tx1">
+            <a:lumMod val="15000"/>
+            <a:lumOff val="85000"/>
+          </a:schemeClr>
+        </a:solidFill>
+        <a:round/>
+      </a:ln>
+    </cs:spPr>
+    <cs:defRPr sz="1000" kern="1200"/>
+  </cs:chartArea>
+  <cs:dataLabel>
+    <cs:lnRef idx="0"/>
+    <cs:fillRef idx="0"/>
+    <cs:effectRef idx="0"/>
+    <cs:fontRef idx="minor">
+      <a:schemeClr val="tx1">
+        <a:lumMod val="75000"/>
+        <a:lumOff val="25000"/>
+      </a:schemeClr>
+    </cs:fontRef>
+    <cs:defRPr sz="900" kern="1200"/>
+  </cs:dataLabel>
+  <cs:dataLabelCallout>
+    <cs:lnRef idx="0"/>
+    <cs:fillRef idx="0"/>
+    <cs:effectRef idx="0"/>
+    <cs:fontRef idx="minor">
+      <a:schemeClr val="dk1">
+        <a:lumMod val="65000"/>
+        <a:lumOff val="35000"/>
+      </a:schemeClr>
+    </cs:fontRef>
+    <cs:spPr>
+      <a:solidFill>
+        <a:schemeClr val="lt1"/>
+      </a:solidFill>
+      <a:ln>
+        <a:solidFill>
+          <a:schemeClr val="dk1">
+            <a:lumMod val="25000"/>
+            <a:lumOff val="75000"/>
+          </a:schemeClr>
+        </a:solidFill>
+      </a:ln>
+    </cs:spPr>
+    <cs:defRPr sz="900" kern="1200"/>
+    <cs:bodyPr rot="0" spcFirstLastPara="1" vertOverflow="clip" horzOverflow="clip" vert="horz" wrap="square" lIns="36576" tIns="18288" rIns="36576" bIns="18288" anchor="ctr" anchorCtr="1">
+      <a:spAutoFit/>
+    </cs:bodyPr>
+  </cs:dataLabelCallout>
+  <cs:dataPoint>
+    <cs:lnRef idx="0"/>
+    <cs:fillRef idx="1">
+      <cs:styleClr val="auto"/>
+    </cs:fillRef>
+    <cs:effectRef idx="0"/>
+    <cs:fontRef idx="minor">
+      <a:schemeClr val="tx1"/>
+    </cs:fontRef>
+  </cs:dataPoint>
+  <cs:dataPoint3D>
+    <cs:lnRef idx="0"/>
+    <cs:fillRef idx="1">
+      <cs:styleClr val="auto"/>
+    </cs:fillRef>
+    <cs:effectRef idx="0"/>
+    <cs:fontRef idx="minor">
+      <a:schemeClr val="tx1"/>
+    </cs:fontRef>
+  </cs:dataPoint3D>
+  <cs:dataPointLine>
+    <cs:lnRef idx="0">
+      <cs:styleClr val="auto"/>
+    </cs:lnRef>
+    <cs:fillRef idx="1"/>
+    <cs:effectRef idx="0"/>
+    <cs:fontRef idx="minor">
+      <a:schemeClr val="tx1"/>
+    </cs:fontRef>
+    <cs:spPr>
+      <a:ln w="28575" cap="rnd">
+        <a:solidFill>
+          <a:schemeClr val="phClr"/>
+        </a:solidFill>
+        <a:round/>
+      </a:ln>
+    </cs:spPr>
+  </cs:dataPointLine>
+  <cs:dataPointMarker>
+    <cs:lnRef idx="0">
+      <cs:styleClr val="auto"/>
+    </cs:lnRef>
+    <cs:fillRef idx="1">
+      <cs:styleClr val="auto"/>
+    </cs:fillRef>
+    <cs:effectRef idx="0"/>
+    <cs:fontRef idx="minor">
+      <a:schemeClr val="tx1"/>
+    </cs:fontRef>
+    <cs:spPr>
+      <a:ln w="9525">
+        <a:solidFill>
+          <a:schemeClr val="phClr"/>
+        </a:solidFill>
+      </a:ln>
+    </cs:spPr>
+  </cs:dataPointMarker>
+  <cs:dataPointMarkerLayout symbol="circle" size="5"/>
+  <cs:dataPointWireframe>
+    <cs:lnRef idx="0">
+      <cs:styleClr val="auto"/>
+    </cs:lnRef>
+    <cs:fillRef idx="1"/>
+    <cs:effectRef idx="0"/>
+    <cs:fontRef idx="minor">
+      <a:schemeClr val="tx1"/>
+    </cs:fontRef>
+    <cs:spPr>
+      <a:ln w="9525" cap="rnd">
+        <a:solidFill>
+          <a:schemeClr val="phClr"/>
+        </a:solidFill>
+        <a:round/>
+      </a:ln>
+    </cs:spPr>
+  </cs:dataPointWireframe>
+  <cs:dataTable>
+    <cs:lnRef idx="0"/>
+    <cs:fillRef idx="0"/>
+    <cs:effectRef idx="0"/>
+    <cs:fontRef idx="minor">
+      <a:schemeClr val="tx1">
+        <a:lumMod val="65000"/>
+        <a:lumOff val="35000"/>
+      </a:schemeClr>
+    </cs:fontRef>
+    <cs:spPr>
+      <a:noFill/>
+      <a:ln w="9525" cap="flat" cmpd="sng" algn="ctr">
+        <a:solidFill>
+          <a:schemeClr val="tx1">
+            <a:lumMod val="15000"/>
+            <a:lumOff val="85000"/>
+          </a:schemeClr>
+        </a:solidFill>
+        <a:round/>
+      </a:ln>
+    </cs:spPr>
+    <cs:defRPr sz="900" kern="1200"/>
+  </cs:dataTable>
+  <cs:downBar>
+    <cs:lnRef idx="0"/>
+    <cs:fillRef idx="0"/>
+    <cs:effectRef idx="0"/>
+    <cs:fontRef idx="minor">
+      <a:schemeClr val="tx1"/>
+    </cs:fontRef>
+    <cs:spPr>
+      <a:solidFill>
+        <a:schemeClr val="dk1">
+          <a:lumMod val="75000"/>
+          <a:lumOff val="25000"/>
+        </a:schemeClr>
+      </a:solidFill>
+      <a:ln w="9525" cap="flat" cmpd="sng" algn="ctr">
+        <a:solidFill>
+          <a:schemeClr val="tx1">
+            <a:lumMod val="65000"/>
+            <a:lumOff val="35000"/>
+          </a:schemeClr>
+        </a:solidFill>
+        <a:round/>
+      </a:ln>
+    </cs:spPr>
+  </cs:downBar>
+  <cs:dropLine>
+    <cs:lnRef idx="0"/>
+    <cs:fillRef idx="0"/>
+    <cs:effectRef idx="0"/>
+    <cs:fontRef idx="minor">
+      <a:schemeClr val="tx1"/>
+    </cs:fontRef>
+    <cs:spPr>
+      <a:ln w="9525" cap="flat" cmpd="sng" algn="ctr">
+        <a:solidFill>
+          <a:schemeClr val="tx1">
+            <a:lumMod val="35000"/>
+            <a:lumOff val="65000"/>
+          </a:schemeClr>
+        </a:solidFill>
+        <a:round/>
+      </a:ln>
+    </cs:spPr>
+  </cs:dropLine>
+  <cs:errorBar>
+    <cs:lnRef idx="0"/>
+    <cs:fillRef idx="0"/>
+    <cs:effectRef idx="0"/>
+    <cs:fontRef idx="minor">
+      <a:schemeClr val="tx1"/>
+    </cs:fontRef>
+    <cs:spPr>
+      <a:ln w="9525" cap="flat" cmpd="sng" algn="ctr">
+        <a:solidFill>
+          <a:schemeClr val="tx1">
+            <a:lumMod val="65000"/>
+            <a:lumOff val="35000"/>
+          </a:schemeClr>
+        </a:solidFill>
+        <a:round/>
+      </a:ln>
+    </cs:spPr>
+  </cs:errorBar>
+  <cs:floor>
+    <cs:lnRef idx="0"/>
+    <cs:fillRef idx="0"/>
+    <cs:effectRef idx="0"/>
+    <cs:fontRef idx="minor">
+      <a:schemeClr val="tx1"/>
+    </cs:fontRef>
+    <cs:spPr>
+      <a:noFill/>
+      <a:ln>
+        <a:noFill/>
+      </a:ln>
+    </cs:spPr>
+  </cs:floor>
+  <cs:gridlineMajor>
+    <cs:lnRef idx="0"/>
+    <cs:fillRef idx="0"/>
+    <cs:effectRef idx="0"/>
+    <cs:fontRef idx="minor">
+      <a:schemeClr val="tx1"/>
+    </cs:fontRef>
+    <cs:spPr>
+      <a:ln w="9525" cap="flat" cmpd="sng" algn="ctr">
+        <a:solidFill>
+          <a:schemeClr val="tx1">
+            <a:lumMod val="15000"/>
+            <a:lumOff val="85000"/>
+          </a:schemeClr>
+        </a:solidFill>
+        <a:round/>
+      </a:ln>
+    </cs:spPr>
+  </cs:gridlineMajor>
+  <cs:gridlineMinor>
+    <cs:lnRef idx="0"/>
+    <cs:fillRef idx="0"/>
+    <cs:effectRef idx="0"/>
+    <cs:fontRef idx="minor">
+      <a:schemeClr val="tx1"/>
+    </cs:fontRef>
+    <cs:spPr>
+      <a:ln w="9525" cap="flat" cmpd="sng" algn="ctr">
+        <a:solidFill>
+          <a:schemeClr val="tx1">
+            <a:lumMod val="5000"/>
+            <a:lumOff val="95000"/>
+          </a:schemeClr>
+        </a:solidFill>
+        <a:round/>
+      </a:ln>
+    </cs:spPr>
+  </cs:gridlineMinor>
+  <cs:hiLoLine>
+    <cs:lnRef idx="0"/>
+    <cs:fillRef idx="0"/>
+    <cs:effectRef idx="0"/>
+    <cs:fontRef idx="minor">
+      <a:schemeClr val="tx1"/>
+    </cs:fontRef>
+    <cs:spPr>
+      <a:ln w="9525" cap="flat" cmpd="sng" algn="ctr">
+        <a:solidFill>
+          <a:schemeClr val="tx1">
+            <a:lumMod val="50000"/>
+            <a:lumOff val="50000"/>
+          </a:schemeClr>
+        </a:solidFill>
+        <a:round/>
+      </a:ln>
+    </cs:spPr>
+  </cs:hiLoLine>
+  <cs:leaderLine>
+    <cs:lnRef idx="0"/>
+    <cs:fillRef idx="0"/>
+    <cs:effectRef idx="0"/>
+    <cs:fontRef idx="minor">
+      <a:schemeClr val="tx1"/>
+    </cs:fontRef>
+    <cs:spPr>
+      <a:ln w="9525" cap="flat" cmpd="sng" algn="ctr">
+        <a:solidFill>
+          <a:schemeClr val="tx1">
+            <a:lumMod val="35000"/>
+            <a:lumOff val="65000"/>
+          </a:schemeClr>
+        </a:solidFill>
+        <a:round/>
+      </a:ln>
+    </cs:spPr>
+  </cs:leaderLine>
+  <cs:legend>
+    <cs:lnRef idx="0"/>
+    <cs:fillRef idx="0"/>
+    <cs:effectRef idx="0"/>
+    <cs:fontRef idx="minor">
+      <a:schemeClr val="tx1">
+        <a:lumMod val="65000"/>
+        <a:lumOff val="35000"/>
+      </a:schemeClr>
+    </cs:fontRef>
+    <cs:defRPr sz="900" kern="1200"/>
+  </cs:legend>
+  <cs:plotArea mods="allowNoFillOverride allowNoLineOverride">
+    <cs:lnRef idx="0"/>
+    <cs:fillRef idx="0"/>
+    <cs:effectRef idx="0"/>
+    <cs:fontRef idx="minor">
+      <a:schemeClr val="tx1"/>
+    </cs:fontRef>
+  </cs:plotArea>
+  <cs:plotArea3D mods="allowNoFillOverride allowNoLineOverride">
+    <cs:lnRef idx="0"/>
+    <cs:fillRef idx="0"/>
+    <cs:effectRef idx="0"/>
+    <cs:fontRef idx="minor">
+      <a:schemeClr val="tx1"/>
+    </cs:fontRef>
+  </cs:plotArea3D>
+  <cs:seriesAxis>
+    <cs:lnRef idx="0"/>
+    <cs:fillRef idx="0"/>
+    <cs:effectRef idx="0"/>
+    <cs:fontRef idx="minor">
+      <a:schemeClr val="tx1">
+        <a:lumMod val="65000"/>
+        <a:lumOff val="35000"/>
+      </a:schemeClr>
+    </cs:fontRef>
+    <cs:defRPr sz="900" kern="1200"/>
+  </cs:seriesAxis>
+  <cs:seriesLine>
+    <cs:lnRef idx="0"/>
+    <cs:fillRef idx="0"/>
+    <cs:effectRef idx="0"/>
+    <cs:fontRef idx="minor">
+      <a:schemeClr val="tx1"/>
+    </cs:fontRef>
+    <cs:spPr>
+      <a:ln w="9525" cap="flat" cmpd="sng" algn="ctr">
+        <a:solidFill>
+          <a:schemeClr val="tx1">
+            <a:lumMod val="35000"/>
+            <a:lumOff val="65000"/>
+          </a:schemeClr>
+        </a:solidFill>
+        <a:round/>
+      </a:ln>
+    </cs:spPr>
+  </cs:seriesLine>
+  <cs:title>
+    <cs:lnRef idx="0"/>
+    <cs:fillRef idx="0"/>
+    <cs:effectRef idx="0"/>
+    <cs:fontRef idx="minor">
+      <a:schemeClr val="tx1">
+        <a:lumMod val="65000"/>
+        <a:lumOff val="35000"/>
+      </a:schemeClr>
+    </cs:fontRef>
+    <cs:defRPr sz="1400" b="0" kern="1200" spc="0" baseline="0"/>
+  </cs:title>
+  <cs:trendline>
+    <cs:lnRef idx="0">
+      <cs:styleClr val="auto"/>
+    </cs:lnRef>
+    <cs:fillRef idx="0"/>
+    <cs:effectRef idx="0"/>
+    <cs:fontRef idx="minor">
+      <a:schemeClr val="tx1"/>
+    </cs:fontRef>
+    <cs:spPr>
+      <a:ln w="19050" cap="rnd">
+        <a:solidFill>
+          <a:schemeClr val="phClr"/>
+        </a:solidFill>
+        <a:prstDash val="sysDot"/>
+      </a:ln>
+    </cs:spPr>
+  </cs:trendline>
+  <cs:trendlineLabel>
+    <cs:lnRef idx="0"/>
+    <cs:fillRef idx="0"/>
+    <cs:effectRef idx="0"/>
+    <cs:fontRef idx="minor">
+      <a:schemeClr val="tx1">
+        <a:lumMod val="65000"/>
+        <a:lumOff val="35000"/>
+      </a:schemeClr>
+    </cs:fontRef>
+    <cs:defRPr sz="900" kern="1200"/>
+  </cs:trendlineLabel>
+  <cs:upBar>
+    <cs:lnRef idx="0"/>
+    <cs:fillRef idx="0"/>
+    <cs:effectRef idx="0"/>
+    <cs:fontRef idx="minor">
+      <a:schemeClr val="tx1"/>
+    </cs:fontRef>
+    <cs:spPr>
+      <a:solidFill>
+        <a:schemeClr val="lt1"/>
+      </a:solidFill>
+      <a:ln w="9525" cap="flat" cmpd="sng" algn="ctr">
+        <a:solidFill>
+          <a:schemeClr val="tx1">
+            <a:lumMod val="65000"/>
+            <a:lumOff val="35000"/>
+          </a:schemeClr>
+        </a:solidFill>
+        <a:round/>
+      </a:ln>
+    </cs:spPr>
+  </cs:upBar>
+  <cs:valueAxis>
+    <cs:lnRef idx="0"/>
+    <cs:fillRef idx="0"/>
+    <cs:effectRef idx="0"/>
+    <cs:fontRef idx="minor">
+      <a:schemeClr val="tx1">
+        <a:lumMod val="65000"/>
+        <a:lumOff val="35000"/>
+      </a:schemeClr>
+    </cs:fontRef>
+    <cs:defRPr sz="900" kern="1200"/>
+  </cs:valueAxis>
+  <cs:wall>
+    <cs:lnRef idx="0"/>
+    <cs:fillRef idx="0"/>
+    <cs:effectRef idx="0"/>
+    <cs:fontRef idx="minor">
+      <a:schemeClr val="tx1"/>
+    </cs:fontRef>
+    <cs:spPr>
+      <a:noFill/>
+      <a:ln>
+        <a:noFill/>
+      </a:ln>
+    </cs:spPr>
+  </cs:wall>
+</cs:chartStyle>
+</file>
+
+<file path=ppt/charts/style2.xml><?xml version="1.0" encoding="utf-8"?>
 <cs:chartStyle xmlns:cs="http://schemas.microsoft.com/office/drawing/2012/chartStyle" xmlns:a="http://schemas.openxmlformats.org/drawingml/2006/main" id="215">
   <cs:axisTitle>
     <cs:lnRef idx="0"/>
@@ -2048,7 +3146,7 @@
 </cs:chartStyle>
 </file>
 
-<file path=ppt/charts/style2.xml><?xml version="1.0" encoding="utf-8"?>
+<file path=ppt/charts/style3.xml><?xml version="1.0" encoding="utf-8"?>
 <cs:chartStyle xmlns:cs="http://schemas.microsoft.com/office/drawing/2012/chartStyle" xmlns:a="http://schemas.openxmlformats.org/drawingml/2006/main" id="215">
   <cs:axisTitle>
     <cs:lnRef idx="0"/>
@@ -2597,7 +3695,7 @@
           <a:noFill/>
           <a:extLst>
             <a:ext uri="{909E8E84-426E-40dd-AFC4-6F175D3DCCD1}">
-              <a14:hiddenFill xmlns="" xmlns:a14="http://schemas.microsoft.com/office/drawing/2010/main">
+              <a14:hiddenFill xmlns:a14="http://schemas.microsoft.com/office/drawing/2010/main" xmlns="">
                 <a:solidFill>
                   <a:srgbClr val="FFFFFF"/>
                 </a:solidFill>
@@ -2656,7 +3754,7 @@
             </a:ln>
             <a:extLst>
               <a:ext uri="{91240B29-F687-4f45-9708-019B960494DF}">
-                <a14:hiddenLine xmlns="" xmlns:a14="http://schemas.microsoft.com/office/drawing/2010/main" w="9525">
+                <a14:hiddenLine xmlns:a14="http://schemas.microsoft.com/office/drawing/2010/main" xmlns="" w="9525">
                   <a:solidFill>
                     <a:srgbClr val="000000"/>
                   </a:solidFill>
@@ -2746,7 +3844,7 @@
             </a:ln>
             <a:extLst>
               <a:ext uri="{91240B29-F687-4f45-9708-019B960494DF}">
-                <a14:hiddenLine xmlns="" xmlns:a14="http://schemas.microsoft.com/office/drawing/2010/main" w="9525">
+                <a14:hiddenLine xmlns:a14="http://schemas.microsoft.com/office/drawing/2010/main" xmlns="" w="9525">
                   <a:solidFill>
                     <a:srgbClr val="000000"/>
                   </a:solidFill>
@@ -2836,7 +3934,7 @@
             </a:ln>
             <a:extLst>
               <a:ext uri="{91240B29-F687-4f45-9708-019B960494DF}">
-                <a14:hiddenLine xmlns="" xmlns:a14="http://schemas.microsoft.com/office/drawing/2010/main" w="9525">
+                <a14:hiddenLine xmlns:a14="http://schemas.microsoft.com/office/drawing/2010/main" xmlns="" w="9525">
                   <a:solidFill>
                     <a:srgbClr val="000000"/>
                   </a:solidFill>
@@ -2870,7 +3968,7 @@
             </a:ln>
             <a:extLst>
               <a:ext uri="{91240B29-F687-4f45-9708-019B960494DF}">
-                <a14:hiddenLine xmlns="" xmlns:a14="http://schemas.microsoft.com/office/drawing/2010/main" w="9525">
+                <a14:hiddenLine xmlns:a14="http://schemas.microsoft.com/office/drawing/2010/main" xmlns="" w="9525">
                   <a:solidFill>
                     <a:srgbClr val="000000"/>
                   </a:solidFill>
@@ -2960,7 +4058,7 @@
             </a:ln>
             <a:extLst>
               <a:ext uri="{91240B29-F687-4f45-9708-019B960494DF}">
-                <a14:hiddenLine xmlns="" xmlns:a14="http://schemas.microsoft.com/office/drawing/2010/main" w="9525">
+                <a14:hiddenLine xmlns:a14="http://schemas.microsoft.com/office/drawing/2010/main" xmlns="" w="9525">
                   <a:solidFill>
                     <a:srgbClr val="000000"/>
                   </a:solidFill>
@@ -3022,7 +4120,7 @@
             </a:ln>
             <a:extLst>
               <a:ext uri="{91240B29-F687-4f45-9708-019B960494DF}">
-                <a14:hiddenLine xmlns="" xmlns:a14="http://schemas.microsoft.com/office/drawing/2010/main" w="9525">
+                <a14:hiddenLine xmlns:a14="http://schemas.microsoft.com/office/drawing/2010/main" xmlns="" w="9525">
                   <a:solidFill>
                     <a:srgbClr val="000000"/>
                   </a:solidFill>
@@ -3084,7 +4182,7 @@
             </a:ln>
             <a:extLst>
               <a:ext uri="{91240B29-F687-4f45-9708-019B960494DF}">
-                <a14:hiddenLine xmlns="" xmlns:a14="http://schemas.microsoft.com/office/drawing/2010/main" w="9525">
+                <a14:hiddenLine xmlns:a14="http://schemas.microsoft.com/office/drawing/2010/main" xmlns="" w="9525">
                   <a:solidFill>
                     <a:srgbClr val="000000"/>
                   </a:solidFill>
@@ -3174,7 +4272,7 @@
             </a:ln>
             <a:extLst>
               <a:ext uri="{91240B29-F687-4f45-9708-019B960494DF}">
-                <a14:hiddenLine xmlns="" xmlns:a14="http://schemas.microsoft.com/office/drawing/2010/main" w="9525">
+                <a14:hiddenLine xmlns:a14="http://schemas.microsoft.com/office/drawing/2010/main" xmlns="" w="9525">
                   <a:solidFill>
                     <a:srgbClr val="000000"/>
                   </a:solidFill>
@@ -3236,7 +4334,7 @@
             </a:ln>
             <a:extLst>
               <a:ext uri="{91240B29-F687-4f45-9708-019B960494DF}">
-                <a14:hiddenLine xmlns="" xmlns:a14="http://schemas.microsoft.com/office/drawing/2010/main" w="9525">
+                <a14:hiddenLine xmlns:a14="http://schemas.microsoft.com/office/drawing/2010/main" xmlns="" w="9525">
                   <a:solidFill>
                     <a:srgbClr val="000000"/>
                   </a:solidFill>
@@ -3298,7 +4396,7 @@
             </a:ln>
             <a:extLst>
               <a:ext uri="{91240B29-F687-4f45-9708-019B960494DF}">
-                <a14:hiddenLine xmlns="" xmlns:a14="http://schemas.microsoft.com/office/drawing/2010/main" w="9525">
+                <a14:hiddenLine xmlns:a14="http://schemas.microsoft.com/office/drawing/2010/main" xmlns="" w="9525">
                   <a:solidFill>
                     <a:srgbClr val="000000"/>
                   </a:solidFill>
@@ -3388,7 +4486,7 @@
             </a:ln>
             <a:extLst>
               <a:ext uri="{91240B29-F687-4f45-9708-019B960494DF}">
-                <a14:hiddenLine xmlns="" xmlns:a14="http://schemas.microsoft.com/office/drawing/2010/main" w="9525">
+                <a14:hiddenLine xmlns:a14="http://schemas.microsoft.com/office/drawing/2010/main" xmlns="" w="9525">
                   <a:solidFill>
                     <a:srgbClr val="000000"/>
                   </a:solidFill>
@@ -3478,7 +4576,7 @@
             </a:ln>
             <a:extLst>
               <a:ext uri="{91240B29-F687-4f45-9708-019B960494DF}">
-                <a14:hiddenLine xmlns="" xmlns:a14="http://schemas.microsoft.com/office/drawing/2010/main" w="9525">
+                <a14:hiddenLine xmlns:a14="http://schemas.microsoft.com/office/drawing/2010/main" xmlns="" w="9525">
                   <a:solidFill>
                     <a:srgbClr val="000000"/>
                   </a:solidFill>
@@ -3540,7 +4638,7 @@
             </a:ln>
             <a:extLst>
               <a:ext uri="{91240B29-F687-4f45-9708-019B960494DF}">
-                <a14:hiddenLine xmlns="" xmlns:a14="http://schemas.microsoft.com/office/drawing/2010/main" w="9525">
+                <a14:hiddenLine xmlns:a14="http://schemas.microsoft.com/office/drawing/2010/main" xmlns="" w="9525">
                   <a:solidFill>
                     <a:srgbClr val="000000"/>
                   </a:solidFill>
@@ -3650,7 +4748,7 @@
             </a:ln>
             <a:extLst>
               <a:ext uri="{91240B29-F687-4f45-9708-019B960494DF}">
-                <a14:hiddenLine xmlns="" xmlns:a14="http://schemas.microsoft.com/office/drawing/2010/main" w="9525">
+                <a14:hiddenLine xmlns:a14="http://schemas.microsoft.com/office/drawing/2010/main" xmlns="" w="9525">
                   <a:solidFill>
                     <a:srgbClr val="000000"/>
                   </a:solidFill>
@@ -3712,7 +4810,7 @@
             </a:ln>
             <a:extLst>
               <a:ext uri="{91240B29-F687-4f45-9708-019B960494DF}">
-                <a14:hiddenLine xmlns="" xmlns:a14="http://schemas.microsoft.com/office/drawing/2010/main" w="9525">
+                <a14:hiddenLine xmlns:a14="http://schemas.microsoft.com/office/drawing/2010/main" xmlns="" w="9525">
                   <a:solidFill>
                     <a:srgbClr val="000000"/>
                   </a:solidFill>
@@ -3802,7 +4900,7 @@
             </a:ln>
             <a:extLst>
               <a:ext uri="{91240B29-F687-4f45-9708-019B960494DF}">
-                <a14:hiddenLine xmlns="" xmlns:a14="http://schemas.microsoft.com/office/drawing/2010/main" w="9525">
+                <a14:hiddenLine xmlns:a14="http://schemas.microsoft.com/office/drawing/2010/main" xmlns="" w="9525">
                   <a:solidFill>
                     <a:srgbClr val="000000"/>
                   </a:solidFill>
@@ -3892,7 +4990,7 @@
             </a:ln>
             <a:extLst>
               <a:ext uri="{91240B29-F687-4f45-9708-019B960494DF}">
-                <a14:hiddenLine xmlns="" xmlns:a14="http://schemas.microsoft.com/office/drawing/2010/main" w="9525">
+                <a14:hiddenLine xmlns:a14="http://schemas.microsoft.com/office/drawing/2010/main" xmlns="" w="9525">
                   <a:solidFill>
                     <a:srgbClr val="000000"/>
                   </a:solidFill>
@@ -3954,7 +5052,7 @@
             </a:ln>
             <a:extLst>
               <a:ext uri="{91240B29-F687-4f45-9708-019B960494DF}">
-                <a14:hiddenLine xmlns="" xmlns:a14="http://schemas.microsoft.com/office/drawing/2010/main" w="9525">
+                <a14:hiddenLine xmlns:a14="http://schemas.microsoft.com/office/drawing/2010/main" xmlns="" w="9525">
                   <a:solidFill>
                     <a:srgbClr val="000000"/>
                   </a:solidFill>
@@ -4044,7 +5142,7 @@
             </a:ln>
             <a:extLst>
               <a:ext uri="{91240B29-F687-4f45-9708-019B960494DF}">
-                <a14:hiddenLine xmlns="" xmlns:a14="http://schemas.microsoft.com/office/drawing/2010/main" w="9525">
+                <a14:hiddenLine xmlns:a14="http://schemas.microsoft.com/office/drawing/2010/main" xmlns="" w="9525">
                   <a:solidFill>
                     <a:srgbClr val="000000"/>
                   </a:solidFill>
@@ -4134,7 +5232,7 @@
             </a:ln>
             <a:extLst>
               <a:ext uri="{91240B29-F687-4f45-9708-019B960494DF}">
-                <a14:hiddenLine xmlns="" xmlns:a14="http://schemas.microsoft.com/office/drawing/2010/main" w="9525">
+                <a14:hiddenLine xmlns:a14="http://schemas.microsoft.com/office/drawing/2010/main" xmlns="" w="9525">
                   <a:solidFill>
                     <a:srgbClr val="000000"/>
                   </a:solidFill>
@@ -4190,7 +5288,7 @@
             </a:ln>
             <a:extLst>
               <a:ext uri="{91240B29-F687-4f45-9708-019B960494DF}">
-                <a14:hiddenLine xmlns="" xmlns:a14="http://schemas.microsoft.com/office/drawing/2010/main" w="9525">
+                <a14:hiddenLine xmlns:a14="http://schemas.microsoft.com/office/drawing/2010/main" xmlns="" w="9525">
                   <a:solidFill>
                     <a:srgbClr val="000000"/>
                   </a:solidFill>
@@ -4280,7 +5378,7 @@
             </a:ln>
             <a:extLst>
               <a:ext uri="{91240B29-F687-4f45-9708-019B960494DF}">
-                <a14:hiddenLine xmlns="" xmlns:a14="http://schemas.microsoft.com/office/drawing/2010/main" w="9525">
+                <a14:hiddenLine xmlns:a14="http://schemas.microsoft.com/office/drawing/2010/main" xmlns="" w="9525">
                   <a:solidFill>
                     <a:srgbClr val="000000"/>
                   </a:solidFill>
@@ -4336,7 +5434,7 @@
             </a:ln>
             <a:extLst>
               <a:ext uri="{91240B29-F687-4f45-9708-019B960494DF}">
-                <a14:hiddenLine xmlns="" xmlns:a14="http://schemas.microsoft.com/office/drawing/2010/main" w="9525">
+                <a14:hiddenLine xmlns:a14="http://schemas.microsoft.com/office/drawing/2010/main" xmlns="" w="9525">
                   <a:solidFill>
                     <a:srgbClr val="000000"/>
                   </a:solidFill>
@@ -4426,7 +5524,7 @@
             </a:ln>
             <a:extLst>
               <a:ext uri="{91240B29-F687-4f45-9708-019B960494DF}">
-                <a14:hiddenLine xmlns="" xmlns:a14="http://schemas.microsoft.com/office/drawing/2010/main" w="9525">
+                <a14:hiddenLine xmlns:a14="http://schemas.microsoft.com/office/drawing/2010/main" xmlns="" w="9525">
                   <a:solidFill>
                     <a:srgbClr val="000000"/>
                   </a:solidFill>
@@ -4494,7 +5592,7 @@
             </a:ln>
             <a:extLst>
               <a:ext uri="{91240B29-F687-4f45-9708-019B960494DF}">
-                <a14:hiddenLine xmlns="" xmlns:a14="http://schemas.microsoft.com/office/drawing/2010/main" w="9525">
+                <a14:hiddenLine xmlns:a14="http://schemas.microsoft.com/office/drawing/2010/main" xmlns="" w="9525">
                   <a:solidFill>
                     <a:srgbClr val="000000"/>
                   </a:solidFill>
@@ -4584,7 +5682,7 @@
             </a:ln>
             <a:extLst>
               <a:ext uri="{91240B29-F687-4f45-9708-019B960494DF}">
-                <a14:hiddenLine xmlns="" xmlns:a14="http://schemas.microsoft.com/office/drawing/2010/main" w="9525">
+                <a14:hiddenLine xmlns:a14="http://schemas.microsoft.com/office/drawing/2010/main" xmlns="" w="9525">
                   <a:solidFill>
                     <a:srgbClr val="000000"/>
                   </a:solidFill>
@@ -4652,7 +5750,7 @@
             </a:ln>
             <a:extLst>
               <a:ext uri="{91240B29-F687-4f45-9708-019B960494DF}">
-                <a14:hiddenLine xmlns="" xmlns:a14="http://schemas.microsoft.com/office/drawing/2010/main" w="9525">
+                <a14:hiddenLine xmlns:a14="http://schemas.microsoft.com/office/drawing/2010/main" xmlns="" w="9525">
                   <a:solidFill>
                     <a:srgbClr val="000000"/>
                   </a:solidFill>
@@ -4742,7 +5840,7 @@
             </a:ln>
             <a:extLst>
               <a:ext uri="{91240B29-F687-4f45-9708-019B960494DF}">
-                <a14:hiddenLine xmlns="" xmlns:a14="http://schemas.microsoft.com/office/drawing/2010/main" w="9525">
+                <a14:hiddenLine xmlns:a14="http://schemas.microsoft.com/office/drawing/2010/main" xmlns="" w="9525">
                   <a:solidFill>
                     <a:srgbClr val="000000"/>
                   </a:solidFill>
@@ -4776,7 +5874,7 @@
             </a:ln>
             <a:extLst>
               <a:ext uri="{91240B29-F687-4f45-9708-019B960494DF}">
-                <a14:hiddenLine xmlns="" xmlns:a14="http://schemas.microsoft.com/office/drawing/2010/main" w="9525">
+                <a14:hiddenLine xmlns:a14="http://schemas.microsoft.com/office/drawing/2010/main" xmlns="" w="9525">
                   <a:solidFill>
                     <a:srgbClr val="000000"/>
                   </a:solidFill>
@@ -4866,7 +5964,7 @@
             </a:ln>
             <a:extLst>
               <a:ext uri="{91240B29-F687-4f45-9708-019B960494DF}">
-                <a14:hiddenLine xmlns="" xmlns:a14="http://schemas.microsoft.com/office/drawing/2010/main" w="9525">
+                <a14:hiddenLine xmlns:a14="http://schemas.microsoft.com/office/drawing/2010/main" xmlns="" w="9525">
                   <a:solidFill>
                     <a:srgbClr val="000000"/>
                   </a:solidFill>
@@ -4928,7 +6026,7 @@
             </a:ln>
             <a:extLst>
               <a:ext uri="{91240B29-F687-4f45-9708-019B960494DF}">
-                <a14:hiddenLine xmlns="" xmlns:a14="http://schemas.microsoft.com/office/drawing/2010/main" w="9525">
+                <a14:hiddenLine xmlns:a14="http://schemas.microsoft.com/office/drawing/2010/main" xmlns="" w="9525">
                   <a:solidFill>
                     <a:srgbClr val="000000"/>
                   </a:solidFill>
@@ -4990,7 +6088,7 @@
             </a:ln>
             <a:extLst>
               <a:ext uri="{91240B29-F687-4f45-9708-019B960494DF}">
-                <a14:hiddenLine xmlns="" xmlns:a14="http://schemas.microsoft.com/office/drawing/2010/main" w="9525">
+                <a14:hiddenLine xmlns:a14="http://schemas.microsoft.com/office/drawing/2010/main" xmlns="" w="9525">
                   <a:solidFill>
                     <a:srgbClr val="000000"/>
                   </a:solidFill>
@@ -5080,7 +6178,7 @@
             </a:ln>
             <a:extLst>
               <a:ext uri="{91240B29-F687-4f45-9708-019B960494DF}">
-                <a14:hiddenLine xmlns="" xmlns:a14="http://schemas.microsoft.com/office/drawing/2010/main" w="9525">
+                <a14:hiddenLine xmlns:a14="http://schemas.microsoft.com/office/drawing/2010/main" xmlns="" w="9525">
                   <a:solidFill>
                     <a:srgbClr val="000000"/>
                   </a:solidFill>
@@ -5148,7 +6246,7 @@
             </a:ln>
             <a:extLst>
               <a:ext uri="{91240B29-F687-4f45-9708-019B960494DF}">
-                <a14:hiddenLine xmlns="" xmlns:a14="http://schemas.microsoft.com/office/drawing/2010/main" w="9525">
+                <a14:hiddenLine xmlns:a14="http://schemas.microsoft.com/office/drawing/2010/main" xmlns="" w="9525">
                   <a:solidFill>
                     <a:srgbClr val="000000"/>
                   </a:solidFill>
@@ -5210,7 +6308,7 @@
             </a:ln>
             <a:extLst>
               <a:ext uri="{91240B29-F687-4f45-9708-019B960494DF}">
-                <a14:hiddenLine xmlns="" xmlns:a14="http://schemas.microsoft.com/office/drawing/2010/main" w="9525">
+                <a14:hiddenLine xmlns:a14="http://schemas.microsoft.com/office/drawing/2010/main" xmlns="" w="9525">
                   <a:solidFill>
                     <a:srgbClr val="000000"/>
                   </a:solidFill>
@@ -5300,7 +6398,7 @@
             </a:ln>
             <a:extLst>
               <a:ext uri="{91240B29-F687-4f45-9708-019B960494DF}">
-                <a14:hiddenLine xmlns="" xmlns:a14="http://schemas.microsoft.com/office/drawing/2010/main" w="9525">
+                <a14:hiddenLine xmlns:a14="http://schemas.microsoft.com/office/drawing/2010/main" xmlns="" w="9525">
                   <a:solidFill>
                     <a:srgbClr val="000000"/>
                   </a:solidFill>
@@ -5362,7 +6460,7 @@
             </a:ln>
             <a:extLst>
               <a:ext uri="{91240B29-F687-4f45-9708-019B960494DF}">
-                <a14:hiddenLine xmlns="" xmlns:a14="http://schemas.microsoft.com/office/drawing/2010/main" w="9525">
+                <a14:hiddenLine xmlns:a14="http://schemas.microsoft.com/office/drawing/2010/main" xmlns="" w="9525">
                   <a:solidFill>
                     <a:srgbClr val="000000"/>
                   </a:solidFill>
@@ -5452,7 +6550,7 @@
             </a:ln>
             <a:extLst>
               <a:ext uri="{91240B29-F687-4f45-9708-019B960494DF}">
-                <a14:hiddenLine xmlns="" xmlns:a14="http://schemas.microsoft.com/office/drawing/2010/main" w="9525">
+                <a14:hiddenLine xmlns:a14="http://schemas.microsoft.com/office/drawing/2010/main" xmlns="" w="9525">
                   <a:solidFill>
                     <a:srgbClr val="000000"/>
                   </a:solidFill>
@@ -5514,7 +6612,7 @@
             </a:ln>
             <a:extLst>
               <a:ext uri="{91240B29-F687-4f45-9708-019B960494DF}">
-                <a14:hiddenLine xmlns="" xmlns:a14="http://schemas.microsoft.com/office/drawing/2010/main" w="9525">
+                <a14:hiddenLine xmlns:a14="http://schemas.microsoft.com/office/drawing/2010/main" xmlns="" w="9525">
                   <a:solidFill>
                     <a:srgbClr val="000000"/>
                   </a:solidFill>
@@ -5604,7 +6702,7 @@
             </a:ln>
             <a:extLst>
               <a:ext uri="{91240B29-F687-4f45-9708-019B960494DF}">
-                <a14:hiddenLine xmlns="" xmlns:a14="http://schemas.microsoft.com/office/drawing/2010/main" w="9525">
+                <a14:hiddenLine xmlns:a14="http://schemas.microsoft.com/office/drawing/2010/main" xmlns="" w="9525">
                   <a:solidFill>
                     <a:srgbClr val="000000"/>
                   </a:solidFill>
@@ -5638,7 +6736,7 @@
             </a:ln>
             <a:extLst>
               <a:ext uri="{91240B29-F687-4f45-9708-019B960494DF}">
-                <a14:hiddenLine xmlns="" xmlns:a14="http://schemas.microsoft.com/office/drawing/2010/main" w="9525">
+                <a14:hiddenLine xmlns:a14="http://schemas.microsoft.com/office/drawing/2010/main" xmlns="" w="9525">
                   <a:solidFill>
                     <a:srgbClr val="000000"/>
                   </a:solidFill>
@@ -5703,7 +6801,7 @@
             </a:ln>
             <a:extLst>
               <a:ext uri="{91240B29-F687-4f45-9708-019B960494DF}">
-                <a14:hiddenLine xmlns="" xmlns:a14="http://schemas.microsoft.com/office/drawing/2010/main" w="9525">
+                <a14:hiddenLine xmlns:a14="http://schemas.microsoft.com/office/drawing/2010/main" xmlns="" w="9525">
                   <a:solidFill>
                     <a:srgbClr val="000000"/>
                   </a:solidFill>
@@ -5793,7 +6891,7 @@
             </a:ln>
             <a:extLst>
               <a:ext uri="{91240B29-F687-4f45-9708-019B960494DF}">
-                <a14:hiddenLine xmlns="" xmlns:a14="http://schemas.microsoft.com/office/drawing/2010/main" w="9525">
+                <a14:hiddenLine xmlns:a14="http://schemas.microsoft.com/office/drawing/2010/main" xmlns="" w="9525">
                   <a:solidFill>
                     <a:srgbClr val="000000"/>
                   </a:solidFill>
@@ -5855,7 +6953,7 @@
             </a:ln>
             <a:extLst>
               <a:ext uri="{91240B29-F687-4f45-9708-019B960494DF}">
-                <a14:hiddenLine xmlns="" xmlns:a14="http://schemas.microsoft.com/office/drawing/2010/main" w="9525">
+                <a14:hiddenLine xmlns:a14="http://schemas.microsoft.com/office/drawing/2010/main" xmlns="" w="9525">
                   <a:solidFill>
                     <a:srgbClr val="000000"/>
                   </a:solidFill>
@@ -5945,7 +7043,7 @@
             </a:ln>
             <a:extLst>
               <a:ext uri="{91240B29-F687-4f45-9708-019B960494DF}">
-                <a14:hiddenLine xmlns="" xmlns:a14="http://schemas.microsoft.com/office/drawing/2010/main" w="9525">
+                <a14:hiddenLine xmlns:a14="http://schemas.microsoft.com/office/drawing/2010/main" xmlns="" w="9525">
                   <a:solidFill>
                     <a:srgbClr val="000000"/>
                   </a:solidFill>
@@ -6035,7 +7133,7 @@
             </a:ln>
             <a:extLst>
               <a:ext uri="{91240B29-F687-4f45-9708-019B960494DF}">
-                <a14:hiddenLine xmlns="" xmlns:a14="http://schemas.microsoft.com/office/drawing/2010/main" w="9525">
+                <a14:hiddenLine xmlns:a14="http://schemas.microsoft.com/office/drawing/2010/main" xmlns="" w="9525">
                   <a:solidFill>
                     <a:srgbClr val="000000"/>
                   </a:solidFill>
@@ -6100,7 +7198,7 @@
             </a:ln>
             <a:extLst>
               <a:ext uri="{91240B29-F687-4f45-9708-019B960494DF}">
-                <a14:hiddenLine xmlns="" xmlns:a14="http://schemas.microsoft.com/office/drawing/2010/main" w="9525">
+                <a14:hiddenLine xmlns:a14="http://schemas.microsoft.com/office/drawing/2010/main" xmlns="" w="9525">
                   <a:solidFill>
                     <a:srgbClr val="000000"/>
                   </a:solidFill>
@@ -6162,7 +7260,7 @@
             </a:ln>
             <a:extLst>
               <a:ext uri="{91240B29-F687-4f45-9708-019B960494DF}">
-                <a14:hiddenLine xmlns="" xmlns:a14="http://schemas.microsoft.com/office/drawing/2010/main" w="9525">
+                <a14:hiddenLine xmlns:a14="http://schemas.microsoft.com/office/drawing/2010/main" xmlns="" w="9525">
                   <a:solidFill>
                     <a:srgbClr val="000000"/>
                   </a:solidFill>
@@ -6252,7 +7350,7 @@
             </a:ln>
             <a:extLst>
               <a:ext uri="{91240B29-F687-4f45-9708-019B960494DF}">
-                <a14:hiddenLine xmlns="" xmlns:a14="http://schemas.microsoft.com/office/drawing/2010/main" w="9525">
+                <a14:hiddenLine xmlns:a14="http://schemas.microsoft.com/office/drawing/2010/main" xmlns="" w="9525">
                   <a:solidFill>
                     <a:srgbClr val="000000"/>
                   </a:solidFill>
@@ -6342,7 +7440,7 @@
             </a:ln>
             <a:extLst>
               <a:ext uri="{91240B29-F687-4f45-9708-019B960494DF}">
-                <a14:hiddenLine xmlns="" xmlns:a14="http://schemas.microsoft.com/office/drawing/2010/main" w="9525">
+                <a14:hiddenLine xmlns:a14="http://schemas.microsoft.com/office/drawing/2010/main" xmlns="" w="9525">
                   <a:solidFill>
                     <a:srgbClr val="000000"/>
                   </a:solidFill>
@@ -6404,7 +7502,7 @@
             </a:ln>
             <a:extLst>
               <a:ext uri="{91240B29-F687-4f45-9708-019B960494DF}">
-                <a14:hiddenLine xmlns="" xmlns:a14="http://schemas.microsoft.com/office/drawing/2010/main" w="9525">
+                <a14:hiddenLine xmlns:a14="http://schemas.microsoft.com/office/drawing/2010/main" xmlns="" w="9525">
                   <a:solidFill>
                     <a:srgbClr val="000000"/>
                   </a:solidFill>
@@ -6524,7 +7622,7 @@
             </a:ln>
             <a:extLst>
               <a:ext uri="{91240B29-F687-4f45-9708-019B960494DF}">
-                <a14:hiddenLine xmlns="" xmlns:a14="http://schemas.microsoft.com/office/drawing/2010/main" w="9525">
+                <a14:hiddenLine xmlns:a14="http://schemas.microsoft.com/office/drawing/2010/main" xmlns="" w="9525">
                   <a:solidFill>
                     <a:srgbClr val="000000"/>
                   </a:solidFill>
@@ -6592,7 +7690,7 @@
             </a:ln>
             <a:extLst>
               <a:ext uri="{91240B29-F687-4f45-9708-019B960494DF}">
-                <a14:hiddenLine xmlns="" xmlns:a14="http://schemas.microsoft.com/office/drawing/2010/main" w="9525">
+                <a14:hiddenLine xmlns:a14="http://schemas.microsoft.com/office/drawing/2010/main" xmlns="" w="9525">
                   <a:solidFill>
                     <a:srgbClr val="000000"/>
                   </a:solidFill>
@@ -6682,7 +7780,7 @@
             </a:ln>
             <a:extLst>
               <a:ext uri="{91240B29-F687-4f45-9708-019B960494DF}">
-                <a14:hiddenLine xmlns="" xmlns:a14="http://schemas.microsoft.com/office/drawing/2010/main" w="9525">
+                <a14:hiddenLine xmlns:a14="http://schemas.microsoft.com/office/drawing/2010/main" xmlns="" w="9525">
                   <a:solidFill>
                     <a:srgbClr val="000000"/>
                   </a:solidFill>
@@ -6822,7 +7920,7 @@
           <a:p>
             <a:fld id="{48A87A34-81AB-432B-8DAE-1953F412C126}" type="datetimeFigureOut">
               <a:rPr lang="en-US" dirty="0"/>
-              <a:t>7/10/2021</a:t>
+              <a:t>7/11/2021</a:t>
             </a:fld>
             <a:endParaRPr lang="en-US" dirty="0"/>
           </a:p>
@@ -7084,7 +8182,7 @@
           <a:p>
             <a:fld id="{48A87A34-81AB-432B-8DAE-1953F412C126}" type="datetimeFigureOut">
               <a:rPr lang="en-US" dirty="0"/>
-              <a:t>7/10/2021</a:t>
+              <a:t>7/11/2021</a:t>
             </a:fld>
             <a:endParaRPr lang="en-US" dirty="0"/>
           </a:p>
@@ -7275,7 +8373,7 @@
           <a:p>
             <a:fld id="{48A87A34-81AB-432B-8DAE-1953F412C126}" type="datetimeFigureOut">
               <a:rPr lang="en-US" dirty="0"/>
-              <a:t>7/10/2021</a:t>
+              <a:t>7/11/2021</a:t>
             </a:fld>
             <a:endParaRPr lang="en-US" dirty="0"/>
           </a:p>
@@ -7533,7 +8631,7 @@
           <a:p>
             <a:fld id="{48A87A34-81AB-432B-8DAE-1953F412C126}" type="datetimeFigureOut">
               <a:rPr lang="en-US" dirty="0"/>
-              <a:t>7/10/2021</a:t>
+              <a:t>7/11/2021</a:t>
             </a:fld>
             <a:endParaRPr lang="en-US" dirty="0"/>
           </a:p>
@@ -7962,7 +9060,7 @@
           <a:p>
             <a:fld id="{48A87A34-81AB-432B-8DAE-1953F412C126}" type="datetimeFigureOut">
               <a:rPr lang="en-US" dirty="0"/>
-              <a:t>7/10/2021</a:t>
+              <a:t>7/11/2021</a:t>
             </a:fld>
             <a:endParaRPr lang="en-US" dirty="0"/>
           </a:p>
@@ -8503,7 +9601,7 @@
           <a:p>
             <a:fld id="{48A87A34-81AB-432B-8DAE-1953F412C126}" type="datetimeFigureOut">
               <a:rPr lang="en-US" dirty="0"/>
-              <a:t>7/10/2021</a:t>
+              <a:t>7/11/2021</a:t>
             </a:fld>
             <a:endParaRPr lang="en-US" dirty="0"/>
           </a:p>
@@ -9218,7 +10316,7 @@
           <a:p>
             <a:fld id="{48A87A34-81AB-432B-8DAE-1953F412C126}" type="datetimeFigureOut">
               <a:rPr lang="en-US" dirty="0"/>
-              <a:t>7/10/2021</a:t>
+              <a:t>7/11/2021</a:t>
             </a:fld>
             <a:endParaRPr lang="en-US" dirty="0"/>
           </a:p>
@@ -9383,7 +10481,7 @@
           <a:p>
             <a:fld id="{48A87A34-81AB-432B-8DAE-1953F412C126}" type="datetimeFigureOut">
               <a:rPr lang="en-US" dirty="0"/>
-              <a:t>7/10/2021</a:t>
+              <a:t>7/11/2021</a:t>
             </a:fld>
             <a:endParaRPr lang="en-US" dirty="0"/>
           </a:p>
@@ -9558,7 +10656,7 @@
           <a:p>
             <a:fld id="{48A87A34-81AB-432B-8DAE-1953F412C126}" type="datetimeFigureOut">
               <a:rPr lang="en-US" dirty="0"/>
-              <a:t>7/10/2021</a:t>
+              <a:t>7/11/2021</a:t>
             </a:fld>
             <a:endParaRPr lang="en-US" dirty="0"/>
           </a:p>
@@ -10015,7 +11113,7 @@
           <a:p>
             <a:fld id="{48A87A34-81AB-432B-8DAE-1953F412C126}" type="datetimeFigureOut">
               <a:rPr lang="en-US" dirty="0"/>
-              <a:t>7/10/2021</a:t>
+              <a:t>7/11/2021</a:t>
             </a:fld>
             <a:endParaRPr lang="en-US" dirty="0"/>
           </a:p>
@@ -10260,7 +11358,7 @@
           <a:p>
             <a:fld id="{48A87A34-81AB-432B-8DAE-1953F412C126}" type="datetimeFigureOut">
               <a:rPr lang="en-US" dirty="0"/>
-              <a:t>7/10/2021</a:t>
+              <a:t>7/11/2021</a:t>
             </a:fld>
             <a:endParaRPr lang="en-US" dirty="0"/>
           </a:p>
@@ -10487,7 +11585,7 @@
           <a:p>
             <a:fld id="{48A87A34-81AB-432B-8DAE-1953F412C126}" type="datetimeFigureOut">
               <a:rPr lang="en-US" dirty="0"/>
-              <a:t>7/10/2021</a:t>
+              <a:t>7/11/2021</a:t>
             </a:fld>
             <a:endParaRPr lang="en-US" dirty="0"/>
           </a:p>
@@ -10863,7 +11961,7 @@
           <a:p>
             <a:fld id="{48A87A34-81AB-432B-8DAE-1953F412C126}" type="datetimeFigureOut">
               <a:rPr lang="en-US" dirty="0"/>
-              <a:t>7/10/2021</a:t>
+              <a:t>7/11/2021</a:t>
             </a:fld>
             <a:endParaRPr lang="en-US" dirty="0"/>
           </a:p>
@@ -10976,7 +12074,7 @@
           <a:p>
             <a:fld id="{48A87A34-81AB-432B-8DAE-1953F412C126}" type="datetimeFigureOut">
               <a:rPr lang="en-US" dirty="0"/>
-              <a:t>7/10/2021</a:t>
+              <a:t>7/11/2021</a:t>
             </a:fld>
             <a:endParaRPr lang="en-US" dirty="0"/>
           </a:p>
@@ -11066,7 +12164,7 @@
           <a:p>
             <a:fld id="{48A87A34-81AB-432B-8DAE-1953F412C126}" type="datetimeFigureOut">
               <a:rPr lang="en-US" dirty="0"/>
-              <a:t>7/10/2021</a:t>
+              <a:t>7/11/2021</a:t>
             </a:fld>
             <a:endParaRPr lang="en-US" dirty="0"/>
           </a:p>
@@ -11310,7 +12408,7 @@
           <a:p>
             <a:fld id="{48A87A34-81AB-432B-8DAE-1953F412C126}" type="datetimeFigureOut">
               <a:rPr lang="en-US" dirty="0"/>
-              <a:t>7/10/2021</a:t>
+              <a:t>7/11/2021</a:t>
             </a:fld>
             <a:endParaRPr lang="en-US" dirty="0"/>
           </a:p>
@@ -11585,7 +12683,7 @@
           <a:p>
             <a:fld id="{48A87A34-81AB-432B-8DAE-1953F412C126}" type="datetimeFigureOut">
               <a:rPr lang="en-US" dirty="0"/>
-              <a:t>7/10/2021</a:t>
+              <a:t>7/11/2021</a:t>
             </a:fld>
             <a:endParaRPr lang="en-US" dirty="0"/>
           </a:p>
@@ -11703,7 +12801,7 @@
           <a:noFill/>
           <a:extLst>
             <a:ext uri="{909E8E84-426E-40dd-AFC4-6F175D3DCCD1}">
-              <a14:hiddenFill xmlns="" xmlns:a14="http://schemas.microsoft.com/office/drawing/2010/main">
+              <a14:hiddenFill xmlns:a14="http://schemas.microsoft.com/office/drawing/2010/main" xmlns="">
                 <a:solidFill>
                   <a:srgbClr val="FFFFFF"/>
                 </a:solidFill>
@@ -11777,7 +12875,7 @@
               </a:ln>
               <a:extLst>
                 <a:ext uri="{91240B29-F687-4f45-9708-019B960494DF}">
-                  <a14:hiddenLine xmlns="" xmlns:a14="http://schemas.microsoft.com/office/drawing/2010/main" w="9525">
+                  <a14:hiddenLine xmlns:a14="http://schemas.microsoft.com/office/drawing/2010/main" xmlns="" w="9525">
                     <a:solidFill>
                       <a:srgbClr val="000000"/>
                     </a:solidFill>
@@ -11867,7 +12965,7 @@
               </a:ln>
               <a:extLst>
                 <a:ext uri="{91240B29-F687-4f45-9708-019B960494DF}">
-                  <a14:hiddenLine xmlns="" xmlns:a14="http://schemas.microsoft.com/office/drawing/2010/main" w="9525">
+                  <a14:hiddenLine xmlns:a14="http://schemas.microsoft.com/office/drawing/2010/main" xmlns="" w="9525">
                     <a:solidFill>
                       <a:srgbClr val="000000"/>
                     </a:solidFill>
@@ -11957,7 +13055,7 @@
               </a:ln>
               <a:extLst>
                 <a:ext uri="{91240B29-F687-4f45-9708-019B960494DF}">
-                  <a14:hiddenLine xmlns="" xmlns:a14="http://schemas.microsoft.com/office/drawing/2010/main" w="9525">
+                  <a14:hiddenLine xmlns:a14="http://schemas.microsoft.com/office/drawing/2010/main" xmlns="" w="9525">
                     <a:solidFill>
                       <a:srgbClr val="000000"/>
                     </a:solidFill>
@@ -12019,7 +13117,7 @@
               </a:ln>
               <a:extLst>
                 <a:ext uri="{91240B29-F687-4f45-9708-019B960494DF}">
-                  <a14:hiddenLine xmlns="" xmlns:a14="http://schemas.microsoft.com/office/drawing/2010/main" w="9525">
+                  <a14:hiddenLine xmlns:a14="http://schemas.microsoft.com/office/drawing/2010/main" xmlns="" w="9525">
                     <a:solidFill>
                       <a:srgbClr val="000000"/>
                     </a:solidFill>
@@ -12109,7 +13207,7 @@
               </a:ln>
               <a:extLst>
                 <a:ext uri="{91240B29-F687-4f45-9708-019B960494DF}">
-                  <a14:hiddenLine xmlns="" xmlns:a14="http://schemas.microsoft.com/office/drawing/2010/main" w="9525">
+                  <a14:hiddenLine xmlns:a14="http://schemas.microsoft.com/office/drawing/2010/main" xmlns="" w="9525">
                     <a:solidFill>
                       <a:srgbClr val="000000"/>
                     </a:solidFill>
@@ -12171,7 +13269,7 @@
               </a:ln>
               <a:extLst>
                 <a:ext uri="{91240B29-F687-4f45-9708-019B960494DF}">
-                  <a14:hiddenLine xmlns="" xmlns:a14="http://schemas.microsoft.com/office/drawing/2010/main" w="9525">
+                  <a14:hiddenLine xmlns:a14="http://schemas.microsoft.com/office/drawing/2010/main" xmlns="" w="9525">
                     <a:solidFill>
                       <a:srgbClr val="000000"/>
                     </a:solidFill>
@@ -12233,7 +13331,7 @@
               </a:ln>
               <a:extLst>
                 <a:ext uri="{91240B29-F687-4f45-9708-019B960494DF}">
-                  <a14:hiddenLine xmlns="" xmlns:a14="http://schemas.microsoft.com/office/drawing/2010/main" w="9525">
+                  <a14:hiddenLine xmlns:a14="http://schemas.microsoft.com/office/drawing/2010/main" xmlns="" w="9525">
                     <a:solidFill>
                       <a:srgbClr val="000000"/>
                     </a:solidFill>
@@ -12323,7 +13421,7 @@
               </a:ln>
               <a:extLst>
                 <a:ext uri="{91240B29-F687-4f45-9708-019B960494DF}">
-                  <a14:hiddenLine xmlns="" xmlns:a14="http://schemas.microsoft.com/office/drawing/2010/main" w="9525">
+                  <a14:hiddenLine xmlns:a14="http://schemas.microsoft.com/office/drawing/2010/main" xmlns="" w="9525">
                     <a:solidFill>
                       <a:srgbClr val="000000"/>
                     </a:solidFill>
@@ -12413,7 +13511,7 @@
               </a:ln>
               <a:extLst>
                 <a:ext uri="{91240B29-F687-4f45-9708-019B960494DF}">
-                  <a14:hiddenLine xmlns="" xmlns:a14="http://schemas.microsoft.com/office/drawing/2010/main" w="9525">
+                  <a14:hiddenLine xmlns:a14="http://schemas.microsoft.com/office/drawing/2010/main" xmlns="" w="9525">
                     <a:solidFill>
                       <a:srgbClr val="000000"/>
                     </a:solidFill>
@@ -12475,7 +13573,7 @@
               </a:ln>
               <a:extLst>
                 <a:ext uri="{91240B29-F687-4f45-9708-019B960494DF}">
-                  <a14:hiddenLine xmlns="" xmlns:a14="http://schemas.microsoft.com/office/drawing/2010/main" w="9525">
+                  <a14:hiddenLine xmlns:a14="http://schemas.microsoft.com/office/drawing/2010/main" xmlns="" w="9525">
                     <a:solidFill>
                       <a:srgbClr val="000000"/>
                     </a:solidFill>
@@ -12585,7 +13683,7 @@
               </a:ln>
               <a:extLst>
                 <a:ext uri="{91240B29-F687-4f45-9708-019B960494DF}">
-                  <a14:hiddenLine xmlns="" xmlns:a14="http://schemas.microsoft.com/office/drawing/2010/main" w="9525">
+                  <a14:hiddenLine xmlns:a14="http://schemas.microsoft.com/office/drawing/2010/main" xmlns="" w="9525">
                     <a:solidFill>
                       <a:srgbClr val="000000"/>
                     </a:solidFill>
@@ -12669,7 +13767,7 @@
               </a:ln>
               <a:extLst>
                 <a:ext uri="{91240B29-F687-4f45-9708-019B960494DF}">
-                  <a14:hiddenLine xmlns="" xmlns:a14="http://schemas.microsoft.com/office/drawing/2010/main" w="9525">
+                  <a14:hiddenLine xmlns:a14="http://schemas.microsoft.com/office/drawing/2010/main" xmlns="" w="9525">
                     <a:solidFill>
                       <a:srgbClr val="000000"/>
                     </a:solidFill>
@@ -12731,7 +13829,7 @@
               </a:ln>
               <a:extLst>
                 <a:ext uri="{91240B29-F687-4f45-9708-019B960494DF}">
-                  <a14:hiddenLine xmlns="" xmlns:a14="http://schemas.microsoft.com/office/drawing/2010/main" w="9525">
+                  <a14:hiddenLine xmlns:a14="http://schemas.microsoft.com/office/drawing/2010/main" xmlns="" w="9525">
                     <a:solidFill>
                       <a:srgbClr val="000000"/>
                     </a:solidFill>
@@ -12793,7 +13891,7 @@
               </a:ln>
               <a:extLst>
                 <a:ext uri="{91240B29-F687-4f45-9708-019B960494DF}">
-                  <a14:hiddenLine xmlns="" xmlns:a14="http://schemas.microsoft.com/office/drawing/2010/main" w="9525">
+                  <a14:hiddenLine xmlns:a14="http://schemas.microsoft.com/office/drawing/2010/main" xmlns="" w="9525">
                     <a:solidFill>
                       <a:srgbClr val="000000"/>
                     </a:solidFill>
@@ -12883,7 +13981,7 @@
               </a:ln>
               <a:extLst>
                 <a:ext uri="{91240B29-F687-4f45-9708-019B960494DF}">
-                  <a14:hiddenLine xmlns="" xmlns:a14="http://schemas.microsoft.com/office/drawing/2010/main" w="9525">
+                  <a14:hiddenLine xmlns:a14="http://schemas.microsoft.com/office/drawing/2010/main" xmlns="" w="9525">
                     <a:solidFill>
                       <a:srgbClr val="000000"/>
                     </a:solidFill>
@@ -12917,7 +14015,7 @@
               </a:ln>
               <a:extLst>
                 <a:ext uri="{91240B29-F687-4f45-9708-019B960494DF}">
-                  <a14:hiddenLine xmlns="" xmlns:a14="http://schemas.microsoft.com/office/drawing/2010/main" w="9525">
+                  <a14:hiddenLine xmlns:a14="http://schemas.microsoft.com/office/drawing/2010/main" xmlns="" w="9525">
                     <a:solidFill>
                       <a:srgbClr val="000000"/>
                     </a:solidFill>
@@ -12982,7 +14080,7 @@
               </a:ln>
               <a:extLst>
                 <a:ext uri="{91240B29-F687-4f45-9708-019B960494DF}">
-                  <a14:hiddenLine xmlns="" xmlns:a14="http://schemas.microsoft.com/office/drawing/2010/main" w="9525">
+                  <a14:hiddenLine xmlns:a14="http://schemas.microsoft.com/office/drawing/2010/main" xmlns="" w="9525">
                     <a:solidFill>
                       <a:srgbClr val="000000"/>
                     </a:solidFill>
@@ -13072,7 +14170,7 @@
               </a:ln>
               <a:extLst>
                 <a:ext uri="{91240B29-F687-4f45-9708-019B960494DF}">
-                  <a14:hiddenLine xmlns="" xmlns:a14="http://schemas.microsoft.com/office/drawing/2010/main" w="9525">
+                  <a14:hiddenLine xmlns:a14="http://schemas.microsoft.com/office/drawing/2010/main" xmlns="" w="9525">
                     <a:solidFill>
                       <a:srgbClr val="000000"/>
                     </a:solidFill>
@@ -13134,7 +14232,7 @@
               </a:ln>
               <a:extLst>
                 <a:ext uri="{91240B29-F687-4f45-9708-019B960494DF}">
-                  <a14:hiddenLine xmlns="" xmlns:a14="http://schemas.microsoft.com/office/drawing/2010/main" w="9525">
+                  <a14:hiddenLine xmlns:a14="http://schemas.microsoft.com/office/drawing/2010/main" xmlns="" w="9525">
                     <a:solidFill>
                       <a:srgbClr val="000000"/>
                     </a:solidFill>
@@ -13224,7 +14322,7 @@
               </a:ln>
               <a:extLst>
                 <a:ext uri="{91240B29-F687-4f45-9708-019B960494DF}">
-                  <a14:hiddenLine xmlns="" xmlns:a14="http://schemas.microsoft.com/office/drawing/2010/main" w="9525">
+                  <a14:hiddenLine xmlns:a14="http://schemas.microsoft.com/office/drawing/2010/main" xmlns="" w="9525">
                     <a:solidFill>
                       <a:srgbClr val="000000"/>
                     </a:solidFill>
@@ -13289,7 +14387,7 @@
               </a:ln>
               <a:extLst>
                 <a:ext uri="{91240B29-F687-4f45-9708-019B960494DF}">
-                  <a14:hiddenLine xmlns="" xmlns:a14="http://schemas.microsoft.com/office/drawing/2010/main" w="9525">
+                  <a14:hiddenLine xmlns:a14="http://schemas.microsoft.com/office/drawing/2010/main" xmlns="" w="9525">
                     <a:solidFill>
                       <a:srgbClr val="000000"/>
                     </a:solidFill>
@@ -13351,7 +14449,7 @@
               </a:ln>
               <a:extLst>
                 <a:ext uri="{91240B29-F687-4f45-9708-019B960494DF}">
-                  <a14:hiddenLine xmlns="" xmlns:a14="http://schemas.microsoft.com/office/drawing/2010/main" w="9525">
+                  <a14:hiddenLine xmlns:a14="http://schemas.microsoft.com/office/drawing/2010/main" xmlns="" w="9525">
                     <a:solidFill>
                       <a:srgbClr val="000000"/>
                     </a:solidFill>
@@ -13441,7 +14539,7 @@
               </a:ln>
               <a:extLst>
                 <a:ext uri="{91240B29-F687-4f45-9708-019B960494DF}">
-                  <a14:hiddenLine xmlns="" xmlns:a14="http://schemas.microsoft.com/office/drawing/2010/main" w="9525">
+                  <a14:hiddenLine xmlns:a14="http://schemas.microsoft.com/office/drawing/2010/main" xmlns="" w="9525">
                     <a:solidFill>
                       <a:srgbClr val="000000"/>
                     </a:solidFill>
@@ -13531,7 +14629,7 @@
               </a:ln>
               <a:extLst>
                 <a:ext uri="{91240B29-F687-4f45-9708-019B960494DF}">
-                  <a14:hiddenLine xmlns="" xmlns:a14="http://schemas.microsoft.com/office/drawing/2010/main" w="9525">
+                  <a14:hiddenLine xmlns:a14="http://schemas.microsoft.com/office/drawing/2010/main" xmlns="" w="9525">
                     <a:solidFill>
                       <a:srgbClr val="000000"/>
                     </a:solidFill>
@@ -13596,7 +14694,7 @@
               </a:ln>
               <a:extLst>
                 <a:ext uri="{91240B29-F687-4f45-9708-019B960494DF}">
-                  <a14:hiddenLine xmlns="" xmlns:a14="http://schemas.microsoft.com/office/drawing/2010/main" w="9525">
+                  <a14:hiddenLine xmlns:a14="http://schemas.microsoft.com/office/drawing/2010/main" xmlns="" w="9525">
                     <a:solidFill>
                       <a:srgbClr val="000000"/>
                     </a:solidFill>
@@ -13716,7 +14814,7 @@
               </a:ln>
               <a:extLst>
                 <a:ext uri="{91240B29-F687-4f45-9708-019B960494DF}">
-                  <a14:hiddenLine xmlns="" xmlns:a14="http://schemas.microsoft.com/office/drawing/2010/main" w="9525">
+                  <a14:hiddenLine xmlns:a14="http://schemas.microsoft.com/office/drawing/2010/main" xmlns="" w="9525">
                     <a:solidFill>
                       <a:srgbClr val="000000"/>
                     </a:solidFill>
@@ -13797,7 +14895,7 @@
               </a:ln>
               <a:extLst>
                 <a:ext uri="{91240B29-F687-4f45-9708-019B960494DF}">
-                  <a14:hiddenLine xmlns="" xmlns:a14="http://schemas.microsoft.com/office/drawing/2010/main" w="9525">
+                  <a14:hiddenLine xmlns:a14="http://schemas.microsoft.com/office/drawing/2010/main" xmlns="" w="9525">
                     <a:solidFill>
                       <a:srgbClr val="000000"/>
                     </a:solidFill>
@@ -13912,7 +15010,7 @@
               </a:ln>
               <a:extLst>
                 <a:ext uri="{91240B29-F687-4f45-9708-019B960494DF}">
-                  <a14:hiddenLine xmlns="" xmlns:a14="http://schemas.microsoft.com/office/drawing/2010/main" w="9525">
+                  <a14:hiddenLine xmlns:a14="http://schemas.microsoft.com/office/drawing/2010/main" xmlns="" w="9525">
                     <a:solidFill>
                       <a:srgbClr val="000000"/>
                     </a:solidFill>
@@ -14002,7 +15100,7 @@
               </a:ln>
               <a:extLst>
                 <a:ext uri="{91240B29-F687-4f45-9708-019B960494DF}">
-                  <a14:hiddenLine xmlns="" xmlns:a14="http://schemas.microsoft.com/office/drawing/2010/main" w="9525">
+                  <a14:hiddenLine xmlns:a14="http://schemas.microsoft.com/office/drawing/2010/main" xmlns="" w="9525">
                     <a:solidFill>
                       <a:srgbClr val="000000"/>
                     </a:solidFill>
@@ -14067,7 +15165,7 @@
               </a:ln>
               <a:extLst>
                 <a:ext uri="{91240B29-F687-4f45-9708-019B960494DF}">
-                  <a14:hiddenLine xmlns="" xmlns:a14="http://schemas.microsoft.com/office/drawing/2010/main" w="9525">
+                  <a14:hiddenLine xmlns:a14="http://schemas.microsoft.com/office/drawing/2010/main" xmlns="" w="9525">
                     <a:solidFill>
                       <a:srgbClr val="000000"/>
                     </a:solidFill>
@@ -14157,7 +15255,7 @@
               </a:ln>
               <a:extLst>
                 <a:ext uri="{91240B29-F687-4f45-9708-019B960494DF}">
-                  <a14:hiddenLine xmlns="" xmlns:a14="http://schemas.microsoft.com/office/drawing/2010/main" w="9525">
+                  <a14:hiddenLine xmlns:a14="http://schemas.microsoft.com/office/drawing/2010/main" xmlns="" w="9525">
                     <a:solidFill>
                       <a:srgbClr val="000000"/>
                     </a:solidFill>
@@ -14225,7 +15323,7 @@
               </a:ln>
               <a:extLst>
                 <a:ext uri="{91240B29-F687-4f45-9708-019B960494DF}">
-                  <a14:hiddenLine xmlns="" xmlns:a14="http://schemas.microsoft.com/office/drawing/2010/main" w="9525">
+                  <a14:hiddenLine xmlns:a14="http://schemas.microsoft.com/office/drawing/2010/main" xmlns="" w="9525">
                     <a:solidFill>
                       <a:srgbClr val="000000"/>
                     </a:solidFill>
@@ -14315,7 +15413,7 @@
               </a:ln>
               <a:extLst>
                 <a:ext uri="{91240B29-F687-4f45-9708-019B960494DF}">
-                  <a14:hiddenLine xmlns="" xmlns:a14="http://schemas.microsoft.com/office/drawing/2010/main" w="9525">
+                  <a14:hiddenLine xmlns:a14="http://schemas.microsoft.com/office/drawing/2010/main" xmlns="" w="9525">
                     <a:solidFill>
                       <a:srgbClr val="000000"/>
                     </a:solidFill>
@@ -14383,7 +15481,7 @@
               </a:ln>
               <a:extLst>
                 <a:ext uri="{91240B29-F687-4f45-9708-019B960494DF}">
-                  <a14:hiddenLine xmlns="" xmlns:a14="http://schemas.microsoft.com/office/drawing/2010/main" w="9525">
+                  <a14:hiddenLine xmlns:a14="http://schemas.microsoft.com/office/drawing/2010/main" xmlns="" w="9525">
                     <a:solidFill>
                       <a:srgbClr val="000000"/>
                     </a:solidFill>
@@ -14473,7 +15571,7 @@
               </a:ln>
               <a:extLst>
                 <a:ext uri="{91240B29-F687-4f45-9708-019B960494DF}">
-                  <a14:hiddenLine xmlns="" xmlns:a14="http://schemas.microsoft.com/office/drawing/2010/main" w="9525">
+                  <a14:hiddenLine xmlns:a14="http://schemas.microsoft.com/office/drawing/2010/main" xmlns="" w="9525">
                     <a:solidFill>
                       <a:srgbClr val="000000"/>
                     </a:solidFill>
@@ -14507,7 +15605,7 @@
               </a:ln>
               <a:extLst>
                 <a:ext uri="{91240B29-F687-4f45-9708-019B960494DF}">
-                  <a14:hiddenLine xmlns="" xmlns:a14="http://schemas.microsoft.com/office/drawing/2010/main" w="9525">
+                  <a14:hiddenLine xmlns:a14="http://schemas.microsoft.com/office/drawing/2010/main" xmlns="" w="9525">
                     <a:solidFill>
                       <a:srgbClr val="000000"/>
                     </a:solidFill>
@@ -14648,7 +15746,7 @@
             <a:fld id="{48A87A34-81AB-432B-8DAE-1953F412C126}" type="datetimeFigureOut">
               <a:rPr lang="en-US" dirty="0"/>
               <a:pPr/>
-              <a:t>7/10/2021</a:t>
+              <a:t>7/11/2021</a:t>
             </a:fld>
             <a:endParaRPr lang="en-US" dirty="0"/>
           </a:p>
@@ -15069,6 +16167,17 @@
                 <a:lumMod val="90000"/>
               </a:schemeClr>
             </a:duotone>
+            <a:extLst>
+              <a:ext uri="{BEBA8EAE-BF5A-486C-A8C5-ECC9F3942E4B}">
+                <a14:imgProps xmlns:a14="http://schemas.microsoft.com/office/drawing/2010/main">
+                  <a14:imgLayer r:embed="rId3">
+                    <a14:imgEffect>
+                      <a14:artisticLightScreen/>
+                    </a14:imgEffect>
+                  </a14:imgLayer>
+                </a14:imgProps>
+              </a:ext>
+            </a:extLst>
           </a:blip>
           <a:stretch/>
         </a:blipFill>
@@ -15202,7 +16311,7 @@
             </p:nvPr>
           </p:nvPicPr>
           <p:blipFill>
-            <a:blip r:embed="rId3">
+            <a:blip r:embed="rId4">
               <a:alphaModFix amt="30000"/>
               <a:duotone>
                 <a:prstClr val="black"/>
@@ -15233,7 +16342,7 @@
             <a:noFill/>
             <a:extLst>
               <a:ext uri="{909E8E84-426E-40dd-AFC4-6F175D3DCCD1}">
-                <a14:hiddenFill xmlns:p14="http://schemas.microsoft.com/office/powerpoint/2010/main" xmlns:a14="http://schemas.microsoft.com/office/drawing/2010/main" xmlns:a16="http://schemas.microsoft.com/office/drawing/2014/main" xmlns="">
+                <a14:hiddenFill xmlns="" xmlns:a16="http://schemas.microsoft.com/office/drawing/2014/main" xmlns:a14="http://schemas.microsoft.com/office/drawing/2010/main" xmlns:p14="http://schemas.microsoft.com/office/powerpoint/2010/main">
                   <a:solidFill>
                     <a:srgbClr val="FFFFFF"/>
                   </a:solidFill>
@@ -15390,7 +16499,7 @@
             </a:ln>
             <a:extLst>
               <a:ext uri="{91240B29-F687-4f45-9708-019B960494DF}">
-                <a14:hiddenLine xmlns:p14="http://schemas.microsoft.com/office/powerpoint/2010/main" xmlns:a14="http://schemas.microsoft.com/office/drawing/2010/main" xmlns:a16="http://schemas.microsoft.com/office/drawing/2014/main" xmlns="" w="9525">
+                <a14:hiddenLine xmlns="" xmlns:a16="http://schemas.microsoft.com/office/drawing/2014/main" xmlns:a14="http://schemas.microsoft.com/office/drawing/2010/main" xmlns:p14="http://schemas.microsoft.com/office/powerpoint/2010/main" w="9525">
                   <a:solidFill>
                     <a:srgbClr val="000000"/>
                   </a:solidFill>
@@ -15495,7 +16604,7 @@
             </a:ln>
             <a:extLst>
               <a:ext uri="{91240B29-F687-4f45-9708-019B960494DF}">
-                <a14:hiddenLine xmlns:p14="http://schemas.microsoft.com/office/powerpoint/2010/main" xmlns:a14="http://schemas.microsoft.com/office/drawing/2010/main" xmlns:a16="http://schemas.microsoft.com/office/drawing/2014/main" xmlns="" w="9525">
+                <a14:hiddenLine xmlns="" xmlns:a16="http://schemas.microsoft.com/office/drawing/2014/main" xmlns:a14="http://schemas.microsoft.com/office/drawing/2010/main" xmlns:p14="http://schemas.microsoft.com/office/powerpoint/2010/main" w="9525">
                   <a:solidFill>
                     <a:srgbClr val="000000"/>
                   </a:solidFill>
@@ -15600,7 +16709,7 @@
             </a:ln>
             <a:extLst>
               <a:ext uri="{91240B29-F687-4f45-9708-019B960494DF}">
-                <a14:hiddenLine xmlns:p14="http://schemas.microsoft.com/office/powerpoint/2010/main" xmlns:a14="http://schemas.microsoft.com/office/drawing/2010/main" xmlns:a16="http://schemas.microsoft.com/office/drawing/2014/main" xmlns="" w="9525">
+                <a14:hiddenLine xmlns="" xmlns:a16="http://schemas.microsoft.com/office/drawing/2014/main" xmlns:a14="http://schemas.microsoft.com/office/drawing/2010/main" xmlns:p14="http://schemas.microsoft.com/office/powerpoint/2010/main" w="9525">
                   <a:solidFill>
                     <a:srgbClr val="000000"/>
                   </a:solidFill>
@@ -15649,7 +16758,7 @@
             </a:ln>
             <a:extLst>
               <a:ext uri="{91240B29-F687-4f45-9708-019B960494DF}">
-                <a14:hiddenLine xmlns:p14="http://schemas.microsoft.com/office/powerpoint/2010/main" xmlns:a14="http://schemas.microsoft.com/office/drawing/2010/main" xmlns:a16="http://schemas.microsoft.com/office/drawing/2014/main" xmlns="" w="9525">
+                <a14:hiddenLine xmlns="" xmlns:a16="http://schemas.microsoft.com/office/drawing/2014/main" xmlns:a14="http://schemas.microsoft.com/office/drawing/2010/main" xmlns:p14="http://schemas.microsoft.com/office/powerpoint/2010/main" w="9525">
                   <a:solidFill>
                     <a:srgbClr val="000000"/>
                   </a:solidFill>
@@ -15754,7 +16863,7 @@
             </a:ln>
             <a:extLst>
               <a:ext uri="{91240B29-F687-4f45-9708-019B960494DF}">
-                <a14:hiddenLine xmlns:p14="http://schemas.microsoft.com/office/powerpoint/2010/main" xmlns:a14="http://schemas.microsoft.com/office/drawing/2010/main" xmlns:a16="http://schemas.microsoft.com/office/drawing/2014/main" xmlns="" w="9525">
+                <a14:hiddenLine xmlns="" xmlns:a16="http://schemas.microsoft.com/office/drawing/2014/main" xmlns:a14="http://schemas.microsoft.com/office/drawing/2010/main" xmlns:p14="http://schemas.microsoft.com/office/powerpoint/2010/main" w="9525">
                   <a:solidFill>
                     <a:srgbClr val="000000"/>
                   </a:solidFill>
@@ -15831,7 +16940,7 @@
             </a:ln>
             <a:extLst>
               <a:ext uri="{91240B29-F687-4f45-9708-019B960494DF}">
-                <a14:hiddenLine xmlns:p14="http://schemas.microsoft.com/office/powerpoint/2010/main" xmlns:a14="http://schemas.microsoft.com/office/drawing/2010/main" xmlns:a16="http://schemas.microsoft.com/office/drawing/2014/main" xmlns="" w="9525">
+                <a14:hiddenLine xmlns="" xmlns:a16="http://schemas.microsoft.com/office/drawing/2014/main" xmlns:a14="http://schemas.microsoft.com/office/drawing/2010/main" xmlns:p14="http://schemas.microsoft.com/office/powerpoint/2010/main" w="9525">
                   <a:solidFill>
                     <a:srgbClr val="000000"/>
                   </a:solidFill>
@@ -15908,7 +17017,7 @@
             </a:ln>
             <a:extLst>
               <a:ext uri="{91240B29-F687-4f45-9708-019B960494DF}">
-                <a14:hiddenLine xmlns:p14="http://schemas.microsoft.com/office/powerpoint/2010/main" xmlns:a14="http://schemas.microsoft.com/office/drawing/2010/main" xmlns:a16="http://schemas.microsoft.com/office/drawing/2014/main" xmlns="" w="9525">
+                <a14:hiddenLine xmlns="" xmlns:a16="http://schemas.microsoft.com/office/drawing/2014/main" xmlns:a14="http://schemas.microsoft.com/office/drawing/2010/main" xmlns:p14="http://schemas.microsoft.com/office/powerpoint/2010/main" w="9525">
                   <a:solidFill>
                     <a:srgbClr val="000000"/>
                   </a:solidFill>
@@ -16013,7 +17122,7 @@
             </a:ln>
             <a:extLst>
               <a:ext uri="{91240B29-F687-4f45-9708-019B960494DF}">
-                <a14:hiddenLine xmlns:p14="http://schemas.microsoft.com/office/powerpoint/2010/main" xmlns:a14="http://schemas.microsoft.com/office/drawing/2010/main" xmlns:a16="http://schemas.microsoft.com/office/drawing/2014/main" xmlns="" w="9525">
+                <a14:hiddenLine xmlns="" xmlns:a16="http://schemas.microsoft.com/office/drawing/2014/main" xmlns:a14="http://schemas.microsoft.com/office/drawing/2010/main" xmlns:p14="http://schemas.microsoft.com/office/powerpoint/2010/main" w="9525">
                   <a:solidFill>
                     <a:srgbClr val="000000"/>
                   </a:solidFill>
@@ -16090,7 +17199,7 @@
             </a:ln>
             <a:extLst>
               <a:ext uri="{91240B29-F687-4f45-9708-019B960494DF}">
-                <a14:hiddenLine xmlns:p14="http://schemas.microsoft.com/office/powerpoint/2010/main" xmlns:a14="http://schemas.microsoft.com/office/drawing/2010/main" xmlns:a16="http://schemas.microsoft.com/office/drawing/2014/main" xmlns="" w="9525">
+                <a14:hiddenLine xmlns="" xmlns:a16="http://schemas.microsoft.com/office/drawing/2014/main" xmlns:a14="http://schemas.microsoft.com/office/drawing/2010/main" xmlns:p14="http://schemas.microsoft.com/office/powerpoint/2010/main" w="9525">
                   <a:solidFill>
                     <a:srgbClr val="000000"/>
                   </a:solidFill>
@@ -16167,7 +17276,7 @@
             </a:ln>
             <a:extLst>
               <a:ext uri="{91240B29-F687-4f45-9708-019B960494DF}">
-                <a14:hiddenLine xmlns:p14="http://schemas.microsoft.com/office/powerpoint/2010/main" xmlns:a14="http://schemas.microsoft.com/office/drawing/2010/main" xmlns:a16="http://schemas.microsoft.com/office/drawing/2014/main" xmlns="" w="9525">
+                <a14:hiddenLine xmlns="" xmlns:a16="http://schemas.microsoft.com/office/drawing/2014/main" xmlns:a14="http://schemas.microsoft.com/office/drawing/2010/main" xmlns:p14="http://schemas.microsoft.com/office/powerpoint/2010/main" w="9525">
                   <a:solidFill>
                     <a:srgbClr val="000000"/>
                   </a:solidFill>
@@ -16272,7 +17381,7 @@
             </a:ln>
             <a:extLst>
               <a:ext uri="{91240B29-F687-4f45-9708-019B960494DF}">
-                <a14:hiddenLine xmlns:p14="http://schemas.microsoft.com/office/powerpoint/2010/main" xmlns:a14="http://schemas.microsoft.com/office/drawing/2010/main" xmlns:a16="http://schemas.microsoft.com/office/drawing/2014/main" xmlns="" w="9525">
+                <a14:hiddenLine xmlns="" xmlns:a16="http://schemas.microsoft.com/office/drawing/2014/main" xmlns:a14="http://schemas.microsoft.com/office/drawing/2010/main" xmlns:p14="http://schemas.microsoft.com/office/powerpoint/2010/main" w="9525">
                   <a:solidFill>
                     <a:srgbClr val="000000"/>
                   </a:solidFill>
@@ -16377,7 +17486,7 @@
             </a:ln>
             <a:extLst>
               <a:ext uri="{91240B29-F687-4f45-9708-019B960494DF}">
-                <a14:hiddenLine xmlns:p14="http://schemas.microsoft.com/office/powerpoint/2010/main" xmlns:a14="http://schemas.microsoft.com/office/drawing/2010/main" xmlns:a16="http://schemas.microsoft.com/office/drawing/2014/main" xmlns="" w="9525">
+                <a14:hiddenLine xmlns="" xmlns:a16="http://schemas.microsoft.com/office/drawing/2014/main" xmlns:a14="http://schemas.microsoft.com/office/drawing/2010/main" xmlns:p14="http://schemas.microsoft.com/office/powerpoint/2010/main" w="9525">
                   <a:solidFill>
                     <a:srgbClr val="000000"/>
                   </a:solidFill>
@@ -16454,7 +17563,7 @@
             </a:ln>
             <a:extLst>
               <a:ext uri="{91240B29-F687-4f45-9708-019B960494DF}">
-                <a14:hiddenLine xmlns:p14="http://schemas.microsoft.com/office/powerpoint/2010/main" xmlns:a14="http://schemas.microsoft.com/office/drawing/2010/main" xmlns:a16="http://schemas.microsoft.com/office/drawing/2014/main" xmlns="" w="9525">
+                <a14:hiddenLine xmlns="" xmlns:a16="http://schemas.microsoft.com/office/drawing/2014/main" xmlns:a14="http://schemas.microsoft.com/office/drawing/2010/main" xmlns:p14="http://schemas.microsoft.com/office/powerpoint/2010/main" w="9525">
                   <a:solidFill>
                     <a:srgbClr val="000000"/>
                   </a:solidFill>
@@ -16579,7 +17688,7 @@
             </a:ln>
             <a:extLst>
               <a:ext uri="{91240B29-F687-4f45-9708-019B960494DF}">
-                <a14:hiddenLine xmlns:p14="http://schemas.microsoft.com/office/powerpoint/2010/main" xmlns:a14="http://schemas.microsoft.com/office/drawing/2010/main" xmlns:a16="http://schemas.microsoft.com/office/drawing/2014/main" xmlns="" w="9525">
+                <a14:hiddenLine xmlns="" xmlns:a16="http://schemas.microsoft.com/office/drawing/2014/main" xmlns:a14="http://schemas.microsoft.com/office/drawing/2010/main" xmlns:p14="http://schemas.microsoft.com/office/powerpoint/2010/main" w="9525">
                   <a:solidFill>
                     <a:srgbClr val="000000"/>
                   </a:solidFill>
@@ -16656,7 +17765,7 @@
             </a:ln>
             <a:extLst>
               <a:ext uri="{91240B29-F687-4f45-9708-019B960494DF}">
-                <a14:hiddenLine xmlns:p14="http://schemas.microsoft.com/office/powerpoint/2010/main" xmlns:a14="http://schemas.microsoft.com/office/drawing/2010/main" xmlns:a16="http://schemas.microsoft.com/office/drawing/2014/main" xmlns="" w="9525">
+                <a14:hiddenLine xmlns="" xmlns:a16="http://schemas.microsoft.com/office/drawing/2014/main" xmlns:a14="http://schemas.microsoft.com/office/drawing/2010/main" xmlns:p14="http://schemas.microsoft.com/office/powerpoint/2010/main" w="9525">
                   <a:solidFill>
                     <a:srgbClr val="000000"/>
                   </a:solidFill>
@@ -16761,7 +17870,7 @@
             </a:ln>
             <a:extLst>
               <a:ext uri="{91240B29-F687-4f45-9708-019B960494DF}">
-                <a14:hiddenLine xmlns:p14="http://schemas.microsoft.com/office/powerpoint/2010/main" xmlns:a14="http://schemas.microsoft.com/office/drawing/2010/main" xmlns:a16="http://schemas.microsoft.com/office/drawing/2014/main" xmlns="" w="9525">
+                <a14:hiddenLine xmlns="" xmlns:a16="http://schemas.microsoft.com/office/drawing/2014/main" xmlns:a14="http://schemas.microsoft.com/office/drawing/2010/main" xmlns:p14="http://schemas.microsoft.com/office/powerpoint/2010/main" w="9525">
                   <a:solidFill>
                     <a:srgbClr val="000000"/>
                   </a:solidFill>
@@ -16866,7 +17975,7 @@
             </a:ln>
             <a:extLst>
               <a:ext uri="{91240B29-F687-4f45-9708-019B960494DF}">
-                <a14:hiddenLine xmlns:p14="http://schemas.microsoft.com/office/powerpoint/2010/main" xmlns:a14="http://schemas.microsoft.com/office/drawing/2010/main" xmlns:a16="http://schemas.microsoft.com/office/drawing/2014/main" xmlns="" w="9525">
+                <a14:hiddenLine xmlns="" xmlns:a16="http://schemas.microsoft.com/office/drawing/2014/main" xmlns:a14="http://schemas.microsoft.com/office/drawing/2010/main" xmlns:p14="http://schemas.microsoft.com/office/powerpoint/2010/main" w="9525">
                   <a:solidFill>
                     <a:srgbClr val="000000"/>
                   </a:solidFill>
@@ -16943,7 +18052,7 @@
             </a:ln>
             <a:extLst>
               <a:ext uri="{91240B29-F687-4f45-9708-019B960494DF}">
-                <a14:hiddenLine xmlns:p14="http://schemas.microsoft.com/office/powerpoint/2010/main" xmlns:a14="http://schemas.microsoft.com/office/drawing/2010/main" xmlns:a16="http://schemas.microsoft.com/office/drawing/2014/main" xmlns="" w="9525">
+                <a14:hiddenLine xmlns="" xmlns:a16="http://schemas.microsoft.com/office/drawing/2014/main" xmlns:a14="http://schemas.microsoft.com/office/drawing/2010/main" xmlns:p14="http://schemas.microsoft.com/office/powerpoint/2010/main" w="9525">
                   <a:solidFill>
                     <a:srgbClr val="000000"/>
                   </a:solidFill>
@@ -17048,7 +18157,7 @@
             </a:ln>
             <a:extLst>
               <a:ext uri="{91240B29-F687-4f45-9708-019B960494DF}">
-                <a14:hiddenLine xmlns:p14="http://schemas.microsoft.com/office/powerpoint/2010/main" xmlns:a14="http://schemas.microsoft.com/office/drawing/2010/main" xmlns:a16="http://schemas.microsoft.com/office/drawing/2014/main" xmlns="" w="9525">
+                <a14:hiddenLine xmlns="" xmlns:a16="http://schemas.microsoft.com/office/drawing/2014/main" xmlns:a14="http://schemas.microsoft.com/office/drawing/2010/main" xmlns:p14="http://schemas.microsoft.com/office/powerpoint/2010/main" w="9525">
                   <a:solidFill>
                     <a:srgbClr val="000000"/>
                   </a:solidFill>
@@ -17153,7 +18262,7 @@
             </a:ln>
             <a:extLst>
               <a:ext uri="{91240B29-F687-4f45-9708-019B960494DF}">
-                <a14:hiddenLine xmlns:p14="http://schemas.microsoft.com/office/powerpoint/2010/main" xmlns:a14="http://schemas.microsoft.com/office/drawing/2010/main" xmlns:a16="http://schemas.microsoft.com/office/drawing/2014/main" xmlns="" w="9525">
+                <a14:hiddenLine xmlns="" xmlns:a16="http://schemas.microsoft.com/office/drawing/2014/main" xmlns:a14="http://schemas.microsoft.com/office/drawing/2010/main" xmlns:p14="http://schemas.microsoft.com/office/powerpoint/2010/main" w="9525">
                   <a:solidFill>
                     <a:srgbClr val="000000"/>
                   </a:solidFill>
@@ -17224,7 +18333,7 @@
             </a:ln>
             <a:extLst>
               <a:ext uri="{91240B29-F687-4f45-9708-019B960494DF}">
-                <a14:hiddenLine xmlns:p14="http://schemas.microsoft.com/office/powerpoint/2010/main" xmlns:a14="http://schemas.microsoft.com/office/drawing/2010/main" xmlns:a16="http://schemas.microsoft.com/office/drawing/2014/main" xmlns="" w="9525">
+                <a14:hiddenLine xmlns="" xmlns:a16="http://schemas.microsoft.com/office/drawing/2014/main" xmlns:a14="http://schemas.microsoft.com/office/drawing/2010/main" xmlns:p14="http://schemas.microsoft.com/office/powerpoint/2010/main" w="9525">
                   <a:solidFill>
                     <a:srgbClr val="000000"/>
                   </a:solidFill>
@@ -17329,7 +18438,7 @@
             </a:ln>
             <a:extLst>
               <a:ext uri="{91240B29-F687-4f45-9708-019B960494DF}">
-                <a14:hiddenLine xmlns:p14="http://schemas.microsoft.com/office/powerpoint/2010/main" xmlns:a14="http://schemas.microsoft.com/office/drawing/2010/main" xmlns:a16="http://schemas.microsoft.com/office/drawing/2014/main" xmlns="" w="9525">
+                <a14:hiddenLine xmlns="" xmlns:a16="http://schemas.microsoft.com/office/drawing/2014/main" xmlns:a14="http://schemas.microsoft.com/office/drawing/2010/main" xmlns:p14="http://schemas.microsoft.com/office/powerpoint/2010/main" w="9525">
                   <a:solidFill>
                     <a:srgbClr val="000000"/>
                   </a:solidFill>
@@ -17400,7 +18509,7 @@
             </a:ln>
             <a:extLst>
               <a:ext uri="{91240B29-F687-4f45-9708-019B960494DF}">
-                <a14:hiddenLine xmlns:p14="http://schemas.microsoft.com/office/powerpoint/2010/main" xmlns:a14="http://schemas.microsoft.com/office/drawing/2010/main" xmlns:a16="http://schemas.microsoft.com/office/drawing/2014/main" xmlns="" w="9525">
+                <a14:hiddenLine xmlns="" xmlns:a16="http://schemas.microsoft.com/office/drawing/2014/main" xmlns:a14="http://schemas.microsoft.com/office/drawing/2010/main" xmlns:p14="http://schemas.microsoft.com/office/powerpoint/2010/main" w="9525">
                   <a:solidFill>
                     <a:srgbClr val="000000"/>
                   </a:solidFill>
@@ -17505,7 +18614,7 @@
             </a:ln>
             <a:extLst>
               <a:ext uri="{91240B29-F687-4f45-9708-019B960494DF}">
-                <a14:hiddenLine xmlns:p14="http://schemas.microsoft.com/office/powerpoint/2010/main" xmlns:a14="http://schemas.microsoft.com/office/drawing/2010/main" xmlns:a16="http://schemas.microsoft.com/office/drawing/2014/main" xmlns="" w="9525">
+                <a14:hiddenLine xmlns="" xmlns:a16="http://schemas.microsoft.com/office/drawing/2014/main" xmlns:a14="http://schemas.microsoft.com/office/drawing/2010/main" xmlns:p14="http://schemas.microsoft.com/office/powerpoint/2010/main" w="9525">
                   <a:solidFill>
                     <a:srgbClr val="000000"/>
                   </a:solidFill>
@@ -17588,7 +18697,7 @@
             </a:ln>
             <a:extLst>
               <a:ext uri="{91240B29-F687-4f45-9708-019B960494DF}">
-                <a14:hiddenLine xmlns:p14="http://schemas.microsoft.com/office/powerpoint/2010/main" xmlns:a14="http://schemas.microsoft.com/office/drawing/2010/main" xmlns:a16="http://schemas.microsoft.com/office/drawing/2014/main" xmlns="" w="9525">
+                <a14:hiddenLine xmlns="" xmlns:a16="http://schemas.microsoft.com/office/drawing/2014/main" xmlns:a14="http://schemas.microsoft.com/office/drawing/2010/main" xmlns:p14="http://schemas.microsoft.com/office/powerpoint/2010/main" w="9525">
                   <a:solidFill>
                     <a:srgbClr val="000000"/>
                   </a:solidFill>
@@ -17693,7 +18802,7 @@
             </a:ln>
             <a:extLst>
               <a:ext uri="{91240B29-F687-4f45-9708-019B960494DF}">
-                <a14:hiddenLine xmlns:p14="http://schemas.microsoft.com/office/powerpoint/2010/main" xmlns:a14="http://schemas.microsoft.com/office/drawing/2010/main" xmlns:a16="http://schemas.microsoft.com/office/drawing/2014/main" xmlns="" w="9525">
+                <a14:hiddenLine xmlns="" xmlns:a16="http://schemas.microsoft.com/office/drawing/2014/main" xmlns:a14="http://schemas.microsoft.com/office/drawing/2010/main" xmlns:p14="http://schemas.microsoft.com/office/powerpoint/2010/main" w="9525">
                   <a:solidFill>
                     <a:srgbClr val="000000"/>
                   </a:solidFill>
@@ -17776,7 +18885,7 @@
             </a:ln>
             <a:extLst>
               <a:ext uri="{91240B29-F687-4f45-9708-019B960494DF}">
-                <a14:hiddenLine xmlns:p14="http://schemas.microsoft.com/office/powerpoint/2010/main" xmlns:a14="http://schemas.microsoft.com/office/drawing/2010/main" xmlns:a16="http://schemas.microsoft.com/office/drawing/2014/main" xmlns="" w="9525">
+                <a14:hiddenLine xmlns="" xmlns:a16="http://schemas.microsoft.com/office/drawing/2014/main" xmlns:a14="http://schemas.microsoft.com/office/drawing/2010/main" xmlns:p14="http://schemas.microsoft.com/office/powerpoint/2010/main" w="9525">
                   <a:solidFill>
                     <a:srgbClr val="000000"/>
                   </a:solidFill>
@@ -17881,7 +18990,7 @@
             </a:ln>
             <a:extLst>
               <a:ext uri="{91240B29-F687-4f45-9708-019B960494DF}">
-                <a14:hiddenLine xmlns:p14="http://schemas.microsoft.com/office/powerpoint/2010/main" xmlns:a14="http://schemas.microsoft.com/office/drawing/2010/main" xmlns:a16="http://schemas.microsoft.com/office/drawing/2014/main" xmlns="" w="9525">
+                <a14:hiddenLine xmlns="" xmlns:a16="http://schemas.microsoft.com/office/drawing/2014/main" xmlns:a14="http://schemas.microsoft.com/office/drawing/2010/main" xmlns:p14="http://schemas.microsoft.com/office/powerpoint/2010/main" w="9525">
                   <a:solidFill>
                     <a:srgbClr val="000000"/>
                   </a:solidFill>
@@ -17930,7 +19039,7 @@
             </a:ln>
             <a:extLst>
               <a:ext uri="{91240B29-F687-4f45-9708-019B960494DF}">
-                <a14:hiddenLine xmlns:p14="http://schemas.microsoft.com/office/powerpoint/2010/main" xmlns:a14="http://schemas.microsoft.com/office/drawing/2010/main" xmlns:a16="http://schemas.microsoft.com/office/drawing/2014/main" xmlns="" w="9525">
+                <a14:hiddenLine xmlns="" xmlns:a16="http://schemas.microsoft.com/office/drawing/2014/main" xmlns:a14="http://schemas.microsoft.com/office/drawing/2010/main" xmlns:p14="http://schemas.microsoft.com/office/powerpoint/2010/main" w="9525">
                   <a:solidFill>
                     <a:srgbClr val="000000"/>
                   </a:solidFill>
@@ -18035,7 +19144,7 @@
             </a:ln>
             <a:extLst>
               <a:ext uri="{91240B29-F687-4f45-9708-019B960494DF}">
-                <a14:hiddenLine xmlns:p14="http://schemas.microsoft.com/office/powerpoint/2010/main" xmlns:a14="http://schemas.microsoft.com/office/drawing/2010/main" xmlns:a16="http://schemas.microsoft.com/office/drawing/2014/main" xmlns="" w="9525">
+                <a14:hiddenLine xmlns="" xmlns:a16="http://schemas.microsoft.com/office/drawing/2014/main" xmlns:a14="http://schemas.microsoft.com/office/drawing/2010/main" xmlns:p14="http://schemas.microsoft.com/office/powerpoint/2010/main" w="9525">
                   <a:solidFill>
                     <a:srgbClr val="000000"/>
                   </a:solidFill>
@@ -18112,7 +19221,7 @@
             </a:ln>
             <a:extLst>
               <a:ext uri="{91240B29-F687-4f45-9708-019B960494DF}">
-                <a14:hiddenLine xmlns:p14="http://schemas.microsoft.com/office/powerpoint/2010/main" xmlns:a14="http://schemas.microsoft.com/office/drawing/2010/main" xmlns:a16="http://schemas.microsoft.com/office/drawing/2014/main" xmlns="" w="9525">
+                <a14:hiddenLine xmlns="" xmlns:a16="http://schemas.microsoft.com/office/drawing/2014/main" xmlns:a14="http://schemas.microsoft.com/office/drawing/2010/main" xmlns:p14="http://schemas.microsoft.com/office/powerpoint/2010/main" w="9525">
                   <a:solidFill>
                     <a:srgbClr val="000000"/>
                   </a:solidFill>
@@ -18189,7 +19298,7 @@
             </a:ln>
             <a:extLst>
               <a:ext uri="{91240B29-F687-4f45-9708-019B960494DF}">
-                <a14:hiddenLine xmlns:p14="http://schemas.microsoft.com/office/powerpoint/2010/main" xmlns:a14="http://schemas.microsoft.com/office/drawing/2010/main" xmlns:a16="http://schemas.microsoft.com/office/drawing/2014/main" xmlns="" w="9525">
+                <a14:hiddenLine xmlns="" xmlns:a16="http://schemas.microsoft.com/office/drawing/2014/main" xmlns:a14="http://schemas.microsoft.com/office/drawing/2010/main" xmlns:p14="http://schemas.microsoft.com/office/powerpoint/2010/main" w="9525">
                   <a:solidFill>
                     <a:srgbClr val="000000"/>
                   </a:solidFill>
@@ -18294,7 +19403,7 @@
             </a:ln>
             <a:extLst>
               <a:ext uri="{91240B29-F687-4f45-9708-019B960494DF}">
-                <a14:hiddenLine xmlns:p14="http://schemas.microsoft.com/office/powerpoint/2010/main" xmlns:a14="http://schemas.microsoft.com/office/drawing/2010/main" xmlns:a16="http://schemas.microsoft.com/office/drawing/2014/main" xmlns="" w="9525">
+                <a14:hiddenLine xmlns="" xmlns:a16="http://schemas.microsoft.com/office/drawing/2014/main" xmlns:a14="http://schemas.microsoft.com/office/drawing/2010/main" xmlns:p14="http://schemas.microsoft.com/office/powerpoint/2010/main" w="9525">
                   <a:solidFill>
                     <a:srgbClr val="000000"/>
                   </a:solidFill>
@@ -18377,7 +19486,7 @@
             </a:ln>
             <a:extLst>
               <a:ext uri="{91240B29-F687-4f45-9708-019B960494DF}">
-                <a14:hiddenLine xmlns:p14="http://schemas.microsoft.com/office/powerpoint/2010/main" xmlns:a14="http://schemas.microsoft.com/office/drawing/2010/main" xmlns:a16="http://schemas.microsoft.com/office/drawing/2014/main" xmlns="" w="9525">
+                <a14:hiddenLine xmlns="" xmlns:a16="http://schemas.microsoft.com/office/drawing/2014/main" xmlns:a14="http://schemas.microsoft.com/office/drawing/2010/main" xmlns:p14="http://schemas.microsoft.com/office/powerpoint/2010/main" w="9525">
                   <a:solidFill>
                     <a:srgbClr val="000000"/>
                   </a:solidFill>
@@ -18454,7 +19563,7 @@
             </a:ln>
             <a:extLst>
               <a:ext uri="{91240B29-F687-4f45-9708-019B960494DF}">
-                <a14:hiddenLine xmlns:p14="http://schemas.microsoft.com/office/powerpoint/2010/main" xmlns:a14="http://schemas.microsoft.com/office/drawing/2010/main" xmlns:a16="http://schemas.microsoft.com/office/drawing/2014/main" xmlns="" w="9525">
+                <a14:hiddenLine xmlns="" xmlns:a16="http://schemas.microsoft.com/office/drawing/2014/main" xmlns:a14="http://schemas.microsoft.com/office/drawing/2010/main" xmlns:p14="http://schemas.microsoft.com/office/powerpoint/2010/main" w="9525">
                   <a:solidFill>
                     <a:srgbClr val="000000"/>
                   </a:solidFill>
@@ -18559,7 +19668,7 @@
             </a:ln>
             <a:extLst>
               <a:ext uri="{91240B29-F687-4f45-9708-019B960494DF}">
-                <a14:hiddenLine xmlns:p14="http://schemas.microsoft.com/office/powerpoint/2010/main" xmlns:a14="http://schemas.microsoft.com/office/drawing/2010/main" xmlns:a16="http://schemas.microsoft.com/office/drawing/2014/main" xmlns="" w="9525">
+                <a14:hiddenLine xmlns="" xmlns:a16="http://schemas.microsoft.com/office/drawing/2014/main" xmlns:a14="http://schemas.microsoft.com/office/drawing/2010/main" xmlns:p14="http://schemas.microsoft.com/office/powerpoint/2010/main" w="9525">
                   <a:solidFill>
                     <a:srgbClr val="000000"/>
                   </a:solidFill>
@@ -18636,7 +19745,7 @@
             </a:ln>
             <a:extLst>
               <a:ext uri="{91240B29-F687-4f45-9708-019B960494DF}">
-                <a14:hiddenLine xmlns:p14="http://schemas.microsoft.com/office/powerpoint/2010/main" xmlns:a14="http://schemas.microsoft.com/office/drawing/2010/main" xmlns:a16="http://schemas.microsoft.com/office/drawing/2014/main" xmlns="" w="9525">
+                <a14:hiddenLine xmlns="" xmlns:a16="http://schemas.microsoft.com/office/drawing/2014/main" xmlns:a14="http://schemas.microsoft.com/office/drawing/2010/main" xmlns:p14="http://schemas.microsoft.com/office/powerpoint/2010/main" w="9525">
                   <a:solidFill>
                     <a:srgbClr val="000000"/>
                   </a:solidFill>
@@ -18741,7 +19850,7 @@
             </a:ln>
             <a:extLst>
               <a:ext uri="{91240B29-F687-4f45-9708-019B960494DF}">
-                <a14:hiddenLine xmlns:p14="http://schemas.microsoft.com/office/powerpoint/2010/main" xmlns:a14="http://schemas.microsoft.com/office/drawing/2010/main" xmlns:a16="http://schemas.microsoft.com/office/drawing/2014/main" xmlns="" w="9525">
+                <a14:hiddenLine xmlns="" xmlns:a16="http://schemas.microsoft.com/office/drawing/2014/main" xmlns:a14="http://schemas.microsoft.com/office/drawing/2010/main" xmlns:p14="http://schemas.microsoft.com/office/powerpoint/2010/main" w="9525">
                   <a:solidFill>
                     <a:srgbClr val="000000"/>
                   </a:solidFill>
@@ -18818,7 +19927,7 @@
             </a:ln>
             <a:extLst>
               <a:ext uri="{91240B29-F687-4f45-9708-019B960494DF}">
-                <a14:hiddenLine xmlns:p14="http://schemas.microsoft.com/office/powerpoint/2010/main" xmlns:a14="http://schemas.microsoft.com/office/drawing/2010/main" xmlns:a16="http://schemas.microsoft.com/office/drawing/2014/main" xmlns="" w="9525">
+                <a14:hiddenLine xmlns="" xmlns:a16="http://schemas.microsoft.com/office/drawing/2014/main" xmlns:a14="http://schemas.microsoft.com/office/drawing/2010/main" xmlns:p14="http://schemas.microsoft.com/office/powerpoint/2010/main" w="9525">
                   <a:solidFill>
                     <a:srgbClr val="000000"/>
                   </a:solidFill>
@@ -18923,7 +20032,7 @@
             </a:ln>
             <a:extLst>
               <a:ext uri="{91240B29-F687-4f45-9708-019B960494DF}">
-                <a14:hiddenLine xmlns:p14="http://schemas.microsoft.com/office/powerpoint/2010/main" xmlns:a14="http://schemas.microsoft.com/office/drawing/2010/main" xmlns:a16="http://schemas.microsoft.com/office/drawing/2014/main" xmlns="" w="9525">
+                <a14:hiddenLine xmlns="" xmlns:a16="http://schemas.microsoft.com/office/drawing/2014/main" xmlns:a14="http://schemas.microsoft.com/office/drawing/2010/main" xmlns:p14="http://schemas.microsoft.com/office/powerpoint/2010/main" w="9525">
                   <a:solidFill>
                     <a:srgbClr val="000000"/>
                   </a:solidFill>
@@ -18972,7 +20081,7 @@
             </a:ln>
             <a:extLst>
               <a:ext uri="{91240B29-F687-4f45-9708-019B960494DF}">
-                <a14:hiddenLine xmlns:p14="http://schemas.microsoft.com/office/powerpoint/2010/main" xmlns:a14="http://schemas.microsoft.com/office/drawing/2010/main" xmlns:a16="http://schemas.microsoft.com/office/drawing/2014/main" xmlns="" w="9525">
+                <a14:hiddenLine xmlns="" xmlns:a16="http://schemas.microsoft.com/office/drawing/2014/main" xmlns:a14="http://schemas.microsoft.com/office/drawing/2010/main" xmlns:p14="http://schemas.microsoft.com/office/powerpoint/2010/main" w="9525">
                   <a:solidFill>
                     <a:srgbClr val="000000"/>
                   </a:solidFill>
@@ -19052,7 +20161,7 @@
             </a:ln>
             <a:extLst>
               <a:ext uri="{91240B29-F687-4f45-9708-019B960494DF}">
-                <a14:hiddenLine xmlns:p14="http://schemas.microsoft.com/office/powerpoint/2010/main" xmlns:a14="http://schemas.microsoft.com/office/drawing/2010/main" xmlns:a16="http://schemas.microsoft.com/office/drawing/2014/main" xmlns="" w="9525">
+                <a14:hiddenLine xmlns="" xmlns:a16="http://schemas.microsoft.com/office/drawing/2014/main" xmlns:a14="http://schemas.microsoft.com/office/drawing/2010/main" xmlns:p14="http://schemas.microsoft.com/office/powerpoint/2010/main" w="9525">
                   <a:solidFill>
                     <a:srgbClr val="000000"/>
                   </a:solidFill>
@@ -19157,7 +20266,7 @@
             </a:ln>
             <a:extLst>
               <a:ext uri="{91240B29-F687-4f45-9708-019B960494DF}">
-                <a14:hiddenLine xmlns:p14="http://schemas.microsoft.com/office/powerpoint/2010/main" xmlns:a14="http://schemas.microsoft.com/office/drawing/2010/main" xmlns:a16="http://schemas.microsoft.com/office/drawing/2014/main" xmlns="" w="9525">
+                <a14:hiddenLine xmlns="" xmlns:a16="http://schemas.microsoft.com/office/drawing/2014/main" xmlns:a14="http://schemas.microsoft.com/office/drawing/2010/main" xmlns:p14="http://schemas.microsoft.com/office/powerpoint/2010/main" w="9525">
                   <a:solidFill>
                     <a:srgbClr val="000000"/>
                   </a:solidFill>
@@ -19234,7 +20343,7 @@
             </a:ln>
             <a:extLst>
               <a:ext uri="{91240B29-F687-4f45-9708-019B960494DF}">
-                <a14:hiddenLine xmlns:p14="http://schemas.microsoft.com/office/powerpoint/2010/main" xmlns:a14="http://schemas.microsoft.com/office/drawing/2010/main" xmlns:a16="http://schemas.microsoft.com/office/drawing/2014/main" xmlns="" w="9525">
+                <a14:hiddenLine xmlns="" xmlns:a16="http://schemas.microsoft.com/office/drawing/2014/main" xmlns:a14="http://schemas.microsoft.com/office/drawing/2010/main" xmlns:p14="http://schemas.microsoft.com/office/powerpoint/2010/main" w="9525">
                   <a:solidFill>
                     <a:srgbClr val="000000"/>
                   </a:solidFill>
@@ -19339,7 +20448,7 @@
             </a:ln>
             <a:extLst>
               <a:ext uri="{91240B29-F687-4f45-9708-019B960494DF}">
-                <a14:hiddenLine xmlns:p14="http://schemas.microsoft.com/office/powerpoint/2010/main" xmlns:a14="http://schemas.microsoft.com/office/drawing/2010/main" xmlns:a16="http://schemas.microsoft.com/office/drawing/2014/main" xmlns="" w="9525">
+                <a14:hiddenLine xmlns="" xmlns:a16="http://schemas.microsoft.com/office/drawing/2014/main" xmlns:a14="http://schemas.microsoft.com/office/drawing/2010/main" xmlns:p14="http://schemas.microsoft.com/office/powerpoint/2010/main" w="9525">
                   <a:solidFill>
                     <a:srgbClr val="000000"/>
                   </a:solidFill>
@@ -19444,7 +20553,7 @@
             </a:ln>
             <a:extLst>
               <a:ext uri="{91240B29-F687-4f45-9708-019B960494DF}">
-                <a14:hiddenLine xmlns:p14="http://schemas.microsoft.com/office/powerpoint/2010/main" xmlns:a14="http://schemas.microsoft.com/office/drawing/2010/main" xmlns:a16="http://schemas.microsoft.com/office/drawing/2014/main" xmlns="" w="9525">
+                <a14:hiddenLine xmlns="" xmlns:a16="http://schemas.microsoft.com/office/drawing/2014/main" xmlns:a14="http://schemas.microsoft.com/office/drawing/2010/main" xmlns:p14="http://schemas.microsoft.com/office/powerpoint/2010/main" w="9525">
                   <a:solidFill>
                     <a:srgbClr val="000000"/>
                   </a:solidFill>
@@ -19524,7 +20633,7 @@
             </a:ln>
             <a:extLst>
               <a:ext uri="{91240B29-F687-4f45-9708-019B960494DF}">
-                <a14:hiddenLine xmlns:p14="http://schemas.microsoft.com/office/powerpoint/2010/main" xmlns:a14="http://schemas.microsoft.com/office/drawing/2010/main" xmlns:a16="http://schemas.microsoft.com/office/drawing/2014/main" xmlns="" w="9525">
+                <a14:hiddenLine xmlns="" xmlns:a16="http://schemas.microsoft.com/office/drawing/2014/main" xmlns:a14="http://schemas.microsoft.com/office/drawing/2010/main" xmlns:p14="http://schemas.microsoft.com/office/powerpoint/2010/main" w="9525">
                   <a:solidFill>
                     <a:srgbClr val="000000"/>
                   </a:solidFill>
@@ -19601,7 +20710,7 @@
             </a:ln>
             <a:extLst>
               <a:ext uri="{91240B29-F687-4f45-9708-019B960494DF}">
-                <a14:hiddenLine xmlns:p14="http://schemas.microsoft.com/office/powerpoint/2010/main" xmlns:a14="http://schemas.microsoft.com/office/drawing/2010/main" xmlns:a16="http://schemas.microsoft.com/office/drawing/2014/main" xmlns="" w="9525">
+                <a14:hiddenLine xmlns="" xmlns:a16="http://schemas.microsoft.com/office/drawing/2014/main" xmlns:a14="http://schemas.microsoft.com/office/drawing/2010/main" xmlns:p14="http://schemas.microsoft.com/office/powerpoint/2010/main" w="9525">
                   <a:solidFill>
                     <a:srgbClr val="000000"/>
                   </a:solidFill>
@@ -19706,7 +20815,7 @@
             </a:ln>
             <a:extLst>
               <a:ext uri="{91240B29-F687-4f45-9708-019B960494DF}">
-                <a14:hiddenLine xmlns:p14="http://schemas.microsoft.com/office/powerpoint/2010/main" xmlns:a14="http://schemas.microsoft.com/office/drawing/2010/main" xmlns:a16="http://schemas.microsoft.com/office/drawing/2014/main" xmlns="" w="9525">
+                <a14:hiddenLine xmlns="" xmlns:a16="http://schemas.microsoft.com/office/drawing/2014/main" xmlns:a14="http://schemas.microsoft.com/office/drawing/2010/main" xmlns:p14="http://schemas.microsoft.com/office/powerpoint/2010/main" w="9525">
                   <a:solidFill>
                     <a:srgbClr val="000000"/>
                   </a:solidFill>
@@ -19811,7 +20920,7 @@
             </a:ln>
             <a:extLst>
               <a:ext uri="{91240B29-F687-4f45-9708-019B960494DF}">
-                <a14:hiddenLine xmlns:p14="http://schemas.microsoft.com/office/powerpoint/2010/main" xmlns:a14="http://schemas.microsoft.com/office/drawing/2010/main" xmlns:a16="http://schemas.microsoft.com/office/drawing/2014/main" xmlns="" w="9525">
+                <a14:hiddenLine xmlns="" xmlns:a16="http://schemas.microsoft.com/office/drawing/2014/main" xmlns:a14="http://schemas.microsoft.com/office/drawing/2010/main" xmlns:p14="http://schemas.microsoft.com/office/powerpoint/2010/main" w="9525">
                   <a:solidFill>
                     <a:srgbClr val="000000"/>
                   </a:solidFill>
@@ -19888,7 +20997,7 @@
             </a:ln>
             <a:extLst>
               <a:ext uri="{91240B29-F687-4f45-9708-019B960494DF}">
-                <a14:hiddenLine xmlns:p14="http://schemas.microsoft.com/office/powerpoint/2010/main" xmlns:a14="http://schemas.microsoft.com/office/drawing/2010/main" xmlns:a16="http://schemas.microsoft.com/office/drawing/2014/main" xmlns="" w="9525">
+                <a14:hiddenLine xmlns="" xmlns:a16="http://schemas.microsoft.com/office/drawing/2014/main" xmlns:a14="http://schemas.microsoft.com/office/drawing/2010/main" xmlns:p14="http://schemas.microsoft.com/office/powerpoint/2010/main" w="9525">
                   <a:solidFill>
                     <a:srgbClr val="000000"/>
                   </a:solidFill>
@@ -20023,7 +21132,7 @@
             </a:ln>
             <a:extLst>
               <a:ext uri="{91240B29-F687-4f45-9708-019B960494DF}">
-                <a14:hiddenLine xmlns:p14="http://schemas.microsoft.com/office/powerpoint/2010/main" xmlns:a14="http://schemas.microsoft.com/office/drawing/2010/main" xmlns:a16="http://schemas.microsoft.com/office/drawing/2014/main" xmlns="" w="9525">
+                <a14:hiddenLine xmlns="" xmlns:a16="http://schemas.microsoft.com/office/drawing/2014/main" xmlns:a14="http://schemas.microsoft.com/office/drawing/2010/main" xmlns:p14="http://schemas.microsoft.com/office/powerpoint/2010/main" w="9525">
                   <a:solidFill>
                     <a:srgbClr val="000000"/>
                   </a:solidFill>
@@ -20106,7 +21215,7 @@
             </a:ln>
             <a:extLst>
               <a:ext uri="{91240B29-F687-4f45-9708-019B960494DF}">
-                <a14:hiddenLine xmlns:p14="http://schemas.microsoft.com/office/powerpoint/2010/main" xmlns:a14="http://schemas.microsoft.com/office/drawing/2010/main" xmlns:a16="http://schemas.microsoft.com/office/drawing/2014/main" xmlns="" w="9525">
+                <a14:hiddenLine xmlns="" xmlns:a16="http://schemas.microsoft.com/office/drawing/2014/main" xmlns:a14="http://schemas.microsoft.com/office/drawing/2010/main" xmlns:p14="http://schemas.microsoft.com/office/powerpoint/2010/main" w="9525">
                   <a:solidFill>
                     <a:srgbClr val="000000"/>
                   </a:solidFill>
@@ -20211,7 +21320,7 @@
             </a:ln>
             <a:extLst>
               <a:ext uri="{91240B29-F687-4f45-9708-019B960494DF}">
-                <a14:hiddenLine xmlns:p14="http://schemas.microsoft.com/office/powerpoint/2010/main" xmlns:a14="http://schemas.microsoft.com/office/drawing/2010/main" xmlns:a16="http://schemas.microsoft.com/office/drawing/2014/main" xmlns="" w="9525">
+                <a14:hiddenLine xmlns="" xmlns:a16="http://schemas.microsoft.com/office/drawing/2014/main" xmlns:a14="http://schemas.microsoft.com/office/drawing/2010/main" xmlns:p14="http://schemas.microsoft.com/office/powerpoint/2010/main" w="9525">
                   <a:solidFill>
                     <a:srgbClr val="000000"/>
                   </a:solidFill>
@@ -20341,7 +21450,7 @@
             </a:ln>
             <a:extLst>
               <a:ext uri="{91240B29-F687-4f45-9708-019B960494DF}">
-                <a14:hiddenLine xmlns:p14="http://schemas.microsoft.com/office/powerpoint/2010/main" xmlns:a14="http://schemas.microsoft.com/office/drawing/2010/main" xmlns:a16="http://schemas.microsoft.com/office/drawing/2014/main" xmlns="" w="9525">
+                <a14:hiddenLine xmlns="" xmlns:a16="http://schemas.microsoft.com/office/drawing/2014/main" xmlns:a14="http://schemas.microsoft.com/office/drawing/2010/main" xmlns:p14="http://schemas.microsoft.com/office/powerpoint/2010/main" w="9525">
                   <a:solidFill>
                     <a:srgbClr val="000000"/>
                   </a:solidFill>
@@ -20471,7 +21580,7 @@
             </a:ln>
             <a:extLst>
               <a:ext uri="{91240B29-F687-4f45-9708-019B960494DF}">
-                <a14:hiddenLine xmlns:p14="http://schemas.microsoft.com/office/powerpoint/2010/main" xmlns:a14="http://schemas.microsoft.com/office/drawing/2010/main" xmlns:a16="http://schemas.microsoft.com/office/drawing/2014/main" xmlns="" w="9525">
+                <a14:hiddenLine xmlns="" xmlns:a16="http://schemas.microsoft.com/office/drawing/2014/main" xmlns:a14="http://schemas.microsoft.com/office/drawing/2010/main" xmlns:p14="http://schemas.microsoft.com/office/powerpoint/2010/main" w="9525">
                   <a:solidFill>
                     <a:srgbClr val="000000"/>
                   </a:solidFill>
@@ -20576,7 +21685,7 @@
             </a:ln>
             <a:extLst>
               <a:ext uri="{91240B29-F687-4f45-9708-019B960494DF}">
-                <a14:hiddenLine xmlns:p14="http://schemas.microsoft.com/office/powerpoint/2010/main" xmlns:a14="http://schemas.microsoft.com/office/drawing/2010/main" xmlns:a16="http://schemas.microsoft.com/office/drawing/2014/main" xmlns="" w="9525">
+                <a14:hiddenLine xmlns="" xmlns:a16="http://schemas.microsoft.com/office/drawing/2014/main" xmlns:a14="http://schemas.microsoft.com/office/drawing/2010/main" xmlns:p14="http://schemas.microsoft.com/office/powerpoint/2010/main" w="9525">
                   <a:solidFill>
                     <a:srgbClr val="000000"/>
                   </a:solidFill>
@@ -20656,7 +21765,7 @@
             </a:ln>
             <a:extLst>
               <a:ext uri="{91240B29-F687-4f45-9708-019B960494DF}">
-                <a14:hiddenLine xmlns:p14="http://schemas.microsoft.com/office/powerpoint/2010/main" xmlns:a14="http://schemas.microsoft.com/office/drawing/2010/main" xmlns:a16="http://schemas.microsoft.com/office/drawing/2014/main" xmlns="" w="9525">
+                <a14:hiddenLine xmlns="" xmlns:a16="http://schemas.microsoft.com/office/drawing/2014/main" xmlns:a14="http://schemas.microsoft.com/office/drawing/2010/main" xmlns:p14="http://schemas.microsoft.com/office/powerpoint/2010/main" w="9525">
                   <a:solidFill>
                     <a:srgbClr val="000000"/>
                   </a:solidFill>
@@ -20761,7 +21870,7 @@
             </a:ln>
             <a:extLst>
               <a:ext uri="{91240B29-F687-4f45-9708-019B960494DF}">
-                <a14:hiddenLine xmlns:p14="http://schemas.microsoft.com/office/powerpoint/2010/main" xmlns:a14="http://schemas.microsoft.com/office/drawing/2010/main" xmlns:a16="http://schemas.microsoft.com/office/drawing/2014/main" xmlns="" w="9525">
+                <a14:hiddenLine xmlns="" xmlns:a16="http://schemas.microsoft.com/office/drawing/2014/main" xmlns:a14="http://schemas.microsoft.com/office/drawing/2010/main" xmlns:p14="http://schemas.microsoft.com/office/powerpoint/2010/main" w="9525">
                   <a:solidFill>
                     <a:srgbClr val="000000"/>
                   </a:solidFill>
@@ -20844,7 +21953,7 @@
             </a:ln>
             <a:extLst>
               <a:ext uri="{91240B29-F687-4f45-9708-019B960494DF}">
-                <a14:hiddenLine xmlns:p14="http://schemas.microsoft.com/office/powerpoint/2010/main" xmlns:a14="http://schemas.microsoft.com/office/drawing/2010/main" xmlns:a16="http://schemas.microsoft.com/office/drawing/2014/main" xmlns="" w="9525">
+                <a14:hiddenLine xmlns="" xmlns:a16="http://schemas.microsoft.com/office/drawing/2014/main" xmlns:a14="http://schemas.microsoft.com/office/drawing/2010/main" xmlns:p14="http://schemas.microsoft.com/office/powerpoint/2010/main" w="9525">
                   <a:solidFill>
                     <a:srgbClr val="000000"/>
                   </a:solidFill>
@@ -20949,7 +22058,7 @@
             </a:ln>
             <a:extLst>
               <a:ext uri="{91240B29-F687-4f45-9708-019B960494DF}">
-                <a14:hiddenLine xmlns:p14="http://schemas.microsoft.com/office/powerpoint/2010/main" xmlns:a14="http://schemas.microsoft.com/office/drawing/2010/main" xmlns:a16="http://schemas.microsoft.com/office/drawing/2014/main" xmlns="" w="9525">
+                <a14:hiddenLine xmlns="" xmlns:a16="http://schemas.microsoft.com/office/drawing/2014/main" xmlns:a14="http://schemas.microsoft.com/office/drawing/2010/main" xmlns:p14="http://schemas.microsoft.com/office/powerpoint/2010/main" w="9525">
                   <a:solidFill>
                     <a:srgbClr val="000000"/>
                   </a:solidFill>
@@ -21032,7 +22141,7 @@
             </a:ln>
             <a:extLst>
               <a:ext uri="{91240B29-F687-4f45-9708-019B960494DF}">
-                <a14:hiddenLine xmlns:p14="http://schemas.microsoft.com/office/powerpoint/2010/main" xmlns:a14="http://schemas.microsoft.com/office/drawing/2010/main" xmlns:a16="http://schemas.microsoft.com/office/drawing/2014/main" xmlns="" w="9525">
+                <a14:hiddenLine xmlns="" xmlns:a16="http://schemas.microsoft.com/office/drawing/2014/main" xmlns:a14="http://schemas.microsoft.com/office/drawing/2010/main" xmlns:p14="http://schemas.microsoft.com/office/powerpoint/2010/main" w="9525">
                   <a:solidFill>
                     <a:srgbClr val="000000"/>
                   </a:solidFill>
@@ -21137,7 +22246,7 @@
             </a:ln>
             <a:extLst>
               <a:ext uri="{91240B29-F687-4f45-9708-019B960494DF}">
-                <a14:hiddenLine xmlns:p14="http://schemas.microsoft.com/office/powerpoint/2010/main" xmlns:a14="http://schemas.microsoft.com/office/drawing/2010/main" xmlns:a16="http://schemas.microsoft.com/office/drawing/2014/main" xmlns="" w="9525">
+                <a14:hiddenLine xmlns="" xmlns:a16="http://schemas.microsoft.com/office/drawing/2014/main" xmlns:a14="http://schemas.microsoft.com/office/drawing/2010/main" xmlns:p14="http://schemas.microsoft.com/office/powerpoint/2010/main" w="9525">
                   <a:solidFill>
                     <a:srgbClr val="000000"/>
                   </a:solidFill>
@@ -21186,7 +22295,7 @@
             </a:ln>
             <a:extLst>
               <a:ext uri="{91240B29-F687-4f45-9708-019B960494DF}">
-                <a14:hiddenLine xmlns:p14="http://schemas.microsoft.com/office/powerpoint/2010/main" xmlns:a14="http://schemas.microsoft.com/office/drawing/2010/main" xmlns:a16="http://schemas.microsoft.com/office/drawing/2014/main" xmlns="" w="9525">
+                <a14:hiddenLine xmlns="" xmlns:a16="http://schemas.microsoft.com/office/drawing/2014/main" xmlns:a14="http://schemas.microsoft.com/office/drawing/2010/main" xmlns:p14="http://schemas.microsoft.com/office/powerpoint/2010/main" w="9525">
                   <a:solidFill>
                     <a:srgbClr val="000000"/>
                   </a:solidFill>
@@ -21217,7 +22326,7 @@
           <p:nvPr/>
         </p:nvPicPr>
         <p:blipFill rotWithShape="1">
-          <a:blip r:embed="rId4" cstate="screen">
+          <a:blip r:embed="rId5" cstate="screen">
             <a:extLst>
               <a:ext uri="{28A0092B-C50C-407E-A947-70E740481C1C}">
                 <a14:useLocalDpi xmlns:a14="http://schemas.microsoft.com/office/drawing/2010/main"/>
@@ -21250,7 +22359,455 @@
 </p:sld>
 </file>
 
+<file path=ppt/slides/slide10.xml><?xml version="1.0" encoding="utf-8"?>
+<p:sld xmlns:a="http://schemas.openxmlformats.org/drawingml/2006/main" xmlns:r="http://schemas.openxmlformats.org/officeDocument/2006/relationships" xmlns:p="http://schemas.openxmlformats.org/presentationml/2006/main">
+  <p:cSld>
+    <p:spTree>
+      <p:nvGrpSpPr>
+        <p:cNvPr id="1" name=""/>
+        <p:cNvGrpSpPr/>
+        <p:nvPr/>
+      </p:nvGrpSpPr>
+      <p:grpSpPr>
+        <a:xfrm>
+          <a:off x="0" y="0"/>
+          <a:ext cx="0" cy="0"/>
+          <a:chOff x="0" y="0"/>
+          <a:chExt cx="0" cy="0"/>
+        </a:xfrm>
+      </p:grpSpPr>
+      <p:sp>
+        <p:nvSpPr>
+          <p:cNvPr id="2" name="Title 1">
+            <a:extLst>
+              <a:ext uri="{FF2B5EF4-FFF2-40B4-BE49-F238E27FC236}">
+                <a16:creationId xmlns:a16="http://schemas.microsoft.com/office/drawing/2014/main" id="{460CC986-6E9C-45CB-8313-5E7E3ACDAE66}"/>
+              </a:ext>
+            </a:extLst>
+          </p:cNvPr>
+          <p:cNvSpPr>
+            <a:spLocks noGrp="1"/>
+          </p:cNvSpPr>
+          <p:nvPr>
+            <p:ph type="title"/>
+          </p:nvPr>
+        </p:nvSpPr>
+        <p:spPr>
+          <a:xfrm>
+            <a:off x="1143001" y="773084"/>
+            <a:ext cx="9905998" cy="1085591"/>
+          </a:xfrm>
+        </p:spPr>
+        <p:txBody>
+          <a:bodyPr/>
+          <a:lstStyle/>
+          <a:p>
+            <a:pPr algn="ctr"/>
+            <a:r>
+              <a:rPr lang="en-US" dirty="0"/>
+              <a:t>V2 along RBD-Up Proteins at 400 and 600 Scanning lengths</a:t>
+            </a:r>
+          </a:p>
+        </p:txBody>
+      </p:sp>
+      <p:pic>
+        <p:nvPicPr>
+          <p:cNvPr id="6" name="Content Placeholder 5">
+            <a:extLst>
+              <a:ext uri="{FF2B5EF4-FFF2-40B4-BE49-F238E27FC236}">
+                <a16:creationId xmlns:a16="http://schemas.microsoft.com/office/drawing/2014/main" id="{810A33BA-B2D5-40F9-AA4F-ECBC134F77F1}"/>
+              </a:ext>
+            </a:extLst>
+          </p:cNvPr>
+          <p:cNvPicPr>
+            <a:picLocks noGrp="1" noChangeAspect="1"/>
+          </p:cNvPicPr>
+          <p:nvPr>
+            <p:ph sz="half" idx="1"/>
+          </p:nvPr>
+        </p:nvPicPr>
+        <p:blipFill>
+          <a:blip r:embed="rId2"/>
+          <a:srcRect/>
+          <a:stretch/>
+        </p:blipFill>
+        <p:spPr>
+          <a:xfrm>
+            <a:off x="-3" y="2046770"/>
+            <a:ext cx="6316747" cy="4038146"/>
+          </a:xfrm>
+        </p:spPr>
+      </p:pic>
+      <p:pic>
+        <p:nvPicPr>
+          <p:cNvPr id="8" name="Content Placeholder 7">
+            <a:extLst>
+              <a:ext uri="{FF2B5EF4-FFF2-40B4-BE49-F238E27FC236}">
+                <a16:creationId xmlns:a16="http://schemas.microsoft.com/office/drawing/2014/main" id="{79C85902-B13D-4741-9398-46C2799F3C8B}"/>
+              </a:ext>
+            </a:extLst>
+          </p:cNvPr>
+          <p:cNvPicPr>
+            <a:picLocks noGrp="1" noChangeAspect="1"/>
+          </p:cNvPicPr>
+          <p:nvPr>
+            <p:ph sz="half" idx="2"/>
+          </p:nvPr>
+        </p:nvPicPr>
+        <p:blipFill>
+          <a:blip r:embed="rId3"/>
+          <a:srcRect/>
+          <a:stretch/>
+        </p:blipFill>
+        <p:spPr>
+          <a:xfrm>
+            <a:off x="5875249" y="2046770"/>
+            <a:ext cx="6316750" cy="4038146"/>
+          </a:xfrm>
+        </p:spPr>
+      </p:pic>
+    </p:spTree>
+    <p:extLst>
+      <p:ext uri="{BB962C8B-B14F-4D97-AF65-F5344CB8AC3E}">
+        <p14:creationId xmlns:p14="http://schemas.microsoft.com/office/powerpoint/2010/main" val="1727561536"/>
+      </p:ext>
+    </p:extLst>
+  </p:cSld>
+  <p:clrMapOvr>
+    <a:masterClrMapping/>
+  </p:clrMapOvr>
+</p:sld>
+</file>
+
+<file path=ppt/slides/slide11.xml><?xml version="1.0" encoding="utf-8"?>
+<p:sld xmlns:a="http://schemas.openxmlformats.org/drawingml/2006/main" xmlns:r="http://schemas.openxmlformats.org/officeDocument/2006/relationships" xmlns:p="http://schemas.openxmlformats.org/presentationml/2006/main">
+  <p:cSld>
+    <p:spTree>
+      <p:nvGrpSpPr>
+        <p:cNvPr id="1" name=""/>
+        <p:cNvGrpSpPr/>
+        <p:nvPr/>
+      </p:nvGrpSpPr>
+      <p:grpSpPr>
+        <a:xfrm>
+          <a:off x="0" y="0"/>
+          <a:ext cx="0" cy="0"/>
+          <a:chOff x="0" y="0"/>
+          <a:chExt cx="0" cy="0"/>
+        </a:xfrm>
+      </p:grpSpPr>
+      <p:pic>
+        <p:nvPicPr>
+          <p:cNvPr id="9" name="Picture Placeholder 8" descr="Abstract organic polygons blurred">
+            <a:extLst>
+              <a:ext uri="{FF2B5EF4-FFF2-40B4-BE49-F238E27FC236}">
+                <a16:creationId xmlns:a16="http://schemas.microsoft.com/office/drawing/2014/main" id="{2D73DA0F-7DB4-4B1A-8B34-4F00DA6DD026}"/>
+              </a:ext>
+            </a:extLst>
+          </p:cNvPr>
+          <p:cNvPicPr>
+            <a:picLocks noGrp="1" noChangeAspect="1"/>
+          </p:cNvPicPr>
+          <p:nvPr>
+            <p:ph type="pic" sz="quarter" idx="16"/>
+          </p:nvPr>
+        </p:nvPicPr>
+        <p:blipFill rotWithShape="1">
+          <a:blip r:embed="rId2" cstate="screen">
+            <a:extLst>
+              <a:ext uri="{28A0092B-C50C-407E-A947-70E740481C1C}">
+                <a14:useLocalDpi xmlns:a14="http://schemas.microsoft.com/office/drawing/2010/main"/>
+              </a:ext>
+            </a:extLst>
+          </a:blip>
+          <a:srcRect/>
+          <a:stretch/>
+        </p:blipFill>
+        <p:spPr>
+          <a:xfrm>
+            <a:off x="-1" y="-1"/>
+            <a:ext cx="5858933" cy="6858219"/>
+          </a:xfrm>
+        </p:spPr>
+      </p:pic>
+      <p:sp>
+        <p:nvSpPr>
+          <p:cNvPr id="2" name="Title 1">
+            <a:extLst>
+              <a:ext uri="{FF2B5EF4-FFF2-40B4-BE49-F238E27FC236}">
+                <a16:creationId xmlns:a16="http://schemas.microsoft.com/office/drawing/2014/main" id="{A6BA76B3-D03C-4451-8EB4-18D3076077B3}"/>
+              </a:ext>
+            </a:extLst>
+          </p:cNvPr>
+          <p:cNvSpPr>
+            <a:spLocks noGrp="1"/>
+          </p:cNvSpPr>
+          <p:nvPr>
+            <p:ph type="title"/>
+          </p:nvPr>
+        </p:nvSpPr>
+        <p:spPr>
+          <a:xfrm>
+            <a:off x="6095999" y="766533"/>
+            <a:ext cx="5046134" cy="1305158"/>
+          </a:xfrm>
+        </p:spPr>
+        <p:txBody>
+          <a:bodyPr>
+            <a:normAutofit/>
+          </a:bodyPr>
+          <a:lstStyle/>
+          <a:p>
+            <a:r>
+              <a:rPr lang="en-US" sz="7200" dirty="0"/>
+              <a:t>THANK YOU</a:t>
+            </a:r>
+          </a:p>
+        </p:txBody>
+      </p:sp>
+      <p:sp>
+        <p:nvSpPr>
+          <p:cNvPr id="4" name="Content Placeholder 3">
+            <a:extLst>
+              <a:ext uri="{FF2B5EF4-FFF2-40B4-BE49-F238E27FC236}">
+                <a16:creationId xmlns:a16="http://schemas.microsoft.com/office/drawing/2014/main" id="{5F0977C3-BD7D-4617-8DF1-56211456D512}"/>
+              </a:ext>
+            </a:extLst>
+          </p:cNvPr>
+          <p:cNvSpPr>
+            <a:spLocks noGrp="1"/>
+          </p:cNvSpPr>
+          <p:nvPr>
+            <p:ph sz="half" idx="1"/>
+          </p:nvPr>
+        </p:nvSpPr>
+        <p:spPr>
+          <a:xfrm>
+            <a:off x="6095999" y="2589839"/>
+            <a:ext cx="4611758" cy="3620161"/>
+          </a:xfrm>
+        </p:spPr>
+        <p:txBody>
+          <a:bodyPr/>
+          <a:lstStyle/>
+          <a:p>
+            <a:pPr marL="91440" indent="-365760"/>
+            <a:r>
+              <a:rPr lang="en-US" dirty="0">
+                <a:hlinkClick r:id="rId3">
+                  <a:extLst>
+                    <a:ext uri="{A12FA001-AC4F-418D-AE19-62706E023703}">
+                      <ahyp:hlinkClr xmlns:ahyp="http://schemas.microsoft.com/office/drawing/2018/hyperlinkcolor" val="tx"/>
+                    </a:ext>
+                  </a:extLst>
+                </a:hlinkClick>
+              </a:rPr>
+              <a:t>https://github.com/jmidrichards/iCompBio-Summer2021</a:t>
+            </a:r>
+            <a:endParaRPr lang="en-US" dirty="0"/>
+          </a:p>
+          <a:p>
+            <a:pPr marL="91440" indent="-365760"/>
+            <a:r>
+              <a:rPr lang="en-US" dirty="0">
+                <a:hlinkClick r:id="rId4">
+                  <a:extLst>
+                    <a:ext uri="{A12FA001-AC4F-418D-AE19-62706E023703}">
+                      <ahyp:hlinkClr xmlns:ahyp="http://schemas.microsoft.com/office/drawing/2018/hyperlinkcolor" val="tx"/>
+                    </a:ext>
+                  </a:extLst>
+                </a:hlinkClick>
+              </a:rPr>
+              <a:t>jmidrichards@gmail.com</a:t>
+            </a:r>
+            <a:endParaRPr lang="en-US" dirty="0"/>
+          </a:p>
+        </p:txBody>
+      </p:sp>
+    </p:spTree>
+    <p:extLst>
+      <p:ext uri="{BB962C8B-B14F-4D97-AF65-F5344CB8AC3E}">
+        <p14:creationId xmlns:p14="http://schemas.microsoft.com/office/powerpoint/2010/main" val="3050793910"/>
+      </p:ext>
+    </p:extLst>
+  </p:cSld>
+  <p:clrMapOvr>
+    <a:masterClrMapping/>
+  </p:clrMapOvr>
+</p:sld>
+</file>
+
 <file path=ppt/slides/slide2.xml><?xml version="1.0" encoding="utf-8"?>
+<p:sld xmlns:a="http://schemas.openxmlformats.org/drawingml/2006/main" xmlns:r="http://schemas.openxmlformats.org/officeDocument/2006/relationships" xmlns:p="http://schemas.openxmlformats.org/presentationml/2006/main">
+  <p:cSld>
+    <p:spTree>
+      <p:nvGrpSpPr>
+        <p:cNvPr id="1" name=""/>
+        <p:cNvGrpSpPr/>
+        <p:nvPr/>
+      </p:nvGrpSpPr>
+      <p:grpSpPr>
+        <a:xfrm>
+          <a:off x="0" y="0"/>
+          <a:ext cx="0" cy="0"/>
+          <a:chOff x="0" y="0"/>
+          <a:chExt cx="0" cy="0"/>
+        </a:xfrm>
+      </p:grpSpPr>
+      <p:sp>
+        <p:nvSpPr>
+          <p:cNvPr id="2" name="Title 1">
+            <a:extLst>
+              <a:ext uri="{FF2B5EF4-FFF2-40B4-BE49-F238E27FC236}">
+                <a16:creationId xmlns:a16="http://schemas.microsoft.com/office/drawing/2014/main" id="{85A902B5-BD51-4A7D-B477-AEC271B1311D}"/>
+              </a:ext>
+            </a:extLst>
+          </p:cNvPr>
+          <p:cNvSpPr>
+            <a:spLocks noGrp="1"/>
+          </p:cNvSpPr>
+          <p:nvPr>
+            <p:ph type="title"/>
+          </p:nvPr>
+        </p:nvSpPr>
+        <p:spPr>
+          <a:xfrm>
+            <a:off x="1143000" y="308344"/>
+            <a:ext cx="9905998" cy="984995"/>
+          </a:xfrm>
+        </p:spPr>
+        <p:txBody>
+          <a:bodyPr/>
+          <a:lstStyle/>
+          <a:p>
+            <a:pPr algn="ctr"/>
+            <a:r>
+              <a:rPr lang="en-US" b="1" dirty="0"/>
+              <a:t>Code Example</a:t>
+            </a:r>
+          </a:p>
+        </p:txBody>
+      </p:sp>
+      <p:pic>
+        <p:nvPicPr>
+          <p:cNvPr id="5" name="Content Placeholder 4">
+            <a:extLst>
+              <a:ext uri="{FF2B5EF4-FFF2-40B4-BE49-F238E27FC236}">
+                <a16:creationId xmlns:a16="http://schemas.microsoft.com/office/drawing/2014/main" id="{9E6B4610-E15A-4BB0-9586-626B16A1BAA4}"/>
+              </a:ext>
+            </a:extLst>
+          </p:cNvPr>
+          <p:cNvPicPr>
+            <a:picLocks noGrp="1" noChangeAspect="1"/>
+          </p:cNvPicPr>
+          <p:nvPr>
+            <p:ph idx="1"/>
+          </p:nvPr>
+        </p:nvPicPr>
+        <p:blipFill>
+          <a:blip r:embed="rId2"/>
+          <a:srcRect/>
+          <a:stretch/>
+        </p:blipFill>
+        <p:spPr>
+          <a:xfrm>
+            <a:off x="1946108" y="1301265"/>
+            <a:ext cx="8299783" cy="5248391"/>
+          </a:xfrm>
+          <a:prstGeom prst="rect">
+            <a:avLst/>
+          </a:prstGeom>
+          <a:ln w="57150" cap="sq" cmpd="thickThin">
+            <a:solidFill>
+              <a:srgbClr val="000000"/>
+            </a:solidFill>
+            <a:prstDash val="solid"/>
+            <a:bevel/>
+          </a:ln>
+          <a:effectLst>
+            <a:outerShdw blurRad="50800" dist="38100" dir="2700000" algn="tl" rotWithShape="0">
+              <a:srgbClr val="000000">
+                <a:alpha val="43000"/>
+              </a:srgbClr>
+            </a:outerShdw>
+          </a:effectLst>
+        </p:spPr>
+      </p:pic>
+    </p:spTree>
+    <p:extLst>
+      <p:ext uri="{BB962C8B-B14F-4D97-AF65-F5344CB8AC3E}">
+        <p14:creationId xmlns:p14="http://schemas.microsoft.com/office/powerpoint/2010/main" val="3037934964"/>
+      </p:ext>
+    </p:extLst>
+  </p:cSld>
+  <p:clrMapOvr>
+    <a:masterClrMapping/>
+  </p:clrMapOvr>
+</p:sld>
+</file>
+
+<file path=ppt/slides/slide3.xml><?xml version="1.0" encoding="utf-8"?>
+<p:sld xmlns:a="http://schemas.openxmlformats.org/drawingml/2006/main" xmlns:r="http://schemas.openxmlformats.org/officeDocument/2006/relationships" xmlns:p="http://schemas.openxmlformats.org/presentationml/2006/main">
+  <p:cSld>
+    <p:spTree>
+      <p:nvGrpSpPr>
+        <p:cNvPr id="1" name=""/>
+        <p:cNvGrpSpPr/>
+        <p:nvPr/>
+      </p:nvGrpSpPr>
+      <p:grpSpPr>
+        <a:xfrm>
+          <a:off x="0" y="0"/>
+          <a:ext cx="0" cy="0"/>
+          <a:chOff x="0" y="0"/>
+          <a:chExt cx="0" cy="0"/>
+        </a:xfrm>
+      </p:grpSpPr>
+      <p:graphicFrame>
+        <p:nvGraphicFramePr>
+          <p:cNvPr id="4" name="Content Placeholder 3">
+            <a:extLst>
+              <a:ext uri="{FF2B5EF4-FFF2-40B4-BE49-F238E27FC236}">
+                <a16:creationId xmlns:a16="http://schemas.microsoft.com/office/drawing/2014/main" id="{6EFA361D-71C1-4B25-BAFB-EBBC7863C809}"/>
+              </a:ext>
+            </a:extLst>
+          </p:cNvPr>
+          <p:cNvGraphicFramePr>
+            <a:graphicFrameLocks noGrp="1"/>
+          </p:cNvGraphicFramePr>
+          <p:nvPr>
+            <p:ph idx="1"/>
+            <p:extLst>
+              <p:ext uri="{D42A27DB-BD31-4B8C-83A1-F6EECF244321}">
+                <p14:modId xmlns:p14="http://schemas.microsoft.com/office/powerpoint/2010/main" val="3837899662"/>
+              </p:ext>
+            </p:extLst>
+          </p:nvPr>
+        </p:nvGraphicFramePr>
+        <p:xfrm>
+          <a:off x="1036119" y="400051"/>
+          <a:ext cx="10119761" cy="6199532"/>
+        </p:xfrm>
+        <a:graphic>
+          <a:graphicData uri="http://schemas.openxmlformats.org/drawingml/2006/chart">
+            <c:chart xmlns:c="http://schemas.openxmlformats.org/drawingml/2006/chart" xmlns:r="http://schemas.openxmlformats.org/officeDocument/2006/relationships" r:id="rId2"/>
+          </a:graphicData>
+        </a:graphic>
+      </p:graphicFrame>
+    </p:spTree>
+    <p:extLst>
+      <p:ext uri="{BB962C8B-B14F-4D97-AF65-F5344CB8AC3E}">
+        <p14:creationId xmlns:p14="http://schemas.microsoft.com/office/powerpoint/2010/main" val="119355397"/>
+      </p:ext>
+    </p:extLst>
+  </p:cSld>
+  <p:clrMapOvr>
+    <a:masterClrMapping/>
+  </p:clrMapOvr>
+</p:sld>
+</file>
+
+<file path=ppt/slides/slide4.xml><?xml version="1.0" encoding="utf-8"?>
 <p:sld xmlns:a="http://schemas.openxmlformats.org/drawingml/2006/main" xmlns:r="http://schemas.openxmlformats.org/officeDocument/2006/relationships" xmlns:p="http://schemas.openxmlformats.org/presentationml/2006/main">
   <p:cSld>
     <p:bg>
@@ -21309,7 +22866,7 @@
         </p:nvSpPr>
         <p:spPr>
           <a:xfrm>
-            <a:off x="1141413" y="553430"/>
+            <a:off x="1141411" y="410555"/>
             <a:ext cx="9905998" cy="1478570"/>
           </a:xfrm>
         </p:spPr>
@@ -21321,15 +22878,15 @@
           <a:p>
             <a:pPr algn="ctr"/>
             <a:r>
-              <a:rPr lang="en-US" dirty="0"/>
-              <a:t>Total Values of V2 for Proteins At 100 </a:t>
+              <a:rPr lang="en-US" b="1" cap="none" dirty="0"/>
+              <a:t>Total Values Of V2 For Proteins At 100 </a:t>
             </a:r>
             <a:br>
-              <a:rPr lang="en-US" dirty="0"/>
+              <a:rPr lang="en-US" b="1" cap="none" dirty="0"/>
             </a:br>
             <a:r>
-              <a:rPr lang="en-US" dirty="0"/>
-              <a:t>and 1000 Projection Sizes</a:t>
+              <a:rPr lang="en-US" b="1" cap="none" dirty="0"/>
+              <a:t>And 1000 Projection Sizes</a:t>
             </a:r>
           </a:p>
         </p:txBody>
@@ -21350,14 +22907,14 @@
             <p:ph idx="1"/>
             <p:extLst>
               <p:ext uri="{D42A27DB-BD31-4B8C-83A1-F6EECF244321}">
-                <p14:modId xmlns:p14="http://schemas.microsoft.com/office/powerpoint/2010/main" val="3554641124"/>
+                <p14:modId xmlns:p14="http://schemas.microsoft.com/office/powerpoint/2010/main" val="341086242"/>
               </p:ext>
             </p:extLst>
           </p:nvPr>
         </p:nvGraphicFramePr>
         <p:xfrm>
-          <a:off x="1141411" y="1921933"/>
-          <a:ext cx="9906000" cy="4673600"/>
+          <a:off x="1141411" y="1271588"/>
+          <a:ext cx="9906000" cy="5323945"/>
         </p:xfrm>
         <a:graphic>
           <a:graphicData uri="http://schemas.openxmlformats.org/drawingml/2006/chart">
@@ -21378,7 +22935,7 @@
 </p:sld>
 </file>
 
-<file path=ppt/slides/slide3.xml><?xml version="1.0" encoding="utf-8"?>
+<file path=ppt/slides/slide5.xml><?xml version="1.0" encoding="utf-8"?>
 <p:sld xmlns:a="http://schemas.openxmlformats.org/drawingml/2006/main" xmlns:r="http://schemas.openxmlformats.org/officeDocument/2006/relationships" xmlns:p="http://schemas.openxmlformats.org/presentationml/2006/main">
   <p:cSld>
     <p:bg>
@@ -21437,7 +22994,7 @@
         </p:nvSpPr>
         <p:spPr>
           <a:xfrm>
-            <a:off x="1141413" y="553430"/>
+            <a:off x="1141415" y="417963"/>
             <a:ext cx="9905998" cy="1478570"/>
           </a:xfrm>
         </p:spPr>
@@ -21449,15 +23006,15 @@
           <a:p>
             <a:pPr algn="ctr"/>
             <a:r>
-              <a:rPr lang="en-US" dirty="0"/>
-              <a:t>Total Values of V2 for Proteins At 1000 </a:t>
+              <a:rPr lang="en-US" b="1" cap="none" dirty="0"/>
+              <a:t>Total Values Of V2 For Proteins At 1000 </a:t>
             </a:r>
             <a:br>
-              <a:rPr lang="en-US" dirty="0"/>
+              <a:rPr lang="en-US" b="1" cap="none" dirty="0"/>
             </a:br>
             <a:r>
-              <a:rPr lang="en-US" dirty="0"/>
-              <a:t>and 2000 Projection Sizes</a:t>
+              <a:rPr lang="en-US" b="1" cap="none" dirty="0"/>
+              <a:t>And 2000 Projection Sizes</a:t>
             </a:r>
           </a:p>
         </p:txBody>
@@ -21478,14 +23035,14 @@
             <p:ph idx="1"/>
             <p:extLst>
               <p:ext uri="{D42A27DB-BD31-4B8C-83A1-F6EECF244321}">
-                <p14:modId xmlns:p14="http://schemas.microsoft.com/office/powerpoint/2010/main" val="433661735"/>
+                <p14:modId xmlns:p14="http://schemas.microsoft.com/office/powerpoint/2010/main" val="1345942409"/>
               </p:ext>
             </p:extLst>
           </p:nvPr>
         </p:nvGraphicFramePr>
         <p:xfrm>
-          <a:off x="1141413" y="1896533"/>
-          <a:ext cx="9906000" cy="4753081"/>
+          <a:off x="1141413" y="1543050"/>
+          <a:ext cx="9906000" cy="5106565"/>
         </p:xfrm>
         <a:graphic>
           <a:graphicData uri="http://schemas.openxmlformats.org/drawingml/2006/chart">
@@ -21506,7 +23063,7 @@
 </p:sld>
 </file>
 
-<file path=ppt/slides/slide4.xml><?xml version="1.0" encoding="utf-8"?>
+<file path=ppt/slides/slide6.xml><?xml version="1.0" encoding="utf-8"?>
 <p:sld xmlns:a="http://schemas.openxmlformats.org/drawingml/2006/main" xmlns:r="http://schemas.openxmlformats.org/officeDocument/2006/relationships" xmlns:p="http://schemas.openxmlformats.org/presentationml/2006/main">
   <p:cSld>
     <p:spTree>
@@ -21601,7 +23158,7 @@
 </p:sld>
 </file>
 
-<file path=ppt/slides/slide5.xml><?xml version="1.0" encoding="utf-8"?>
+<file path=ppt/slides/slide7.xml><?xml version="1.0" encoding="utf-8"?>
 <p:sld xmlns:a="http://schemas.openxmlformats.org/drawingml/2006/main" xmlns:r="http://schemas.openxmlformats.org/officeDocument/2006/relationships" xmlns:p="http://schemas.openxmlformats.org/presentationml/2006/main">
   <p:cSld>
     <p:spTree>
@@ -21694,7 +23251,7 @@
 </p:sld>
 </file>
 
-<file path=ppt/slides/slide6.xml><?xml version="1.0" encoding="utf-8"?>
+<file path=ppt/slides/slide8.xml><?xml version="1.0" encoding="utf-8"?>
 <p:sld xmlns:a="http://schemas.openxmlformats.org/drawingml/2006/main" xmlns:r="http://schemas.openxmlformats.org/officeDocument/2006/relationships" xmlns:p="http://schemas.openxmlformats.org/presentationml/2006/main">
   <p:cSld>
     <p:spTree>
@@ -21816,7 +23373,7 @@
 </p:sld>
 </file>
 
-<file path=ppt/slides/slide7.xml><?xml version="1.0" encoding="utf-8"?>
+<file path=ppt/slides/slide9.xml><?xml version="1.0" encoding="utf-8"?>
 <p:sld xmlns:a="http://schemas.openxmlformats.org/drawingml/2006/main" xmlns:r="http://schemas.openxmlformats.org/officeDocument/2006/relationships" xmlns:p="http://schemas.openxmlformats.org/presentationml/2006/main">
   <p:cSld>
     <p:spTree>
@@ -21899,258 +23456,6 @@
     <p:extLst>
       <p:ext uri="{BB962C8B-B14F-4D97-AF65-F5344CB8AC3E}">
         <p14:creationId xmlns:p14="http://schemas.microsoft.com/office/powerpoint/2010/main" val="769219942"/>
-      </p:ext>
-    </p:extLst>
-  </p:cSld>
-  <p:clrMapOvr>
-    <a:masterClrMapping/>
-  </p:clrMapOvr>
-</p:sld>
-</file>
-
-<file path=ppt/slides/slide8.xml><?xml version="1.0" encoding="utf-8"?>
-<p:sld xmlns:a="http://schemas.openxmlformats.org/drawingml/2006/main" xmlns:r="http://schemas.openxmlformats.org/officeDocument/2006/relationships" xmlns:p="http://schemas.openxmlformats.org/presentationml/2006/main">
-  <p:cSld>
-    <p:spTree>
-      <p:nvGrpSpPr>
-        <p:cNvPr id="1" name=""/>
-        <p:cNvGrpSpPr/>
-        <p:nvPr/>
-      </p:nvGrpSpPr>
-      <p:grpSpPr>
-        <a:xfrm>
-          <a:off x="0" y="0"/>
-          <a:ext cx="0" cy="0"/>
-          <a:chOff x="0" y="0"/>
-          <a:chExt cx="0" cy="0"/>
-        </a:xfrm>
-      </p:grpSpPr>
-      <p:sp>
-        <p:nvSpPr>
-          <p:cNvPr id="2" name="Title 1">
-            <a:extLst>
-              <a:ext uri="{FF2B5EF4-FFF2-40B4-BE49-F238E27FC236}">
-                <a16:creationId xmlns:a16="http://schemas.microsoft.com/office/drawing/2014/main" id="{460CC986-6E9C-45CB-8313-5E7E3ACDAE66}"/>
-              </a:ext>
-            </a:extLst>
-          </p:cNvPr>
-          <p:cNvSpPr>
-            <a:spLocks noGrp="1"/>
-          </p:cNvSpPr>
-          <p:nvPr>
-            <p:ph type="title"/>
-          </p:nvPr>
-        </p:nvSpPr>
-        <p:spPr>
-          <a:xfrm>
-            <a:off x="1143001" y="773084"/>
-            <a:ext cx="9905998" cy="1085591"/>
-          </a:xfrm>
-        </p:spPr>
-        <p:txBody>
-          <a:bodyPr/>
-          <a:lstStyle/>
-          <a:p>
-            <a:pPr algn="ctr"/>
-            <a:r>
-              <a:rPr lang="en-US" dirty="0"/>
-              <a:t>V2 along RBD-Up Proteins at 400 and 600 Scanning lengths</a:t>
-            </a:r>
-          </a:p>
-        </p:txBody>
-      </p:sp>
-      <p:pic>
-        <p:nvPicPr>
-          <p:cNvPr id="6" name="Content Placeholder 5">
-            <a:extLst>
-              <a:ext uri="{FF2B5EF4-FFF2-40B4-BE49-F238E27FC236}">
-                <a16:creationId xmlns:a16="http://schemas.microsoft.com/office/drawing/2014/main" id="{810A33BA-B2D5-40F9-AA4F-ECBC134F77F1}"/>
-              </a:ext>
-            </a:extLst>
-          </p:cNvPr>
-          <p:cNvPicPr>
-            <a:picLocks noGrp="1" noChangeAspect="1"/>
-          </p:cNvPicPr>
-          <p:nvPr>
-            <p:ph sz="half" idx="1"/>
-          </p:nvPr>
-        </p:nvPicPr>
-        <p:blipFill>
-          <a:blip r:embed="rId2"/>
-          <a:srcRect/>
-          <a:stretch/>
-        </p:blipFill>
-        <p:spPr>
-          <a:xfrm>
-            <a:off x="-3" y="2046770"/>
-            <a:ext cx="6316747" cy="4038146"/>
-          </a:xfrm>
-        </p:spPr>
-      </p:pic>
-      <p:pic>
-        <p:nvPicPr>
-          <p:cNvPr id="8" name="Content Placeholder 7">
-            <a:extLst>
-              <a:ext uri="{FF2B5EF4-FFF2-40B4-BE49-F238E27FC236}">
-                <a16:creationId xmlns:a16="http://schemas.microsoft.com/office/drawing/2014/main" id="{79C85902-B13D-4741-9398-46C2799F3C8B}"/>
-              </a:ext>
-            </a:extLst>
-          </p:cNvPr>
-          <p:cNvPicPr>
-            <a:picLocks noGrp="1" noChangeAspect="1"/>
-          </p:cNvPicPr>
-          <p:nvPr>
-            <p:ph sz="half" idx="2"/>
-          </p:nvPr>
-        </p:nvPicPr>
-        <p:blipFill>
-          <a:blip r:embed="rId3"/>
-          <a:srcRect/>
-          <a:stretch/>
-        </p:blipFill>
-        <p:spPr>
-          <a:xfrm>
-            <a:off x="5875249" y="2046770"/>
-            <a:ext cx="6316750" cy="4038146"/>
-          </a:xfrm>
-        </p:spPr>
-      </p:pic>
-    </p:spTree>
-    <p:extLst>
-      <p:ext uri="{BB962C8B-B14F-4D97-AF65-F5344CB8AC3E}">
-        <p14:creationId xmlns:p14="http://schemas.microsoft.com/office/powerpoint/2010/main" val="1727561536"/>
-      </p:ext>
-    </p:extLst>
-  </p:cSld>
-  <p:clrMapOvr>
-    <a:masterClrMapping/>
-  </p:clrMapOvr>
-</p:sld>
-</file>
-
-<file path=ppt/slides/slide9.xml><?xml version="1.0" encoding="utf-8"?>
-<p:sld xmlns:a="http://schemas.openxmlformats.org/drawingml/2006/main" xmlns:r="http://schemas.openxmlformats.org/officeDocument/2006/relationships" xmlns:p="http://schemas.openxmlformats.org/presentationml/2006/main">
-  <p:cSld>
-    <p:spTree>
-      <p:nvGrpSpPr>
-        <p:cNvPr id="1" name=""/>
-        <p:cNvGrpSpPr/>
-        <p:nvPr/>
-      </p:nvGrpSpPr>
-      <p:grpSpPr>
-        <a:xfrm>
-          <a:off x="0" y="0"/>
-          <a:ext cx="0" cy="0"/>
-          <a:chOff x="0" y="0"/>
-          <a:chExt cx="0" cy="0"/>
-        </a:xfrm>
-      </p:grpSpPr>
-      <p:pic>
-        <p:nvPicPr>
-          <p:cNvPr id="9" name="Picture Placeholder 8" descr="Abstract organic polygons blurred">
-            <a:extLst>
-              <a:ext uri="{FF2B5EF4-FFF2-40B4-BE49-F238E27FC236}">
-                <a16:creationId xmlns:a16="http://schemas.microsoft.com/office/drawing/2014/main" id="{2D73DA0F-7DB4-4B1A-8B34-4F00DA6DD026}"/>
-              </a:ext>
-            </a:extLst>
-          </p:cNvPr>
-          <p:cNvPicPr>
-            <a:picLocks noGrp="1" noChangeAspect="1"/>
-          </p:cNvPicPr>
-          <p:nvPr>
-            <p:ph type="pic" sz="quarter" idx="16"/>
-          </p:nvPr>
-        </p:nvPicPr>
-        <p:blipFill rotWithShape="1">
-          <a:blip r:embed="rId2" cstate="screen">
-            <a:extLst>
-              <a:ext uri="{28A0092B-C50C-407E-A947-70E740481C1C}">
-                <a14:useLocalDpi xmlns:a14="http://schemas.microsoft.com/office/drawing/2010/main"/>
-              </a:ext>
-            </a:extLst>
-          </a:blip>
-          <a:srcRect/>
-          <a:stretch/>
-        </p:blipFill>
-        <p:spPr>
-          <a:xfrm>
-            <a:off x="-1" y="-1"/>
-            <a:ext cx="5858933" cy="6858219"/>
-          </a:xfrm>
-        </p:spPr>
-      </p:pic>
-      <p:sp>
-        <p:nvSpPr>
-          <p:cNvPr id="2" name="Title 1">
-            <a:extLst>
-              <a:ext uri="{FF2B5EF4-FFF2-40B4-BE49-F238E27FC236}">
-                <a16:creationId xmlns:a16="http://schemas.microsoft.com/office/drawing/2014/main" id="{A6BA76B3-D03C-4451-8EB4-18D3076077B3}"/>
-              </a:ext>
-            </a:extLst>
-          </p:cNvPr>
-          <p:cNvSpPr>
-            <a:spLocks noGrp="1"/>
-          </p:cNvSpPr>
-          <p:nvPr>
-            <p:ph type="title"/>
-          </p:nvPr>
-        </p:nvSpPr>
-        <p:spPr>
-          <a:xfrm>
-            <a:off x="6095999" y="766533"/>
-            <a:ext cx="5046134" cy="1305158"/>
-          </a:xfrm>
-        </p:spPr>
-        <p:txBody>
-          <a:bodyPr>
-            <a:normAutofit/>
-          </a:bodyPr>
-          <a:lstStyle/>
-          <a:p>
-            <a:r>
-              <a:rPr lang="en-US" sz="7200" dirty="0"/>
-              <a:t>THANK YOU</a:t>
-            </a:r>
-          </a:p>
-        </p:txBody>
-      </p:sp>
-      <p:sp>
-        <p:nvSpPr>
-          <p:cNvPr id="4" name="Content Placeholder 3">
-            <a:extLst>
-              <a:ext uri="{FF2B5EF4-FFF2-40B4-BE49-F238E27FC236}">
-                <a16:creationId xmlns:a16="http://schemas.microsoft.com/office/drawing/2014/main" id="{5F0977C3-BD7D-4617-8DF1-56211456D512}"/>
-              </a:ext>
-            </a:extLst>
-          </p:cNvPr>
-          <p:cNvSpPr>
-            <a:spLocks noGrp="1"/>
-          </p:cNvSpPr>
-          <p:nvPr>
-            <p:ph sz="half" idx="1"/>
-          </p:nvPr>
-        </p:nvSpPr>
-        <p:spPr>
-          <a:xfrm>
-            <a:off x="6095999" y="2589839"/>
-            <a:ext cx="5046134" cy="3620161"/>
-          </a:xfrm>
-        </p:spPr>
-        <p:txBody>
-          <a:bodyPr/>
-          <a:lstStyle/>
-          <a:p>
-            <a:pPr marL="0" indent="0">
-              <a:buNone/>
-            </a:pPr>
-            <a:endParaRPr lang="en-US" dirty="0"/>
-          </a:p>
-        </p:txBody>
-      </p:sp>
-    </p:spTree>
-    <p:extLst>
-      <p:ext uri="{BB962C8B-B14F-4D97-AF65-F5344CB8AC3E}">
-        <p14:creationId xmlns:p14="http://schemas.microsoft.com/office/powerpoint/2010/main" val="3050793910"/>
       </p:ext>
     </p:extLst>
   </p:cSld>

</xml_diff>

<commit_message>
Update Domain Structure Data, Attempt Graph Update
Attempted to update grouped graphs so that the section missing from 6zgh would be more obviously missing data, also rearranged the proteins in the Wild Proteins graphs (6zg*) so that the proteins are in the correct order.
Also added more complete domain structure info to both Vas-Figures and, in the form of the original source plot, to FinalPresentation.
</commit_message>
<xml_diff>
--- a/Vas-Data/FinalPresentation.pptx
+++ b/Vas-Data/FinalPresentation.pptx
@@ -4,6 +4,9 @@
   <p:sldMasterIdLst>
     <p:sldMasterId id="2147483648" r:id="rId1"/>
   </p:sldMasterIdLst>
+  <p:notesMasterIdLst>
+    <p:notesMasterId r:id="rId13"/>
+  </p:notesMasterIdLst>
   <p:sldIdLst>
     <p:sldId id="256" r:id="rId2"/>
     <p:sldId id="275" r:id="rId3"/>
@@ -3638,6 +3641,355 @@
 </cs:chartStyle>
 </file>
 
+<file path=ppt/notesMasters/notesMaster1.xml><?xml version="1.0" encoding="utf-8"?>
+<p:notesMaster xmlns:a="http://schemas.openxmlformats.org/drawingml/2006/main" xmlns:r="http://schemas.openxmlformats.org/officeDocument/2006/relationships" xmlns:p="http://schemas.openxmlformats.org/presentationml/2006/main">
+  <p:cSld>
+    <p:bg>
+      <p:bgRef idx="1001">
+        <a:schemeClr val="bg1"/>
+      </p:bgRef>
+    </p:bg>
+    <p:spTree>
+      <p:nvGrpSpPr>
+        <p:cNvPr id="1" name=""/>
+        <p:cNvGrpSpPr/>
+        <p:nvPr/>
+      </p:nvGrpSpPr>
+      <p:grpSpPr>
+        <a:xfrm>
+          <a:off x="0" y="0"/>
+          <a:ext cx="0" cy="0"/>
+          <a:chOff x="0" y="0"/>
+          <a:chExt cx="0" cy="0"/>
+        </a:xfrm>
+      </p:grpSpPr>
+      <p:sp>
+        <p:nvSpPr>
+          <p:cNvPr id="2" name="Header Placeholder 1"/>
+          <p:cNvSpPr>
+            <a:spLocks noGrp="1"/>
+          </p:cNvSpPr>
+          <p:nvPr>
+            <p:ph type="hdr" sz="quarter"/>
+          </p:nvPr>
+        </p:nvSpPr>
+        <p:spPr>
+          <a:xfrm>
+            <a:off x="0" y="0"/>
+            <a:ext cx="2971800" cy="458788"/>
+          </a:xfrm>
+          <a:prstGeom prst="rect">
+            <a:avLst/>
+          </a:prstGeom>
+        </p:spPr>
+        <p:txBody>
+          <a:bodyPr vert="horz" lIns="91440" tIns="45720" rIns="91440" bIns="45720" rtlCol="0"/>
+          <a:lstStyle>
+            <a:lvl1pPr algn="l">
+              <a:defRPr sz="1200"/>
+            </a:lvl1pPr>
+          </a:lstStyle>
+          <a:p>
+            <a:endParaRPr lang="en-US"/>
+          </a:p>
+        </p:txBody>
+      </p:sp>
+      <p:sp>
+        <p:nvSpPr>
+          <p:cNvPr id="3" name="Date Placeholder 2"/>
+          <p:cNvSpPr>
+            <a:spLocks noGrp="1"/>
+          </p:cNvSpPr>
+          <p:nvPr>
+            <p:ph type="dt" idx="1"/>
+          </p:nvPr>
+        </p:nvSpPr>
+        <p:spPr>
+          <a:xfrm>
+            <a:off x="3884613" y="0"/>
+            <a:ext cx="2971800" cy="458788"/>
+          </a:xfrm>
+          <a:prstGeom prst="rect">
+            <a:avLst/>
+          </a:prstGeom>
+        </p:spPr>
+        <p:txBody>
+          <a:bodyPr vert="horz" lIns="91440" tIns="45720" rIns="91440" bIns="45720" rtlCol="0"/>
+          <a:lstStyle>
+            <a:lvl1pPr algn="r">
+              <a:defRPr sz="1200"/>
+            </a:lvl1pPr>
+          </a:lstStyle>
+          <a:p>
+            <a:fld id="{FB0D78C5-FAF4-4263-84DD-579F970B9B04}" type="datetimeFigureOut">
+              <a:rPr lang="en-US" smtClean="0"/>
+              <a:t>7/13/2021</a:t>
+            </a:fld>
+            <a:endParaRPr lang="en-US"/>
+          </a:p>
+        </p:txBody>
+      </p:sp>
+      <p:sp>
+        <p:nvSpPr>
+          <p:cNvPr id="4" name="Slide Image Placeholder 3"/>
+          <p:cNvSpPr>
+            <a:spLocks noGrp="1" noRot="1" noChangeAspect="1"/>
+          </p:cNvSpPr>
+          <p:nvPr>
+            <p:ph type="sldImg" idx="2"/>
+          </p:nvPr>
+        </p:nvSpPr>
+        <p:spPr>
+          <a:xfrm>
+            <a:off x="685800" y="1143000"/>
+            <a:ext cx="5486400" cy="3086100"/>
+          </a:xfrm>
+          <a:prstGeom prst="rect">
+            <a:avLst/>
+          </a:prstGeom>
+          <a:noFill/>
+          <a:ln w="12700">
+            <a:solidFill>
+              <a:prstClr val="black"/>
+            </a:solidFill>
+          </a:ln>
+        </p:spPr>
+        <p:txBody>
+          <a:bodyPr vert="horz" lIns="91440" tIns="45720" rIns="91440" bIns="45720" rtlCol="0" anchor="ctr"/>
+          <a:lstStyle/>
+          <a:p>
+            <a:endParaRPr lang="en-US"/>
+          </a:p>
+        </p:txBody>
+      </p:sp>
+      <p:sp>
+        <p:nvSpPr>
+          <p:cNvPr id="5" name="Notes Placeholder 4"/>
+          <p:cNvSpPr>
+            <a:spLocks noGrp="1"/>
+          </p:cNvSpPr>
+          <p:nvPr>
+            <p:ph type="body" sz="quarter" idx="3"/>
+          </p:nvPr>
+        </p:nvSpPr>
+        <p:spPr>
+          <a:xfrm>
+            <a:off x="685800" y="4400550"/>
+            <a:ext cx="5486400" cy="3600450"/>
+          </a:xfrm>
+          <a:prstGeom prst="rect">
+            <a:avLst/>
+          </a:prstGeom>
+        </p:spPr>
+        <p:txBody>
+          <a:bodyPr vert="horz" lIns="91440" tIns="45720" rIns="91440" bIns="45720" rtlCol="0"/>
+          <a:lstStyle/>
+          <a:p>
+            <a:pPr lvl="0"/>
+            <a:r>
+              <a:rPr lang="en-US"/>
+              <a:t>Click to edit Master text styles</a:t>
+            </a:r>
+          </a:p>
+          <a:p>
+            <a:pPr lvl="1"/>
+            <a:r>
+              <a:rPr lang="en-US"/>
+              <a:t>Second level</a:t>
+            </a:r>
+          </a:p>
+          <a:p>
+            <a:pPr lvl="2"/>
+            <a:r>
+              <a:rPr lang="en-US"/>
+              <a:t>Third level</a:t>
+            </a:r>
+          </a:p>
+          <a:p>
+            <a:pPr lvl="3"/>
+            <a:r>
+              <a:rPr lang="en-US"/>
+              <a:t>Fourth level</a:t>
+            </a:r>
+          </a:p>
+          <a:p>
+            <a:pPr lvl="4"/>
+            <a:r>
+              <a:rPr lang="en-US"/>
+              <a:t>Fifth level</a:t>
+            </a:r>
+          </a:p>
+        </p:txBody>
+      </p:sp>
+      <p:sp>
+        <p:nvSpPr>
+          <p:cNvPr id="6" name="Footer Placeholder 5"/>
+          <p:cNvSpPr>
+            <a:spLocks noGrp="1"/>
+          </p:cNvSpPr>
+          <p:nvPr>
+            <p:ph type="ftr" sz="quarter" idx="4"/>
+          </p:nvPr>
+        </p:nvSpPr>
+        <p:spPr>
+          <a:xfrm>
+            <a:off x="0" y="8685213"/>
+            <a:ext cx="2971800" cy="458787"/>
+          </a:xfrm>
+          <a:prstGeom prst="rect">
+            <a:avLst/>
+          </a:prstGeom>
+        </p:spPr>
+        <p:txBody>
+          <a:bodyPr vert="horz" lIns="91440" tIns="45720" rIns="91440" bIns="45720" rtlCol="0" anchor="b"/>
+          <a:lstStyle>
+            <a:lvl1pPr algn="l">
+              <a:defRPr sz="1200"/>
+            </a:lvl1pPr>
+          </a:lstStyle>
+          <a:p>
+            <a:endParaRPr lang="en-US"/>
+          </a:p>
+        </p:txBody>
+      </p:sp>
+      <p:sp>
+        <p:nvSpPr>
+          <p:cNvPr id="7" name="Slide Number Placeholder 6"/>
+          <p:cNvSpPr>
+            <a:spLocks noGrp="1"/>
+          </p:cNvSpPr>
+          <p:nvPr>
+            <p:ph type="sldNum" sz="quarter" idx="5"/>
+          </p:nvPr>
+        </p:nvSpPr>
+        <p:spPr>
+          <a:xfrm>
+            <a:off x="3884613" y="8685213"/>
+            <a:ext cx="2971800" cy="458787"/>
+          </a:xfrm>
+          <a:prstGeom prst="rect">
+            <a:avLst/>
+          </a:prstGeom>
+        </p:spPr>
+        <p:txBody>
+          <a:bodyPr vert="horz" lIns="91440" tIns="45720" rIns="91440" bIns="45720" rtlCol="0" anchor="b"/>
+          <a:lstStyle>
+            <a:lvl1pPr algn="r">
+              <a:defRPr sz="1200"/>
+            </a:lvl1pPr>
+          </a:lstStyle>
+          <a:p>
+            <a:fld id="{05E2BF2E-52C3-4B53-8A39-72F148B593BB}" type="slidenum">
+              <a:rPr lang="en-US" smtClean="0"/>
+              <a:t>‹#›</a:t>
+            </a:fld>
+            <a:endParaRPr lang="en-US"/>
+          </a:p>
+        </p:txBody>
+      </p:sp>
+    </p:spTree>
+    <p:extLst>
+      <p:ext uri="{BB962C8B-B14F-4D97-AF65-F5344CB8AC3E}">
+        <p14:creationId xmlns:p14="http://schemas.microsoft.com/office/powerpoint/2010/main" val="4101134621"/>
+      </p:ext>
+    </p:extLst>
+  </p:cSld>
+  <p:clrMap bg1="lt1" tx1="dk1" bg2="lt2" tx2="dk2" accent1="accent1" accent2="accent2" accent3="accent3" accent4="accent4" accent5="accent5" accent6="accent6" hlink="hlink" folHlink="folHlink"/>
+  <p:notesStyle>
+    <a:lvl1pPr marL="0" algn="l" defTabSz="914400" rtl="0" eaLnBrk="1" latinLnBrk="0" hangingPunct="1">
+      <a:defRPr sz="1200" kern="1200">
+        <a:solidFill>
+          <a:schemeClr val="tx1"/>
+        </a:solidFill>
+        <a:latin typeface="+mn-lt"/>
+        <a:ea typeface="+mn-ea"/>
+        <a:cs typeface="+mn-cs"/>
+      </a:defRPr>
+    </a:lvl1pPr>
+    <a:lvl2pPr marL="457200" algn="l" defTabSz="914400" rtl="0" eaLnBrk="1" latinLnBrk="0" hangingPunct="1">
+      <a:defRPr sz="1200" kern="1200">
+        <a:solidFill>
+          <a:schemeClr val="tx1"/>
+        </a:solidFill>
+        <a:latin typeface="+mn-lt"/>
+        <a:ea typeface="+mn-ea"/>
+        <a:cs typeface="+mn-cs"/>
+      </a:defRPr>
+    </a:lvl2pPr>
+    <a:lvl3pPr marL="914400" algn="l" defTabSz="914400" rtl="0" eaLnBrk="1" latinLnBrk="0" hangingPunct="1">
+      <a:defRPr sz="1200" kern="1200">
+        <a:solidFill>
+          <a:schemeClr val="tx1"/>
+        </a:solidFill>
+        <a:latin typeface="+mn-lt"/>
+        <a:ea typeface="+mn-ea"/>
+        <a:cs typeface="+mn-cs"/>
+      </a:defRPr>
+    </a:lvl3pPr>
+    <a:lvl4pPr marL="1371600" algn="l" defTabSz="914400" rtl="0" eaLnBrk="1" latinLnBrk="0" hangingPunct="1">
+      <a:defRPr sz="1200" kern="1200">
+        <a:solidFill>
+          <a:schemeClr val="tx1"/>
+        </a:solidFill>
+        <a:latin typeface="+mn-lt"/>
+        <a:ea typeface="+mn-ea"/>
+        <a:cs typeface="+mn-cs"/>
+      </a:defRPr>
+    </a:lvl4pPr>
+    <a:lvl5pPr marL="1828800" algn="l" defTabSz="914400" rtl="0" eaLnBrk="1" latinLnBrk="0" hangingPunct="1">
+      <a:defRPr sz="1200" kern="1200">
+        <a:solidFill>
+          <a:schemeClr val="tx1"/>
+        </a:solidFill>
+        <a:latin typeface="+mn-lt"/>
+        <a:ea typeface="+mn-ea"/>
+        <a:cs typeface="+mn-cs"/>
+      </a:defRPr>
+    </a:lvl5pPr>
+    <a:lvl6pPr marL="2286000" algn="l" defTabSz="914400" rtl="0" eaLnBrk="1" latinLnBrk="0" hangingPunct="1">
+      <a:defRPr sz="1200" kern="1200">
+        <a:solidFill>
+          <a:schemeClr val="tx1"/>
+        </a:solidFill>
+        <a:latin typeface="+mn-lt"/>
+        <a:ea typeface="+mn-ea"/>
+        <a:cs typeface="+mn-cs"/>
+      </a:defRPr>
+    </a:lvl6pPr>
+    <a:lvl7pPr marL="2743200" algn="l" defTabSz="914400" rtl="0" eaLnBrk="1" latinLnBrk="0" hangingPunct="1">
+      <a:defRPr sz="1200" kern="1200">
+        <a:solidFill>
+          <a:schemeClr val="tx1"/>
+        </a:solidFill>
+        <a:latin typeface="+mn-lt"/>
+        <a:ea typeface="+mn-ea"/>
+        <a:cs typeface="+mn-cs"/>
+      </a:defRPr>
+    </a:lvl7pPr>
+    <a:lvl8pPr marL="3200400" algn="l" defTabSz="914400" rtl="0" eaLnBrk="1" latinLnBrk="0" hangingPunct="1">
+      <a:defRPr sz="1200" kern="1200">
+        <a:solidFill>
+          <a:schemeClr val="tx1"/>
+        </a:solidFill>
+        <a:latin typeface="+mn-lt"/>
+        <a:ea typeface="+mn-ea"/>
+        <a:cs typeface="+mn-cs"/>
+      </a:defRPr>
+    </a:lvl8pPr>
+    <a:lvl9pPr marL="3657600" algn="l" defTabSz="914400" rtl="0" eaLnBrk="1" latinLnBrk="0" hangingPunct="1">
+      <a:defRPr sz="1200" kern="1200">
+        <a:solidFill>
+          <a:schemeClr val="tx1"/>
+        </a:solidFill>
+        <a:latin typeface="+mn-lt"/>
+        <a:ea typeface="+mn-ea"/>
+        <a:cs typeface="+mn-cs"/>
+      </a:defRPr>
+    </a:lvl9pPr>
+  </p:notesStyle>
+</p:notesMaster>
+</file>
+
 <file path=ppt/slideLayouts/slideLayout1.xml><?xml version="1.0" encoding="utf-8"?>
 <p:sldLayout xmlns:a="http://schemas.openxmlformats.org/drawingml/2006/main" xmlns:r="http://schemas.openxmlformats.org/officeDocument/2006/relationships" xmlns:p="http://schemas.openxmlformats.org/presentationml/2006/main" showMasterSp="0" type="title" preserve="1">
   <p:cSld name="Title Slide">
@@ -3695,7 +4047,7 @@
           <a:noFill/>
           <a:extLst>
             <a:ext uri="{909E8E84-426E-40dd-AFC4-6F175D3DCCD1}">
-              <a14:hiddenFill xmlns:a14="http://schemas.microsoft.com/office/drawing/2010/main" xmlns="">
+              <a14:hiddenFill xmlns="" xmlns:a14="http://schemas.microsoft.com/office/drawing/2010/main">
                 <a:solidFill>
                   <a:srgbClr val="FFFFFF"/>
                 </a:solidFill>
@@ -3754,7 +4106,7 @@
             </a:ln>
             <a:extLst>
               <a:ext uri="{91240B29-F687-4f45-9708-019B960494DF}">
-                <a14:hiddenLine xmlns:a14="http://schemas.microsoft.com/office/drawing/2010/main" xmlns="" w="9525">
+                <a14:hiddenLine xmlns="" xmlns:a14="http://schemas.microsoft.com/office/drawing/2010/main" w="9525">
                   <a:solidFill>
                     <a:srgbClr val="000000"/>
                   </a:solidFill>
@@ -3844,7 +4196,7 @@
             </a:ln>
             <a:extLst>
               <a:ext uri="{91240B29-F687-4f45-9708-019B960494DF}">
-                <a14:hiddenLine xmlns:a14="http://schemas.microsoft.com/office/drawing/2010/main" xmlns="" w="9525">
+                <a14:hiddenLine xmlns="" xmlns:a14="http://schemas.microsoft.com/office/drawing/2010/main" w="9525">
                   <a:solidFill>
                     <a:srgbClr val="000000"/>
                   </a:solidFill>
@@ -3934,7 +4286,7 @@
             </a:ln>
             <a:extLst>
               <a:ext uri="{91240B29-F687-4f45-9708-019B960494DF}">
-                <a14:hiddenLine xmlns:a14="http://schemas.microsoft.com/office/drawing/2010/main" xmlns="" w="9525">
+                <a14:hiddenLine xmlns="" xmlns:a14="http://schemas.microsoft.com/office/drawing/2010/main" w="9525">
                   <a:solidFill>
                     <a:srgbClr val="000000"/>
                   </a:solidFill>
@@ -3968,7 +4320,7 @@
             </a:ln>
             <a:extLst>
               <a:ext uri="{91240B29-F687-4f45-9708-019B960494DF}">
-                <a14:hiddenLine xmlns:a14="http://schemas.microsoft.com/office/drawing/2010/main" xmlns="" w="9525">
+                <a14:hiddenLine xmlns="" xmlns:a14="http://schemas.microsoft.com/office/drawing/2010/main" w="9525">
                   <a:solidFill>
                     <a:srgbClr val="000000"/>
                   </a:solidFill>
@@ -4058,7 +4410,7 @@
             </a:ln>
             <a:extLst>
               <a:ext uri="{91240B29-F687-4f45-9708-019B960494DF}">
-                <a14:hiddenLine xmlns:a14="http://schemas.microsoft.com/office/drawing/2010/main" xmlns="" w="9525">
+                <a14:hiddenLine xmlns="" xmlns:a14="http://schemas.microsoft.com/office/drawing/2010/main" w="9525">
                   <a:solidFill>
                     <a:srgbClr val="000000"/>
                   </a:solidFill>
@@ -4120,7 +4472,7 @@
             </a:ln>
             <a:extLst>
               <a:ext uri="{91240B29-F687-4f45-9708-019B960494DF}">
-                <a14:hiddenLine xmlns:a14="http://schemas.microsoft.com/office/drawing/2010/main" xmlns="" w="9525">
+                <a14:hiddenLine xmlns="" xmlns:a14="http://schemas.microsoft.com/office/drawing/2010/main" w="9525">
                   <a:solidFill>
                     <a:srgbClr val="000000"/>
                   </a:solidFill>
@@ -4182,7 +4534,7 @@
             </a:ln>
             <a:extLst>
               <a:ext uri="{91240B29-F687-4f45-9708-019B960494DF}">
-                <a14:hiddenLine xmlns:a14="http://schemas.microsoft.com/office/drawing/2010/main" xmlns="" w="9525">
+                <a14:hiddenLine xmlns="" xmlns:a14="http://schemas.microsoft.com/office/drawing/2010/main" w="9525">
                   <a:solidFill>
                     <a:srgbClr val="000000"/>
                   </a:solidFill>
@@ -4272,7 +4624,7 @@
             </a:ln>
             <a:extLst>
               <a:ext uri="{91240B29-F687-4f45-9708-019B960494DF}">
-                <a14:hiddenLine xmlns:a14="http://schemas.microsoft.com/office/drawing/2010/main" xmlns="" w="9525">
+                <a14:hiddenLine xmlns="" xmlns:a14="http://schemas.microsoft.com/office/drawing/2010/main" w="9525">
                   <a:solidFill>
                     <a:srgbClr val="000000"/>
                   </a:solidFill>
@@ -4334,7 +4686,7 @@
             </a:ln>
             <a:extLst>
               <a:ext uri="{91240B29-F687-4f45-9708-019B960494DF}">
-                <a14:hiddenLine xmlns:a14="http://schemas.microsoft.com/office/drawing/2010/main" xmlns="" w="9525">
+                <a14:hiddenLine xmlns="" xmlns:a14="http://schemas.microsoft.com/office/drawing/2010/main" w="9525">
                   <a:solidFill>
                     <a:srgbClr val="000000"/>
                   </a:solidFill>
@@ -4396,7 +4748,7 @@
             </a:ln>
             <a:extLst>
               <a:ext uri="{91240B29-F687-4f45-9708-019B960494DF}">
-                <a14:hiddenLine xmlns:a14="http://schemas.microsoft.com/office/drawing/2010/main" xmlns="" w="9525">
+                <a14:hiddenLine xmlns="" xmlns:a14="http://schemas.microsoft.com/office/drawing/2010/main" w="9525">
                   <a:solidFill>
                     <a:srgbClr val="000000"/>
                   </a:solidFill>
@@ -4486,7 +4838,7 @@
             </a:ln>
             <a:extLst>
               <a:ext uri="{91240B29-F687-4f45-9708-019B960494DF}">
-                <a14:hiddenLine xmlns:a14="http://schemas.microsoft.com/office/drawing/2010/main" xmlns="" w="9525">
+                <a14:hiddenLine xmlns="" xmlns:a14="http://schemas.microsoft.com/office/drawing/2010/main" w="9525">
                   <a:solidFill>
                     <a:srgbClr val="000000"/>
                   </a:solidFill>
@@ -4576,7 +4928,7 @@
             </a:ln>
             <a:extLst>
               <a:ext uri="{91240B29-F687-4f45-9708-019B960494DF}">
-                <a14:hiddenLine xmlns:a14="http://schemas.microsoft.com/office/drawing/2010/main" xmlns="" w="9525">
+                <a14:hiddenLine xmlns="" xmlns:a14="http://schemas.microsoft.com/office/drawing/2010/main" w="9525">
                   <a:solidFill>
                     <a:srgbClr val="000000"/>
                   </a:solidFill>
@@ -4638,7 +4990,7 @@
             </a:ln>
             <a:extLst>
               <a:ext uri="{91240B29-F687-4f45-9708-019B960494DF}">
-                <a14:hiddenLine xmlns:a14="http://schemas.microsoft.com/office/drawing/2010/main" xmlns="" w="9525">
+                <a14:hiddenLine xmlns="" xmlns:a14="http://schemas.microsoft.com/office/drawing/2010/main" w="9525">
                   <a:solidFill>
                     <a:srgbClr val="000000"/>
                   </a:solidFill>
@@ -4748,7 +5100,7 @@
             </a:ln>
             <a:extLst>
               <a:ext uri="{91240B29-F687-4f45-9708-019B960494DF}">
-                <a14:hiddenLine xmlns:a14="http://schemas.microsoft.com/office/drawing/2010/main" xmlns="" w="9525">
+                <a14:hiddenLine xmlns="" xmlns:a14="http://schemas.microsoft.com/office/drawing/2010/main" w="9525">
                   <a:solidFill>
                     <a:srgbClr val="000000"/>
                   </a:solidFill>
@@ -4810,7 +5162,7 @@
             </a:ln>
             <a:extLst>
               <a:ext uri="{91240B29-F687-4f45-9708-019B960494DF}">
-                <a14:hiddenLine xmlns:a14="http://schemas.microsoft.com/office/drawing/2010/main" xmlns="" w="9525">
+                <a14:hiddenLine xmlns="" xmlns:a14="http://schemas.microsoft.com/office/drawing/2010/main" w="9525">
                   <a:solidFill>
                     <a:srgbClr val="000000"/>
                   </a:solidFill>
@@ -4900,7 +5252,7 @@
             </a:ln>
             <a:extLst>
               <a:ext uri="{91240B29-F687-4f45-9708-019B960494DF}">
-                <a14:hiddenLine xmlns:a14="http://schemas.microsoft.com/office/drawing/2010/main" xmlns="" w="9525">
+                <a14:hiddenLine xmlns="" xmlns:a14="http://schemas.microsoft.com/office/drawing/2010/main" w="9525">
                   <a:solidFill>
                     <a:srgbClr val="000000"/>
                   </a:solidFill>
@@ -4990,7 +5342,7 @@
             </a:ln>
             <a:extLst>
               <a:ext uri="{91240B29-F687-4f45-9708-019B960494DF}">
-                <a14:hiddenLine xmlns:a14="http://schemas.microsoft.com/office/drawing/2010/main" xmlns="" w="9525">
+                <a14:hiddenLine xmlns="" xmlns:a14="http://schemas.microsoft.com/office/drawing/2010/main" w="9525">
                   <a:solidFill>
                     <a:srgbClr val="000000"/>
                   </a:solidFill>
@@ -5052,7 +5404,7 @@
             </a:ln>
             <a:extLst>
               <a:ext uri="{91240B29-F687-4f45-9708-019B960494DF}">
-                <a14:hiddenLine xmlns:a14="http://schemas.microsoft.com/office/drawing/2010/main" xmlns="" w="9525">
+                <a14:hiddenLine xmlns="" xmlns:a14="http://schemas.microsoft.com/office/drawing/2010/main" w="9525">
                   <a:solidFill>
                     <a:srgbClr val="000000"/>
                   </a:solidFill>
@@ -5142,7 +5494,7 @@
             </a:ln>
             <a:extLst>
               <a:ext uri="{91240B29-F687-4f45-9708-019B960494DF}">
-                <a14:hiddenLine xmlns:a14="http://schemas.microsoft.com/office/drawing/2010/main" xmlns="" w="9525">
+                <a14:hiddenLine xmlns="" xmlns:a14="http://schemas.microsoft.com/office/drawing/2010/main" w="9525">
                   <a:solidFill>
                     <a:srgbClr val="000000"/>
                   </a:solidFill>
@@ -5232,7 +5584,7 @@
             </a:ln>
             <a:extLst>
               <a:ext uri="{91240B29-F687-4f45-9708-019B960494DF}">
-                <a14:hiddenLine xmlns:a14="http://schemas.microsoft.com/office/drawing/2010/main" xmlns="" w="9525">
+                <a14:hiddenLine xmlns="" xmlns:a14="http://schemas.microsoft.com/office/drawing/2010/main" w="9525">
                   <a:solidFill>
                     <a:srgbClr val="000000"/>
                   </a:solidFill>
@@ -5288,7 +5640,7 @@
             </a:ln>
             <a:extLst>
               <a:ext uri="{91240B29-F687-4f45-9708-019B960494DF}">
-                <a14:hiddenLine xmlns:a14="http://schemas.microsoft.com/office/drawing/2010/main" xmlns="" w="9525">
+                <a14:hiddenLine xmlns="" xmlns:a14="http://schemas.microsoft.com/office/drawing/2010/main" w="9525">
                   <a:solidFill>
                     <a:srgbClr val="000000"/>
                   </a:solidFill>
@@ -5378,7 +5730,7 @@
             </a:ln>
             <a:extLst>
               <a:ext uri="{91240B29-F687-4f45-9708-019B960494DF}">
-                <a14:hiddenLine xmlns:a14="http://schemas.microsoft.com/office/drawing/2010/main" xmlns="" w="9525">
+                <a14:hiddenLine xmlns="" xmlns:a14="http://schemas.microsoft.com/office/drawing/2010/main" w="9525">
                   <a:solidFill>
                     <a:srgbClr val="000000"/>
                   </a:solidFill>
@@ -5434,7 +5786,7 @@
             </a:ln>
             <a:extLst>
               <a:ext uri="{91240B29-F687-4f45-9708-019B960494DF}">
-                <a14:hiddenLine xmlns:a14="http://schemas.microsoft.com/office/drawing/2010/main" xmlns="" w="9525">
+                <a14:hiddenLine xmlns="" xmlns:a14="http://schemas.microsoft.com/office/drawing/2010/main" w="9525">
                   <a:solidFill>
                     <a:srgbClr val="000000"/>
                   </a:solidFill>
@@ -5524,7 +5876,7 @@
             </a:ln>
             <a:extLst>
               <a:ext uri="{91240B29-F687-4f45-9708-019B960494DF}">
-                <a14:hiddenLine xmlns:a14="http://schemas.microsoft.com/office/drawing/2010/main" xmlns="" w="9525">
+                <a14:hiddenLine xmlns="" xmlns:a14="http://schemas.microsoft.com/office/drawing/2010/main" w="9525">
                   <a:solidFill>
                     <a:srgbClr val="000000"/>
                   </a:solidFill>
@@ -5592,7 +5944,7 @@
             </a:ln>
             <a:extLst>
               <a:ext uri="{91240B29-F687-4f45-9708-019B960494DF}">
-                <a14:hiddenLine xmlns:a14="http://schemas.microsoft.com/office/drawing/2010/main" xmlns="" w="9525">
+                <a14:hiddenLine xmlns="" xmlns:a14="http://schemas.microsoft.com/office/drawing/2010/main" w="9525">
                   <a:solidFill>
                     <a:srgbClr val="000000"/>
                   </a:solidFill>
@@ -5682,7 +6034,7 @@
             </a:ln>
             <a:extLst>
               <a:ext uri="{91240B29-F687-4f45-9708-019B960494DF}">
-                <a14:hiddenLine xmlns:a14="http://schemas.microsoft.com/office/drawing/2010/main" xmlns="" w="9525">
+                <a14:hiddenLine xmlns="" xmlns:a14="http://schemas.microsoft.com/office/drawing/2010/main" w="9525">
                   <a:solidFill>
                     <a:srgbClr val="000000"/>
                   </a:solidFill>
@@ -5750,7 +6102,7 @@
             </a:ln>
             <a:extLst>
               <a:ext uri="{91240B29-F687-4f45-9708-019B960494DF}">
-                <a14:hiddenLine xmlns:a14="http://schemas.microsoft.com/office/drawing/2010/main" xmlns="" w="9525">
+                <a14:hiddenLine xmlns="" xmlns:a14="http://schemas.microsoft.com/office/drawing/2010/main" w="9525">
                   <a:solidFill>
                     <a:srgbClr val="000000"/>
                   </a:solidFill>
@@ -5840,7 +6192,7 @@
             </a:ln>
             <a:extLst>
               <a:ext uri="{91240B29-F687-4f45-9708-019B960494DF}">
-                <a14:hiddenLine xmlns:a14="http://schemas.microsoft.com/office/drawing/2010/main" xmlns="" w="9525">
+                <a14:hiddenLine xmlns="" xmlns:a14="http://schemas.microsoft.com/office/drawing/2010/main" w="9525">
                   <a:solidFill>
                     <a:srgbClr val="000000"/>
                   </a:solidFill>
@@ -5874,7 +6226,7 @@
             </a:ln>
             <a:extLst>
               <a:ext uri="{91240B29-F687-4f45-9708-019B960494DF}">
-                <a14:hiddenLine xmlns:a14="http://schemas.microsoft.com/office/drawing/2010/main" xmlns="" w="9525">
+                <a14:hiddenLine xmlns="" xmlns:a14="http://schemas.microsoft.com/office/drawing/2010/main" w="9525">
                   <a:solidFill>
                     <a:srgbClr val="000000"/>
                   </a:solidFill>
@@ -5964,7 +6316,7 @@
             </a:ln>
             <a:extLst>
               <a:ext uri="{91240B29-F687-4f45-9708-019B960494DF}">
-                <a14:hiddenLine xmlns:a14="http://schemas.microsoft.com/office/drawing/2010/main" xmlns="" w="9525">
+                <a14:hiddenLine xmlns="" xmlns:a14="http://schemas.microsoft.com/office/drawing/2010/main" w="9525">
                   <a:solidFill>
                     <a:srgbClr val="000000"/>
                   </a:solidFill>
@@ -6026,7 +6378,7 @@
             </a:ln>
             <a:extLst>
               <a:ext uri="{91240B29-F687-4f45-9708-019B960494DF}">
-                <a14:hiddenLine xmlns:a14="http://schemas.microsoft.com/office/drawing/2010/main" xmlns="" w="9525">
+                <a14:hiddenLine xmlns="" xmlns:a14="http://schemas.microsoft.com/office/drawing/2010/main" w="9525">
                   <a:solidFill>
                     <a:srgbClr val="000000"/>
                   </a:solidFill>
@@ -6088,7 +6440,7 @@
             </a:ln>
             <a:extLst>
               <a:ext uri="{91240B29-F687-4f45-9708-019B960494DF}">
-                <a14:hiddenLine xmlns:a14="http://schemas.microsoft.com/office/drawing/2010/main" xmlns="" w="9525">
+                <a14:hiddenLine xmlns="" xmlns:a14="http://schemas.microsoft.com/office/drawing/2010/main" w="9525">
                   <a:solidFill>
                     <a:srgbClr val="000000"/>
                   </a:solidFill>
@@ -6178,7 +6530,7 @@
             </a:ln>
             <a:extLst>
               <a:ext uri="{91240B29-F687-4f45-9708-019B960494DF}">
-                <a14:hiddenLine xmlns:a14="http://schemas.microsoft.com/office/drawing/2010/main" xmlns="" w="9525">
+                <a14:hiddenLine xmlns="" xmlns:a14="http://schemas.microsoft.com/office/drawing/2010/main" w="9525">
                   <a:solidFill>
                     <a:srgbClr val="000000"/>
                   </a:solidFill>
@@ -6246,7 +6598,7 @@
             </a:ln>
             <a:extLst>
               <a:ext uri="{91240B29-F687-4f45-9708-019B960494DF}">
-                <a14:hiddenLine xmlns:a14="http://schemas.microsoft.com/office/drawing/2010/main" xmlns="" w="9525">
+                <a14:hiddenLine xmlns="" xmlns:a14="http://schemas.microsoft.com/office/drawing/2010/main" w="9525">
                   <a:solidFill>
                     <a:srgbClr val="000000"/>
                   </a:solidFill>
@@ -6308,7 +6660,7 @@
             </a:ln>
             <a:extLst>
               <a:ext uri="{91240B29-F687-4f45-9708-019B960494DF}">
-                <a14:hiddenLine xmlns:a14="http://schemas.microsoft.com/office/drawing/2010/main" xmlns="" w="9525">
+                <a14:hiddenLine xmlns="" xmlns:a14="http://schemas.microsoft.com/office/drawing/2010/main" w="9525">
                   <a:solidFill>
                     <a:srgbClr val="000000"/>
                   </a:solidFill>
@@ -6398,7 +6750,7 @@
             </a:ln>
             <a:extLst>
               <a:ext uri="{91240B29-F687-4f45-9708-019B960494DF}">
-                <a14:hiddenLine xmlns:a14="http://schemas.microsoft.com/office/drawing/2010/main" xmlns="" w="9525">
+                <a14:hiddenLine xmlns="" xmlns:a14="http://schemas.microsoft.com/office/drawing/2010/main" w="9525">
                   <a:solidFill>
                     <a:srgbClr val="000000"/>
                   </a:solidFill>
@@ -6460,7 +6812,7 @@
             </a:ln>
             <a:extLst>
               <a:ext uri="{91240B29-F687-4f45-9708-019B960494DF}">
-                <a14:hiddenLine xmlns:a14="http://schemas.microsoft.com/office/drawing/2010/main" xmlns="" w="9525">
+                <a14:hiddenLine xmlns="" xmlns:a14="http://schemas.microsoft.com/office/drawing/2010/main" w="9525">
                   <a:solidFill>
                     <a:srgbClr val="000000"/>
                   </a:solidFill>
@@ -6550,7 +6902,7 @@
             </a:ln>
             <a:extLst>
               <a:ext uri="{91240B29-F687-4f45-9708-019B960494DF}">
-                <a14:hiddenLine xmlns:a14="http://schemas.microsoft.com/office/drawing/2010/main" xmlns="" w="9525">
+                <a14:hiddenLine xmlns="" xmlns:a14="http://schemas.microsoft.com/office/drawing/2010/main" w="9525">
                   <a:solidFill>
                     <a:srgbClr val="000000"/>
                   </a:solidFill>
@@ -6612,7 +6964,7 @@
             </a:ln>
             <a:extLst>
               <a:ext uri="{91240B29-F687-4f45-9708-019B960494DF}">
-                <a14:hiddenLine xmlns:a14="http://schemas.microsoft.com/office/drawing/2010/main" xmlns="" w="9525">
+                <a14:hiddenLine xmlns="" xmlns:a14="http://schemas.microsoft.com/office/drawing/2010/main" w="9525">
                   <a:solidFill>
                     <a:srgbClr val="000000"/>
                   </a:solidFill>
@@ -6702,7 +7054,7 @@
             </a:ln>
             <a:extLst>
               <a:ext uri="{91240B29-F687-4f45-9708-019B960494DF}">
-                <a14:hiddenLine xmlns:a14="http://schemas.microsoft.com/office/drawing/2010/main" xmlns="" w="9525">
+                <a14:hiddenLine xmlns="" xmlns:a14="http://schemas.microsoft.com/office/drawing/2010/main" w="9525">
                   <a:solidFill>
                     <a:srgbClr val="000000"/>
                   </a:solidFill>
@@ -6736,7 +7088,7 @@
             </a:ln>
             <a:extLst>
               <a:ext uri="{91240B29-F687-4f45-9708-019B960494DF}">
-                <a14:hiddenLine xmlns:a14="http://schemas.microsoft.com/office/drawing/2010/main" xmlns="" w="9525">
+                <a14:hiddenLine xmlns="" xmlns:a14="http://schemas.microsoft.com/office/drawing/2010/main" w="9525">
                   <a:solidFill>
                     <a:srgbClr val="000000"/>
                   </a:solidFill>
@@ -6801,7 +7153,7 @@
             </a:ln>
             <a:extLst>
               <a:ext uri="{91240B29-F687-4f45-9708-019B960494DF}">
-                <a14:hiddenLine xmlns:a14="http://schemas.microsoft.com/office/drawing/2010/main" xmlns="" w="9525">
+                <a14:hiddenLine xmlns="" xmlns:a14="http://schemas.microsoft.com/office/drawing/2010/main" w="9525">
                   <a:solidFill>
                     <a:srgbClr val="000000"/>
                   </a:solidFill>
@@ -6891,7 +7243,7 @@
             </a:ln>
             <a:extLst>
               <a:ext uri="{91240B29-F687-4f45-9708-019B960494DF}">
-                <a14:hiddenLine xmlns:a14="http://schemas.microsoft.com/office/drawing/2010/main" xmlns="" w="9525">
+                <a14:hiddenLine xmlns="" xmlns:a14="http://schemas.microsoft.com/office/drawing/2010/main" w="9525">
                   <a:solidFill>
                     <a:srgbClr val="000000"/>
                   </a:solidFill>
@@ -6953,7 +7305,7 @@
             </a:ln>
             <a:extLst>
               <a:ext uri="{91240B29-F687-4f45-9708-019B960494DF}">
-                <a14:hiddenLine xmlns:a14="http://schemas.microsoft.com/office/drawing/2010/main" xmlns="" w="9525">
+                <a14:hiddenLine xmlns="" xmlns:a14="http://schemas.microsoft.com/office/drawing/2010/main" w="9525">
                   <a:solidFill>
                     <a:srgbClr val="000000"/>
                   </a:solidFill>
@@ -7043,7 +7395,7 @@
             </a:ln>
             <a:extLst>
               <a:ext uri="{91240B29-F687-4f45-9708-019B960494DF}">
-                <a14:hiddenLine xmlns:a14="http://schemas.microsoft.com/office/drawing/2010/main" xmlns="" w="9525">
+                <a14:hiddenLine xmlns="" xmlns:a14="http://schemas.microsoft.com/office/drawing/2010/main" w="9525">
                   <a:solidFill>
                     <a:srgbClr val="000000"/>
                   </a:solidFill>
@@ -7133,7 +7485,7 @@
             </a:ln>
             <a:extLst>
               <a:ext uri="{91240B29-F687-4f45-9708-019B960494DF}">
-                <a14:hiddenLine xmlns:a14="http://schemas.microsoft.com/office/drawing/2010/main" xmlns="" w="9525">
+                <a14:hiddenLine xmlns="" xmlns:a14="http://schemas.microsoft.com/office/drawing/2010/main" w="9525">
                   <a:solidFill>
                     <a:srgbClr val="000000"/>
                   </a:solidFill>
@@ -7198,7 +7550,7 @@
             </a:ln>
             <a:extLst>
               <a:ext uri="{91240B29-F687-4f45-9708-019B960494DF}">
-                <a14:hiddenLine xmlns:a14="http://schemas.microsoft.com/office/drawing/2010/main" xmlns="" w="9525">
+                <a14:hiddenLine xmlns="" xmlns:a14="http://schemas.microsoft.com/office/drawing/2010/main" w="9525">
                   <a:solidFill>
                     <a:srgbClr val="000000"/>
                   </a:solidFill>
@@ -7260,7 +7612,7 @@
             </a:ln>
             <a:extLst>
               <a:ext uri="{91240B29-F687-4f45-9708-019B960494DF}">
-                <a14:hiddenLine xmlns:a14="http://schemas.microsoft.com/office/drawing/2010/main" xmlns="" w="9525">
+                <a14:hiddenLine xmlns="" xmlns:a14="http://schemas.microsoft.com/office/drawing/2010/main" w="9525">
                   <a:solidFill>
                     <a:srgbClr val="000000"/>
                   </a:solidFill>
@@ -7350,7 +7702,7 @@
             </a:ln>
             <a:extLst>
               <a:ext uri="{91240B29-F687-4f45-9708-019B960494DF}">
-                <a14:hiddenLine xmlns:a14="http://schemas.microsoft.com/office/drawing/2010/main" xmlns="" w="9525">
+                <a14:hiddenLine xmlns="" xmlns:a14="http://schemas.microsoft.com/office/drawing/2010/main" w="9525">
                   <a:solidFill>
                     <a:srgbClr val="000000"/>
                   </a:solidFill>
@@ -7440,7 +7792,7 @@
             </a:ln>
             <a:extLst>
               <a:ext uri="{91240B29-F687-4f45-9708-019B960494DF}">
-                <a14:hiddenLine xmlns:a14="http://schemas.microsoft.com/office/drawing/2010/main" xmlns="" w="9525">
+                <a14:hiddenLine xmlns="" xmlns:a14="http://schemas.microsoft.com/office/drawing/2010/main" w="9525">
                   <a:solidFill>
                     <a:srgbClr val="000000"/>
                   </a:solidFill>
@@ -7502,7 +7854,7 @@
             </a:ln>
             <a:extLst>
               <a:ext uri="{91240B29-F687-4f45-9708-019B960494DF}">
-                <a14:hiddenLine xmlns:a14="http://schemas.microsoft.com/office/drawing/2010/main" xmlns="" w="9525">
+                <a14:hiddenLine xmlns="" xmlns:a14="http://schemas.microsoft.com/office/drawing/2010/main" w="9525">
                   <a:solidFill>
                     <a:srgbClr val="000000"/>
                   </a:solidFill>
@@ -7622,7 +7974,7 @@
             </a:ln>
             <a:extLst>
               <a:ext uri="{91240B29-F687-4f45-9708-019B960494DF}">
-                <a14:hiddenLine xmlns:a14="http://schemas.microsoft.com/office/drawing/2010/main" xmlns="" w="9525">
+                <a14:hiddenLine xmlns="" xmlns:a14="http://schemas.microsoft.com/office/drawing/2010/main" w="9525">
                   <a:solidFill>
                     <a:srgbClr val="000000"/>
                   </a:solidFill>
@@ -7690,7 +8042,7 @@
             </a:ln>
             <a:extLst>
               <a:ext uri="{91240B29-F687-4f45-9708-019B960494DF}">
-                <a14:hiddenLine xmlns:a14="http://schemas.microsoft.com/office/drawing/2010/main" xmlns="" w="9525">
+                <a14:hiddenLine xmlns="" xmlns:a14="http://schemas.microsoft.com/office/drawing/2010/main" w="9525">
                   <a:solidFill>
                     <a:srgbClr val="000000"/>
                   </a:solidFill>
@@ -7780,7 +8132,7 @@
             </a:ln>
             <a:extLst>
               <a:ext uri="{91240B29-F687-4f45-9708-019B960494DF}">
-                <a14:hiddenLine xmlns:a14="http://schemas.microsoft.com/office/drawing/2010/main" xmlns="" w="9525">
+                <a14:hiddenLine xmlns="" xmlns:a14="http://schemas.microsoft.com/office/drawing/2010/main" w="9525">
                   <a:solidFill>
                     <a:srgbClr val="000000"/>
                   </a:solidFill>
@@ -7920,7 +8272,7 @@
           <a:p>
             <a:fld id="{48A87A34-81AB-432B-8DAE-1953F412C126}" type="datetimeFigureOut">
               <a:rPr lang="en-US" dirty="0"/>
-              <a:t>7/11/2021</a:t>
+              <a:t>7/13/2021</a:t>
             </a:fld>
             <a:endParaRPr lang="en-US" dirty="0"/>
           </a:p>
@@ -8182,7 +8534,7 @@
           <a:p>
             <a:fld id="{48A87A34-81AB-432B-8DAE-1953F412C126}" type="datetimeFigureOut">
               <a:rPr lang="en-US" dirty="0"/>
-              <a:t>7/11/2021</a:t>
+              <a:t>7/13/2021</a:t>
             </a:fld>
             <a:endParaRPr lang="en-US" dirty="0"/>
           </a:p>
@@ -8373,7 +8725,7 @@
           <a:p>
             <a:fld id="{48A87A34-81AB-432B-8DAE-1953F412C126}" type="datetimeFigureOut">
               <a:rPr lang="en-US" dirty="0"/>
-              <a:t>7/11/2021</a:t>
+              <a:t>7/13/2021</a:t>
             </a:fld>
             <a:endParaRPr lang="en-US" dirty="0"/>
           </a:p>
@@ -8631,7 +8983,7 @@
           <a:p>
             <a:fld id="{48A87A34-81AB-432B-8DAE-1953F412C126}" type="datetimeFigureOut">
               <a:rPr lang="en-US" dirty="0"/>
-              <a:t>7/11/2021</a:t>
+              <a:t>7/13/2021</a:t>
             </a:fld>
             <a:endParaRPr lang="en-US" dirty="0"/>
           </a:p>
@@ -9060,7 +9412,7 @@
           <a:p>
             <a:fld id="{48A87A34-81AB-432B-8DAE-1953F412C126}" type="datetimeFigureOut">
               <a:rPr lang="en-US" dirty="0"/>
-              <a:t>7/11/2021</a:t>
+              <a:t>7/13/2021</a:t>
             </a:fld>
             <a:endParaRPr lang="en-US" dirty="0"/>
           </a:p>
@@ -9601,7 +9953,7 @@
           <a:p>
             <a:fld id="{48A87A34-81AB-432B-8DAE-1953F412C126}" type="datetimeFigureOut">
               <a:rPr lang="en-US" dirty="0"/>
-              <a:t>7/11/2021</a:t>
+              <a:t>7/13/2021</a:t>
             </a:fld>
             <a:endParaRPr lang="en-US" dirty="0"/>
           </a:p>
@@ -10316,7 +10668,7 @@
           <a:p>
             <a:fld id="{48A87A34-81AB-432B-8DAE-1953F412C126}" type="datetimeFigureOut">
               <a:rPr lang="en-US" dirty="0"/>
-              <a:t>7/11/2021</a:t>
+              <a:t>7/13/2021</a:t>
             </a:fld>
             <a:endParaRPr lang="en-US" dirty="0"/>
           </a:p>
@@ -10481,7 +10833,7 @@
           <a:p>
             <a:fld id="{48A87A34-81AB-432B-8DAE-1953F412C126}" type="datetimeFigureOut">
               <a:rPr lang="en-US" dirty="0"/>
-              <a:t>7/11/2021</a:t>
+              <a:t>7/13/2021</a:t>
             </a:fld>
             <a:endParaRPr lang="en-US" dirty="0"/>
           </a:p>
@@ -10656,7 +11008,7 @@
           <a:p>
             <a:fld id="{48A87A34-81AB-432B-8DAE-1953F412C126}" type="datetimeFigureOut">
               <a:rPr lang="en-US" dirty="0"/>
-              <a:t>7/11/2021</a:t>
+              <a:t>7/13/2021</a:t>
             </a:fld>
             <a:endParaRPr lang="en-US" dirty="0"/>
           </a:p>
@@ -11113,7 +11465,7 @@
           <a:p>
             <a:fld id="{48A87A34-81AB-432B-8DAE-1953F412C126}" type="datetimeFigureOut">
               <a:rPr lang="en-US" dirty="0"/>
-              <a:t>7/11/2021</a:t>
+              <a:t>7/13/2021</a:t>
             </a:fld>
             <a:endParaRPr lang="en-US" dirty="0"/>
           </a:p>
@@ -11358,7 +11710,7 @@
           <a:p>
             <a:fld id="{48A87A34-81AB-432B-8DAE-1953F412C126}" type="datetimeFigureOut">
               <a:rPr lang="en-US" dirty="0"/>
-              <a:t>7/11/2021</a:t>
+              <a:t>7/13/2021</a:t>
             </a:fld>
             <a:endParaRPr lang="en-US" dirty="0"/>
           </a:p>
@@ -11585,7 +11937,7 @@
           <a:p>
             <a:fld id="{48A87A34-81AB-432B-8DAE-1953F412C126}" type="datetimeFigureOut">
               <a:rPr lang="en-US" dirty="0"/>
-              <a:t>7/11/2021</a:t>
+              <a:t>7/13/2021</a:t>
             </a:fld>
             <a:endParaRPr lang="en-US" dirty="0"/>
           </a:p>
@@ -11961,7 +12313,7 @@
           <a:p>
             <a:fld id="{48A87A34-81AB-432B-8DAE-1953F412C126}" type="datetimeFigureOut">
               <a:rPr lang="en-US" dirty="0"/>
-              <a:t>7/11/2021</a:t>
+              <a:t>7/13/2021</a:t>
             </a:fld>
             <a:endParaRPr lang="en-US" dirty="0"/>
           </a:p>
@@ -12074,7 +12426,7 @@
           <a:p>
             <a:fld id="{48A87A34-81AB-432B-8DAE-1953F412C126}" type="datetimeFigureOut">
               <a:rPr lang="en-US" dirty="0"/>
-              <a:t>7/11/2021</a:t>
+              <a:t>7/13/2021</a:t>
             </a:fld>
             <a:endParaRPr lang="en-US" dirty="0"/>
           </a:p>
@@ -12164,7 +12516,7 @@
           <a:p>
             <a:fld id="{48A87A34-81AB-432B-8DAE-1953F412C126}" type="datetimeFigureOut">
               <a:rPr lang="en-US" dirty="0"/>
-              <a:t>7/11/2021</a:t>
+              <a:t>7/13/2021</a:t>
             </a:fld>
             <a:endParaRPr lang="en-US" dirty="0"/>
           </a:p>
@@ -12408,7 +12760,7 @@
           <a:p>
             <a:fld id="{48A87A34-81AB-432B-8DAE-1953F412C126}" type="datetimeFigureOut">
               <a:rPr lang="en-US" dirty="0"/>
-              <a:t>7/11/2021</a:t>
+              <a:t>7/13/2021</a:t>
             </a:fld>
             <a:endParaRPr lang="en-US" dirty="0"/>
           </a:p>
@@ -12683,7 +13035,7 @@
           <a:p>
             <a:fld id="{48A87A34-81AB-432B-8DAE-1953F412C126}" type="datetimeFigureOut">
               <a:rPr lang="en-US" dirty="0"/>
-              <a:t>7/11/2021</a:t>
+              <a:t>7/13/2021</a:t>
             </a:fld>
             <a:endParaRPr lang="en-US" dirty="0"/>
           </a:p>
@@ -12801,7 +13153,7 @@
           <a:noFill/>
           <a:extLst>
             <a:ext uri="{909E8E84-426E-40dd-AFC4-6F175D3DCCD1}">
-              <a14:hiddenFill xmlns:a14="http://schemas.microsoft.com/office/drawing/2010/main" xmlns="">
+              <a14:hiddenFill xmlns="" xmlns:a14="http://schemas.microsoft.com/office/drawing/2010/main">
                 <a:solidFill>
                   <a:srgbClr val="FFFFFF"/>
                 </a:solidFill>
@@ -12875,7 +13227,7 @@
               </a:ln>
               <a:extLst>
                 <a:ext uri="{91240B29-F687-4f45-9708-019B960494DF}">
-                  <a14:hiddenLine xmlns:a14="http://schemas.microsoft.com/office/drawing/2010/main" xmlns="" w="9525">
+                  <a14:hiddenLine xmlns="" xmlns:a14="http://schemas.microsoft.com/office/drawing/2010/main" w="9525">
                     <a:solidFill>
                       <a:srgbClr val="000000"/>
                     </a:solidFill>
@@ -12965,7 +13317,7 @@
               </a:ln>
               <a:extLst>
                 <a:ext uri="{91240B29-F687-4f45-9708-019B960494DF}">
-                  <a14:hiddenLine xmlns:a14="http://schemas.microsoft.com/office/drawing/2010/main" xmlns="" w="9525">
+                  <a14:hiddenLine xmlns="" xmlns:a14="http://schemas.microsoft.com/office/drawing/2010/main" w="9525">
                     <a:solidFill>
                       <a:srgbClr val="000000"/>
                     </a:solidFill>
@@ -13055,7 +13407,7 @@
               </a:ln>
               <a:extLst>
                 <a:ext uri="{91240B29-F687-4f45-9708-019B960494DF}">
-                  <a14:hiddenLine xmlns:a14="http://schemas.microsoft.com/office/drawing/2010/main" xmlns="" w="9525">
+                  <a14:hiddenLine xmlns="" xmlns:a14="http://schemas.microsoft.com/office/drawing/2010/main" w="9525">
                     <a:solidFill>
                       <a:srgbClr val="000000"/>
                     </a:solidFill>
@@ -13117,7 +13469,7 @@
               </a:ln>
               <a:extLst>
                 <a:ext uri="{91240B29-F687-4f45-9708-019B960494DF}">
-                  <a14:hiddenLine xmlns:a14="http://schemas.microsoft.com/office/drawing/2010/main" xmlns="" w="9525">
+                  <a14:hiddenLine xmlns="" xmlns:a14="http://schemas.microsoft.com/office/drawing/2010/main" w="9525">
                     <a:solidFill>
                       <a:srgbClr val="000000"/>
                     </a:solidFill>
@@ -13207,7 +13559,7 @@
               </a:ln>
               <a:extLst>
                 <a:ext uri="{91240B29-F687-4f45-9708-019B960494DF}">
-                  <a14:hiddenLine xmlns:a14="http://schemas.microsoft.com/office/drawing/2010/main" xmlns="" w="9525">
+                  <a14:hiddenLine xmlns="" xmlns:a14="http://schemas.microsoft.com/office/drawing/2010/main" w="9525">
                     <a:solidFill>
                       <a:srgbClr val="000000"/>
                     </a:solidFill>
@@ -13269,7 +13621,7 @@
               </a:ln>
               <a:extLst>
                 <a:ext uri="{91240B29-F687-4f45-9708-019B960494DF}">
-                  <a14:hiddenLine xmlns:a14="http://schemas.microsoft.com/office/drawing/2010/main" xmlns="" w="9525">
+                  <a14:hiddenLine xmlns="" xmlns:a14="http://schemas.microsoft.com/office/drawing/2010/main" w="9525">
                     <a:solidFill>
                       <a:srgbClr val="000000"/>
                     </a:solidFill>
@@ -13331,7 +13683,7 @@
               </a:ln>
               <a:extLst>
                 <a:ext uri="{91240B29-F687-4f45-9708-019B960494DF}">
-                  <a14:hiddenLine xmlns:a14="http://schemas.microsoft.com/office/drawing/2010/main" xmlns="" w="9525">
+                  <a14:hiddenLine xmlns="" xmlns:a14="http://schemas.microsoft.com/office/drawing/2010/main" w="9525">
                     <a:solidFill>
                       <a:srgbClr val="000000"/>
                     </a:solidFill>
@@ -13421,7 +13773,7 @@
               </a:ln>
               <a:extLst>
                 <a:ext uri="{91240B29-F687-4f45-9708-019B960494DF}">
-                  <a14:hiddenLine xmlns:a14="http://schemas.microsoft.com/office/drawing/2010/main" xmlns="" w="9525">
+                  <a14:hiddenLine xmlns="" xmlns:a14="http://schemas.microsoft.com/office/drawing/2010/main" w="9525">
                     <a:solidFill>
                       <a:srgbClr val="000000"/>
                     </a:solidFill>
@@ -13511,7 +13863,7 @@
               </a:ln>
               <a:extLst>
                 <a:ext uri="{91240B29-F687-4f45-9708-019B960494DF}">
-                  <a14:hiddenLine xmlns:a14="http://schemas.microsoft.com/office/drawing/2010/main" xmlns="" w="9525">
+                  <a14:hiddenLine xmlns="" xmlns:a14="http://schemas.microsoft.com/office/drawing/2010/main" w="9525">
                     <a:solidFill>
                       <a:srgbClr val="000000"/>
                     </a:solidFill>
@@ -13573,7 +13925,7 @@
               </a:ln>
               <a:extLst>
                 <a:ext uri="{91240B29-F687-4f45-9708-019B960494DF}">
-                  <a14:hiddenLine xmlns:a14="http://schemas.microsoft.com/office/drawing/2010/main" xmlns="" w="9525">
+                  <a14:hiddenLine xmlns="" xmlns:a14="http://schemas.microsoft.com/office/drawing/2010/main" w="9525">
                     <a:solidFill>
                       <a:srgbClr val="000000"/>
                     </a:solidFill>
@@ -13683,7 +14035,7 @@
               </a:ln>
               <a:extLst>
                 <a:ext uri="{91240B29-F687-4f45-9708-019B960494DF}">
-                  <a14:hiddenLine xmlns:a14="http://schemas.microsoft.com/office/drawing/2010/main" xmlns="" w="9525">
+                  <a14:hiddenLine xmlns="" xmlns:a14="http://schemas.microsoft.com/office/drawing/2010/main" w="9525">
                     <a:solidFill>
                       <a:srgbClr val="000000"/>
                     </a:solidFill>
@@ -13767,7 +14119,7 @@
               </a:ln>
               <a:extLst>
                 <a:ext uri="{91240B29-F687-4f45-9708-019B960494DF}">
-                  <a14:hiddenLine xmlns:a14="http://schemas.microsoft.com/office/drawing/2010/main" xmlns="" w="9525">
+                  <a14:hiddenLine xmlns="" xmlns:a14="http://schemas.microsoft.com/office/drawing/2010/main" w="9525">
                     <a:solidFill>
                       <a:srgbClr val="000000"/>
                     </a:solidFill>
@@ -13829,7 +14181,7 @@
               </a:ln>
               <a:extLst>
                 <a:ext uri="{91240B29-F687-4f45-9708-019B960494DF}">
-                  <a14:hiddenLine xmlns:a14="http://schemas.microsoft.com/office/drawing/2010/main" xmlns="" w="9525">
+                  <a14:hiddenLine xmlns="" xmlns:a14="http://schemas.microsoft.com/office/drawing/2010/main" w="9525">
                     <a:solidFill>
                       <a:srgbClr val="000000"/>
                     </a:solidFill>
@@ -13891,7 +14243,7 @@
               </a:ln>
               <a:extLst>
                 <a:ext uri="{91240B29-F687-4f45-9708-019B960494DF}">
-                  <a14:hiddenLine xmlns:a14="http://schemas.microsoft.com/office/drawing/2010/main" xmlns="" w="9525">
+                  <a14:hiddenLine xmlns="" xmlns:a14="http://schemas.microsoft.com/office/drawing/2010/main" w="9525">
                     <a:solidFill>
                       <a:srgbClr val="000000"/>
                     </a:solidFill>
@@ -13981,7 +14333,7 @@
               </a:ln>
               <a:extLst>
                 <a:ext uri="{91240B29-F687-4f45-9708-019B960494DF}">
-                  <a14:hiddenLine xmlns:a14="http://schemas.microsoft.com/office/drawing/2010/main" xmlns="" w="9525">
+                  <a14:hiddenLine xmlns="" xmlns:a14="http://schemas.microsoft.com/office/drawing/2010/main" w="9525">
                     <a:solidFill>
                       <a:srgbClr val="000000"/>
                     </a:solidFill>
@@ -14015,7 +14367,7 @@
               </a:ln>
               <a:extLst>
                 <a:ext uri="{91240B29-F687-4f45-9708-019B960494DF}">
-                  <a14:hiddenLine xmlns:a14="http://schemas.microsoft.com/office/drawing/2010/main" xmlns="" w="9525">
+                  <a14:hiddenLine xmlns="" xmlns:a14="http://schemas.microsoft.com/office/drawing/2010/main" w="9525">
                     <a:solidFill>
                       <a:srgbClr val="000000"/>
                     </a:solidFill>
@@ -14080,7 +14432,7 @@
               </a:ln>
               <a:extLst>
                 <a:ext uri="{91240B29-F687-4f45-9708-019B960494DF}">
-                  <a14:hiddenLine xmlns:a14="http://schemas.microsoft.com/office/drawing/2010/main" xmlns="" w="9525">
+                  <a14:hiddenLine xmlns="" xmlns:a14="http://schemas.microsoft.com/office/drawing/2010/main" w="9525">
                     <a:solidFill>
                       <a:srgbClr val="000000"/>
                     </a:solidFill>
@@ -14170,7 +14522,7 @@
               </a:ln>
               <a:extLst>
                 <a:ext uri="{91240B29-F687-4f45-9708-019B960494DF}">
-                  <a14:hiddenLine xmlns:a14="http://schemas.microsoft.com/office/drawing/2010/main" xmlns="" w="9525">
+                  <a14:hiddenLine xmlns="" xmlns:a14="http://schemas.microsoft.com/office/drawing/2010/main" w="9525">
                     <a:solidFill>
                       <a:srgbClr val="000000"/>
                     </a:solidFill>
@@ -14232,7 +14584,7 @@
               </a:ln>
               <a:extLst>
                 <a:ext uri="{91240B29-F687-4f45-9708-019B960494DF}">
-                  <a14:hiddenLine xmlns:a14="http://schemas.microsoft.com/office/drawing/2010/main" xmlns="" w="9525">
+                  <a14:hiddenLine xmlns="" xmlns:a14="http://schemas.microsoft.com/office/drawing/2010/main" w="9525">
                     <a:solidFill>
                       <a:srgbClr val="000000"/>
                     </a:solidFill>
@@ -14322,7 +14674,7 @@
               </a:ln>
               <a:extLst>
                 <a:ext uri="{91240B29-F687-4f45-9708-019B960494DF}">
-                  <a14:hiddenLine xmlns:a14="http://schemas.microsoft.com/office/drawing/2010/main" xmlns="" w="9525">
+                  <a14:hiddenLine xmlns="" xmlns:a14="http://schemas.microsoft.com/office/drawing/2010/main" w="9525">
                     <a:solidFill>
                       <a:srgbClr val="000000"/>
                     </a:solidFill>
@@ -14387,7 +14739,7 @@
               </a:ln>
               <a:extLst>
                 <a:ext uri="{91240B29-F687-4f45-9708-019B960494DF}">
-                  <a14:hiddenLine xmlns:a14="http://schemas.microsoft.com/office/drawing/2010/main" xmlns="" w="9525">
+                  <a14:hiddenLine xmlns="" xmlns:a14="http://schemas.microsoft.com/office/drawing/2010/main" w="9525">
                     <a:solidFill>
                       <a:srgbClr val="000000"/>
                     </a:solidFill>
@@ -14449,7 +14801,7 @@
               </a:ln>
               <a:extLst>
                 <a:ext uri="{91240B29-F687-4f45-9708-019B960494DF}">
-                  <a14:hiddenLine xmlns:a14="http://schemas.microsoft.com/office/drawing/2010/main" xmlns="" w="9525">
+                  <a14:hiddenLine xmlns="" xmlns:a14="http://schemas.microsoft.com/office/drawing/2010/main" w="9525">
                     <a:solidFill>
                       <a:srgbClr val="000000"/>
                     </a:solidFill>
@@ -14539,7 +14891,7 @@
               </a:ln>
               <a:extLst>
                 <a:ext uri="{91240B29-F687-4f45-9708-019B960494DF}">
-                  <a14:hiddenLine xmlns:a14="http://schemas.microsoft.com/office/drawing/2010/main" xmlns="" w="9525">
+                  <a14:hiddenLine xmlns="" xmlns:a14="http://schemas.microsoft.com/office/drawing/2010/main" w="9525">
                     <a:solidFill>
                       <a:srgbClr val="000000"/>
                     </a:solidFill>
@@ -14629,7 +14981,7 @@
               </a:ln>
               <a:extLst>
                 <a:ext uri="{91240B29-F687-4f45-9708-019B960494DF}">
-                  <a14:hiddenLine xmlns:a14="http://schemas.microsoft.com/office/drawing/2010/main" xmlns="" w="9525">
+                  <a14:hiddenLine xmlns="" xmlns:a14="http://schemas.microsoft.com/office/drawing/2010/main" w="9525">
                     <a:solidFill>
                       <a:srgbClr val="000000"/>
                     </a:solidFill>
@@ -14694,7 +15046,7 @@
               </a:ln>
               <a:extLst>
                 <a:ext uri="{91240B29-F687-4f45-9708-019B960494DF}">
-                  <a14:hiddenLine xmlns:a14="http://schemas.microsoft.com/office/drawing/2010/main" xmlns="" w="9525">
+                  <a14:hiddenLine xmlns="" xmlns:a14="http://schemas.microsoft.com/office/drawing/2010/main" w="9525">
                     <a:solidFill>
                       <a:srgbClr val="000000"/>
                     </a:solidFill>
@@ -14814,7 +15166,7 @@
               </a:ln>
               <a:extLst>
                 <a:ext uri="{91240B29-F687-4f45-9708-019B960494DF}">
-                  <a14:hiddenLine xmlns:a14="http://schemas.microsoft.com/office/drawing/2010/main" xmlns="" w="9525">
+                  <a14:hiddenLine xmlns="" xmlns:a14="http://schemas.microsoft.com/office/drawing/2010/main" w="9525">
                     <a:solidFill>
                       <a:srgbClr val="000000"/>
                     </a:solidFill>
@@ -14895,7 +15247,7 @@
               </a:ln>
               <a:extLst>
                 <a:ext uri="{91240B29-F687-4f45-9708-019B960494DF}">
-                  <a14:hiddenLine xmlns:a14="http://schemas.microsoft.com/office/drawing/2010/main" xmlns="" w="9525">
+                  <a14:hiddenLine xmlns="" xmlns:a14="http://schemas.microsoft.com/office/drawing/2010/main" w="9525">
                     <a:solidFill>
                       <a:srgbClr val="000000"/>
                     </a:solidFill>
@@ -15010,7 +15362,7 @@
               </a:ln>
               <a:extLst>
                 <a:ext uri="{91240B29-F687-4f45-9708-019B960494DF}">
-                  <a14:hiddenLine xmlns:a14="http://schemas.microsoft.com/office/drawing/2010/main" xmlns="" w="9525">
+                  <a14:hiddenLine xmlns="" xmlns:a14="http://schemas.microsoft.com/office/drawing/2010/main" w="9525">
                     <a:solidFill>
                       <a:srgbClr val="000000"/>
                     </a:solidFill>
@@ -15100,7 +15452,7 @@
               </a:ln>
               <a:extLst>
                 <a:ext uri="{91240B29-F687-4f45-9708-019B960494DF}">
-                  <a14:hiddenLine xmlns:a14="http://schemas.microsoft.com/office/drawing/2010/main" xmlns="" w="9525">
+                  <a14:hiddenLine xmlns="" xmlns:a14="http://schemas.microsoft.com/office/drawing/2010/main" w="9525">
                     <a:solidFill>
                       <a:srgbClr val="000000"/>
                     </a:solidFill>
@@ -15165,7 +15517,7 @@
               </a:ln>
               <a:extLst>
                 <a:ext uri="{91240B29-F687-4f45-9708-019B960494DF}">
-                  <a14:hiddenLine xmlns:a14="http://schemas.microsoft.com/office/drawing/2010/main" xmlns="" w="9525">
+                  <a14:hiddenLine xmlns="" xmlns:a14="http://schemas.microsoft.com/office/drawing/2010/main" w="9525">
                     <a:solidFill>
                       <a:srgbClr val="000000"/>
                     </a:solidFill>
@@ -15255,7 +15607,7 @@
               </a:ln>
               <a:extLst>
                 <a:ext uri="{91240B29-F687-4f45-9708-019B960494DF}">
-                  <a14:hiddenLine xmlns:a14="http://schemas.microsoft.com/office/drawing/2010/main" xmlns="" w="9525">
+                  <a14:hiddenLine xmlns="" xmlns:a14="http://schemas.microsoft.com/office/drawing/2010/main" w="9525">
                     <a:solidFill>
                       <a:srgbClr val="000000"/>
                     </a:solidFill>
@@ -15323,7 +15675,7 @@
               </a:ln>
               <a:extLst>
                 <a:ext uri="{91240B29-F687-4f45-9708-019B960494DF}">
-                  <a14:hiddenLine xmlns:a14="http://schemas.microsoft.com/office/drawing/2010/main" xmlns="" w="9525">
+                  <a14:hiddenLine xmlns="" xmlns:a14="http://schemas.microsoft.com/office/drawing/2010/main" w="9525">
                     <a:solidFill>
                       <a:srgbClr val="000000"/>
                     </a:solidFill>
@@ -15413,7 +15765,7 @@
               </a:ln>
               <a:extLst>
                 <a:ext uri="{91240B29-F687-4f45-9708-019B960494DF}">
-                  <a14:hiddenLine xmlns:a14="http://schemas.microsoft.com/office/drawing/2010/main" xmlns="" w="9525">
+                  <a14:hiddenLine xmlns="" xmlns:a14="http://schemas.microsoft.com/office/drawing/2010/main" w="9525">
                     <a:solidFill>
                       <a:srgbClr val="000000"/>
                     </a:solidFill>
@@ -15481,7 +15833,7 @@
               </a:ln>
               <a:extLst>
                 <a:ext uri="{91240B29-F687-4f45-9708-019B960494DF}">
-                  <a14:hiddenLine xmlns:a14="http://schemas.microsoft.com/office/drawing/2010/main" xmlns="" w="9525">
+                  <a14:hiddenLine xmlns="" xmlns:a14="http://schemas.microsoft.com/office/drawing/2010/main" w="9525">
                     <a:solidFill>
                       <a:srgbClr val="000000"/>
                     </a:solidFill>
@@ -15571,7 +15923,7 @@
               </a:ln>
               <a:extLst>
                 <a:ext uri="{91240B29-F687-4f45-9708-019B960494DF}">
-                  <a14:hiddenLine xmlns:a14="http://schemas.microsoft.com/office/drawing/2010/main" xmlns="" w="9525">
+                  <a14:hiddenLine xmlns="" xmlns:a14="http://schemas.microsoft.com/office/drawing/2010/main" w="9525">
                     <a:solidFill>
                       <a:srgbClr val="000000"/>
                     </a:solidFill>
@@ -15605,7 +15957,7 @@
               </a:ln>
               <a:extLst>
                 <a:ext uri="{91240B29-F687-4f45-9708-019B960494DF}">
-                  <a14:hiddenLine xmlns:a14="http://schemas.microsoft.com/office/drawing/2010/main" xmlns="" w="9525">
+                  <a14:hiddenLine xmlns="" xmlns:a14="http://schemas.microsoft.com/office/drawing/2010/main" w="9525">
                     <a:solidFill>
                       <a:srgbClr val="000000"/>
                     </a:solidFill>
@@ -15746,7 +16098,7 @@
             <a:fld id="{48A87A34-81AB-432B-8DAE-1953F412C126}" type="datetimeFigureOut">
               <a:rPr lang="en-US" dirty="0"/>
               <a:pPr/>
-              <a:t>7/11/2021</a:t>
+              <a:t>7/13/2021</a:t>
             </a:fld>
             <a:endParaRPr lang="en-US" dirty="0"/>
           </a:p>
@@ -16342,7 +16694,7 @@
             <a:noFill/>
             <a:extLst>
               <a:ext uri="{909E8E84-426E-40dd-AFC4-6F175D3DCCD1}">
-                <a14:hiddenFill xmlns="" xmlns:a16="http://schemas.microsoft.com/office/drawing/2014/main" xmlns:a14="http://schemas.microsoft.com/office/drawing/2010/main" xmlns:p14="http://schemas.microsoft.com/office/powerpoint/2010/main">
+                <a14:hiddenFill xmlns:p14="http://schemas.microsoft.com/office/powerpoint/2010/main" xmlns:a14="http://schemas.microsoft.com/office/drawing/2010/main" xmlns:a16="http://schemas.microsoft.com/office/drawing/2014/main" xmlns="">
                   <a:solidFill>
                     <a:srgbClr val="FFFFFF"/>
                   </a:solidFill>
@@ -16499,7 +16851,7 @@
             </a:ln>
             <a:extLst>
               <a:ext uri="{91240B29-F687-4f45-9708-019B960494DF}">
-                <a14:hiddenLine xmlns="" xmlns:a16="http://schemas.microsoft.com/office/drawing/2014/main" xmlns:a14="http://schemas.microsoft.com/office/drawing/2010/main" xmlns:p14="http://schemas.microsoft.com/office/powerpoint/2010/main" w="9525">
+                <a14:hiddenLine xmlns:p14="http://schemas.microsoft.com/office/powerpoint/2010/main" xmlns:a14="http://schemas.microsoft.com/office/drawing/2010/main" xmlns:a16="http://schemas.microsoft.com/office/drawing/2014/main" xmlns="" w="9525">
                   <a:solidFill>
                     <a:srgbClr val="000000"/>
                   </a:solidFill>
@@ -16604,7 +16956,7 @@
             </a:ln>
             <a:extLst>
               <a:ext uri="{91240B29-F687-4f45-9708-019B960494DF}">
-                <a14:hiddenLine xmlns="" xmlns:a16="http://schemas.microsoft.com/office/drawing/2014/main" xmlns:a14="http://schemas.microsoft.com/office/drawing/2010/main" xmlns:p14="http://schemas.microsoft.com/office/powerpoint/2010/main" w="9525">
+                <a14:hiddenLine xmlns:p14="http://schemas.microsoft.com/office/powerpoint/2010/main" xmlns:a14="http://schemas.microsoft.com/office/drawing/2010/main" xmlns:a16="http://schemas.microsoft.com/office/drawing/2014/main" xmlns="" w="9525">
                   <a:solidFill>
                     <a:srgbClr val="000000"/>
                   </a:solidFill>
@@ -16709,7 +17061,7 @@
             </a:ln>
             <a:extLst>
               <a:ext uri="{91240B29-F687-4f45-9708-019B960494DF}">
-                <a14:hiddenLine xmlns="" xmlns:a16="http://schemas.microsoft.com/office/drawing/2014/main" xmlns:a14="http://schemas.microsoft.com/office/drawing/2010/main" xmlns:p14="http://schemas.microsoft.com/office/powerpoint/2010/main" w="9525">
+                <a14:hiddenLine xmlns:p14="http://schemas.microsoft.com/office/powerpoint/2010/main" xmlns:a14="http://schemas.microsoft.com/office/drawing/2010/main" xmlns:a16="http://schemas.microsoft.com/office/drawing/2014/main" xmlns="" w="9525">
                   <a:solidFill>
                     <a:srgbClr val="000000"/>
                   </a:solidFill>
@@ -16758,7 +17110,7 @@
             </a:ln>
             <a:extLst>
               <a:ext uri="{91240B29-F687-4f45-9708-019B960494DF}">
-                <a14:hiddenLine xmlns="" xmlns:a16="http://schemas.microsoft.com/office/drawing/2014/main" xmlns:a14="http://schemas.microsoft.com/office/drawing/2010/main" xmlns:p14="http://schemas.microsoft.com/office/powerpoint/2010/main" w="9525">
+                <a14:hiddenLine xmlns:p14="http://schemas.microsoft.com/office/powerpoint/2010/main" xmlns:a14="http://schemas.microsoft.com/office/drawing/2010/main" xmlns:a16="http://schemas.microsoft.com/office/drawing/2014/main" xmlns="" w="9525">
                   <a:solidFill>
                     <a:srgbClr val="000000"/>
                   </a:solidFill>
@@ -16863,7 +17215,7 @@
             </a:ln>
             <a:extLst>
               <a:ext uri="{91240B29-F687-4f45-9708-019B960494DF}">
-                <a14:hiddenLine xmlns="" xmlns:a16="http://schemas.microsoft.com/office/drawing/2014/main" xmlns:a14="http://schemas.microsoft.com/office/drawing/2010/main" xmlns:p14="http://schemas.microsoft.com/office/powerpoint/2010/main" w="9525">
+                <a14:hiddenLine xmlns:p14="http://schemas.microsoft.com/office/powerpoint/2010/main" xmlns:a14="http://schemas.microsoft.com/office/drawing/2010/main" xmlns:a16="http://schemas.microsoft.com/office/drawing/2014/main" xmlns="" w="9525">
                   <a:solidFill>
                     <a:srgbClr val="000000"/>
                   </a:solidFill>
@@ -16940,7 +17292,7 @@
             </a:ln>
             <a:extLst>
               <a:ext uri="{91240B29-F687-4f45-9708-019B960494DF}">
-                <a14:hiddenLine xmlns="" xmlns:a16="http://schemas.microsoft.com/office/drawing/2014/main" xmlns:a14="http://schemas.microsoft.com/office/drawing/2010/main" xmlns:p14="http://schemas.microsoft.com/office/powerpoint/2010/main" w="9525">
+                <a14:hiddenLine xmlns:p14="http://schemas.microsoft.com/office/powerpoint/2010/main" xmlns:a14="http://schemas.microsoft.com/office/drawing/2010/main" xmlns:a16="http://schemas.microsoft.com/office/drawing/2014/main" xmlns="" w="9525">
                   <a:solidFill>
                     <a:srgbClr val="000000"/>
                   </a:solidFill>
@@ -17017,7 +17369,7 @@
             </a:ln>
             <a:extLst>
               <a:ext uri="{91240B29-F687-4f45-9708-019B960494DF}">
-                <a14:hiddenLine xmlns="" xmlns:a16="http://schemas.microsoft.com/office/drawing/2014/main" xmlns:a14="http://schemas.microsoft.com/office/drawing/2010/main" xmlns:p14="http://schemas.microsoft.com/office/powerpoint/2010/main" w="9525">
+                <a14:hiddenLine xmlns:p14="http://schemas.microsoft.com/office/powerpoint/2010/main" xmlns:a14="http://schemas.microsoft.com/office/drawing/2010/main" xmlns:a16="http://schemas.microsoft.com/office/drawing/2014/main" xmlns="" w="9525">
                   <a:solidFill>
                     <a:srgbClr val="000000"/>
                   </a:solidFill>
@@ -17122,7 +17474,7 @@
             </a:ln>
             <a:extLst>
               <a:ext uri="{91240B29-F687-4f45-9708-019B960494DF}">
-                <a14:hiddenLine xmlns="" xmlns:a16="http://schemas.microsoft.com/office/drawing/2014/main" xmlns:a14="http://schemas.microsoft.com/office/drawing/2010/main" xmlns:p14="http://schemas.microsoft.com/office/powerpoint/2010/main" w="9525">
+                <a14:hiddenLine xmlns:p14="http://schemas.microsoft.com/office/powerpoint/2010/main" xmlns:a14="http://schemas.microsoft.com/office/drawing/2010/main" xmlns:a16="http://schemas.microsoft.com/office/drawing/2014/main" xmlns="" w="9525">
                   <a:solidFill>
                     <a:srgbClr val="000000"/>
                   </a:solidFill>
@@ -17199,7 +17551,7 @@
             </a:ln>
             <a:extLst>
               <a:ext uri="{91240B29-F687-4f45-9708-019B960494DF}">
-                <a14:hiddenLine xmlns="" xmlns:a16="http://schemas.microsoft.com/office/drawing/2014/main" xmlns:a14="http://schemas.microsoft.com/office/drawing/2010/main" xmlns:p14="http://schemas.microsoft.com/office/powerpoint/2010/main" w="9525">
+                <a14:hiddenLine xmlns:p14="http://schemas.microsoft.com/office/powerpoint/2010/main" xmlns:a14="http://schemas.microsoft.com/office/drawing/2010/main" xmlns:a16="http://schemas.microsoft.com/office/drawing/2014/main" xmlns="" w="9525">
                   <a:solidFill>
                     <a:srgbClr val="000000"/>
                   </a:solidFill>
@@ -17276,7 +17628,7 @@
             </a:ln>
             <a:extLst>
               <a:ext uri="{91240B29-F687-4f45-9708-019B960494DF}">
-                <a14:hiddenLine xmlns="" xmlns:a16="http://schemas.microsoft.com/office/drawing/2014/main" xmlns:a14="http://schemas.microsoft.com/office/drawing/2010/main" xmlns:p14="http://schemas.microsoft.com/office/powerpoint/2010/main" w="9525">
+                <a14:hiddenLine xmlns:p14="http://schemas.microsoft.com/office/powerpoint/2010/main" xmlns:a14="http://schemas.microsoft.com/office/drawing/2010/main" xmlns:a16="http://schemas.microsoft.com/office/drawing/2014/main" xmlns="" w="9525">
                   <a:solidFill>
                     <a:srgbClr val="000000"/>
                   </a:solidFill>
@@ -17381,7 +17733,7 @@
             </a:ln>
             <a:extLst>
               <a:ext uri="{91240B29-F687-4f45-9708-019B960494DF}">
-                <a14:hiddenLine xmlns="" xmlns:a16="http://schemas.microsoft.com/office/drawing/2014/main" xmlns:a14="http://schemas.microsoft.com/office/drawing/2010/main" xmlns:p14="http://schemas.microsoft.com/office/powerpoint/2010/main" w="9525">
+                <a14:hiddenLine xmlns:p14="http://schemas.microsoft.com/office/powerpoint/2010/main" xmlns:a14="http://schemas.microsoft.com/office/drawing/2010/main" xmlns:a16="http://schemas.microsoft.com/office/drawing/2014/main" xmlns="" w="9525">
                   <a:solidFill>
                     <a:srgbClr val="000000"/>
                   </a:solidFill>
@@ -17486,7 +17838,7 @@
             </a:ln>
             <a:extLst>
               <a:ext uri="{91240B29-F687-4f45-9708-019B960494DF}">
-                <a14:hiddenLine xmlns="" xmlns:a16="http://schemas.microsoft.com/office/drawing/2014/main" xmlns:a14="http://schemas.microsoft.com/office/drawing/2010/main" xmlns:p14="http://schemas.microsoft.com/office/powerpoint/2010/main" w="9525">
+                <a14:hiddenLine xmlns:p14="http://schemas.microsoft.com/office/powerpoint/2010/main" xmlns:a14="http://schemas.microsoft.com/office/drawing/2010/main" xmlns:a16="http://schemas.microsoft.com/office/drawing/2014/main" xmlns="" w="9525">
                   <a:solidFill>
                     <a:srgbClr val="000000"/>
                   </a:solidFill>
@@ -17563,7 +17915,7 @@
             </a:ln>
             <a:extLst>
               <a:ext uri="{91240B29-F687-4f45-9708-019B960494DF}">
-                <a14:hiddenLine xmlns="" xmlns:a16="http://schemas.microsoft.com/office/drawing/2014/main" xmlns:a14="http://schemas.microsoft.com/office/drawing/2010/main" xmlns:p14="http://schemas.microsoft.com/office/powerpoint/2010/main" w="9525">
+                <a14:hiddenLine xmlns:p14="http://schemas.microsoft.com/office/powerpoint/2010/main" xmlns:a14="http://schemas.microsoft.com/office/drawing/2010/main" xmlns:a16="http://schemas.microsoft.com/office/drawing/2014/main" xmlns="" w="9525">
                   <a:solidFill>
                     <a:srgbClr val="000000"/>
                   </a:solidFill>
@@ -17688,7 +18040,7 @@
             </a:ln>
             <a:extLst>
               <a:ext uri="{91240B29-F687-4f45-9708-019B960494DF}">
-                <a14:hiddenLine xmlns="" xmlns:a16="http://schemas.microsoft.com/office/drawing/2014/main" xmlns:a14="http://schemas.microsoft.com/office/drawing/2010/main" xmlns:p14="http://schemas.microsoft.com/office/powerpoint/2010/main" w="9525">
+                <a14:hiddenLine xmlns:p14="http://schemas.microsoft.com/office/powerpoint/2010/main" xmlns:a14="http://schemas.microsoft.com/office/drawing/2010/main" xmlns:a16="http://schemas.microsoft.com/office/drawing/2014/main" xmlns="" w="9525">
                   <a:solidFill>
                     <a:srgbClr val="000000"/>
                   </a:solidFill>
@@ -17765,7 +18117,7 @@
             </a:ln>
             <a:extLst>
               <a:ext uri="{91240B29-F687-4f45-9708-019B960494DF}">
-                <a14:hiddenLine xmlns="" xmlns:a16="http://schemas.microsoft.com/office/drawing/2014/main" xmlns:a14="http://schemas.microsoft.com/office/drawing/2010/main" xmlns:p14="http://schemas.microsoft.com/office/powerpoint/2010/main" w="9525">
+                <a14:hiddenLine xmlns:p14="http://schemas.microsoft.com/office/powerpoint/2010/main" xmlns:a14="http://schemas.microsoft.com/office/drawing/2010/main" xmlns:a16="http://schemas.microsoft.com/office/drawing/2014/main" xmlns="" w="9525">
                   <a:solidFill>
                     <a:srgbClr val="000000"/>
                   </a:solidFill>
@@ -17870,7 +18222,7 @@
             </a:ln>
             <a:extLst>
               <a:ext uri="{91240B29-F687-4f45-9708-019B960494DF}">
-                <a14:hiddenLine xmlns="" xmlns:a16="http://schemas.microsoft.com/office/drawing/2014/main" xmlns:a14="http://schemas.microsoft.com/office/drawing/2010/main" xmlns:p14="http://schemas.microsoft.com/office/powerpoint/2010/main" w="9525">
+                <a14:hiddenLine xmlns:p14="http://schemas.microsoft.com/office/powerpoint/2010/main" xmlns:a14="http://schemas.microsoft.com/office/drawing/2010/main" xmlns:a16="http://schemas.microsoft.com/office/drawing/2014/main" xmlns="" w="9525">
                   <a:solidFill>
                     <a:srgbClr val="000000"/>
                   </a:solidFill>
@@ -17975,7 +18327,7 @@
             </a:ln>
             <a:extLst>
               <a:ext uri="{91240B29-F687-4f45-9708-019B960494DF}">
-                <a14:hiddenLine xmlns="" xmlns:a16="http://schemas.microsoft.com/office/drawing/2014/main" xmlns:a14="http://schemas.microsoft.com/office/drawing/2010/main" xmlns:p14="http://schemas.microsoft.com/office/powerpoint/2010/main" w="9525">
+                <a14:hiddenLine xmlns:p14="http://schemas.microsoft.com/office/powerpoint/2010/main" xmlns:a14="http://schemas.microsoft.com/office/drawing/2010/main" xmlns:a16="http://schemas.microsoft.com/office/drawing/2014/main" xmlns="" w="9525">
                   <a:solidFill>
                     <a:srgbClr val="000000"/>
                   </a:solidFill>
@@ -18052,7 +18404,7 @@
             </a:ln>
             <a:extLst>
               <a:ext uri="{91240B29-F687-4f45-9708-019B960494DF}">
-                <a14:hiddenLine xmlns="" xmlns:a16="http://schemas.microsoft.com/office/drawing/2014/main" xmlns:a14="http://schemas.microsoft.com/office/drawing/2010/main" xmlns:p14="http://schemas.microsoft.com/office/powerpoint/2010/main" w="9525">
+                <a14:hiddenLine xmlns:p14="http://schemas.microsoft.com/office/powerpoint/2010/main" xmlns:a14="http://schemas.microsoft.com/office/drawing/2010/main" xmlns:a16="http://schemas.microsoft.com/office/drawing/2014/main" xmlns="" w="9525">
                   <a:solidFill>
                     <a:srgbClr val="000000"/>
                   </a:solidFill>
@@ -18157,7 +18509,7 @@
             </a:ln>
             <a:extLst>
               <a:ext uri="{91240B29-F687-4f45-9708-019B960494DF}">
-                <a14:hiddenLine xmlns="" xmlns:a16="http://schemas.microsoft.com/office/drawing/2014/main" xmlns:a14="http://schemas.microsoft.com/office/drawing/2010/main" xmlns:p14="http://schemas.microsoft.com/office/powerpoint/2010/main" w="9525">
+                <a14:hiddenLine xmlns:p14="http://schemas.microsoft.com/office/powerpoint/2010/main" xmlns:a14="http://schemas.microsoft.com/office/drawing/2010/main" xmlns:a16="http://schemas.microsoft.com/office/drawing/2014/main" xmlns="" w="9525">
                   <a:solidFill>
                     <a:srgbClr val="000000"/>
                   </a:solidFill>
@@ -18262,7 +18614,7 @@
             </a:ln>
             <a:extLst>
               <a:ext uri="{91240B29-F687-4f45-9708-019B960494DF}">
-                <a14:hiddenLine xmlns="" xmlns:a16="http://schemas.microsoft.com/office/drawing/2014/main" xmlns:a14="http://schemas.microsoft.com/office/drawing/2010/main" xmlns:p14="http://schemas.microsoft.com/office/powerpoint/2010/main" w="9525">
+                <a14:hiddenLine xmlns:p14="http://schemas.microsoft.com/office/powerpoint/2010/main" xmlns:a14="http://schemas.microsoft.com/office/drawing/2010/main" xmlns:a16="http://schemas.microsoft.com/office/drawing/2014/main" xmlns="" w="9525">
                   <a:solidFill>
                     <a:srgbClr val="000000"/>
                   </a:solidFill>
@@ -18333,7 +18685,7 @@
             </a:ln>
             <a:extLst>
               <a:ext uri="{91240B29-F687-4f45-9708-019B960494DF}">
-                <a14:hiddenLine xmlns="" xmlns:a16="http://schemas.microsoft.com/office/drawing/2014/main" xmlns:a14="http://schemas.microsoft.com/office/drawing/2010/main" xmlns:p14="http://schemas.microsoft.com/office/powerpoint/2010/main" w="9525">
+                <a14:hiddenLine xmlns:p14="http://schemas.microsoft.com/office/powerpoint/2010/main" xmlns:a14="http://schemas.microsoft.com/office/drawing/2010/main" xmlns:a16="http://schemas.microsoft.com/office/drawing/2014/main" xmlns="" w="9525">
                   <a:solidFill>
                     <a:srgbClr val="000000"/>
                   </a:solidFill>
@@ -18438,7 +18790,7 @@
             </a:ln>
             <a:extLst>
               <a:ext uri="{91240B29-F687-4f45-9708-019B960494DF}">
-                <a14:hiddenLine xmlns="" xmlns:a16="http://schemas.microsoft.com/office/drawing/2014/main" xmlns:a14="http://schemas.microsoft.com/office/drawing/2010/main" xmlns:p14="http://schemas.microsoft.com/office/powerpoint/2010/main" w="9525">
+                <a14:hiddenLine xmlns:p14="http://schemas.microsoft.com/office/powerpoint/2010/main" xmlns:a14="http://schemas.microsoft.com/office/drawing/2010/main" xmlns:a16="http://schemas.microsoft.com/office/drawing/2014/main" xmlns="" w="9525">
                   <a:solidFill>
                     <a:srgbClr val="000000"/>
                   </a:solidFill>
@@ -18509,7 +18861,7 @@
             </a:ln>
             <a:extLst>
               <a:ext uri="{91240B29-F687-4f45-9708-019B960494DF}">
-                <a14:hiddenLine xmlns="" xmlns:a16="http://schemas.microsoft.com/office/drawing/2014/main" xmlns:a14="http://schemas.microsoft.com/office/drawing/2010/main" xmlns:p14="http://schemas.microsoft.com/office/powerpoint/2010/main" w="9525">
+                <a14:hiddenLine xmlns:p14="http://schemas.microsoft.com/office/powerpoint/2010/main" xmlns:a14="http://schemas.microsoft.com/office/drawing/2010/main" xmlns:a16="http://schemas.microsoft.com/office/drawing/2014/main" xmlns="" w="9525">
                   <a:solidFill>
                     <a:srgbClr val="000000"/>
                   </a:solidFill>
@@ -18614,7 +18966,7 @@
             </a:ln>
             <a:extLst>
               <a:ext uri="{91240B29-F687-4f45-9708-019B960494DF}">
-                <a14:hiddenLine xmlns="" xmlns:a16="http://schemas.microsoft.com/office/drawing/2014/main" xmlns:a14="http://schemas.microsoft.com/office/drawing/2010/main" xmlns:p14="http://schemas.microsoft.com/office/powerpoint/2010/main" w="9525">
+                <a14:hiddenLine xmlns:p14="http://schemas.microsoft.com/office/powerpoint/2010/main" xmlns:a14="http://schemas.microsoft.com/office/drawing/2010/main" xmlns:a16="http://schemas.microsoft.com/office/drawing/2014/main" xmlns="" w="9525">
                   <a:solidFill>
                     <a:srgbClr val="000000"/>
                   </a:solidFill>
@@ -18697,7 +19049,7 @@
             </a:ln>
             <a:extLst>
               <a:ext uri="{91240B29-F687-4f45-9708-019B960494DF}">
-                <a14:hiddenLine xmlns="" xmlns:a16="http://schemas.microsoft.com/office/drawing/2014/main" xmlns:a14="http://schemas.microsoft.com/office/drawing/2010/main" xmlns:p14="http://schemas.microsoft.com/office/powerpoint/2010/main" w="9525">
+                <a14:hiddenLine xmlns:p14="http://schemas.microsoft.com/office/powerpoint/2010/main" xmlns:a14="http://schemas.microsoft.com/office/drawing/2010/main" xmlns:a16="http://schemas.microsoft.com/office/drawing/2014/main" xmlns="" w="9525">
                   <a:solidFill>
                     <a:srgbClr val="000000"/>
                   </a:solidFill>
@@ -18802,7 +19154,7 @@
             </a:ln>
             <a:extLst>
               <a:ext uri="{91240B29-F687-4f45-9708-019B960494DF}">
-                <a14:hiddenLine xmlns="" xmlns:a16="http://schemas.microsoft.com/office/drawing/2014/main" xmlns:a14="http://schemas.microsoft.com/office/drawing/2010/main" xmlns:p14="http://schemas.microsoft.com/office/powerpoint/2010/main" w="9525">
+                <a14:hiddenLine xmlns:p14="http://schemas.microsoft.com/office/powerpoint/2010/main" xmlns:a14="http://schemas.microsoft.com/office/drawing/2010/main" xmlns:a16="http://schemas.microsoft.com/office/drawing/2014/main" xmlns="" w="9525">
                   <a:solidFill>
                     <a:srgbClr val="000000"/>
                   </a:solidFill>
@@ -18885,7 +19237,7 @@
             </a:ln>
             <a:extLst>
               <a:ext uri="{91240B29-F687-4f45-9708-019B960494DF}">
-                <a14:hiddenLine xmlns="" xmlns:a16="http://schemas.microsoft.com/office/drawing/2014/main" xmlns:a14="http://schemas.microsoft.com/office/drawing/2010/main" xmlns:p14="http://schemas.microsoft.com/office/powerpoint/2010/main" w="9525">
+                <a14:hiddenLine xmlns:p14="http://schemas.microsoft.com/office/powerpoint/2010/main" xmlns:a14="http://schemas.microsoft.com/office/drawing/2010/main" xmlns:a16="http://schemas.microsoft.com/office/drawing/2014/main" xmlns="" w="9525">
                   <a:solidFill>
                     <a:srgbClr val="000000"/>
                   </a:solidFill>
@@ -18990,7 +19342,7 @@
             </a:ln>
             <a:extLst>
               <a:ext uri="{91240B29-F687-4f45-9708-019B960494DF}">
-                <a14:hiddenLine xmlns="" xmlns:a16="http://schemas.microsoft.com/office/drawing/2014/main" xmlns:a14="http://schemas.microsoft.com/office/drawing/2010/main" xmlns:p14="http://schemas.microsoft.com/office/powerpoint/2010/main" w="9525">
+                <a14:hiddenLine xmlns:p14="http://schemas.microsoft.com/office/powerpoint/2010/main" xmlns:a14="http://schemas.microsoft.com/office/drawing/2010/main" xmlns:a16="http://schemas.microsoft.com/office/drawing/2014/main" xmlns="" w="9525">
                   <a:solidFill>
                     <a:srgbClr val="000000"/>
                   </a:solidFill>
@@ -19039,7 +19391,7 @@
             </a:ln>
             <a:extLst>
               <a:ext uri="{91240B29-F687-4f45-9708-019B960494DF}">
-                <a14:hiddenLine xmlns="" xmlns:a16="http://schemas.microsoft.com/office/drawing/2014/main" xmlns:a14="http://schemas.microsoft.com/office/drawing/2010/main" xmlns:p14="http://schemas.microsoft.com/office/powerpoint/2010/main" w="9525">
+                <a14:hiddenLine xmlns:p14="http://schemas.microsoft.com/office/powerpoint/2010/main" xmlns:a14="http://schemas.microsoft.com/office/drawing/2010/main" xmlns:a16="http://schemas.microsoft.com/office/drawing/2014/main" xmlns="" w="9525">
                   <a:solidFill>
                     <a:srgbClr val="000000"/>
                   </a:solidFill>
@@ -19144,7 +19496,7 @@
             </a:ln>
             <a:extLst>
               <a:ext uri="{91240B29-F687-4f45-9708-019B960494DF}">
-                <a14:hiddenLine xmlns="" xmlns:a16="http://schemas.microsoft.com/office/drawing/2014/main" xmlns:a14="http://schemas.microsoft.com/office/drawing/2010/main" xmlns:p14="http://schemas.microsoft.com/office/powerpoint/2010/main" w="9525">
+                <a14:hiddenLine xmlns:p14="http://schemas.microsoft.com/office/powerpoint/2010/main" xmlns:a14="http://schemas.microsoft.com/office/drawing/2010/main" xmlns:a16="http://schemas.microsoft.com/office/drawing/2014/main" xmlns="" w="9525">
                   <a:solidFill>
                     <a:srgbClr val="000000"/>
                   </a:solidFill>
@@ -19221,7 +19573,7 @@
             </a:ln>
             <a:extLst>
               <a:ext uri="{91240B29-F687-4f45-9708-019B960494DF}">
-                <a14:hiddenLine xmlns="" xmlns:a16="http://schemas.microsoft.com/office/drawing/2014/main" xmlns:a14="http://schemas.microsoft.com/office/drawing/2010/main" xmlns:p14="http://schemas.microsoft.com/office/powerpoint/2010/main" w="9525">
+                <a14:hiddenLine xmlns:p14="http://schemas.microsoft.com/office/powerpoint/2010/main" xmlns:a14="http://schemas.microsoft.com/office/drawing/2010/main" xmlns:a16="http://schemas.microsoft.com/office/drawing/2014/main" xmlns="" w="9525">
                   <a:solidFill>
                     <a:srgbClr val="000000"/>
                   </a:solidFill>
@@ -19298,7 +19650,7 @@
             </a:ln>
             <a:extLst>
               <a:ext uri="{91240B29-F687-4f45-9708-019B960494DF}">
-                <a14:hiddenLine xmlns="" xmlns:a16="http://schemas.microsoft.com/office/drawing/2014/main" xmlns:a14="http://schemas.microsoft.com/office/drawing/2010/main" xmlns:p14="http://schemas.microsoft.com/office/powerpoint/2010/main" w="9525">
+                <a14:hiddenLine xmlns:p14="http://schemas.microsoft.com/office/powerpoint/2010/main" xmlns:a14="http://schemas.microsoft.com/office/drawing/2010/main" xmlns:a16="http://schemas.microsoft.com/office/drawing/2014/main" xmlns="" w="9525">
                   <a:solidFill>
                     <a:srgbClr val="000000"/>
                   </a:solidFill>
@@ -19403,7 +19755,7 @@
             </a:ln>
             <a:extLst>
               <a:ext uri="{91240B29-F687-4f45-9708-019B960494DF}">
-                <a14:hiddenLine xmlns="" xmlns:a16="http://schemas.microsoft.com/office/drawing/2014/main" xmlns:a14="http://schemas.microsoft.com/office/drawing/2010/main" xmlns:p14="http://schemas.microsoft.com/office/powerpoint/2010/main" w="9525">
+                <a14:hiddenLine xmlns:p14="http://schemas.microsoft.com/office/powerpoint/2010/main" xmlns:a14="http://schemas.microsoft.com/office/drawing/2010/main" xmlns:a16="http://schemas.microsoft.com/office/drawing/2014/main" xmlns="" w="9525">
                   <a:solidFill>
                     <a:srgbClr val="000000"/>
                   </a:solidFill>
@@ -19486,7 +19838,7 @@
             </a:ln>
             <a:extLst>
               <a:ext uri="{91240B29-F687-4f45-9708-019B960494DF}">
-                <a14:hiddenLine xmlns="" xmlns:a16="http://schemas.microsoft.com/office/drawing/2014/main" xmlns:a14="http://schemas.microsoft.com/office/drawing/2010/main" xmlns:p14="http://schemas.microsoft.com/office/powerpoint/2010/main" w="9525">
+                <a14:hiddenLine xmlns:p14="http://schemas.microsoft.com/office/powerpoint/2010/main" xmlns:a14="http://schemas.microsoft.com/office/drawing/2010/main" xmlns:a16="http://schemas.microsoft.com/office/drawing/2014/main" xmlns="" w="9525">
                   <a:solidFill>
                     <a:srgbClr val="000000"/>
                   </a:solidFill>
@@ -19563,7 +19915,7 @@
             </a:ln>
             <a:extLst>
               <a:ext uri="{91240B29-F687-4f45-9708-019B960494DF}">
-                <a14:hiddenLine xmlns="" xmlns:a16="http://schemas.microsoft.com/office/drawing/2014/main" xmlns:a14="http://schemas.microsoft.com/office/drawing/2010/main" xmlns:p14="http://schemas.microsoft.com/office/powerpoint/2010/main" w="9525">
+                <a14:hiddenLine xmlns:p14="http://schemas.microsoft.com/office/powerpoint/2010/main" xmlns:a14="http://schemas.microsoft.com/office/drawing/2010/main" xmlns:a16="http://schemas.microsoft.com/office/drawing/2014/main" xmlns="" w="9525">
                   <a:solidFill>
                     <a:srgbClr val="000000"/>
                   </a:solidFill>
@@ -19668,7 +20020,7 @@
             </a:ln>
             <a:extLst>
               <a:ext uri="{91240B29-F687-4f45-9708-019B960494DF}">
-                <a14:hiddenLine xmlns="" xmlns:a16="http://schemas.microsoft.com/office/drawing/2014/main" xmlns:a14="http://schemas.microsoft.com/office/drawing/2010/main" xmlns:p14="http://schemas.microsoft.com/office/powerpoint/2010/main" w="9525">
+                <a14:hiddenLine xmlns:p14="http://schemas.microsoft.com/office/powerpoint/2010/main" xmlns:a14="http://schemas.microsoft.com/office/drawing/2010/main" xmlns:a16="http://schemas.microsoft.com/office/drawing/2014/main" xmlns="" w="9525">
                   <a:solidFill>
                     <a:srgbClr val="000000"/>
                   </a:solidFill>
@@ -19745,7 +20097,7 @@
             </a:ln>
             <a:extLst>
               <a:ext uri="{91240B29-F687-4f45-9708-019B960494DF}">
-                <a14:hiddenLine xmlns="" xmlns:a16="http://schemas.microsoft.com/office/drawing/2014/main" xmlns:a14="http://schemas.microsoft.com/office/drawing/2010/main" xmlns:p14="http://schemas.microsoft.com/office/powerpoint/2010/main" w="9525">
+                <a14:hiddenLine xmlns:p14="http://schemas.microsoft.com/office/powerpoint/2010/main" xmlns:a14="http://schemas.microsoft.com/office/drawing/2010/main" xmlns:a16="http://schemas.microsoft.com/office/drawing/2014/main" xmlns="" w="9525">
                   <a:solidFill>
                     <a:srgbClr val="000000"/>
                   </a:solidFill>
@@ -19850,7 +20202,7 @@
             </a:ln>
             <a:extLst>
               <a:ext uri="{91240B29-F687-4f45-9708-019B960494DF}">
-                <a14:hiddenLine xmlns="" xmlns:a16="http://schemas.microsoft.com/office/drawing/2014/main" xmlns:a14="http://schemas.microsoft.com/office/drawing/2010/main" xmlns:p14="http://schemas.microsoft.com/office/powerpoint/2010/main" w="9525">
+                <a14:hiddenLine xmlns:p14="http://schemas.microsoft.com/office/powerpoint/2010/main" xmlns:a14="http://schemas.microsoft.com/office/drawing/2010/main" xmlns:a16="http://schemas.microsoft.com/office/drawing/2014/main" xmlns="" w="9525">
                   <a:solidFill>
                     <a:srgbClr val="000000"/>
                   </a:solidFill>
@@ -19927,7 +20279,7 @@
             </a:ln>
             <a:extLst>
               <a:ext uri="{91240B29-F687-4f45-9708-019B960494DF}">
-                <a14:hiddenLine xmlns="" xmlns:a16="http://schemas.microsoft.com/office/drawing/2014/main" xmlns:a14="http://schemas.microsoft.com/office/drawing/2010/main" xmlns:p14="http://schemas.microsoft.com/office/powerpoint/2010/main" w="9525">
+                <a14:hiddenLine xmlns:p14="http://schemas.microsoft.com/office/powerpoint/2010/main" xmlns:a14="http://schemas.microsoft.com/office/drawing/2010/main" xmlns:a16="http://schemas.microsoft.com/office/drawing/2014/main" xmlns="" w="9525">
                   <a:solidFill>
                     <a:srgbClr val="000000"/>
                   </a:solidFill>
@@ -20032,7 +20384,7 @@
             </a:ln>
             <a:extLst>
               <a:ext uri="{91240B29-F687-4f45-9708-019B960494DF}">
-                <a14:hiddenLine xmlns="" xmlns:a16="http://schemas.microsoft.com/office/drawing/2014/main" xmlns:a14="http://schemas.microsoft.com/office/drawing/2010/main" xmlns:p14="http://schemas.microsoft.com/office/powerpoint/2010/main" w="9525">
+                <a14:hiddenLine xmlns:p14="http://schemas.microsoft.com/office/powerpoint/2010/main" xmlns:a14="http://schemas.microsoft.com/office/drawing/2010/main" xmlns:a16="http://schemas.microsoft.com/office/drawing/2014/main" xmlns="" w="9525">
                   <a:solidFill>
                     <a:srgbClr val="000000"/>
                   </a:solidFill>
@@ -20081,7 +20433,7 @@
             </a:ln>
             <a:extLst>
               <a:ext uri="{91240B29-F687-4f45-9708-019B960494DF}">
-                <a14:hiddenLine xmlns="" xmlns:a16="http://schemas.microsoft.com/office/drawing/2014/main" xmlns:a14="http://schemas.microsoft.com/office/drawing/2010/main" xmlns:p14="http://schemas.microsoft.com/office/powerpoint/2010/main" w="9525">
+                <a14:hiddenLine xmlns:p14="http://schemas.microsoft.com/office/powerpoint/2010/main" xmlns:a14="http://schemas.microsoft.com/office/drawing/2010/main" xmlns:a16="http://schemas.microsoft.com/office/drawing/2014/main" xmlns="" w="9525">
                   <a:solidFill>
                     <a:srgbClr val="000000"/>
                   </a:solidFill>
@@ -20161,7 +20513,7 @@
             </a:ln>
             <a:extLst>
               <a:ext uri="{91240B29-F687-4f45-9708-019B960494DF}">
-                <a14:hiddenLine xmlns="" xmlns:a16="http://schemas.microsoft.com/office/drawing/2014/main" xmlns:a14="http://schemas.microsoft.com/office/drawing/2010/main" xmlns:p14="http://schemas.microsoft.com/office/powerpoint/2010/main" w="9525">
+                <a14:hiddenLine xmlns:p14="http://schemas.microsoft.com/office/powerpoint/2010/main" xmlns:a14="http://schemas.microsoft.com/office/drawing/2010/main" xmlns:a16="http://schemas.microsoft.com/office/drawing/2014/main" xmlns="" w="9525">
                   <a:solidFill>
                     <a:srgbClr val="000000"/>
                   </a:solidFill>
@@ -20266,7 +20618,7 @@
             </a:ln>
             <a:extLst>
               <a:ext uri="{91240B29-F687-4f45-9708-019B960494DF}">
-                <a14:hiddenLine xmlns="" xmlns:a16="http://schemas.microsoft.com/office/drawing/2014/main" xmlns:a14="http://schemas.microsoft.com/office/drawing/2010/main" xmlns:p14="http://schemas.microsoft.com/office/powerpoint/2010/main" w="9525">
+                <a14:hiddenLine xmlns:p14="http://schemas.microsoft.com/office/powerpoint/2010/main" xmlns:a14="http://schemas.microsoft.com/office/drawing/2010/main" xmlns:a16="http://schemas.microsoft.com/office/drawing/2014/main" xmlns="" w="9525">
                   <a:solidFill>
                     <a:srgbClr val="000000"/>
                   </a:solidFill>
@@ -20343,7 +20695,7 @@
             </a:ln>
             <a:extLst>
               <a:ext uri="{91240B29-F687-4f45-9708-019B960494DF}">
-                <a14:hiddenLine xmlns="" xmlns:a16="http://schemas.microsoft.com/office/drawing/2014/main" xmlns:a14="http://schemas.microsoft.com/office/drawing/2010/main" xmlns:p14="http://schemas.microsoft.com/office/powerpoint/2010/main" w="9525">
+                <a14:hiddenLine xmlns:p14="http://schemas.microsoft.com/office/powerpoint/2010/main" xmlns:a14="http://schemas.microsoft.com/office/drawing/2010/main" xmlns:a16="http://schemas.microsoft.com/office/drawing/2014/main" xmlns="" w="9525">
                   <a:solidFill>
                     <a:srgbClr val="000000"/>
                   </a:solidFill>
@@ -20448,7 +20800,7 @@
             </a:ln>
             <a:extLst>
               <a:ext uri="{91240B29-F687-4f45-9708-019B960494DF}">
-                <a14:hiddenLine xmlns="" xmlns:a16="http://schemas.microsoft.com/office/drawing/2014/main" xmlns:a14="http://schemas.microsoft.com/office/drawing/2010/main" xmlns:p14="http://schemas.microsoft.com/office/powerpoint/2010/main" w="9525">
+                <a14:hiddenLine xmlns:p14="http://schemas.microsoft.com/office/powerpoint/2010/main" xmlns:a14="http://schemas.microsoft.com/office/drawing/2010/main" xmlns:a16="http://schemas.microsoft.com/office/drawing/2014/main" xmlns="" w="9525">
                   <a:solidFill>
                     <a:srgbClr val="000000"/>
                   </a:solidFill>
@@ -20553,7 +20905,7 @@
             </a:ln>
             <a:extLst>
               <a:ext uri="{91240B29-F687-4f45-9708-019B960494DF}">
-                <a14:hiddenLine xmlns="" xmlns:a16="http://schemas.microsoft.com/office/drawing/2014/main" xmlns:a14="http://schemas.microsoft.com/office/drawing/2010/main" xmlns:p14="http://schemas.microsoft.com/office/powerpoint/2010/main" w="9525">
+                <a14:hiddenLine xmlns:p14="http://schemas.microsoft.com/office/powerpoint/2010/main" xmlns:a14="http://schemas.microsoft.com/office/drawing/2010/main" xmlns:a16="http://schemas.microsoft.com/office/drawing/2014/main" xmlns="" w="9525">
                   <a:solidFill>
                     <a:srgbClr val="000000"/>
                   </a:solidFill>
@@ -20633,7 +20985,7 @@
             </a:ln>
             <a:extLst>
               <a:ext uri="{91240B29-F687-4f45-9708-019B960494DF}">
-                <a14:hiddenLine xmlns="" xmlns:a16="http://schemas.microsoft.com/office/drawing/2014/main" xmlns:a14="http://schemas.microsoft.com/office/drawing/2010/main" xmlns:p14="http://schemas.microsoft.com/office/powerpoint/2010/main" w="9525">
+                <a14:hiddenLine xmlns:p14="http://schemas.microsoft.com/office/powerpoint/2010/main" xmlns:a14="http://schemas.microsoft.com/office/drawing/2010/main" xmlns:a16="http://schemas.microsoft.com/office/drawing/2014/main" xmlns="" w="9525">
                   <a:solidFill>
                     <a:srgbClr val="000000"/>
                   </a:solidFill>
@@ -20710,7 +21062,7 @@
             </a:ln>
             <a:extLst>
               <a:ext uri="{91240B29-F687-4f45-9708-019B960494DF}">
-                <a14:hiddenLine xmlns="" xmlns:a16="http://schemas.microsoft.com/office/drawing/2014/main" xmlns:a14="http://schemas.microsoft.com/office/drawing/2010/main" xmlns:p14="http://schemas.microsoft.com/office/powerpoint/2010/main" w="9525">
+                <a14:hiddenLine xmlns:p14="http://schemas.microsoft.com/office/powerpoint/2010/main" xmlns:a14="http://schemas.microsoft.com/office/drawing/2010/main" xmlns:a16="http://schemas.microsoft.com/office/drawing/2014/main" xmlns="" w="9525">
                   <a:solidFill>
                     <a:srgbClr val="000000"/>
                   </a:solidFill>
@@ -20815,7 +21167,7 @@
             </a:ln>
             <a:extLst>
               <a:ext uri="{91240B29-F687-4f45-9708-019B960494DF}">
-                <a14:hiddenLine xmlns="" xmlns:a16="http://schemas.microsoft.com/office/drawing/2014/main" xmlns:a14="http://schemas.microsoft.com/office/drawing/2010/main" xmlns:p14="http://schemas.microsoft.com/office/powerpoint/2010/main" w="9525">
+                <a14:hiddenLine xmlns:p14="http://schemas.microsoft.com/office/powerpoint/2010/main" xmlns:a14="http://schemas.microsoft.com/office/drawing/2010/main" xmlns:a16="http://schemas.microsoft.com/office/drawing/2014/main" xmlns="" w="9525">
                   <a:solidFill>
                     <a:srgbClr val="000000"/>
                   </a:solidFill>
@@ -20920,7 +21272,7 @@
             </a:ln>
             <a:extLst>
               <a:ext uri="{91240B29-F687-4f45-9708-019B960494DF}">
-                <a14:hiddenLine xmlns="" xmlns:a16="http://schemas.microsoft.com/office/drawing/2014/main" xmlns:a14="http://schemas.microsoft.com/office/drawing/2010/main" xmlns:p14="http://schemas.microsoft.com/office/powerpoint/2010/main" w="9525">
+                <a14:hiddenLine xmlns:p14="http://schemas.microsoft.com/office/powerpoint/2010/main" xmlns:a14="http://schemas.microsoft.com/office/drawing/2010/main" xmlns:a16="http://schemas.microsoft.com/office/drawing/2014/main" xmlns="" w="9525">
                   <a:solidFill>
                     <a:srgbClr val="000000"/>
                   </a:solidFill>
@@ -20997,7 +21349,7 @@
             </a:ln>
             <a:extLst>
               <a:ext uri="{91240B29-F687-4f45-9708-019B960494DF}">
-                <a14:hiddenLine xmlns="" xmlns:a16="http://schemas.microsoft.com/office/drawing/2014/main" xmlns:a14="http://schemas.microsoft.com/office/drawing/2010/main" xmlns:p14="http://schemas.microsoft.com/office/powerpoint/2010/main" w="9525">
+                <a14:hiddenLine xmlns:p14="http://schemas.microsoft.com/office/powerpoint/2010/main" xmlns:a14="http://schemas.microsoft.com/office/drawing/2010/main" xmlns:a16="http://schemas.microsoft.com/office/drawing/2014/main" xmlns="" w="9525">
                   <a:solidFill>
                     <a:srgbClr val="000000"/>
                   </a:solidFill>
@@ -21132,7 +21484,7 @@
             </a:ln>
             <a:extLst>
               <a:ext uri="{91240B29-F687-4f45-9708-019B960494DF}">
-                <a14:hiddenLine xmlns="" xmlns:a16="http://schemas.microsoft.com/office/drawing/2014/main" xmlns:a14="http://schemas.microsoft.com/office/drawing/2010/main" xmlns:p14="http://schemas.microsoft.com/office/powerpoint/2010/main" w="9525">
+                <a14:hiddenLine xmlns:p14="http://schemas.microsoft.com/office/powerpoint/2010/main" xmlns:a14="http://schemas.microsoft.com/office/drawing/2010/main" xmlns:a16="http://schemas.microsoft.com/office/drawing/2014/main" xmlns="" w="9525">
                   <a:solidFill>
                     <a:srgbClr val="000000"/>
                   </a:solidFill>
@@ -21215,7 +21567,7 @@
             </a:ln>
             <a:extLst>
               <a:ext uri="{91240B29-F687-4f45-9708-019B960494DF}">
-                <a14:hiddenLine xmlns="" xmlns:a16="http://schemas.microsoft.com/office/drawing/2014/main" xmlns:a14="http://schemas.microsoft.com/office/drawing/2010/main" xmlns:p14="http://schemas.microsoft.com/office/powerpoint/2010/main" w="9525">
+                <a14:hiddenLine xmlns:p14="http://schemas.microsoft.com/office/powerpoint/2010/main" xmlns:a14="http://schemas.microsoft.com/office/drawing/2010/main" xmlns:a16="http://schemas.microsoft.com/office/drawing/2014/main" xmlns="" w="9525">
                   <a:solidFill>
                     <a:srgbClr val="000000"/>
                   </a:solidFill>
@@ -21320,7 +21672,7 @@
             </a:ln>
             <a:extLst>
               <a:ext uri="{91240B29-F687-4f45-9708-019B960494DF}">
-                <a14:hiddenLine xmlns="" xmlns:a16="http://schemas.microsoft.com/office/drawing/2014/main" xmlns:a14="http://schemas.microsoft.com/office/drawing/2010/main" xmlns:p14="http://schemas.microsoft.com/office/powerpoint/2010/main" w="9525">
+                <a14:hiddenLine xmlns:p14="http://schemas.microsoft.com/office/powerpoint/2010/main" xmlns:a14="http://schemas.microsoft.com/office/drawing/2010/main" xmlns:a16="http://schemas.microsoft.com/office/drawing/2014/main" xmlns="" w="9525">
                   <a:solidFill>
                     <a:srgbClr val="000000"/>
                   </a:solidFill>
@@ -21450,7 +21802,7 @@
             </a:ln>
             <a:extLst>
               <a:ext uri="{91240B29-F687-4f45-9708-019B960494DF}">
-                <a14:hiddenLine xmlns="" xmlns:a16="http://schemas.microsoft.com/office/drawing/2014/main" xmlns:a14="http://schemas.microsoft.com/office/drawing/2010/main" xmlns:p14="http://schemas.microsoft.com/office/powerpoint/2010/main" w="9525">
+                <a14:hiddenLine xmlns:p14="http://schemas.microsoft.com/office/powerpoint/2010/main" xmlns:a14="http://schemas.microsoft.com/office/drawing/2010/main" xmlns:a16="http://schemas.microsoft.com/office/drawing/2014/main" xmlns="" w="9525">
                   <a:solidFill>
                     <a:srgbClr val="000000"/>
                   </a:solidFill>
@@ -21580,7 +21932,7 @@
             </a:ln>
             <a:extLst>
               <a:ext uri="{91240B29-F687-4f45-9708-019B960494DF}">
-                <a14:hiddenLine xmlns="" xmlns:a16="http://schemas.microsoft.com/office/drawing/2014/main" xmlns:a14="http://schemas.microsoft.com/office/drawing/2010/main" xmlns:p14="http://schemas.microsoft.com/office/powerpoint/2010/main" w="9525">
+                <a14:hiddenLine xmlns:p14="http://schemas.microsoft.com/office/powerpoint/2010/main" xmlns:a14="http://schemas.microsoft.com/office/drawing/2010/main" xmlns:a16="http://schemas.microsoft.com/office/drawing/2014/main" xmlns="" w="9525">
                   <a:solidFill>
                     <a:srgbClr val="000000"/>
                   </a:solidFill>
@@ -21685,7 +22037,7 @@
             </a:ln>
             <a:extLst>
               <a:ext uri="{91240B29-F687-4f45-9708-019B960494DF}">
-                <a14:hiddenLine xmlns="" xmlns:a16="http://schemas.microsoft.com/office/drawing/2014/main" xmlns:a14="http://schemas.microsoft.com/office/drawing/2010/main" xmlns:p14="http://schemas.microsoft.com/office/powerpoint/2010/main" w="9525">
+                <a14:hiddenLine xmlns:p14="http://schemas.microsoft.com/office/powerpoint/2010/main" xmlns:a14="http://schemas.microsoft.com/office/drawing/2010/main" xmlns:a16="http://schemas.microsoft.com/office/drawing/2014/main" xmlns="" w="9525">
                   <a:solidFill>
                     <a:srgbClr val="000000"/>
                   </a:solidFill>
@@ -21765,7 +22117,7 @@
             </a:ln>
             <a:extLst>
               <a:ext uri="{91240B29-F687-4f45-9708-019B960494DF}">
-                <a14:hiddenLine xmlns="" xmlns:a16="http://schemas.microsoft.com/office/drawing/2014/main" xmlns:a14="http://schemas.microsoft.com/office/drawing/2010/main" xmlns:p14="http://schemas.microsoft.com/office/powerpoint/2010/main" w="9525">
+                <a14:hiddenLine xmlns:p14="http://schemas.microsoft.com/office/powerpoint/2010/main" xmlns:a14="http://schemas.microsoft.com/office/drawing/2010/main" xmlns:a16="http://schemas.microsoft.com/office/drawing/2014/main" xmlns="" w="9525">
                   <a:solidFill>
                     <a:srgbClr val="000000"/>
                   </a:solidFill>
@@ -21870,7 +22222,7 @@
             </a:ln>
             <a:extLst>
               <a:ext uri="{91240B29-F687-4f45-9708-019B960494DF}">
-                <a14:hiddenLine xmlns="" xmlns:a16="http://schemas.microsoft.com/office/drawing/2014/main" xmlns:a14="http://schemas.microsoft.com/office/drawing/2010/main" xmlns:p14="http://schemas.microsoft.com/office/powerpoint/2010/main" w="9525">
+                <a14:hiddenLine xmlns:p14="http://schemas.microsoft.com/office/powerpoint/2010/main" xmlns:a14="http://schemas.microsoft.com/office/drawing/2010/main" xmlns:a16="http://schemas.microsoft.com/office/drawing/2014/main" xmlns="" w="9525">
                   <a:solidFill>
                     <a:srgbClr val="000000"/>
                   </a:solidFill>
@@ -21953,7 +22305,7 @@
             </a:ln>
             <a:extLst>
               <a:ext uri="{91240B29-F687-4f45-9708-019B960494DF}">
-                <a14:hiddenLine xmlns="" xmlns:a16="http://schemas.microsoft.com/office/drawing/2014/main" xmlns:a14="http://schemas.microsoft.com/office/drawing/2010/main" xmlns:p14="http://schemas.microsoft.com/office/powerpoint/2010/main" w="9525">
+                <a14:hiddenLine xmlns:p14="http://schemas.microsoft.com/office/powerpoint/2010/main" xmlns:a14="http://schemas.microsoft.com/office/drawing/2010/main" xmlns:a16="http://schemas.microsoft.com/office/drawing/2014/main" xmlns="" w="9525">
                   <a:solidFill>
                     <a:srgbClr val="000000"/>
                   </a:solidFill>
@@ -22058,7 +22410,7 @@
             </a:ln>
             <a:extLst>
               <a:ext uri="{91240B29-F687-4f45-9708-019B960494DF}">
-                <a14:hiddenLine xmlns="" xmlns:a16="http://schemas.microsoft.com/office/drawing/2014/main" xmlns:a14="http://schemas.microsoft.com/office/drawing/2010/main" xmlns:p14="http://schemas.microsoft.com/office/powerpoint/2010/main" w="9525">
+                <a14:hiddenLine xmlns:p14="http://schemas.microsoft.com/office/powerpoint/2010/main" xmlns:a14="http://schemas.microsoft.com/office/drawing/2010/main" xmlns:a16="http://schemas.microsoft.com/office/drawing/2014/main" xmlns="" w="9525">
                   <a:solidFill>
                     <a:srgbClr val="000000"/>
                   </a:solidFill>
@@ -22141,7 +22493,7 @@
             </a:ln>
             <a:extLst>
               <a:ext uri="{91240B29-F687-4f45-9708-019B960494DF}">
-                <a14:hiddenLine xmlns="" xmlns:a16="http://schemas.microsoft.com/office/drawing/2014/main" xmlns:a14="http://schemas.microsoft.com/office/drawing/2010/main" xmlns:p14="http://schemas.microsoft.com/office/powerpoint/2010/main" w="9525">
+                <a14:hiddenLine xmlns:p14="http://schemas.microsoft.com/office/powerpoint/2010/main" xmlns:a14="http://schemas.microsoft.com/office/drawing/2010/main" xmlns:a16="http://schemas.microsoft.com/office/drawing/2014/main" xmlns="" w="9525">
                   <a:solidFill>
                     <a:srgbClr val="000000"/>
                   </a:solidFill>
@@ -22246,7 +22598,7 @@
             </a:ln>
             <a:extLst>
               <a:ext uri="{91240B29-F687-4f45-9708-019B960494DF}">
-                <a14:hiddenLine xmlns="" xmlns:a16="http://schemas.microsoft.com/office/drawing/2014/main" xmlns:a14="http://schemas.microsoft.com/office/drawing/2010/main" xmlns:p14="http://schemas.microsoft.com/office/powerpoint/2010/main" w="9525">
+                <a14:hiddenLine xmlns:p14="http://schemas.microsoft.com/office/powerpoint/2010/main" xmlns:a14="http://schemas.microsoft.com/office/drawing/2010/main" xmlns:a16="http://schemas.microsoft.com/office/drawing/2014/main" xmlns="" w="9525">
                   <a:solidFill>
                     <a:srgbClr val="000000"/>
                   </a:solidFill>
@@ -22295,7 +22647,7 @@
             </a:ln>
             <a:extLst>
               <a:ext uri="{91240B29-F687-4f45-9708-019B960494DF}">
-                <a14:hiddenLine xmlns="" xmlns:a16="http://schemas.microsoft.com/office/drawing/2014/main" xmlns:a14="http://schemas.microsoft.com/office/drawing/2010/main" xmlns:p14="http://schemas.microsoft.com/office/powerpoint/2010/main" w="9525">
+                <a14:hiddenLine xmlns:p14="http://schemas.microsoft.com/office/powerpoint/2010/main" xmlns:a14="http://schemas.microsoft.com/office/drawing/2010/main" xmlns:a16="http://schemas.microsoft.com/office/drawing/2014/main" xmlns="" w="9525">
                   <a:solidFill>
                     <a:srgbClr val="000000"/>
                   </a:solidFill>
@@ -22498,7 +22850,7 @@
       </p:grpSpPr>
       <p:pic>
         <p:nvPicPr>
-          <p:cNvPr id="9" name="Picture Placeholder 8" descr="Abstract organic polygons blurred">
+          <p:cNvPr id="9" name="Picture Placeholder 8" descr="Close-up of circuit board">
             <a:extLst>
               <a:ext uri="{FF2B5EF4-FFF2-40B4-BE49-F238E27FC236}">
                 <a16:creationId xmlns:a16="http://schemas.microsoft.com/office/drawing/2014/main" id="{2D73DA0F-7DB4-4B1A-8B34-4F00DA6DD026}"/>
@@ -22512,21 +22864,15 @@
             <p:ph type="pic" sz="quarter" idx="16"/>
           </p:nvPr>
         </p:nvPicPr>
-        <p:blipFill rotWithShape="1">
-          <a:blip r:embed="rId2" cstate="screen">
-            <a:extLst>
-              <a:ext uri="{28A0092B-C50C-407E-A947-70E740481C1C}">
-                <a14:useLocalDpi xmlns:a14="http://schemas.microsoft.com/office/drawing/2010/main"/>
-              </a:ext>
-            </a:extLst>
-          </a:blip>
+        <p:blipFill>
+          <a:blip r:embed="rId2"/>
           <a:srcRect/>
           <a:stretch/>
         </p:blipFill>
         <p:spPr>
-          <a:xfrm>
-            <a:off x="-1" y="-1"/>
-            <a:ext cx="5858933" cy="6858219"/>
+          <a:xfrm rot="5400000">
+            <a:off x="-882513" y="357008"/>
+            <a:ext cx="7383503" cy="5618481"/>
           </a:xfrm>
         </p:spPr>
       </p:pic>
@@ -22583,8 +22929,8 @@
         </p:nvSpPr>
         <p:spPr>
           <a:xfrm>
-            <a:off x="6095999" y="2589839"/>
-            <a:ext cx="4611758" cy="3620161"/>
+            <a:off x="6095999" y="2315520"/>
+            <a:ext cx="4611758" cy="1691216"/>
           </a:xfrm>
         </p:spPr>
         <p:txBody>
@@ -22621,6 +22967,74 @@
               <a:t>jmidrichards@gmail.com</a:t>
             </a:r>
             <a:endParaRPr lang="en-US" dirty="0"/>
+          </a:p>
+        </p:txBody>
+      </p:sp>
+      <p:sp>
+        <p:nvSpPr>
+          <p:cNvPr id="7" name="TextBox 6">
+            <a:extLst>
+              <a:ext uri="{FF2B5EF4-FFF2-40B4-BE49-F238E27FC236}">
+                <a16:creationId xmlns:a16="http://schemas.microsoft.com/office/drawing/2014/main" id="{4D265F7B-4739-4C48-966F-DC0C82710984}"/>
+              </a:ext>
+            </a:extLst>
+          </p:cNvPr>
+          <p:cNvSpPr txBox="1"/>
+          <p:nvPr/>
+        </p:nvSpPr>
+        <p:spPr>
+          <a:xfrm>
+            <a:off x="348670" y="409698"/>
+            <a:ext cx="4921135" cy="2000548"/>
+          </a:xfrm>
+          <a:prstGeom prst="rect">
+            <a:avLst/>
+          </a:prstGeom>
+          <a:noFill/>
+        </p:spPr>
+        <p:txBody>
+          <a:bodyPr wrap="square">
+            <a:spAutoFit/>
+          </a:bodyPr>
+          <a:lstStyle/>
+          <a:p>
+            <a:r>
+              <a:rPr lang="en-US" sz="2400" b="1" dirty="0"/>
+              <a:t>References:</a:t>
+            </a:r>
+            <a:endParaRPr lang="en-US" sz="600" b="1" dirty="0"/>
+          </a:p>
+          <a:p>
+            <a:pPr marL="342900" indent="-342900">
+              <a:spcBef>
+                <a:spcPts val="600"/>
+              </a:spcBef>
+              <a:buAutoNum type="arabicPeriod"/>
+            </a:pPr>
+            <a:r>
+              <a:rPr lang="en-US" dirty="0"/>
+              <a:t>Xia X. Domains and Functions of Spike Protein in Sars-Cov-2 in the Context of Vaccine Design. Viruses. 2021 Jan 14;13(1):109. </a:t>
+            </a:r>
+            <a:r>
+              <a:rPr lang="en-US" dirty="0" err="1"/>
+              <a:t>doi</a:t>
+            </a:r>
+            <a:r>
+              <a:rPr lang="en-US" dirty="0"/>
+              <a:t>: 10.3390/v13010109.</a:t>
+            </a:r>
+          </a:p>
+          <a:p>
+            <a:pPr marL="342900" indent="-342900">
+              <a:spcBef>
+                <a:spcPts val="600"/>
+              </a:spcBef>
+              <a:buAutoNum type="arabicPeriod"/>
+            </a:pPr>
+            <a:r>
+              <a:rPr lang="en-US" dirty="0"/>
+              <a:t>Other references here</a:t>
+            </a:r>
           </a:p>
         </p:txBody>
       </p:sp>
@@ -23096,51 +23510,106 @@
             <p:ph type="title"/>
           </p:nvPr>
         </p:nvSpPr>
-        <p:spPr/>
+        <p:spPr>
+          <a:xfrm>
+            <a:off x="1143001" y="425478"/>
+            <a:ext cx="9905998" cy="1078202"/>
+          </a:xfrm>
+        </p:spPr>
         <p:txBody>
-          <a:bodyPr/>
+          <a:bodyPr>
+            <a:normAutofit fontScale="90000"/>
+          </a:bodyPr>
           <a:lstStyle/>
           <a:p>
             <a:pPr algn="ctr"/>
             <a:r>
-              <a:rPr lang="en-US" dirty="0"/>
-              <a:t>Protein Structure and Domains</a:t>
+              <a:rPr lang="en-US" b="1" dirty="0"/>
+              <a:t>Protein Structure and</a:t>
+            </a:r>
+            <a:br>
+              <a:rPr lang="en-US" b="1" dirty="0"/>
+            </a:br>
+            <a:r>
+              <a:rPr lang="en-US" b="1" dirty="0"/>
+              <a:t>Approximate Domains</a:t>
             </a:r>
           </a:p>
         </p:txBody>
       </p:sp>
-      <p:sp>
-        <p:nvSpPr>
-          <p:cNvPr id="3" name="Content Placeholder 2">
+      <p:pic>
+        <p:nvPicPr>
+          <p:cNvPr id="7" name="Content Placeholder 6">
             <a:extLst>
               <a:ext uri="{FF2B5EF4-FFF2-40B4-BE49-F238E27FC236}">
-                <a16:creationId xmlns:a16="http://schemas.microsoft.com/office/drawing/2014/main" id="{53274F13-FA89-4BB9-BE9D-33722F0F966D}"/>
+                <a16:creationId xmlns:a16="http://schemas.microsoft.com/office/drawing/2014/main" id="{AF0BB68C-8C73-4E90-B642-24F9929EDA4B}"/>
               </a:ext>
             </a:extLst>
           </p:cNvPr>
-          <p:cNvSpPr>
-            <a:spLocks noGrp="1"/>
-          </p:cNvSpPr>
+          <p:cNvPicPr>
+            <a:picLocks noGrp="1" noChangeAspect="1"/>
+          </p:cNvPicPr>
           <p:nvPr>
             <p:ph idx="1"/>
           </p:nvPr>
+        </p:nvPicPr>
+        <p:blipFill>
+          <a:blip r:embed="rId2"/>
+          <a:srcRect/>
+          <a:stretch/>
+        </p:blipFill>
+        <p:spPr>
+          <a:xfrm>
+            <a:off x="405733" y="1665099"/>
+            <a:ext cx="11380533" cy="4002060"/>
+          </a:xfrm>
+          <a:prstGeom prst="roundRect">
+            <a:avLst>
+              <a:gd name="adj" fmla="val 8594"/>
+            </a:avLst>
+          </a:prstGeom>
+          <a:solidFill>
+            <a:srgbClr val="FFFFFF">
+              <a:shade val="85000"/>
+            </a:srgbClr>
+          </a:solidFill>
+          <a:ln>
+            <a:noFill/>
+          </a:ln>
+          <a:effectLst/>
+        </p:spPr>
+      </p:pic>
+      <p:sp>
+        <p:nvSpPr>
+          <p:cNvPr id="10" name="TextBox 9">
+            <a:extLst>
+              <a:ext uri="{FF2B5EF4-FFF2-40B4-BE49-F238E27FC236}">
+                <a16:creationId xmlns:a16="http://schemas.microsoft.com/office/drawing/2014/main" id="{210FBD5B-CED2-4858-B20B-5690C77E4FF5}"/>
+              </a:ext>
+            </a:extLst>
+          </p:cNvPr>
+          <p:cNvSpPr txBox="1"/>
+          <p:nvPr/>
         </p:nvSpPr>
-        <p:spPr/>
+        <p:spPr>
+          <a:xfrm>
+            <a:off x="7489768" y="5853516"/>
+            <a:ext cx="3865418" cy="369332"/>
+          </a:xfrm>
+          <a:prstGeom prst="rect">
+            <a:avLst/>
+          </a:prstGeom>
+          <a:noFill/>
+        </p:spPr>
         <p:txBody>
-          <a:bodyPr/>
+          <a:bodyPr wrap="square" rtlCol="0">
+            <a:spAutoFit/>
+          </a:bodyPr>
           <a:lstStyle/>
           <a:p>
             <a:r>
               <a:rPr lang="en-US" dirty="0"/>
-              <a:t>Receptor Binding Domain (</a:t>
-            </a:r>
-            <a:r>
-              <a:rPr lang="en-US" u="sng" dirty="0"/>
-              <a:t>RBD</a:t>
-            </a:r>
-            <a:r>
-              <a:rPr lang="en-US" dirty="0"/>
-              <a:t>) is at amino acids 327-529</a:t>
+              <a:t>Source: [1], graph truncated for space</a:t>
             </a:r>
           </a:p>
         </p:txBody>
@@ -23714,4 +24183,299 @@
     </a:ext>
   </a:extLst>
 </a:theme>
+</file>
+
+<file path=ppt/theme/theme2.xml><?xml version="1.0" encoding="utf-8"?>
+<a:theme xmlns:a="http://schemas.openxmlformats.org/drawingml/2006/main" name="Office Theme">
+  <a:themeElements>
+    <a:clrScheme name="Office">
+      <a:dk1>
+        <a:sysClr val="windowText" lastClr="000000"/>
+      </a:dk1>
+      <a:lt1>
+        <a:sysClr val="window" lastClr="FFFFFF"/>
+      </a:lt1>
+      <a:dk2>
+        <a:srgbClr val="44546A"/>
+      </a:dk2>
+      <a:lt2>
+        <a:srgbClr val="E7E6E6"/>
+      </a:lt2>
+      <a:accent1>
+        <a:srgbClr val="4472C4"/>
+      </a:accent1>
+      <a:accent2>
+        <a:srgbClr val="ED7D31"/>
+      </a:accent2>
+      <a:accent3>
+        <a:srgbClr val="A5A5A5"/>
+      </a:accent3>
+      <a:accent4>
+        <a:srgbClr val="FFC000"/>
+      </a:accent4>
+      <a:accent5>
+        <a:srgbClr val="5B9BD5"/>
+      </a:accent5>
+      <a:accent6>
+        <a:srgbClr val="70AD47"/>
+      </a:accent6>
+      <a:hlink>
+        <a:srgbClr val="0563C1"/>
+      </a:hlink>
+      <a:folHlink>
+        <a:srgbClr val="954F72"/>
+      </a:folHlink>
+    </a:clrScheme>
+    <a:fontScheme name="Office">
+      <a:majorFont>
+        <a:latin typeface="Calibri Light" panose="020F0302020204030204"/>
+        <a:ea typeface=""/>
+        <a:cs typeface=""/>
+        <a:font script="Jpan" typeface="游ゴシック Light"/>
+        <a:font script="Hang" typeface="맑은 고딕"/>
+        <a:font script="Hans" typeface="等线 Light"/>
+        <a:font script="Hant" typeface="新細明體"/>
+        <a:font script="Arab" typeface="Times New Roman"/>
+        <a:font script="Hebr" typeface="Times New Roman"/>
+        <a:font script="Thai" typeface="Angsana New"/>
+        <a:font script="Ethi" typeface="Nyala"/>
+        <a:font script="Beng" typeface="Vrinda"/>
+        <a:font script="Gujr" typeface="Shruti"/>
+        <a:font script="Khmr" typeface="MoolBoran"/>
+        <a:font script="Knda" typeface="Tunga"/>
+        <a:font script="Guru" typeface="Raavi"/>
+        <a:font script="Cans" typeface="Euphemia"/>
+        <a:font script="Cher" typeface="Plantagenet Cherokee"/>
+        <a:font script="Yiii" typeface="Microsoft Yi Baiti"/>
+        <a:font script="Tibt" typeface="Microsoft Himalaya"/>
+        <a:font script="Thaa" typeface="MV Boli"/>
+        <a:font script="Deva" typeface="Mangal"/>
+        <a:font script="Telu" typeface="Gautami"/>
+        <a:font script="Taml" typeface="Latha"/>
+        <a:font script="Syrc" typeface="Estrangelo Edessa"/>
+        <a:font script="Orya" typeface="Kalinga"/>
+        <a:font script="Mlym" typeface="Kartika"/>
+        <a:font script="Laoo" typeface="DokChampa"/>
+        <a:font script="Sinh" typeface="Iskoola Pota"/>
+        <a:font script="Mong" typeface="Mongolian Baiti"/>
+        <a:font script="Viet" typeface="Times New Roman"/>
+        <a:font script="Uigh" typeface="Microsoft Uighur"/>
+        <a:font script="Geor" typeface="Sylfaen"/>
+        <a:font script="Armn" typeface="Arial"/>
+        <a:font script="Bugi" typeface="Leelawadee UI"/>
+        <a:font script="Bopo" typeface="Microsoft JhengHei"/>
+        <a:font script="Java" typeface="Javanese Text"/>
+        <a:font script="Lisu" typeface="Segoe UI"/>
+        <a:font script="Mymr" typeface="Myanmar Text"/>
+        <a:font script="Nkoo" typeface="Ebrima"/>
+        <a:font script="Olck" typeface="Nirmala UI"/>
+        <a:font script="Osma" typeface="Ebrima"/>
+        <a:font script="Phag" typeface="Phagspa"/>
+        <a:font script="Syrn" typeface="Estrangelo Edessa"/>
+        <a:font script="Syrj" typeface="Estrangelo Edessa"/>
+        <a:font script="Syre" typeface="Estrangelo Edessa"/>
+        <a:font script="Sora" typeface="Nirmala UI"/>
+        <a:font script="Tale" typeface="Microsoft Tai Le"/>
+        <a:font script="Talu" typeface="Microsoft New Tai Lue"/>
+        <a:font script="Tfng" typeface="Ebrima"/>
+      </a:majorFont>
+      <a:minorFont>
+        <a:latin typeface="Calibri" panose="020F0502020204030204"/>
+        <a:ea typeface=""/>
+        <a:cs typeface=""/>
+        <a:font script="Jpan" typeface="游ゴシック"/>
+        <a:font script="Hang" typeface="맑은 고딕"/>
+        <a:font script="Hans" typeface="等线"/>
+        <a:font script="Hant" typeface="新細明體"/>
+        <a:font script="Arab" typeface="Arial"/>
+        <a:font script="Hebr" typeface="Arial"/>
+        <a:font script="Thai" typeface="Cordia New"/>
+        <a:font script="Ethi" typeface="Nyala"/>
+        <a:font script="Beng" typeface="Vrinda"/>
+        <a:font script="Gujr" typeface="Shruti"/>
+        <a:font script="Khmr" typeface="DaunPenh"/>
+        <a:font script="Knda" typeface="Tunga"/>
+        <a:font script="Guru" typeface="Raavi"/>
+        <a:font script="Cans" typeface="Euphemia"/>
+        <a:font script="Cher" typeface="Plantagenet Cherokee"/>
+        <a:font script="Yiii" typeface="Microsoft Yi Baiti"/>
+        <a:font script="Tibt" typeface="Microsoft Himalaya"/>
+        <a:font script="Thaa" typeface="MV Boli"/>
+        <a:font script="Deva" typeface="Mangal"/>
+        <a:font script="Telu" typeface="Gautami"/>
+        <a:font script="Taml" typeface="Latha"/>
+        <a:font script="Syrc" typeface="Estrangelo Edessa"/>
+        <a:font script="Orya" typeface="Kalinga"/>
+        <a:font script="Mlym" typeface="Kartika"/>
+        <a:font script="Laoo" typeface="DokChampa"/>
+        <a:font script="Sinh" typeface="Iskoola Pota"/>
+        <a:font script="Mong" typeface="Mongolian Baiti"/>
+        <a:font script="Viet" typeface="Arial"/>
+        <a:font script="Uigh" typeface="Microsoft Uighur"/>
+        <a:font script="Geor" typeface="Sylfaen"/>
+        <a:font script="Armn" typeface="Arial"/>
+        <a:font script="Bugi" typeface="Leelawadee UI"/>
+        <a:font script="Bopo" typeface="Microsoft JhengHei"/>
+        <a:font script="Java" typeface="Javanese Text"/>
+        <a:font script="Lisu" typeface="Segoe UI"/>
+        <a:font script="Mymr" typeface="Myanmar Text"/>
+        <a:font script="Nkoo" typeface="Ebrima"/>
+        <a:font script="Olck" typeface="Nirmala UI"/>
+        <a:font script="Osma" typeface="Ebrima"/>
+        <a:font script="Phag" typeface="Phagspa"/>
+        <a:font script="Syrn" typeface="Estrangelo Edessa"/>
+        <a:font script="Syrj" typeface="Estrangelo Edessa"/>
+        <a:font script="Syre" typeface="Estrangelo Edessa"/>
+        <a:font script="Sora" typeface="Nirmala UI"/>
+        <a:font script="Tale" typeface="Microsoft Tai Le"/>
+        <a:font script="Talu" typeface="Microsoft New Tai Lue"/>
+        <a:font script="Tfng" typeface="Ebrima"/>
+      </a:minorFont>
+    </a:fontScheme>
+    <a:fmtScheme name="Office">
+      <a:fillStyleLst>
+        <a:solidFill>
+          <a:schemeClr val="phClr"/>
+        </a:solidFill>
+        <a:gradFill rotWithShape="1">
+          <a:gsLst>
+            <a:gs pos="0">
+              <a:schemeClr val="phClr">
+                <a:lumMod val="110000"/>
+                <a:satMod val="105000"/>
+                <a:tint val="67000"/>
+              </a:schemeClr>
+            </a:gs>
+            <a:gs pos="50000">
+              <a:schemeClr val="phClr">
+                <a:lumMod val="105000"/>
+                <a:satMod val="103000"/>
+                <a:tint val="73000"/>
+              </a:schemeClr>
+            </a:gs>
+            <a:gs pos="100000">
+              <a:schemeClr val="phClr">
+                <a:lumMod val="105000"/>
+                <a:satMod val="109000"/>
+                <a:tint val="81000"/>
+              </a:schemeClr>
+            </a:gs>
+          </a:gsLst>
+          <a:lin ang="5400000" scaled="0"/>
+        </a:gradFill>
+        <a:gradFill rotWithShape="1">
+          <a:gsLst>
+            <a:gs pos="0">
+              <a:schemeClr val="phClr">
+                <a:satMod val="103000"/>
+                <a:lumMod val="102000"/>
+                <a:tint val="94000"/>
+              </a:schemeClr>
+            </a:gs>
+            <a:gs pos="50000">
+              <a:schemeClr val="phClr">
+                <a:satMod val="110000"/>
+                <a:lumMod val="100000"/>
+                <a:shade val="100000"/>
+              </a:schemeClr>
+            </a:gs>
+            <a:gs pos="100000">
+              <a:schemeClr val="phClr">
+                <a:lumMod val="99000"/>
+                <a:satMod val="120000"/>
+                <a:shade val="78000"/>
+              </a:schemeClr>
+            </a:gs>
+          </a:gsLst>
+          <a:lin ang="5400000" scaled="0"/>
+        </a:gradFill>
+      </a:fillStyleLst>
+      <a:lnStyleLst>
+        <a:ln w="6350" cap="flat" cmpd="sng" algn="ctr">
+          <a:solidFill>
+            <a:schemeClr val="phClr"/>
+          </a:solidFill>
+          <a:prstDash val="solid"/>
+          <a:miter lim="800000"/>
+        </a:ln>
+        <a:ln w="12700" cap="flat" cmpd="sng" algn="ctr">
+          <a:solidFill>
+            <a:schemeClr val="phClr"/>
+          </a:solidFill>
+          <a:prstDash val="solid"/>
+          <a:miter lim="800000"/>
+        </a:ln>
+        <a:ln w="19050" cap="flat" cmpd="sng" algn="ctr">
+          <a:solidFill>
+            <a:schemeClr val="phClr"/>
+          </a:solidFill>
+          <a:prstDash val="solid"/>
+          <a:miter lim="800000"/>
+        </a:ln>
+      </a:lnStyleLst>
+      <a:effectStyleLst>
+        <a:effectStyle>
+          <a:effectLst/>
+        </a:effectStyle>
+        <a:effectStyle>
+          <a:effectLst/>
+        </a:effectStyle>
+        <a:effectStyle>
+          <a:effectLst>
+            <a:outerShdw blurRad="57150" dist="19050" dir="5400000" algn="ctr" rotWithShape="0">
+              <a:srgbClr val="000000">
+                <a:alpha val="63000"/>
+              </a:srgbClr>
+            </a:outerShdw>
+          </a:effectLst>
+        </a:effectStyle>
+      </a:effectStyleLst>
+      <a:bgFillStyleLst>
+        <a:solidFill>
+          <a:schemeClr val="phClr"/>
+        </a:solidFill>
+        <a:solidFill>
+          <a:schemeClr val="phClr">
+            <a:tint val="95000"/>
+            <a:satMod val="170000"/>
+          </a:schemeClr>
+        </a:solidFill>
+        <a:gradFill rotWithShape="1">
+          <a:gsLst>
+            <a:gs pos="0">
+              <a:schemeClr val="phClr">
+                <a:tint val="93000"/>
+                <a:satMod val="150000"/>
+                <a:shade val="98000"/>
+                <a:lumMod val="102000"/>
+              </a:schemeClr>
+            </a:gs>
+            <a:gs pos="50000">
+              <a:schemeClr val="phClr">
+                <a:tint val="98000"/>
+                <a:satMod val="130000"/>
+                <a:shade val="90000"/>
+                <a:lumMod val="103000"/>
+              </a:schemeClr>
+            </a:gs>
+            <a:gs pos="100000">
+              <a:schemeClr val="phClr">
+                <a:shade val="63000"/>
+                <a:satMod val="120000"/>
+              </a:schemeClr>
+            </a:gs>
+          </a:gsLst>
+          <a:lin ang="5400000" scaled="0"/>
+        </a:gradFill>
+      </a:bgFillStyleLst>
+    </a:fmtScheme>
+  </a:themeElements>
+  <a:objectDefaults/>
+  <a:extraClrSchemeLst/>
+  <a:extLst>
+    <a:ext uri="{05A4C25C-085E-4340-85A3-A5531E510DB2}">
+      <thm15:themeFamily xmlns:thm15="http://schemas.microsoft.com/office/thememl/2012/main" name="Office Theme" id="{62F939B6-93AF-4DB8-9C6B-D6C7DFDC589F}" vid="{4A3C46E8-61CC-4603-A589-7422A47A8E4A}"/>
+    </a:ext>
+  </a:extLst>
+</a:theme>
 </file>
</xml_diff>

<commit_message>
Add 6xra, Update Matrix_0-1100.png, Update Presentation
</commit_message>
<xml_diff>
--- a/Vas-Data/FinalPresentation.pptx
+++ b/Vas-Data/FinalPresentation.pptx
@@ -5,7 +5,7 @@
     <p:sldMasterId id="2147483648" r:id="rId1"/>
   </p:sldMasterIdLst>
   <p:notesMasterIdLst>
-    <p:notesMasterId r:id="rId13"/>
+    <p:notesMasterId r:id="rId14"/>
   </p:notesMasterIdLst>
   <p:sldIdLst>
     <p:sldId id="256" r:id="rId2"/>
@@ -18,7 +18,8 @@
     <p:sldId id="257" r:id="rId9"/>
     <p:sldId id="260" r:id="rId10"/>
     <p:sldId id="258" r:id="rId11"/>
-    <p:sldId id="271" r:id="rId12"/>
+    <p:sldId id="277" r:id="rId12"/>
+    <p:sldId id="271" r:id="rId13"/>
   </p:sldIdLst>
   <p:sldSz cx="12192000" cy="6858000"/>
   <p:notesSz cx="6858000" cy="9144000"/>
@@ -3723,7 +3724,7 @@
           <a:p>
             <a:fld id="{FB0D78C5-FAF4-4263-84DD-579F970B9B04}" type="datetimeFigureOut">
               <a:rPr lang="en-US" smtClean="0"/>
-              <a:t>7/13/2021</a:t>
+              <a:t>7/19/2021</a:t>
             </a:fld>
             <a:endParaRPr lang="en-US"/>
           </a:p>
@@ -8272,7 +8273,7 @@
           <a:p>
             <a:fld id="{48A87A34-81AB-432B-8DAE-1953F412C126}" type="datetimeFigureOut">
               <a:rPr lang="en-US" dirty="0"/>
-              <a:t>7/13/2021</a:t>
+              <a:t>7/19/2021</a:t>
             </a:fld>
             <a:endParaRPr lang="en-US" dirty="0"/>
           </a:p>
@@ -8534,7 +8535,7 @@
           <a:p>
             <a:fld id="{48A87A34-81AB-432B-8DAE-1953F412C126}" type="datetimeFigureOut">
               <a:rPr lang="en-US" dirty="0"/>
-              <a:t>7/13/2021</a:t>
+              <a:t>7/19/2021</a:t>
             </a:fld>
             <a:endParaRPr lang="en-US" dirty="0"/>
           </a:p>
@@ -8725,7 +8726,7 @@
           <a:p>
             <a:fld id="{48A87A34-81AB-432B-8DAE-1953F412C126}" type="datetimeFigureOut">
               <a:rPr lang="en-US" dirty="0"/>
-              <a:t>7/13/2021</a:t>
+              <a:t>7/19/2021</a:t>
             </a:fld>
             <a:endParaRPr lang="en-US" dirty="0"/>
           </a:p>
@@ -8983,7 +8984,7 @@
           <a:p>
             <a:fld id="{48A87A34-81AB-432B-8DAE-1953F412C126}" type="datetimeFigureOut">
               <a:rPr lang="en-US" dirty="0"/>
-              <a:t>7/13/2021</a:t>
+              <a:t>7/19/2021</a:t>
             </a:fld>
             <a:endParaRPr lang="en-US" dirty="0"/>
           </a:p>
@@ -9412,7 +9413,7 @@
           <a:p>
             <a:fld id="{48A87A34-81AB-432B-8DAE-1953F412C126}" type="datetimeFigureOut">
               <a:rPr lang="en-US" dirty="0"/>
-              <a:t>7/13/2021</a:t>
+              <a:t>7/19/2021</a:t>
             </a:fld>
             <a:endParaRPr lang="en-US" dirty="0"/>
           </a:p>
@@ -9953,7 +9954,7 @@
           <a:p>
             <a:fld id="{48A87A34-81AB-432B-8DAE-1953F412C126}" type="datetimeFigureOut">
               <a:rPr lang="en-US" dirty="0"/>
-              <a:t>7/13/2021</a:t>
+              <a:t>7/19/2021</a:t>
             </a:fld>
             <a:endParaRPr lang="en-US" dirty="0"/>
           </a:p>
@@ -10668,7 +10669,7 @@
           <a:p>
             <a:fld id="{48A87A34-81AB-432B-8DAE-1953F412C126}" type="datetimeFigureOut">
               <a:rPr lang="en-US" dirty="0"/>
-              <a:t>7/13/2021</a:t>
+              <a:t>7/19/2021</a:t>
             </a:fld>
             <a:endParaRPr lang="en-US" dirty="0"/>
           </a:p>
@@ -10833,7 +10834,7 @@
           <a:p>
             <a:fld id="{48A87A34-81AB-432B-8DAE-1953F412C126}" type="datetimeFigureOut">
               <a:rPr lang="en-US" dirty="0"/>
-              <a:t>7/13/2021</a:t>
+              <a:t>7/19/2021</a:t>
             </a:fld>
             <a:endParaRPr lang="en-US" dirty="0"/>
           </a:p>
@@ -11008,7 +11009,7 @@
           <a:p>
             <a:fld id="{48A87A34-81AB-432B-8DAE-1953F412C126}" type="datetimeFigureOut">
               <a:rPr lang="en-US" dirty="0"/>
-              <a:t>7/13/2021</a:t>
+              <a:t>7/19/2021</a:t>
             </a:fld>
             <a:endParaRPr lang="en-US" dirty="0"/>
           </a:p>
@@ -11465,7 +11466,7 @@
           <a:p>
             <a:fld id="{48A87A34-81AB-432B-8DAE-1953F412C126}" type="datetimeFigureOut">
               <a:rPr lang="en-US" dirty="0"/>
-              <a:t>7/13/2021</a:t>
+              <a:t>7/19/2021</a:t>
             </a:fld>
             <a:endParaRPr lang="en-US" dirty="0"/>
           </a:p>
@@ -11710,7 +11711,7 @@
           <a:p>
             <a:fld id="{48A87A34-81AB-432B-8DAE-1953F412C126}" type="datetimeFigureOut">
               <a:rPr lang="en-US" dirty="0"/>
-              <a:t>7/13/2021</a:t>
+              <a:t>7/19/2021</a:t>
             </a:fld>
             <a:endParaRPr lang="en-US" dirty="0"/>
           </a:p>
@@ -11937,7 +11938,7 @@
           <a:p>
             <a:fld id="{48A87A34-81AB-432B-8DAE-1953F412C126}" type="datetimeFigureOut">
               <a:rPr lang="en-US" dirty="0"/>
-              <a:t>7/13/2021</a:t>
+              <a:t>7/19/2021</a:t>
             </a:fld>
             <a:endParaRPr lang="en-US" dirty="0"/>
           </a:p>
@@ -12313,7 +12314,7 @@
           <a:p>
             <a:fld id="{48A87A34-81AB-432B-8DAE-1953F412C126}" type="datetimeFigureOut">
               <a:rPr lang="en-US" dirty="0"/>
-              <a:t>7/13/2021</a:t>
+              <a:t>7/19/2021</a:t>
             </a:fld>
             <a:endParaRPr lang="en-US" dirty="0"/>
           </a:p>
@@ -12426,7 +12427,7 @@
           <a:p>
             <a:fld id="{48A87A34-81AB-432B-8DAE-1953F412C126}" type="datetimeFigureOut">
               <a:rPr lang="en-US" dirty="0"/>
-              <a:t>7/13/2021</a:t>
+              <a:t>7/19/2021</a:t>
             </a:fld>
             <a:endParaRPr lang="en-US" dirty="0"/>
           </a:p>
@@ -12516,7 +12517,7 @@
           <a:p>
             <a:fld id="{48A87A34-81AB-432B-8DAE-1953F412C126}" type="datetimeFigureOut">
               <a:rPr lang="en-US" dirty="0"/>
-              <a:t>7/13/2021</a:t>
+              <a:t>7/19/2021</a:t>
             </a:fld>
             <a:endParaRPr lang="en-US" dirty="0"/>
           </a:p>
@@ -12760,7 +12761,7 @@
           <a:p>
             <a:fld id="{48A87A34-81AB-432B-8DAE-1953F412C126}" type="datetimeFigureOut">
               <a:rPr lang="en-US" dirty="0"/>
-              <a:t>7/13/2021</a:t>
+              <a:t>7/19/2021</a:t>
             </a:fld>
             <a:endParaRPr lang="en-US" dirty="0"/>
           </a:p>
@@ -13035,7 +13036,7 @@
           <a:p>
             <a:fld id="{48A87A34-81AB-432B-8DAE-1953F412C126}" type="datetimeFigureOut">
               <a:rPr lang="en-US" dirty="0"/>
-              <a:t>7/13/2021</a:t>
+              <a:t>7/19/2021</a:t>
             </a:fld>
             <a:endParaRPr lang="en-US" dirty="0"/>
           </a:p>
@@ -16098,7 +16099,7 @@
             <a:fld id="{48A87A34-81AB-432B-8DAE-1953F412C126}" type="datetimeFigureOut">
               <a:rPr lang="en-US" dirty="0"/>
               <a:pPr/>
-              <a:t>7/13/2021</a:t>
+              <a:t>7/19/2021</a:t>
             </a:fld>
             <a:endParaRPr lang="en-US" dirty="0"/>
           </a:p>
@@ -16733,7 +16734,7 @@
           <a:lstStyle/>
           <a:p>
             <a:r>
-              <a:rPr lang="en-US" sz="3700" dirty="0"/>
+              <a:rPr lang="en-US" sz="3700" b="1" dirty="0"/>
               <a:t>SARS-Cov-2 Spike Protein Analysis using second Vassiliev Measure</a:t>
             </a:r>
           </a:p>
@@ -16757,8 +16758,8 @@
         </p:nvSpPr>
         <p:spPr>
           <a:xfrm>
-            <a:off x="6597650" y="3767138"/>
-            <a:ext cx="4189412" cy="2278062"/>
+            <a:off x="6597649" y="3767138"/>
+            <a:ext cx="4481511" cy="1655762"/>
           </a:xfrm>
         </p:spPr>
         <p:txBody>
@@ -16767,12 +16768,48 @@
           </a:bodyPr>
           <a:lstStyle/>
           <a:p>
-            <a:endParaRPr lang="en-US" dirty="0"/>
+            <a:pPr>
+              <a:spcBef>
+                <a:spcPts val="0"/>
+              </a:spcBef>
+            </a:pPr>
+            <a:r>
+              <a:rPr lang="en-US" sz="2400" cap="none" dirty="0">
+                <a:solidFill>
+                  <a:schemeClr val="tx1"/>
+                </a:solidFill>
+              </a:rPr>
+              <a:t>UTC iCompBio REU 2021</a:t>
+            </a:r>
           </a:p>
           <a:p>
+            <a:pPr>
+              <a:spcBef>
+                <a:spcPts val="0"/>
+              </a:spcBef>
+            </a:pPr>
             <a:r>
-              <a:rPr lang="en-US" dirty="0"/>
-              <a:t>Subtitle</a:t>
+              <a:rPr lang="en-US" sz="2400" cap="none" dirty="0">
+                <a:solidFill>
+                  <a:schemeClr val="tx1"/>
+                </a:solidFill>
+              </a:rPr>
+              <a:t>Jason Middlebrook</a:t>
+            </a:r>
+          </a:p>
+          <a:p>
+            <a:pPr>
+              <a:spcBef>
+                <a:spcPts val="0"/>
+              </a:spcBef>
+            </a:pPr>
+            <a:r>
+              <a:rPr lang="en-US" sz="2400" cap="none" dirty="0">
+                <a:solidFill>
+                  <a:schemeClr val="tx1"/>
+                </a:solidFill>
+              </a:rPr>
+              <a:t>Professor Eleni Panagiotou</a:t>
             </a:r>
           </a:p>
         </p:txBody>
@@ -22850,6 +22887,100 @@
       </p:grpSpPr>
       <p:pic>
         <p:nvPicPr>
+          <p:cNvPr id="6" name="Content Placeholder 5" descr="Chart&#10;&#10;Description automatically generated">
+            <a:extLst>
+              <a:ext uri="{FF2B5EF4-FFF2-40B4-BE49-F238E27FC236}">
+                <a16:creationId xmlns:a16="http://schemas.microsoft.com/office/drawing/2014/main" id="{2D3C7CE3-12C1-492F-ADA7-FFFF25732F21}"/>
+              </a:ext>
+            </a:extLst>
+          </p:cNvPr>
+          <p:cNvPicPr>
+            <a:picLocks noGrp="1" noChangeAspect="1"/>
+          </p:cNvPicPr>
+          <p:nvPr>
+            <p:ph sz="half" idx="1"/>
+          </p:nvPr>
+        </p:nvPicPr>
+        <p:blipFill rotWithShape="1">
+          <a:blip r:embed="rId2"/>
+          <a:srcRect l="7162" r="7033"/>
+          <a:stretch/>
+        </p:blipFill>
+        <p:spPr>
+          <a:xfrm>
+            <a:off x="1814" y="0"/>
+            <a:ext cx="7685299" cy="6858000"/>
+          </a:xfrm>
+        </p:spPr>
+      </p:pic>
+      <p:sp>
+        <p:nvSpPr>
+          <p:cNvPr id="7" name="Title 1">
+            <a:extLst>
+              <a:ext uri="{FF2B5EF4-FFF2-40B4-BE49-F238E27FC236}">
+                <a16:creationId xmlns:a16="http://schemas.microsoft.com/office/drawing/2014/main" id="{922E2F90-C9D1-4C0C-9D1E-D8A08DD87DFF}"/>
+              </a:ext>
+            </a:extLst>
+          </p:cNvPr>
+          <p:cNvSpPr>
+            <a:spLocks noGrp="1"/>
+          </p:cNvSpPr>
+          <p:nvPr>
+            <p:ph type="title"/>
+          </p:nvPr>
+        </p:nvSpPr>
+        <p:spPr>
+          <a:xfrm>
+            <a:off x="7734300" y="1422400"/>
+            <a:ext cx="4138386" cy="3780971"/>
+          </a:xfrm>
+        </p:spPr>
+        <p:txBody>
+          <a:bodyPr>
+            <a:normAutofit/>
+          </a:bodyPr>
+          <a:lstStyle/>
+          <a:p>
+            <a:pPr algn="ctr"/>
+            <a:r>
+              <a:rPr lang="en-US" b="1" cap="none" dirty="0"/>
+              <a:t>Difference Distance Matrix (DDM) for the V2 values Of The Uncleaved Closed S Protein For SARS-CoV-2 (PDB: 6zge)</a:t>
+            </a:r>
+          </a:p>
+        </p:txBody>
+      </p:sp>
+    </p:spTree>
+    <p:extLst>
+      <p:ext uri="{BB962C8B-B14F-4D97-AF65-F5344CB8AC3E}">
+        <p14:creationId xmlns:p14="http://schemas.microsoft.com/office/powerpoint/2010/main" val="1859357173"/>
+      </p:ext>
+    </p:extLst>
+  </p:cSld>
+  <p:clrMapOvr>
+    <a:masterClrMapping/>
+  </p:clrMapOvr>
+</p:sld>
+</file>
+
+<file path=ppt/slides/slide12.xml><?xml version="1.0" encoding="utf-8"?>
+<p:sld xmlns:a="http://schemas.openxmlformats.org/drawingml/2006/main" xmlns:r="http://schemas.openxmlformats.org/officeDocument/2006/relationships" xmlns:p="http://schemas.openxmlformats.org/presentationml/2006/main">
+  <p:cSld>
+    <p:spTree>
+      <p:nvGrpSpPr>
+        <p:cNvPr id="1" name=""/>
+        <p:cNvGrpSpPr/>
+        <p:nvPr/>
+      </p:nvGrpSpPr>
+      <p:grpSpPr>
+        <a:xfrm>
+          <a:off x="0" y="0"/>
+          <a:ext cx="0" cy="0"/>
+          <a:chOff x="0" y="0"/>
+          <a:chExt cx="0" cy="0"/>
+        </a:xfrm>
+      </p:grpSpPr>
+      <p:pic>
+        <p:nvPicPr>
           <p:cNvPr id="9" name="Picture Placeholder 8" descr="Close-up of circuit board">
             <a:extLst>
               <a:ext uri="{FF2B5EF4-FFF2-40B4-BE49-F238E27FC236}">
@@ -22929,8 +23060,8 @@
         </p:nvSpPr>
         <p:spPr>
           <a:xfrm>
-            <a:off x="6095999" y="2315520"/>
-            <a:ext cx="4611758" cy="1691216"/>
+            <a:off x="6095998" y="2315520"/>
+            <a:ext cx="4800601" cy="1691216"/>
           </a:xfrm>
         </p:spPr>
         <p:txBody>
@@ -22948,7 +23079,7 @@
                   </a:extLst>
                 </a:hlinkClick>
               </a:rPr>
-              <a:t>https://github.com/jmidrichards/iCompBio-Summer2021</a:t>
+              <a:t>https://github.com/MiddlebrookJF/iCompBio-Summer2021</a:t>
             </a:r>
             <a:endParaRPr lang="en-US" dirty="0"/>
           </a:p>
@@ -22964,7 +23095,7 @@
                   </a:extLst>
                 </a:hlinkClick>
               </a:rPr>
-              <a:t>jmidrichards@gmail.com</a:t>
+              <a:t>MiddlebrookJF@gmail.com</a:t>
             </a:r>
             <a:endParaRPr lang="en-US" dirty="0"/>
           </a:p>
@@ -22985,7 +23116,7 @@
         <p:spPr>
           <a:xfrm>
             <a:off x="348670" y="409698"/>
-            <a:ext cx="4921135" cy="2000548"/>
+            <a:ext cx="4921135" cy="2416046"/>
           </a:xfrm>
           <a:prstGeom prst="rect">
             <a:avLst/>
@@ -22998,11 +23129,16 @@
           </a:bodyPr>
           <a:lstStyle/>
           <a:p>
+            <a:pPr>
+              <a:spcAft>
+                <a:spcPts val="600"/>
+              </a:spcAft>
+            </a:pPr>
             <a:r>
-              <a:rPr lang="en-US" sz="2400" b="1" dirty="0"/>
+              <a:rPr lang="en-US" sz="2800" b="1" dirty="0"/>
               <a:t>References:</a:t>
             </a:r>
-            <a:endParaRPr lang="en-US" sz="600" b="1" dirty="0"/>
+            <a:endParaRPr lang="en-US" sz="700" b="1" dirty="0"/>
           </a:p>
           <a:p>
             <a:pPr marL="342900" indent="-342900">
@@ -23013,16 +23149,39 @@
             </a:pPr>
             <a:r>
               <a:rPr lang="en-US" dirty="0"/>
-              <a:t>Xia X. Domains and Functions of Spike Protein in Sars-Cov-2 in the Context of Vaccine Design. Viruses. 2021 Jan 14;13(1):109. </a:t>
+              <a:t>Hu, B., Guo, H., Zhou, P. </a:t>
             </a:r>
             <a:r>
-              <a:rPr lang="en-US" dirty="0" err="1"/>
-              <a:t>doi</a:t>
+              <a:rPr lang="en-US" i="1" dirty="0"/>
+              <a:t>et al.</a:t>
             </a:r>
             <a:r>
               <a:rPr lang="en-US" dirty="0"/>
-              <a:t>: 10.3390/v13010109.</a:t>
+              <a:t> Characteristics of SARS-CoV-2 and COVID-19. </a:t>
             </a:r>
+            <a:r>
+              <a:rPr lang="en-US" i="1" dirty="0"/>
+              <a:t>Nat Rev Microbiol</a:t>
+            </a:r>
+            <a:r>
+              <a:rPr lang="en-US" dirty="0"/>
+              <a:t> </a:t>
+            </a:r>
+            <a:r>
+              <a:rPr lang="en-US" b="1" dirty="0"/>
+              <a:t>19, </a:t>
+            </a:r>
+            <a:r>
+              <a:rPr lang="en-US" dirty="0"/>
+              <a:t>141–154 (2021). </a:t>
+            </a:r>
+            <a:r>
+              <a:rPr lang="en-US" dirty="0">
+                <a:hlinkClick r:id="rId5"/>
+              </a:rPr>
+              <a:t>https://doi.org/10.1038/s41579-020-00459-7</a:t>
+            </a:r>
+            <a:endParaRPr lang="en-US" dirty="0"/>
           </a:p>
           <a:p>
             <a:pPr marL="342900" indent="-342900">
@@ -23031,10 +23190,7 @@
               </a:spcBef>
               <a:buAutoNum type="arabicPeriod"/>
             </a:pPr>
-            <a:r>
-              <a:rPr lang="en-US" dirty="0"/>
-              <a:t>Other references here</a:t>
-            </a:r>
+            <a:endParaRPr lang="en-US" dirty="0"/>
           </a:p>
         </p:txBody>
       </p:sp>
@@ -23553,9 +23709,9 @@
             <p:ph idx="1"/>
           </p:nvPr>
         </p:nvPicPr>
-        <p:blipFill>
+        <p:blipFill rotWithShape="1">
           <a:blip r:embed="rId2"/>
-          <a:srcRect/>
+          <a:srcRect t="4160" b="4264"/>
           <a:stretch/>
         </p:blipFill>
         <p:spPr>
@@ -23593,8 +23749,8 @@
         </p:nvSpPr>
         <p:spPr>
           <a:xfrm>
-            <a:off x="7489768" y="5853516"/>
-            <a:ext cx="3865418" cy="369332"/>
+            <a:off x="9017000" y="5853516"/>
+            <a:ext cx="2425700" cy="400110"/>
           </a:xfrm>
           <a:prstGeom prst="rect">
             <a:avLst/>
@@ -23609,7 +23765,15 @@
           <a:p>
             <a:r>
               <a:rPr lang="en-US" dirty="0"/>
-              <a:t>Source: [1], graph truncated for space</a:t>
+              <a:t>Source: [1], </a:t>
+            </a:r>
+            <a:r>
+              <a:rPr lang="en-US" sz="2000" dirty="0"/>
+              <a:t>figure</a:t>
+            </a:r>
+            <a:r>
+              <a:rPr lang="en-US" dirty="0"/>
+              <a:t> 3a</a:t>
             </a:r>
           </a:p>
         </p:txBody>

</xml_diff>